<commit_message>
Add Slide on shuffle
</commit_message>
<xml_diff>
--- a/module4/td2/td2-spark-dataframe.pptx
+++ b/module4/td2/td2-spark-dataframe.pptx
@@ -5,18 +5,20 @@
     <p:sldMasterId id="2147483648" r:id="rId1"/>
   </p:sldMasterIdLst>
   <p:sldIdLst>
-    <p:sldId id="270" r:id="rId2"/>
-    <p:sldId id="274" r:id="rId3"/>
-    <p:sldId id="264" r:id="rId4"/>
-    <p:sldId id="263" r:id="rId5"/>
-    <p:sldId id="266" r:id="rId6"/>
-    <p:sldId id="265" r:id="rId7"/>
-    <p:sldId id="271" r:id="rId8"/>
-    <p:sldId id="272" r:id="rId9"/>
-    <p:sldId id="273" r:id="rId10"/>
-    <p:sldId id="275" r:id="rId11"/>
-    <p:sldId id="276" r:id="rId12"/>
-    <p:sldId id="262" r:id="rId13"/>
+    <p:sldId id="256" r:id="rId2"/>
+    <p:sldId id="277" r:id="rId3"/>
+    <p:sldId id="270" r:id="rId4"/>
+    <p:sldId id="274" r:id="rId5"/>
+    <p:sldId id="264" r:id="rId6"/>
+    <p:sldId id="263" r:id="rId7"/>
+    <p:sldId id="266" r:id="rId8"/>
+    <p:sldId id="265" r:id="rId9"/>
+    <p:sldId id="271" r:id="rId10"/>
+    <p:sldId id="272" r:id="rId11"/>
+    <p:sldId id="273" r:id="rId12"/>
+    <p:sldId id="275" r:id="rId13"/>
+    <p:sldId id="276" r:id="rId14"/>
+    <p:sldId id="262" r:id="rId15"/>
   </p:sldIdLst>
   <p:sldSz cx="12192000" cy="6858000"/>
   <p:notesSz cx="6858000" cy="9144000"/>
@@ -278,7 +280,7 @@
           <a:p>
             <a:fld id="{97D5A493-CCC9-418E-861C-802A9D3B9980}" type="datetimeFigureOut">
               <a:rPr lang="en-US" smtClean="0"/>
-              <a:t>11/6/20</a:t>
+              <a:t>1/25/2022</a:t>
             </a:fld>
             <a:endParaRPr lang="en-US"/>
           </a:p>
@@ -332,7 +334,7 @@
           <a:p>
             <a:fld id="{EAF0293D-07D2-48DC-BE8F-8E4761C07219}" type="slidenum">
               <a:rPr lang="en-US" smtClean="0"/>
-              <a:t>‹#›</a:t>
+              <a:t>‹N°›</a:t>
             </a:fld>
             <a:endParaRPr lang="en-US"/>
           </a:p>
@@ -476,7 +478,7 @@
           <a:p>
             <a:fld id="{97D5A493-CCC9-418E-861C-802A9D3B9980}" type="datetimeFigureOut">
               <a:rPr lang="en-US" smtClean="0"/>
-              <a:t>11/6/20</a:t>
+              <a:t>1/25/2022</a:t>
             </a:fld>
             <a:endParaRPr lang="en-US"/>
           </a:p>
@@ -530,7 +532,7 @@
           <a:p>
             <a:fld id="{EAF0293D-07D2-48DC-BE8F-8E4761C07219}" type="slidenum">
               <a:rPr lang="en-US" smtClean="0"/>
-              <a:t>‹#›</a:t>
+              <a:t>‹N°›</a:t>
             </a:fld>
             <a:endParaRPr lang="en-US"/>
           </a:p>
@@ -684,7 +686,7 @@
           <a:p>
             <a:fld id="{97D5A493-CCC9-418E-861C-802A9D3B9980}" type="datetimeFigureOut">
               <a:rPr lang="en-US" smtClean="0"/>
-              <a:t>11/6/20</a:t>
+              <a:t>1/25/2022</a:t>
             </a:fld>
             <a:endParaRPr lang="en-US"/>
           </a:p>
@@ -738,7 +740,7 @@
           <a:p>
             <a:fld id="{EAF0293D-07D2-48DC-BE8F-8E4761C07219}" type="slidenum">
               <a:rPr lang="en-US" smtClean="0"/>
-              <a:t>‹#›</a:t>
+              <a:t>‹N°›</a:t>
             </a:fld>
             <a:endParaRPr lang="en-US"/>
           </a:p>
@@ -882,7 +884,7 @@
           <a:p>
             <a:fld id="{97D5A493-CCC9-418E-861C-802A9D3B9980}" type="datetimeFigureOut">
               <a:rPr lang="en-US" smtClean="0"/>
-              <a:t>11/6/20</a:t>
+              <a:t>1/25/2022</a:t>
             </a:fld>
             <a:endParaRPr lang="en-US"/>
           </a:p>
@@ -936,7 +938,7 @@
           <a:p>
             <a:fld id="{EAF0293D-07D2-48DC-BE8F-8E4761C07219}" type="slidenum">
               <a:rPr lang="en-US" smtClean="0"/>
-              <a:t>‹#›</a:t>
+              <a:t>‹N°›</a:t>
             </a:fld>
             <a:endParaRPr lang="en-US"/>
           </a:p>
@@ -1157,7 +1159,7 @@
           <a:p>
             <a:fld id="{97D5A493-CCC9-418E-861C-802A9D3B9980}" type="datetimeFigureOut">
               <a:rPr lang="en-US" smtClean="0"/>
-              <a:t>11/6/20</a:t>
+              <a:t>1/25/2022</a:t>
             </a:fld>
             <a:endParaRPr lang="en-US"/>
           </a:p>
@@ -1211,7 +1213,7 @@
           <a:p>
             <a:fld id="{EAF0293D-07D2-48DC-BE8F-8E4761C07219}" type="slidenum">
               <a:rPr lang="en-US" smtClean="0"/>
-              <a:t>‹#›</a:t>
+              <a:t>‹N°›</a:t>
             </a:fld>
             <a:endParaRPr lang="en-US"/>
           </a:p>
@@ -1422,7 +1424,7 @@
           <a:p>
             <a:fld id="{97D5A493-CCC9-418E-861C-802A9D3B9980}" type="datetimeFigureOut">
               <a:rPr lang="en-US" smtClean="0"/>
-              <a:t>11/6/20</a:t>
+              <a:t>1/25/2022</a:t>
             </a:fld>
             <a:endParaRPr lang="en-US"/>
           </a:p>
@@ -1476,7 +1478,7 @@
           <a:p>
             <a:fld id="{EAF0293D-07D2-48DC-BE8F-8E4761C07219}" type="slidenum">
               <a:rPr lang="en-US" smtClean="0"/>
-              <a:t>‹#›</a:t>
+              <a:t>‹N°›</a:t>
             </a:fld>
             <a:endParaRPr lang="en-US"/>
           </a:p>
@@ -1834,7 +1836,7 @@
           <a:p>
             <a:fld id="{97D5A493-CCC9-418E-861C-802A9D3B9980}" type="datetimeFigureOut">
               <a:rPr lang="en-US" smtClean="0"/>
-              <a:t>11/6/20</a:t>
+              <a:t>1/25/2022</a:t>
             </a:fld>
             <a:endParaRPr lang="en-US"/>
           </a:p>
@@ -1888,7 +1890,7 @@
           <a:p>
             <a:fld id="{EAF0293D-07D2-48DC-BE8F-8E4761C07219}" type="slidenum">
               <a:rPr lang="en-US" smtClean="0"/>
-              <a:t>‹#›</a:t>
+              <a:t>‹N°›</a:t>
             </a:fld>
             <a:endParaRPr lang="en-US"/>
           </a:p>
@@ -1975,7 +1977,7 @@
           <a:p>
             <a:fld id="{97D5A493-CCC9-418E-861C-802A9D3B9980}" type="datetimeFigureOut">
               <a:rPr lang="en-US" smtClean="0"/>
-              <a:t>11/6/20</a:t>
+              <a:t>1/25/2022</a:t>
             </a:fld>
             <a:endParaRPr lang="en-US"/>
           </a:p>
@@ -2029,7 +2031,7 @@
           <a:p>
             <a:fld id="{EAF0293D-07D2-48DC-BE8F-8E4761C07219}" type="slidenum">
               <a:rPr lang="en-US" smtClean="0"/>
-              <a:t>‹#›</a:t>
+              <a:t>‹N°›</a:t>
             </a:fld>
             <a:endParaRPr lang="en-US"/>
           </a:p>
@@ -2088,7 +2090,7 @@
           <a:p>
             <a:fld id="{97D5A493-CCC9-418E-861C-802A9D3B9980}" type="datetimeFigureOut">
               <a:rPr lang="en-US" smtClean="0"/>
-              <a:t>11/6/20</a:t>
+              <a:t>1/25/2022</a:t>
             </a:fld>
             <a:endParaRPr lang="en-US"/>
           </a:p>
@@ -2142,7 +2144,7 @@
           <a:p>
             <a:fld id="{EAF0293D-07D2-48DC-BE8F-8E4761C07219}" type="slidenum">
               <a:rPr lang="en-US" smtClean="0"/>
-              <a:t>‹#›</a:t>
+              <a:t>‹N°›</a:t>
             </a:fld>
             <a:endParaRPr lang="en-US"/>
           </a:p>
@@ -2399,7 +2401,7 @@
           <a:p>
             <a:fld id="{97D5A493-CCC9-418E-861C-802A9D3B9980}" type="datetimeFigureOut">
               <a:rPr lang="en-US" smtClean="0"/>
-              <a:t>11/6/20</a:t>
+              <a:t>1/25/2022</a:t>
             </a:fld>
             <a:endParaRPr lang="en-US"/>
           </a:p>
@@ -2453,7 +2455,7 @@
           <a:p>
             <a:fld id="{EAF0293D-07D2-48DC-BE8F-8E4761C07219}" type="slidenum">
               <a:rPr lang="en-US" smtClean="0"/>
-              <a:t>‹#›</a:t>
+              <a:t>‹N°›</a:t>
             </a:fld>
             <a:endParaRPr lang="en-US"/>
           </a:p>
@@ -2687,7 +2689,7 @@
           <a:p>
             <a:fld id="{97D5A493-CCC9-418E-861C-802A9D3B9980}" type="datetimeFigureOut">
               <a:rPr lang="en-US" smtClean="0"/>
-              <a:t>11/6/20</a:t>
+              <a:t>1/25/2022</a:t>
             </a:fld>
             <a:endParaRPr lang="en-US"/>
           </a:p>
@@ -2741,7 +2743,7 @@
           <a:p>
             <a:fld id="{EAF0293D-07D2-48DC-BE8F-8E4761C07219}" type="slidenum">
               <a:rPr lang="en-US" smtClean="0"/>
-              <a:t>‹#›</a:t>
+              <a:t>‹N°›</a:t>
             </a:fld>
             <a:endParaRPr lang="en-US"/>
           </a:p>
@@ -2928,7 +2930,7 @@
           <a:p>
             <a:fld id="{97D5A493-CCC9-418E-861C-802A9D3B9980}" type="datetimeFigureOut">
               <a:rPr lang="en-US" smtClean="0"/>
-              <a:t>11/6/20</a:t>
+              <a:t>1/25/2022</a:t>
             </a:fld>
             <a:endParaRPr lang="en-US"/>
           </a:p>
@@ -3018,7 +3020,7 @@
           <a:p>
             <a:fld id="{EAF0293D-07D2-48DC-BE8F-8E4761C07219}" type="slidenum">
               <a:rPr lang="en-US" smtClean="0"/>
-              <a:t>‹#›</a:t>
+              <a:t>‹N°›</a:t>
             </a:fld>
             <a:endParaRPr lang="en-US"/>
           </a:p>
@@ -3347,330 +3349,65 @@
       </p:grpSpPr>
       <p:sp>
         <p:nvSpPr>
-          <p:cNvPr id="2" name="Title 1">
-            <a:extLst>
-              <a:ext uri="{FF2B5EF4-FFF2-40B4-BE49-F238E27FC236}">
-                <a16:creationId xmlns:a16="http://schemas.microsoft.com/office/drawing/2014/main" id="{1EF77BFB-B82D-46E7-9ED3-A723BCC0A39C}"/>
-              </a:ext>
-            </a:extLst>
-          </p:cNvPr>
-          <p:cNvSpPr>
+          <p:cNvPr id="2" name="object 2"/>
+          <p:cNvSpPr txBox="1">
             <a:spLocks noGrp="1"/>
           </p:cNvSpPr>
           <p:nvPr>
             <p:ph type="title"/>
           </p:nvPr>
         </p:nvSpPr>
-        <p:spPr/>
+        <p:spPr>
+          <a:xfrm>
+            <a:off x="2271493" y="2592883"/>
+            <a:ext cx="7575491" cy="1672740"/>
+          </a:xfrm>
+          <a:prstGeom prst="rect">
+            <a:avLst/>
+          </a:prstGeom>
+        </p:spPr>
         <p:txBody>
-          <a:bodyPr/>
+          <a:bodyPr vert="horz" wrap="square" lIns="0" tIns="13310" rIns="0" bIns="0" rtlCol="0" anchor="ctr">
+            <a:spAutoFit/>
+          </a:bodyPr>
           <a:lstStyle/>
           <a:p>
-            <a:r>
-              <a:rPr lang="fr-FR" err="1"/>
-              <a:t>DataFrame</a:t>
-            </a:r>
-            <a:r>
-              <a:rPr lang="fr-FR"/>
-              <a:t> vs RDD</a:t>
-            </a:r>
-            <a:endParaRPr lang="en-US"/>
+            <a:pPr marL="12677" algn="ctr">
+              <a:lnSpc>
+                <a:spcPct val="100000"/>
+              </a:lnSpc>
+              <a:spcBef>
+                <a:spcPts val="105"/>
+              </a:spcBef>
+            </a:pPr>
+            <a:r>
+              <a:rPr lang="en-US" sz="3594" b="1" spc="-5" dirty="0">
+                <a:latin typeface="Verdana"/>
+                <a:cs typeface="Verdana"/>
+              </a:rPr>
+              <a:t>Systems, paradigms and algorithms for Big Data</a:t>
+            </a:r>
+            <a:br>
+              <a:rPr lang="en-US" sz="3594" b="1" spc="-5" dirty="0">
+                <a:latin typeface="Verdana"/>
+                <a:cs typeface="Verdana"/>
+              </a:rPr>
+            </a:br>
+            <a:r>
+              <a:rPr lang="en-US" sz="3594" b="1" spc="-5" dirty="0">
+                <a:latin typeface="Verdana"/>
+                <a:cs typeface="Verdana"/>
+              </a:rPr>
+              <a:t>TD 2</a:t>
+            </a:r>
+            <a:endParaRPr sz="3594" dirty="0">
+              <a:latin typeface="Verdana"/>
+              <a:cs typeface="Verdana"/>
+            </a:endParaRPr>
           </a:p>
         </p:txBody>
       </p:sp>
-      <p:graphicFrame>
-        <p:nvGraphicFramePr>
-          <p:cNvPr id="3" name="Table 3">
-            <a:extLst>
-              <a:ext uri="{FF2B5EF4-FFF2-40B4-BE49-F238E27FC236}">
-                <a16:creationId xmlns:a16="http://schemas.microsoft.com/office/drawing/2014/main" id="{8AC5CF6B-3A9E-4753-8D79-A19BA46BDB37}"/>
-              </a:ext>
-            </a:extLst>
-          </p:cNvPr>
-          <p:cNvGraphicFramePr>
-            <a:graphicFrameLocks noGrp="1"/>
-          </p:cNvGraphicFramePr>
-          <p:nvPr>
-            <p:extLst>
-              <p:ext uri="{D42A27DB-BD31-4B8C-83A1-F6EECF244321}">
-                <p14:modId xmlns:p14="http://schemas.microsoft.com/office/powerpoint/2010/main" val="3240734895"/>
-              </p:ext>
-            </p:extLst>
-          </p:nvPr>
-        </p:nvGraphicFramePr>
-        <p:xfrm>
-          <a:off x="1758877" y="1980479"/>
-          <a:ext cx="8168638" cy="3187021"/>
-        </p:xfrm>
-        <a:graphic>
-          <a:graphicData uri="http://schemas.openxmlformats.org/drawingml/2006/table">
-            <a:tbl>
-              <a:tblPr firstRow="1" bandRow="1">
-                <a:tableStyleId>{5C22544A-7EE6-4342-B048-85BDC9FD1C3A}</a:tableStyleId>
-              </a:tblPr>
-              <a:tblGrid>
-                <a:gridCol w="1948295">
-                  <a:extLst>
-                    <a:ext uri="{9D8B030D-6E8A-4147-A177-3AD203B41FA5}">
-                      <a16:colId xmlns:a16="http://schemas.microsoft.com/office/drawing/2014/main" val="2054145470"/>
-                    </a:ext>
-                  </a:extLst>
-                </a:gridCol>
-                <a:gridCol w="3497464">
-                  <a:extLst>
-                    <a:ext uri="{9D8B030D-6E8A-4147-A177-3AD203B41FA5}">
-                      <a16:colId xmlns:a16="http://schemas.microsoft.com/office/drawing/2014/main" val="663163494"/>
-                    </a:ext>
-                  </a:extLst>
-                </a:gridCol>
-                <a:gridCol w="2722879">
-                  <a:extLst>
-                    <a:ext uri="{9D8B030D-6E8A-4147-A177-3AD203B41FA5}">
-                      <a16:colId xmlns:a16="http://schemas.microsoft.com/office/drawing/2014/main" val="1763996286"/>
-                    </a:ext>
-                  </a:extLst>
-                </a:gridCol>
-              </a:tblGrid>
-              <a:tr h="626701">
-                <a:tc>
-                  <a:txBody>
-                    <a:bodyPr/>
-                    <a:lstStyle/>
-                    <a:p>
-                      <a:r>
-                        <a:rPr lang="en-US"/>
-                        <a:t>Feature</a:t>
-                      </a:r>
-                    </a:p>
-                  </a:txBody>
-                  <a:tcPr/>
-                </a:tc>
-                <a:tc>
-                  <a:txBody>
-                    <a:bodyPr/>
-                    <a:lstStyle/>
-                    <a:p>
-                      <a:r>
-                        <a:rPr lang="en-US" err="1"/>
-                        <a:t>DataFrame</a:t>
-                      </a:r>
-                    </a:p>
-                  </a:txBody>
-                  <a:tcPr/>
-                </a:tc>
-                <a:tc>
-                  <a:txBody>
-                    <a:bodyPr/>
-                    <a:lstStyle/>
-                    <a:p>
-                      <a:r>
-                        <a:rPr lang="en-US"/>
-                        <a:t>RDD</a:t>
-                      </a:r>
-                    </a:p>
-                  </a:txBody>
-                  <a:tcPr/>
-                </a:tc>
-                <a:extLst>
-                  <a:ext uri="{0D108BD9-81ED-4DB2-BD59-A6C34878D82A}">
-                    <a16:rowId xmlns:a16="http://schemas.microsoft.com/office/drawing/2014/main" val="573614090"/>
-                  </a:ext>
-                </a:extLst>
-              </a:tr>
-              <a:tr h="626701">
-                <a:tc>
-                  <a:txBody>
-                    <a:bodyPr/>
-                    <a:lstStyle/>
-                    <a:p>
-                      <a:r>
-                        <a:rPr lang="en-US"/>
-                        <a:t>Data Format</a:t>
-                      </a:r>
-                    </a:p>
-                  </a:txBody>
-                  <a:tcPr/>
-                </a:tc>
-                <a:tc>
-                  <a:txBody>
-                    <a:bodyPr/>
-                    <a:lstStyle/>
-                    <a:p>
-                      <a:r>
-                        <a:rPr lang="en-US"/>
-                        <a:t>Structured, organized in columns</a:t>
-                      </a:r>
-                    </a:p>
-                  </a:txBody>
-                  <a:tcPr/>
-                </a:tc>
-                <a:tc>
-                  <a:txBody>
-                    <a:bodyPr/>
-                    <a:lstStyle/>
-                    <a:p>
-                      <a:r>
-                        <a:rPr lang="en-US"/>
-                        <a:t>Anything, but schema to be passed to spark.</a:t>
-                      </a:r>
-                    </a:p>
-                  </a:txBody>
-                  <a:tcPr/>
-                </a:tc>
-                <a:extLst>
-                  <a:ext uri="{0D108BD9-81ED-4DB2-BD59-A6C34878D82A}">
-                    <a16:rowId xmlns:a16="http://schemas.microsoft.com/office/drawing/2014/main" val="435315506"/>
-                  </a:ext>
-                </a:extLst>
-              </a:tr>
-              <a:tr h="626701">
-                <a:tc>
-                  <a:txBody>
-                    <a:bodyPr/>
-                    <a:lstStyle/>
-                    <a:p>
-                      <a:r>
-                        <a:rPr lang="en-US"/>
-                        <a:t>Compile-time safety</a:t>
-                      </a:r>
-                    </a:p>
-                  </a:txBody>
-                  <a:tcPr/>
-                </a:tc>
-                <a:tc>
-                  <a:txBody>
-                    <a:bodyPr/>
-                    <a:lstStyle/>
-                    <a:p>
-                      <a:r>
-                        <a:rPr lang="en-US"/>
-                        <a:t>No</a:t>
-                      </a:r>
-                    </a:p>
-                  </a:txBody>
-                  <a:tcPr/>
-                </a:tc>
-                <a:tc>
-                  <a:txBody>
-                    <a:bodyPr/>
-                    <a:lstStyle/>
-                    <a:p>
-                      <a:r>
-                        <a:rPr lang="en-US"/>
-                        <a:t>Yes</a:t>
-                      </a:r>
-                    </a:p>
-                  </a:txBody>
-                  <a:tcPr/>
-                </a:tc>
-                <a:extLst>
-                  <a:ext uri="{0D108BD9-81ED-4DB2-BD59-A6C34878D82A}">
-                    <a16:rowId xmlns:a16="http://schemas.microsoft.com/office/drawing/2014/main" val="2691982164"/>
-                  </a:ext>
-                </a:extLst>
-              </a:tr>
-              <a:tr h="626701">
-                <a:tc>
-                  <a:txBody>
-                    <a:bodyPr/>
-                    <a:lstStyle/>
-                    <a:p>
-                      <a:r>
-                        <a:rPr lang="en-US"/>
-                        <a:t>API</a:t>
-                      </a:r>
-                    </a:p>
-                  </a:txBody>
-                  <a:tcPr/>
-                </a:tc>
-                <a:tc>
-                  <a:txBody>
-                    <a:bodyPr/>
-                    <a:lstStyle/>
-                    <a:p>
-                      <a:r>
-                        <a:rPr lang="en-US"/>
-                        <a:t>High Level, spark take care of optimizations for you</a:t>
-                      </a:r>
-                    </a:p>
-                  </a:txBody>
-                  <a:tcPr/>
-                </a:tc>
-                <a:tc>
-                  <a:txBody>
-                    <a:bodyPr/>
-                    <a:lstStyle/>
-                    <a:p>
-                      <a:r>
-                        <a:rPr lang="en-US"/>
-                        <a:t>Low Level</a:t>
-                      </a:r>
-                    </a:p>
-                  </a:txBody>
-                  <a:tcPr/>
-                </a:tc>
-                <a:extLst>
-                  <a:ext uri="{0D108BD9-81ED-4DB2-BD59-A6C34878D82A}">
-                    <a16:rowId xmlns:a16="http://schemas.microsoft.com/office/drawing/2014/main" val="1165791648"/>
-                  </a:ext>
-                </a:extLst>
-              </a:tr>
-              <a:tr h="626701">
-                <a:tc>
-                  <a:txBody>
-                    <a:bodyPr/>
-                    <a:lstStyle/>
-                    <a:p>
-                      <a:r>
-                        <a:rPr lang="en-US"/>
-                        <a:t>Memory Management</a:t>
-                      </a:r>
-                    </a:p>
-                  </a:txBody>
-                  <a:tcPr/>
-                </a:tc>
-                <a:tc>
-                  <a:txBody>
-                    <a:bodyPr/>
-                    <a:lstStyle/>
-                    <a:p>
-                      <a:r>
-                        <a:rPr lang="en-US"/>
-                        <a:t>Off-heap (because spark knows the schema it is working with)</a:t>
-                      </a:r>
-                    </a:p>
-                  </a:txBody>
-                  <a:tcPr/>
-                </a:tc>
-                <a:tc>
-                  <a:txBody>
-                    <a:bodyPr/>
-                    <a:lstStyle/>
-                    <a:p>
-                      <a:r>
-                        <a:rPr lang="en-US"/>
-                        <a:t>Heap (implies serialization, garbage collection)</a:t>
-                      </a:r>
-                    </a:p>
-                  </a:txBody>
-                  <a:tcPr/>
-                </a:tc>
-                <a:extLst>
-                  <a:ext uri="{0D108BD9-81ED-4DB2-BD59-A6C34878D82A}">
-                    <a16:rowId xmlns:a16="http://schemas.microsoft.com/office/drawing/2014/main" val="2232703497"/>
-                  </a:ext>
-                </a:extLst>
-              </a:tr>
-            </a:tbl>
-          </a:graphicData>
-        </a:graphic>
-      </p:graphicFrame>
     </p:spTree>
-    <p:extLst>
-      <p:ext uri="{BB962C8B-B14F-4D97-AF65-F5344CB8AC3E}">
-        <p14:creationId xmlns:p14="http://schemas.microsoft.com/office/powerpoint/2010/main" val="2929757071"/>
-      </p:ext>
-    </p:extLst>
   </p:cSld>
   <p:clrMapOvr>
     <a:masterClrMapping/>
@@ -3718,6 +3455,819 @@
           <a:p>
             <a:r>
               <a:rPr lang="fr-FR"/>
+              <a:t>Appendix - </a:t>
+            </a:r>
+            <a:r>
+              <a:rPr lang="fr-FR" err="1"/>
+              <a:t>Explaining</a:t>
+            </a:r>
+            <a:r>
+              <a:rPr lang="fr-FR"/>
+              <a:t> </a:t>
+            </a:r>
+            <a:r>
+              <a:rPr lang="fr-FR" err="1"/>
+              <a:t>Explain</a:t>
+            </a:r>
+            <a:endParaRPr lang="en-US"/>
+          </a:p>
+        </p:txBody>
+      </p:sp>
+      <p:graphicFrame>
+        <p:nvGraphicFramePr>
+          <p:cNvPr id="6" name="Tableau 6">
+            <a:extLst>
+              <a:ext uri="{FF2B5EF4-FFF2-40B4-BE49-F238E27FC236}">
+                <a16:creationId xmlns:a16="http://schemas.microsoft.com/office/drawing/2014/main" id="{AF1C0C6C-8325-4157-A90A-6A1E1FB23A2D}"/>
+              </a:ext>
+            </a:extLst>
+          </p:cNvPr>
+          <p:cNvGraphicFramePr>
+            <a:graphicFrameLocks noGrp="1"/>
+          </p:cNvGraphicFramePr>
+          <p:nvPr>
+            <p:extLst>
+              <p:ext uri="{D42A27DB-BD31-4B8C-83A1-F6EECF244321}">
+                <p14:modId xmlns:p14="http://schemas.microsoft.com/office/powerpoint/2010/main" val="1791102191"/>
+              </p:ext>
+            </p:extLst>
+          </p:nvPr>
+        </p:nvGraphicFramePr>
+        <p:xfrm>
+          <a:off x="2187783" y="1885834"/>
+          <a:ext cx="7528893" cy="3769360"/>
+        </p:xfrm>
+        <a:graphic>
+          <a:graphicData uri="http://schemas.openxmlformats.org/drawingml/2006/table">
+            <a:tbl>
+              <a:tblPr firstRow="1" bandRow="1">
+                <a:tableStyleId>{5C22544A-7EE6-4342-B048-85BDC9FD1C3A}</a:tableStyleId>
+              </a:tblPr>
+              <a:tblGrid>
+                <a:gridCol w="3167253">
+                  <a:extLst>
+                    <a:ext uri="{9D8B030D-6E8A-4147-A177-3AD203B41FA5}">
+                      <a16:colId xmlns:a16="http://schemas.microsoft.com/office/drawing/2014/main" val="3427962586"/>
+                    </a:ext>
+                  </a:extLst>
+                </a:gridCol>
+                <a:gridCol w="4361640">
+                  <a:extLst>
+                    <a:ext uri="{9D8B030D-6E8A-4147-A177-3AD203B41FA5}">
+                      <a16:colId xmlns:a16="http://schemas.microsoft.com/office/drawing/2014/main" val="3365148309"/>
+                    </a:ext>
+                  </a:extLst>
+                </a:gridCol>
+              </a:tblGrid>
+              <a:tr h="0">
+                <a:tc>
+                  <a:txBody>
+                    <a:bodyPr/>
+                    <a:lstStyle/>
+                    <a:p>
+                      <a:r>
+                        <a:rPr lang="fr-FR"/>
+                        <a:t>Keyword</a:t>
+                      </a:r>
+                    </a:p>
+                  </a:txBody>
+                  <a:tcPr/>
+                </a:tc>
+                <a:tc>
+                  <a:txBody>
+                    <a:bodyPr/>
+                    <a:lstStyle/>
+                    <a:p>
+                      <a:r>
+                        <a:rPr lang="fr-FR" err="1"/>
+                        <a:t>Meaning</a:t>
+                      </a:r>
+                      <a:endParaRPr lang="fr-FR"/>
+                    </a:p>
+                  </a:txBody>
+                  <a:tcPr/>
+                </a:tc>
+                <a:extLst>
+                  <a:ext uri="{0D108BD9-81ED-4DB2-BD59-A6C34878D82A}">
+                    <a16:rowId xmlns:a16="http://schemas.microsoft.com/office/drawing/2014/main" val="3464255511"/>
+                  </a:ext>
+                </a:extLst>
+              </a:tr>
+              <a:tr h="370840">
+                <a:tc>
+                  <a:txBody>
+                    <a:bodyPr/>
+                    <a:lstStyle/>
+                    <a:p>
+                      <a:r>
+                        <a:rPr lang="fr-FR" err="1"/>
+                        <a:t>FileScan</a:t>
+                      </a:r>
+                      <a:endParaRPr lang="fr-FR"/>
+                    </a:p>
+                  </a:txBody>
+                  <a:tcPr/>
+                </a:tc>
+                <a:tc>
+                  <a:txBody>
+                    <a:bodyPr/>
+                    <a:lstStyle/>
+                    <a:p>
+                      <a:r>
+                        <a:rPr lang="fr-FR"/>
+                        <a:t>Data </a:t>
+                      </a:r>
+                      <a:r>
+                        <a:rPr lang="fr-FR" err="1"/>
+                        <a:t>read</a:t>
+                      </a:r>
+                      <a:endParaRPr lang="fr-FR"/>
+                    </a:p>
+                  </a:txBody>
+                  <a:tcPr/>
+                </a:tc>
+                <a:extLst>
+                  <a:ext uri="{0D108BD9-81ED-4DB2-BD59-A6C34878D82A}">
+                    <a16:rowId xmlns:a16="http://schemas.microsoft.com/office/drawing/2014/main" val="1975725446"/>
+                  </a:ext>
+                </a:extLst>
+              </a:tr>
+              <a:tr h="370840">
+                <a:tc>
+                  <a:txBody>
+                    <a:bodyPr/>
+                    <a:lstStyle/>
+                    <a:p>
+                      <a:r>
+                        <a:rPr lang="fr-FR" err="1"/>
+                        <a:t>InMemoryRelation</a:t>
+                      </a:r>
+                      <a:endParaRPr lang="fr-FR"/>
+                    </a:p>
+                    <a:p>
+                      <a:r>
+                        <a:rPr lang="fr-FR" err="1"/>
+                        <a:t>InMemoryTableScan</a:t>
+                      </a:r>
+                      <a:endParaRPr lang="fr-FR"/>
+                    </a:p>
+                  </a:txBody>
+                  <a:tcPr/>
+                </a:tc>
+                <a:tc>
+                  <a:txBody>
+                    <a:bodyPr/>
+                    <a:lstStyle/>
+                    <a:p>
+                      <a:r>
+                        <a:rPr lang="fr-FR" err="1"/>
+                        <a:t>When</a:t>
+                      </a:r>
+                      <a:r>
+                        <a:rPr lang="fr-FR"/>
+                        <a:t> </a:t>
+                      </a:r>
+                      <a:r>
+                        <a:rPr lang="fr-FR" err="1"/>
+                        <a:t>caching</a:t>
+                      </a:r>
+                      <a:r>
+                        <a:rPr lang="fr-FR"/>
+                        <a:t> has been </a:t>
+                      </a:r>
+                      <a:r>
+                        <a:rPr lang="fr-FR" err="1"/>
+                        <a:t>done</a:t>
+                      </a:r>
+                      <a:endParaRPr lang="fr-FR"/>
+                    </a:p>
+                  </a:txBody>
+                  <a:tcPr/>
+                </a:tc>
+                <a:extLst>
+                  <a:ext uri="{0D108BD9-81ED-4DB2-BD59-A6C34878D82A}">
+                    <a16:rowId xmlns:a16="http://schemas.microsoft.com/office/drawing/2014/main" val="2773974586"/>
+                  </a:ext>
+                </a:extLst>
+              </a:tr>
+              <a:tr h="370840">
+                <a:tc>
+                  <a:txBody>
+                    <a:bodyPr/>
+                    <a:lstStyle/>
+                    <a:p>
+                      <a:r>
+                        <a:rPr lang="fr-FR"/>
+                        <a:t>Exchange</a:t>
+                      </a:r>
+                    </a:p>
+                  </a:txBody>
+                  <a:tcPr/>
+                </a:tc>
+                <a:tc>
+                  <a:txBody>
+                    <a:bodyPr/>
+                    <a:lstStyle/>
+                    <a:p>
+                      <a:r>
+                        <a:rPr lang="fr-FR" err="1"/>
+                        <a:t>Shuffle</a:t>
+                      </a:r>
+                      <a:endParaRPr lang="fr-FR"/>
+                    </a:p>
+                  </a:txBody>
+                  <a:tcPr/>
+                </a:tc>
+                <a:extLst>
+                  <a:ext uri="{0D108BD9-81ED-4DB2-BD59-A6C34878D82A}">
+                    <a16:rowId xmlns:a16="http://schemas.microsoft.com/office/drawing/2014/main" val="3400787861"/>
+                  </a:ext>
+                </a:extLst>
+              </a:tr>
+              <a:tr h="370840">
+                <a:tc>
+                  <a:txBody>
+                    <a:bodyPr/>
+                    <a:lstStyle/>
+                    <a:p>
+                      <a:r>
+                        <a:rPr lang="fr-FR" err="1"/>
+                        <a:t>HashAggregate</a:t>
+                      </a:r>
+                      <a:endParaRPr lang="fr-FR"/>
+                    </a:p>
+                    <a:p>
+                      <a:r>
+                        <a:rPr lang="fr-FR" err="1"/>
+                        <a:t>SortAggregate</a:t>
+                      </a:r>
+                      <a:endParaRPr lang="fr-FR"/>
+                    </a:p>
+                  </a:txBody>
+                  <a:tcPr/>
+                </a:tc>
+                <a:tc>
+                  <a:txBody>
+                    <a:bodyPr/>
+                    <a:lstStyle/>
+                    <a:p>
+                      <a:r>
+                        <a:rPr lang="fr-FR" err="1"/>
+                        <a:t>When</a:t>
+                      </a:r>
+                      <a:r>
+                        <a:rPr lang="fr-FR"/>
+                        <a:t> </a:t>
+                      </a:r>
+                      <a:r>
+                        <a:rPr lang="fr-FR" err="1"/>
+                        <a:t>aggregating</a:t>
+                      </a:r>
+                      <a:r>
+                        <a:rPr lang="fr-FR"/>
+                        <a:t>!</a:t>
+                      </a:r>
+                    </a:p>
+                  </a:txBody>
+                  <a:tcPr/>
+                </a:tc>
+                <a:extLst>
+                  <a:ext uri="{0D108BD9-81ED-4DB2-BD59-A6C34878D82A}">
+                    <a16:rowId xmlns:a16="http://schemas.microsoft.com/office/drawing/2014/main" val="1645622270"/>
+                  </a:ext>
+                </a:extLst>
+              </a:tr>
+              <a:tr h="370840">
+                <a:tc>
+                  <a:txBody>
+                    <a:bodyPr/>
+                    <a:lstStyle/>
+                    <a:p>
+                      <a:r>
+                        <a:rPr lang="fr-FR" err="1"/>
+                        <a:t>BatchEvalPython</a:t>
+                      </a:r>
+                      <a:endParaRPr lang="fr-FR"/>
+                    </a:p>
+                  </a:txBody>
+                  <a:tcPr/>
+                </a:tc>
+                <a:tc>
+                  <a:txBody>
+                    <a:bodyPr/>
+                    <a:lstStyle/>
+                    <a:p>
+                      <a:r>
+                        <a:rPr lang="fr-FR"/>
+                        <a:t>User </a:t>
+                      </a:r>
+                      <a:r>
+                        <a:rPr lang="fr-FR" err="1"/>
+                        <a:t>defined</a:t>
+                      </a:r>
+                      <a:r>
+                        <a:rPr lang="fr-FR"/>
+                        <a:t> </a:t>
+                      </a:r>
+                      <a:r>
+                        <a:rPr lang="fr-FR" err="1"/>
+                        <a:t>function</a:t>
+                      </a:r>
+                      <a:endParaRPr lang="fr-FR"/>
+                    </a:p>
+                  </a:txBody>
+                  <a:tcPr/>
+                </a:tc>
+                <a:extLst>
+                  <a:ext uri="{0D108BD9-81ED-4DB2-BD59-A6C34878D82A}">
+                    <a16:rowId xmlns:a16="http://schemas.microsoft.com/office/drawing/2014/main" val="273080408"/>
+                  </a:ext>
+                </a:extLst>
+              </a:tr>
+              <a:tr h="370840">
+                <a:tc>
+                  <a:txBody>
+                    <a:bodyPr/>
+                    <a:lstStyle/>
+                    <a:p>
+                      <a:r>
+                        <a:rPr lang="fr-FR"/>
+                        <a:t>Project</a:t>
+                      </a:r>
+                    </a:p>
+                  </a:txBody>
+                  <a:tcPr/>
+                </a:tc>
+                <a:tc>
+                  <a:txBody>
+                    <a:bodyPr/>
+                    <a:lstStyle/>
+                    <a:p>
+                      <a:r>
+                        <a:rPr lang="fr-FR" err="1"/>
+                        <a:t>Defining</a:t>
+                      </a:r>
+                      <a:r>
+                        <a:rPr lang="fr-FR"/>
+                        <a:t> new </a:t>
+                      </a:r>
+                      <a:r>
+                        <a:rPr lang="fr-FR" err="1"/>
+                        <a:t>column</a:t>
+                      </a:r>
+                      <a:endParaRPr lang="fr-FR"/>
+                    </a:p>
+                  </a:txBody>
+                  <a:tcPr/>
+                </a:tc>
+                <a:extLst>
+                  <a:ext uri="{0D108BD9-81ED-4DB2-BD59-A6C34878D82A}">
+                    <a16:rowId xmlns:a16="http://schemas.microsoft.com/office/drawing/2014/main" val="1161682776"/>
+                  </a:ext>
+                </a:extLst>
+              </a:tr>
+              <a:tr h="370840">
+                <a:tc>
+                  <a:txBody>
+                    <a:bodyPr/>
+                    <a:lstStyle/>
+                    <a:p>
+                      <a:r>
+                        <a:rPr lang="fr-FR" err="1"/>
+                        <a:t>AdaptativeSparkPlan</a:t>
+                      </a:r>
+                    </a:p>
+                  </a:txBody>
+                  <a:tcPr/>
+                </a:tc>
+                <a:tc>
+                  <a:txBody>
+                    <a:bodyPr/>
+                    <a:lstStyle/>
+                    <a:p>
+                      <a:r>
+                        <a:rPr lang="fr-FR"/>
+                        <a:t>Spark </a:t>
+                      </a:r>
+                      <a:r>
+                        <a:rPr lang="fr-FR" err="1"/>
+                        <a:t>may</a:t>
+                      </a:r>
+                      <a:r>
+                        <a:rPr lang="fr-FR"/>
+                        <a:t> </a:t>
+                      </a:r>
+                      <a:r>
+                        <a:rPr lang="fr-FR" err="1"/>
+                        <a:t>want</a:t>
+                      </a:r>
+                      <a:r>
+                        <a:rPr lang="fr-FR"/>
+                        <a:t> to change the </a:t>
+                      </a:r>
+                      <a:r>
+                        <a:rPr lang="fr-FR" err="1"/>
+                        <a:t>physical</a:t>
+                      </a:r>
+                      <a:r>
+                        <a:rPr lang="fr-FR"/>
+                        <a:t> plan at runtime </a:t>
+                      </a:r>
+                      <a:r>
+                        <a:rPr lang="fr-FR" err="1"/>
+                        <a:t>based</a:t>
+                      </a:r>
+                      <a:r>
+                        <a:rPr lang="fr-FR"/>
+                        <a:t> on </a:t>
+                      </a:r>
+                      <a:r>
+                        <a:rPr lang="fr-FR" err="1"/>
+                        <a:t>statistics</a:t>
+                      </a:r>
+                      <a:r>
+                        <a:rPr lang="fr-FR"/>
+                        <a:t> </a:t>
+                      </a:r>
+                      <a:r>
+                        <a:rPr lang="fr-FR" err="1"/>
+                        <a:t>collected</a:t>
+                      </a:r>
+                      <a:r>
+                        <a:rPr lang="fr-FR"/>
+                        <a:t>.</a:t>
+                      </a:r>
+                    </a:p>
+                  </a:txBody>
+                  <a:tcPr/>
+                </a:tc>
+                <a:extLst>
+                  <a:ext uri="{0D108BD9-81ED-4DB2-BD59-A6C34878D82A}">
+                    <a16:rowId xmlns:a16="http://schemas.microsoft.com/office/drawing/2014/main" val="657081736"/>
+                  </a:ext>
+                </a:extLst>
+              </a:tr>
+            </a:tbl>
+          </a:graphicData>
+        </a:graphic>
+      </p:graphicFrame>
+    </p:spTree>
+    <p:extLst>
+      <p:ext uri="{BB962C8B-B14F-4D97-AF65-F5344CB8AC3E}">
+        <p14:creationId xmlns:p14="http://schemas.microsoft.com/office/powerpoint/2010/main" val="1807516561"/>
+      </p:ext>
+    </p:extLst>
+  </p:cSld>
+  <p:clrMapOvr>
+    <a:masterClrMapping/>
+  </p:clrMapOvr>
+</p:sld>
+</file>
+
+<file path=ppt/slides/slide11.xml><?xml version="1.0" encoding="utf-8"?>
+<p:sld xmlns:a="http://schemas.openxmlformats.org/drawingml/2006/main" xmlns:r="http://schemas.openxmlformats.org/officeDocument/2006/relationships" xmlns:p="http://schemas.openxmlformats.org/presentationml/2006/main">
+  <p:cSld>
+    <p:spTree>
+      <p:nvGrpSpPr>
+        <p:cNvPr id="1" name=""/>
+        <p:cNvGrpSpPr/>
+        <p:nvPr/>
+      </p:nvGrpSpPr>
+      <p:grpSpPr>
+        <a:xfrm>
+          <a:off x="0" y="0"/>
+          <a:ext cx="0" cy="0"/>
+          <a:chOff x="0" y="0"/>
+          <a:chExt cx="0" cy="0"/>
+        </a:xfrm>
+      </p:grpSpPr>
+      <p:sp>
+        <p:nvSpPr>
+          <p:cNvPr id="2" name="Title 1">
+            <a:extLst>
+              <a:ext uri="{FF2B5EF4-FFF2-40B4-BE49-F238E27FC236}">
+                <a16:creationId xmlns:a16="http://schemas.microsoft.com/office/drawing/2014/main" id="{CCEBEA0F-0285-4189-992D-2C894A4D4A61}"/>
+              </a:ext>
+            </a:extLst>
+          </p:cNvPr>
+          <p:cNvSpPr>
+            <a:spLocks noGrp="1"/>
+          </p:cNvSpPr>
+          <p:nvPr>
+            <p:ph type="title"/>
+          </p:nvPr>
+        </p:nvSpPr>
+        <p:spPr/>
+        <p:txBody>
+          <a:bodyPr/>
+          <a:lstStyle/>
+          <a:p>
+            <a:r>
+              <a:rPr lang="fr-FR"/>
+              <a:t>Appendix - </a:t>
+            </a:r>
+            <a:r>
+              <a:rPr lang="fr-FR" err="1"/>
+              <a:t>Explaining</a:t>
+            </a:r>
+            <a:r>
+              <a:rPr lang="fr-FR"/>
+              <a:t> </a:t>
+            </a:r>
+            <a:r>
+              <a:rPr lang="fr-FR" err="1"/>
+              <a:t>Explain</a:t>
+            </a:r>
+            <a:r>
+              <a:rPr lang="fr-FR"/>
+              <a:t> - </a:t>
+            </a:r>
+            <a:r>
+              <a:rPr lang="fr-FR" err="1"/>
+              <a:t>Partitionning</a:t>
+            </a:r>
+            <a:endParaRPr lang="en-US" err="1"/>
+          </a:p>
+        </p:txBody>
+      </p:sp>
+      <p:sp>
+        <p:nvSpPr>
+          <p:cNvPr id="3" name="TextBox 2">
+            <a:extLst>
+              <a:ext uri="{FF2B5EF4-FFF2-40B4-BE49-F238E27FC236}">
+                <a16:creationId xmlns:a16="http://schemas.microsoft.com/office/drawing/2014/main" id="{BC361A8F-D866-4182-888B-19A422A07044}"/>
+              </a:ext>
+            </a:extLst>
+          </p:cNvPr>
+          <p:cNvSpPr txBox="1"/>
+          <p:nvPr/>
+        </p:nvSpPr>
+        <p:spPr>
+          <a:xfrm>
+            <a:off x="1211766" y="1434791"/>
+            <a:ext cx="9415346" cy="3970318"/>
+          </a:xfrm>
+          <a:prstGeom prst="rect">
+            <a:avLst/>
+          </a:prstGeom>
+          <a:noFill/>
+        </p:spPr>
+        <p:txBody>
+          <a:bodyPr rot="0" spcFirstLastPara="0" vertOverflow="overflow" horzOverflow="overflow" vert="horz" wrap="square" lIns="91440" tIns="45720" rIns="91440" bIns="45720" numCol="1" spcCol="0" rtlCol="0" fromWordArt="0" anchor="t" anchorCtr="0" forceAA="0" compatLnSpc="1">
+            <a:prstTxWarp prst="textNoShape">
+              <a:avLst/>
+            </a:prstTxWarp>
+            <a:spAutoFit/>
+          </a:bodyPr>
+          <a:lstStyle/>
+          <a:p>
+            <a:r>
+              <a:rPr lang="en-US" dirty="0" err="1">
+                <a:cs typeface="Calibri"/>
+              </a:rPr>
+              <a:t>nb_records_by_key</a:t>
+            </a:r>
+            <a:r>
+              <a:rPr lang="en-US" dirty="0">
+                <a:cs typeface="Calibri"/>
+              </a:rPr>
+              <a:t> : </a:t>
+            </a:r>
+            <a:r>
+              <a:rPr lang="en-US" dirty="0" err="1">
+                <a:cs typeface="Calibri"/>
+              </a:rPr>
+              <a:t>dict</a:t>
+            </a:r>
+            <a:r>
+              <a:rPr lang="en-US" dirty="0">
+                <a:cs typeface="Calibri"/>
+              </a:rPr>
+              <a:t>&lt;string, int&gt; : amount of records in dataset, for each distinct key</a:t>
+            </a:r>
+            <a:endParaRPr lang="en-US" dirty="0"/>
+          </a:p>
+          <a:p>
+            <a:r>
+              <a:rPr lang="en-US" dirty="0">
+                <a:cs typeface="Calibri"/>
+              </a:rPr>
+              <a:t>n : total amount of records</a:t>
+            </a:r>
+            <a:endParaRPr lang="en-US" dirty="0"/>
+          </a:p>
+          <a:p>
+            <a:endParaRPr lang="en-US" dirty="0"/>
+          </a:p>
+          <a:p>
+            <a:r>
+              <a:rPr lang="en-US" b="1" dirty="0"/>
+              <a:t>Exchange </a:t>
+            </a:r>
+            <a:r>
+              <a:rPr lang="en-US" b="1" dirty="0" err="1"/>
+              <a:t>RangePartitioning</a:t>
+            </a:r>
+            <a:r>
+              <a:rPr lang="en-US" b="1" dirty="0"/>
+              <a:t>(k)</a:t>
+            </a:r>
+            <a:endParaRPr lang="en-US" b="1" dirty="0">
+              <a:cs typeface="Calibri"/>
+            </a:endParaRPr>
+          </a:p>
+          <a:p>
+            <a:pPr marL="285750" indent="-285750">
+              <a:buFont typeface="Arial"/>
+              <a:buChar char="•"/>
+            </a:pPr>
+            <a:r>
+              <a:rPr lang="en-US" dirty="0">
+                <a:cs typeface="Calibri"/>
+              </a:rPr>
+              <a:t>Divides dataset in k partitions</a:t>
+            </a:r>
+          </a:p>
+          <a:p>
+            <a:pPr marL="285750" indent="-285750">
+              <a:buFont typeface="Arial"/>
+              <a:buChar char="•"/>
+            </a:pPr>
+            <a:r>
+              <a:rPr lang="en-US" dirty="0">
+                <a:cs typeface="Calibri"/>
+              </a:rPr>
+              <a:t>Each partition contains all records with same key</a:t>
+            </a:r>
+          </a:p>
+          <a:p>
+            <a:pPr marL="285750" indent="-285750">
+              <a:buFont typeface="Arial"/>
+              <a:buChar char="•"/>
+            </a:pPr>
+            <a:r>
+              <a:rPr lang="en-US" dirty="0">
+                <a:cs typeface="Calibri"/>
+              </a:rPr>
+              <a:t>Each partition roughly contains n/k records</a:t>
+            </a:r>
+          </a:p>
+          <a:p>
+            <a:pPr marL="285750" indent="-285750">
+              <a:buFont typeface="Arial"/>
+              <a:buChar char="•"/>
+            </a:pPr>
+            <a:r>
+              <a:rPr lang="en-US" i="1" dirty="0" err="1">
+                <a:ea typeface="+mn-lt"/>
+                <a:cs typeface="+mn-lt"/>
+              </a:rPr>
+              <a:t>nb_records_by_key</a:t>
+            </a:r>
+            <a:r>
+              <a:rPr lang="en-US" i="1" dirty="0">
+                <a:ea typeface="+mn-lt"/>
+                <a:cs typeface="+mn-lt"/>
+              </a:rPr>
+              <a:t> </a:t>
+            </a:r>
+            <a:r>
+              <a:rPr lang="en-US" dirty="0">
+                <a:ea typeface="+mn-lt"/>
+                <a:cs typeface="+mn-lt"/>
+              </a:rPr>
+              <a:t>estimated with Reservoir Sampling algorithm</a:t>
+            </a:r>
+            <a:endParaRPr lang="en-US" i="1" dirty="0">
+              <a:ea typeface="+mn-lt"/>
+              <a:cs typeface="+mn-lt"/>
+            </a:endParaRPr>
+          </a:p>
+          <a:p>
+            <a:pPr marL="285750" indent="-285750">
+              <a:buFont typeface="Arial"/>
+              <a:buChar char="•"/>
+            </a:pPr>
+            <a:endParaRPr lang="en-US" dirty="0">
+              <a:cs typeface="Calibri"/>
+            </a:endParaRPr>
+          </a:p>
+          <a:p>
+            <a:r>
+              <a:rPr lang="en-US" b="1" dirty="0"/>
+              <a:t>Exchange </a:t>
+            </a:r>
+            <a:r>
+              <a:rPr lang="en-US" b="1" dirty="0" err="1"/>
+              <a:t>RoundRobinPartitioning</a:t>
+            </a:r>
+            <a:endParaRPr lang="en-US" b="1" dirty="0">
+              <a:cs typeface="Calibri"/>
+            </a:endParaRPr>
+          </a:p>
+          <a:p>
+            <a:pPr marL="285750" indent="-285750">
+              <a:buFont typeface="Arial"/>
+              <a:buChar char="•"/>
+            </a:pPr>
+            <a:r>
+              <a:rPr lang="en-US" dirty="0">
+                <a:cs typeface="Calibri"/>
+              </a:rPr>
+              <a:t>When called by repartition</a:t>
+            </a:r>
+          </a:p>
+          <a:p>
+            <a:pPr marL="285750" indent="-285750">
+              <a:buFont typeface="Arial"/>
+              <a:buChar char="•"/>
+            </a:pPr>
+            <a:r>
+              <a:rPr lang="en-US" dirty="0">
+                <a:cs typeface="Calibri"/>
+              </a:rPr>
+              <a:t>First record goes to first partition</a:t>
+            </a:r>
+          </a:p>
+          <a:p>
+            <a:pPr marL="285750" indent="-285750">
+              <a:buFont typeface="Arial"/>
+              <a:buChar char="•"/>
+            </a:pPr>
+            <a:r>
+              <a:rPr lang="en-US" dirty="0">
+                <a:cs typeface="Calibri"/>
+              </a:rPr>
+              <a:t>Second goes to second partition, etc...</a:t>
+            </a:r>
+          </a:p>
+          <a:p>
+            <a:pPr marL="285750" indent="-285750">
+              <a:buFont typeface="Arial"/>
+              <a:buChar char="•"/>
+            </a:pPr>
+            <a:r>
+              <a:rPr lang="en-US" dirty="0">
+                <a:cs typeface="Calibri"/>
+              </a:rPr>
+              <a:t>Modulo amount of partitions</a:t>
+            </a:r>
+          </a:p>
+        </p:txBody>
+      </p:sp>
+    </p:spTree>
+    <p:extLst>
+      <p:ext uri="{BB962C8B-B14F-4D97-AF65-F5344CB8AC3E}">
+        <p14:creationId xmlns:p14="http://schemas.microsoft.com/office/powerpoint/2010/main" val="3189802429"/>
+      </p:ext>
+    </p:extLst>
+  </p:cSld>
+  <p:clrMapOvr>
+    <a:masterClrMapping/>
+  </p:clrMapOvr>
+</p:sld>
+</file>
+
+<file path=ppt/slides/slide12.xml><?xml version="1.0" encoding="utf-8"?>
+<p:sld xmlns:a="http://schemas.openxmlformats.org/drawingml/2006/main" xmlns:r="http://schemas.openxmlformats.org/officeDocument/2006/relationships" xmlns:p="http://schemas.openxmlformats.org/presentationml/2006/main">
+  <p:cSld>
+    <p:spTree>
+      <p:nvGrpSpPr>
+        <p:cNvPr id="1" name=""/>
+        <p:cNvGrpSpPr/>
+        <p:nvPr/>
+      </p:nvGrpSpPr>
+      <p:grpSpPr>
+        <a:xfrm>
+          <a:off x="0" y="0"/>
+          <a:ext cx="0" cy="0"/>
+          <a:chOff x="0" y="0"/>
+          <a:chExt cx="0" cy="0"/>
+        </a:xfrm>
+      </p:grpSpPr>
+      <p:sp>
+        <p:nvSpPr>
+          <p:cNvPr id="2" name="Title 1">
+            <a:extLst>
+              <a:ext uri="{FF2B5EF4-FFF2-40B4-BE49-F238E27FC236}">
+                <a16:creationId xmlns:a16="http://schemas.microsoft.com/office/drawing/2014/main" id="{CCEBEA0F-0285-4189-992D-2C894A4D4A61}"/>
+              </a:ext>
+            </a:extLst>
+          </p:cNvPr>
+          <p:cNvSpPr>
+            <a:spLocks noGrp="1"/>
+          </p:cNvSpPr>
+          <p:nvPr>
+            <p:ph type="title"/>
+          </p:nvPr>
+        </p:nvSpPr>
+        <p:spPr/>
+        <p:txBody>
+          <a:bodyPr/>
+          <a:lstStyle/>
+          <a:p>
+            <a:r>
+              <a:rPr lang="fr-FR"/>
               <a:t>Appendix - Parquet</a:t>
             </a:r>
             <a:endParaRPr lang="en-US" err="1"/>
@@ -3905,7 +4455,7 @@
 </p:sld>
 </file>
 
-<file path=ppt/slides/slide11.xml><?xml version="1.0" encoding="utf-8"?>
+<file path=ppt/slides/slide13.xml><?xml version="1.0" encoding="utf-8"?>
 <p:sld xmlns:a="http://schemas.openxmlformats.org/drawingml/2006/main" xmlns:r="http://schemas.openxmlformats.org/officeDocument/2006/relationships" xmlns:p="http://schemas.openxmlformats.org/presentationml/2006/main">
   <p:cSld>
     <p:spTree>
@@ -5210,7 +5760,7 @@
 </p:sld>
 </file>
 
-<file path=ppt/slides/slide12.xml><?xml version="1.0" encoding="utf-8"?>
+<file path=ppt/slides/slide14.xml><?xml version="1.0" encoding="utf-8"?>
 <p:sld xmlns:a="http://schemas.openxmlformats.org/drawingml/2006/main" xmlns:r="http://schemas.openxmlformats.org/officeDocument/2006/relationships" xmlns:p="http://schemas.openxmlformats.org/presentationml/2006/main">
   <p:cSld>
     <p:spTree>
@@ -5424,6 +5974,1765 @@
       </p:grpSpPr>
       <p:sp>
         <p:nvSpPr>
+          <p:cNvPr id="4" name="Title 1">
+            <a:extLst>
+              <a:ext uri="{FF2B5EF4-FFF2-40B4-BE49-F238E27FC236}">
+                <a16:creationId xmlns:a16="http://schemas.microsoft.com/office/drawing/2014/main" id="{FEB0FEFD-B9BE-4607-93E8-F292419196C0}"/>
+              </a:ext>
+            </a:extLst>
+          </p:cNvPr>
+          <p:cNvSpPr>
+            <a:spLocks noGrp="1"/>
+          </p:cNvSpPr>
+          <p:nvPr>
+            <p:ph type="title"/>
+          </p:nvPr>
+        </p:nvSpPr>
+        <p:spPr>
+          <a:xfrm>
+            <a:off x="838200" y="365125"/>
+            <a:ext cx="10515600" cy="1325563"/>
+          </a:xfrm>
+        </p:spPr>
+        <p:txBody>
+          <a:bodyPr/>
+          <a:lstStyle/>
+          <a:p>
+            <a:r>
+              <a:rPr lang="fr-FR" dirty="0" err="1"/>
+              <a:t>Reminder</a:t>
+            </a:r>
+            <a:r>
+              <a:rPr lang="fr-FR" dirty="0"/>
+              <a:t> : </a:t>
+            </a:r>
+            <a:r>
+              <a:rPr lang="fr-FR" dirty="0" err="1"/>
+              <a:t>Shuffle</a:t>
+            </a:r>
+            <a:endParaRPr lang="en-US" dirty="0"/>
+          </a:p>
+        </p:txBody>
+      </p:sp>
+      <p:sp>
+        <p:nvSpPr>
+          <p:cNvPr id="5" name="TextBox 4">
+            <a:extLst>
+              <a:ext uri="{FF2B5EF4-FFF2-40B4-BE49-F238E27FC236}">
+                <a16:creationId xmlns:a16="http://schemas.microsoft.com/office/drawing/2014/main" id="{58B04BB1-7645-4255-9DE3-2DA7EFB68D92}"/>
+              </a:ext>
+            </a:extLst>
+          </p:cNvPr>
+          <p:cNvSpPr txBox="1"/>
+          <p:nvPr/>
+        </p:nvSpPr>
+        <p:spPr>
+          <a:xfrm>
+            <a:off x="1036948" y="1432874"/>
+            <a:ext cx="9881423" cy="369332"/>
+          </a:xfrm>
+          <a:prstGeom prst="rect">
+            <a:avLst/>
+          </a:prstGeom>
+          <a:noFill/>
+        </p:spPr>
+        <p:txBody>
+          <a:bodyPr wrap="square" rtlCol="0">
+            <a:spAutoFit/>
+          </a:bodyPr>
+          <a:lstStyle/>
+          <a:p>
+            <a:r>
+              <a:rPr lang="fr-FR" i="1" dirty="0" err="1"/>
+              <a:t>Spark.read</a:t>
+            </a:r>
+            <a:r>
+              <a:rPr lang="fr-FR" i="1" dirty="0"/>
+              <a:t>(…).csv(/</a:t>
+            </a:r>
+            <a:r>
+              <a:rPr lang="fr-FR" i="1" dirty="0" err="1"/>
+              <a:t>path</a:t>
+            </a:r>
+            <a:r>
+              <a:rPr lang="fr-FR" i="1" dirty="0"/>
+              <a:t>/to/csv).</a:t>
+            </a:r>
+            <a:r>
+              <a:rPr lang="fr-FR" i="1" dirty="0" err="1"/>
+              <a:t>keyBy</a:t>
+            </a:r>
+            <a:r>
+              <a:rPr lang="fr-FR" i="1" dirty="0"/>
+              <a:t>(‘City’).</a:t>
+            </a:r>
+            <a:r>
+              <a:rPr lang="fr-FR" i="1" dirty="0" err="1"/>
+              <a:t>mapValues</a:t>
+            </a:r>
+            <a:r>
+              <a:rPr lang="fr-FR" i="1" dirty="0"/>
+              <a:t>(x </a:t>
+            </a:r>
+            <a:r>
+              <a:rPr lang="fr-FR" i="1" dirty="0">
+                <a:sym typeface="Wingdings" panose="05000000000000000000" pitchFamily="2" charset="2"/>
+              </a:rPr>
+              <a:t> x[‘</a:t>
+            </a:r>
+            <a:r>
+              <a:rPr lang="fr-FR" i="1" dirty="0" err="1">
+                <a:sym typeface="Wingdings" panose="05000000000000000000" pitchFamily="2" charset="2"/>
+              </a:rPr>
+              <a:t>consumption</a:t>
+            </a:r>
+            <a:r>
+              <a:rPr lang="fr-FR" i="1" dirty="0">
+                <a:sym typeface="Wingdings" panose="05000000000000000000" pitchFamily="2" charset="2"/>
+              </a:rPr>
+              <a:t>’]).</a:t>
+            </a:r>
+            <a:r>
+              <a:rPr lang="fr-FR" i="1" dirty="0" err="1">
+                <a:sym typeface="Wingdings" panose="05000000000000000000" pitchFamily="2" charset="2"/>
+              </a:rPr>
+              <a:t>reduceByKey</a:t>
+            </a:r>
+            <a:r>
+              <a:rPr lang="fr-FR" i="1" dirty="0">
+                <a:sym typeface="Wingdings" panose="05000000000000000000" pitchFamily="2" charset="2"/>
+              </a:rPr>
+              <a:t>(</a:t>
+            </a:r>
+            <a:r>
+              <a:rPr lang="fr-FR" i="1" dirty="0" err="1">
+                <a:sym typeface="Wingdings" panose="05000000000000000000" pitchFamily="2" charset="2"/>
+              </a:rPr>
+              <a:t>x,y</a:t>
+            </a:r>
+            <a:r>
+              <a:rPr lang="fr-FR" i="1" dirty="0">
+                <a:sym typeface="Wingdings" panose="05000000000000000000" pitchFamily="2" charset="2"/>
+              </a:rPr>
+              <a:t> </a:t>
+            </a:r>
+            <a:r>
+              <a:rPr lang="fr-FR" i="1" dirty="0" err="1">
+                <a:sym typeface="Wingdings" panose="05000000000000000000" pitchFamily="2" charset="2"/>
+              </a:rPr>
+              <a:t>x+y</a:t>
+            </a:r>
+            <a:r>
+              <a:rPr lang="fr-FR" i="1" dirty="0">
+                <a:sym typeface="Wingdings" panose="05000000000000000000" pitchFamily="2" charset="2"/>
+              </a:rPr>
+              <a:t>)</a:t>
+            </a:r>
+            <a:endParaRPr lang="fr-FR" i="1" dirty="0"/>
+          </a:p>
+        </p:txBody>
+      </p:sp>
+      <p:graphicFrame>
+        <p:nvGraphicFramePr>
+          <p:cNvPr id="6" name="Tableau 6">
+            <a:extLst>
+              <a:ext uri="{FF2B5EF4-FFF2-40B4-BE49-F238E27FC236}">
+                <a16:creationId xmlns:a16="http://schemas.microsoft.com/office/drawing/2014/main" id="{CFF7373F-5C11-48C2-B0D6-8C4DB105109F}"/>
+              </a:ext>
+            </a:extLst>
+          </p:cNvPr>
+          <p:cNvGraphicFramePr>
+            <a:graphicFrameLocks noGrp="1"/>
+          </p:cNvGraphicFramePr>
+          <p:nvPr/>
+        </p:nvGraphicFramePr>
+        <p:xfrm>
+          <a:off x="217713" y="2470089"/>
+          <a:ext cx="4876800" cy="3165575"/>
+        </p:xfrm>
+        <a:graphic>
+          <a:graphicData uri="http://schemas.openxmlformats.org/drawingml/2006/table">
+            <a:tbl>
+              <a:tblPr firstRow="1" bandRow="1">
+                <a:tableStyleId>{5C22544A-7EE6-4342-B048-85BDC9FD1C3A}</a:tableStyleId>
+              </a:tblPr>
+              <a:tblGrid>
+                <a:gridCol w="1625600">
+                  <a:extLst>
+                    <a:ext uri="{9D8B030D-6E8A-4147-A177-3AD203B41FA5}">
+                      <a16:colId xmlns:a16="http://schemas.microsoft.com/office/drawing/2014/main" val="3107301055"/>
+                    </a:ext>
+                  </a:extLst>
+                </a:gridCol>
+                <a:gridCol w="1625600">
+                  <a:extLst>
+                    <a:ext uri="{9D8B030D-6E8A-4147-A177-3AD203B41FA5}">
+                      <a16:colId xmlns:a16="http://schemas.microsoft.com/office/drawing/2014/main" val="496090384"/>
+                    </a:ext>
+                  </a:extLst>
+                </a:gridCol>
+                <a:gridCol w="1625600">
+                  <a:extLst>
+                    <a:ext uri="{9D8B030D-6E8A-4147-A177-3AD203B41FA5}">
+                      <a16:colId xmlns:a16="http://schemas.microsoft.com/office/drawing/2014/main" val="3669967165"/>
+                    </a:ext>
+                  </a:extLst>
+                </a:gridCol>
+              </a:tblGrid>
+              <a:tr h="450235">
+                <a:tc>
+                  <a:txBody>
+                    <a:bodyPr/>
+                    <a:lstStyle/>
+                    <a:p>
+                      <a:r>
+                        <a:rPr lang="fr-FR" dirty="0"/>
+                        <a:t>Client-id</a:t>
+                      </a:r>
+                    </a:p>
+                  </a:txBody>
+                  <a:tcPr/>
+                </a:tc>
+                <a:tc>
+                  <a:txBody>
+                    <a:bodyPr/>
+                    <a:lstStyle/>
+                    <a:p>
+                      <a:r>
+                        <a:rPr lang="fr-FR" dirty="0"/>
+                        <a:t>City</a:t>
+                      </a:r>
+                    </a:p>
+                  </a:txBody>
+                  <a:tcPr/>
+                </a:tc>
+                <a:tc>
+                  <a:txBody>
+                    <a:bodyPr/>
+                    <a:lstStyle/>
+                    <a:p>
+                      <a:r>
+                        <a:rPr lang="fr-FR" dirty="0" err="1"/>
+                        <a:t>Yearly</a:t>
+                      </a:r>
+                      <a:r>
+                        <a:rPr lang="fr-FR" dirty="0"/>
+                        <a:t> Energy </a:t>
+                      </a:r>
+                      <a:r>
+                        <a:rPr lang="fr-FR" dirty="0" err="1"/>
+                        <a:t>Consumption</a:t>
+                      </a:r>
+                      <a:r>
+                        <a:rPr lang="fr-FR" dirty="0"/>
+                        <a:t> (kWh)</a:t>
+                      </a:r>
+                    </a:p>
+                  </a:txBody>
+                  <a:tcPr/>
+                </a:tc>
+                <a:extLst>
+                  <a:ext uri="{0D108BD9-81ED-4DB2-BD59-A6C34878D82A}">
+                    <a16:rowId xmlns:a16="http://schemas.microsoft.com/office/drawing/2014/main" val="4274213881"/>
+                  </a:ext>
+                </a:extLst>
+              </a:tr>
+              <a:tr h="450235">
+                <a:tc>
+                  <a:txBody>
+                    <a:bodyPr/>
+                    <a:lstStyle/>
+                    <a:p>
+                      <a:r>
+                        <a:rPr lang="fr-FR" dirty="0"/>
+                        <a:t>Alice</a:t>
+                      </a:r>
+                    </a:p>
+                  </a:txBody>
+                  <a:tcPr/>
+                </a:tc>
+                <a:tc>
+                  <a:txBody>
+                    <a:bodyPr/>
+                    <a:lstStyle/>
+                    <a:p>
+                      <a:r>
+                        <a:rPr lang="fr-FR" dirty="0"/>
+                        <a:t>Paris</a:t>
+                      </a:r>
+                    </a:p>
+                  </a:txBody>
+                  <a:tcPr/>
+                </a:tc>
+                <a:tc>
+                  <a:txBody>
+                    <a:bodyPr/>
+                    <a:lstStyle/>
+                    <a:p>
+                      <a:r>
+                        <a:rPr lang="fr-FR" dirty="0"/>
+                        <a:t>380</a:t>
+                      </a:r>
+                    </a:p>
+                  </a:txBody>
+                  <a:tcPr/>
+                </a:tc>
+                <a:extLst>
+                  <a:ext uri="{0D108BD9-81ED-4DB2-BD59-A6C34878D82A}">
+                    <a16:rowId xmlns:a16="http://schemas.microsoft.com/office/drawing/2014/main" val="3334246921"/>
+                  </a:ext>
+                </a:extLst>
+              </a:tr>
+              <a:tr h="450235">
+                <a:tc>
+                  <a:txBody>
+                    <a:bodyPr/>
+                    <a:lstStyle/>
+                    <a:p>
+                      <a:r>
+                        <a:rPr lang="fr-FR" dirty="0"/>
+                        <a:t>Bob</a:t>
+                      </a:r>
+                    </a:p>
+                  </a:txBody>
+                  <a:tcPr/>
+                </a:tc>
+                <a:tc>
+                  <a:txBody>
+                    <a:bodyPr/>
+                    <a:lstStyle/>
+                    <a:p>
+                      <a:r>
+                        <a:rPr lang="fr-FR" dirty="0"/>
+                        <a:t>Toulouse</a:t>
+                      </a:r>
+                    </a:p>
+                  </a:txBody>
+                  <a:tcPr/>
+                </a:tc>
+                <a:tc>
+                  <a:txBody>
+                    <a:bodyPr/>
+                    <a:lstStyle/>
+                    <a:p>
+                      <a:r>
+                        <a:rPr lang="fr-FR" dirty="0"/>
+                        <a:t>200</a:t>
+                      </a:r>
+                    </a:p>
+                  </a:txBody>
+                  <a:tcPr/>
+                </a:tc>
+                <a:extLst>
+                  <a:ext uri="{0D108BD9-81ED-4DB2-BD59-A6C34878D82A}">
+                    <a16:rowId xmlns:a16="http://schemas.microsoft.com/office/drawing/2014/main" val="4001535200"/>
+                  </a:ext>
+                </a:extLst>
+              </a:tr>
+              <a:tr h="450235">
+                <a:tc>
+                  <a:txBody>
+                    <a:bodyPr/>
+                    <a:lstStyle/>
+                    <a:p>
+                      <a:r>
+                        <a:rPr lang="fr-FR" dirty="0"/>
+                        <a:t>..</a:t>
+                      </a:r>
+                    </a:p>
+                  </a:txBody>
+                  <a:tcPr/>
+                </a:tc>
+                <a:tc>
+                  <a:txBody>
+                    <a:bodyPr/>
+                    <a:lstStyle/>
+                    <a:p>
+                      <a:r>
+                        <a:rPr lang="fr-FR" dirty="0"/>
+                        <a:t>…</a:t>
+                      </a:r>
+                    </a:p>
+                  </a:txBody>
+                  <a:tcPr/>
+                </a:tc>
+                <a:tc>
+                  <a:txBody>
+                    <a:bodyPr/>
+                    <a:lstStyle/>
+                    <a:p>
+                      <a:r>
+                        <a:rPr lang="fr-FR" dirty="0"/>
+                        <a:t>…</a:t>
+                      </a:r>
+                    </a:p>
+                  </a:txBody>
+                  <a:tcPr/>
+                </a:tc>
+                <a:extLst>
+                  <a:ext uri="{0D108BD9-81ED-4DB2-BD59-A6C34878D82A}">
+                    <a16:rowId xmlns:a16="http://schemas.microsoft.com/office/drawing/2014/main" val="1975303347"/>
+                  </a:ext>
+                </a:extLst>
+              </a:tr>
+              <a:tr h="450235">
+                <a:tc>
+                  <a:txBody>
+                    <a:bodyPr/>
+                    <a:lstStyle/>
+                    <a:p>
+                      <a:r>
+                        <a:rPr lang="fr-FR" dirty="0"/>
+                        <a:t>Jean</a:t>
+                      </a:r>
+                    </a:p>
+                  </a:txBody>
+                  <a:tcPr/>
+                </a:tc>
+                <a:tc>
+                  <a:txBody>
+                    <a:bodyPr/>
+                    <a:lstStyle/>
+                    <a:p>
+                      <a:r>
+                        <a:rPr lang="fr-FR" dirty="0"/>
+                        <a:t>Paris</a:t>
+                      </a:r>
+                    </a:p>
+                  </a:txBody>
+                  <a:tcPr/>
+                </a:tc>
+                <a:tc>
+                  <a:txBody>
+                    <a:bodyPr/>
+                    <a:lstStyle/>
+                    <a:p>
+                      <a:r>
+                        <a:rPr lang="fr-FR" dirty="0"/>
+                        <a:t>390</a:t>
+                      </a:r>
+                    </a:p>
+                  </a:txBody>
+                  <a:tcPr/>
+                </a:tc>
+                <a:extLst>
+                  <a:ext uri="{0D108BD9-81ED-4DB2-BD59-A6C34878D82A}">
+                    <a16:rowId xmlns:a16="http://schemas.microsoft.com/office/drawing/2014/main" val="3269228350"/>
+                  </a:ext>
+                </a:extLst>
+              </a:tr>
+              <a:tr h="450235">
+                <a:tc>
+                  <a:txBody>
+                    <a:bodyPr/>
+                    <a:lstStyle/>
+                    <a:p>
+                      <a:r>
+                        <a:rPr lang="fr-FR" dirty="0"/>
+                        <a:t>Isabelle</a:t>
+                      </a:r>
+                    </a:p>
+                  </a:txBody>
+                  <a:tcPr/>
+                </a:tc>
+                <a:tc>
+                  <a:txBody>
+                    <a:bodyPr/>
+                    <a:lstStyle/>
+                    <a:p>
+                      <a:r>
+                        <a:rPr lang="fr-FR" dirty="0"/>
+                        <a:t>Rouen</a:t>
+                      </a:r>
+                    </a:p>
+                  </a:txBody>
+                  <a:tcPr/>
+                </a:tc>
+                <a:tc>
+                  <a:txBody>
+                    <a:bodyPr/>
+                    <a:lstStyle/>
+                    <a:p>
+                      <a:r>
+                        <a:rPr lang="fr-FR" dirty="0"/>
+                        <a:t>350</a:t>
+                      </a:r>
+                    </a:p>
+                  </a:txBody>
+                  <a:tcPr/>
+                </a:tc>
+                <a:extLst>
+                  <a:ext uri="{0D108BD9-81ED-4DB2-BD59-A6C34878D82A}">
+                    <a16:rowId xmlns:a16="http://schemas.microsoft.com/office/drawing/2014/main" val="1662352899"/>
+                  </a:ext>
+                </a:extLst>
+              </a:tr>
+            </a:tbl>
+          </a:graphicData>
+        </a:graphic>
+      </p:graphicFrame>
+      <p:sp>
+        <p:nvSpPr>
+          <p:cNvPr id="7" name="Rectangle 6">
+            <a:extLst>
+              <a:ext uri="{FF2B5EF4-FFF2-40B4-BE49-F238E27FC236}">
+                <a16:creationId xmlns:a16="http://schemas.microsoft.com/office/drawing/2014/main" id="{794391AB-9590-4C63-A093-6794385E733E}"/>
+              </a:ext>
+            </a:extLst>
+          </p:cNvPr>
+          <p:cNvSpPr/>
+          <p:nvPr/>
+        </p:nvSpPr>
+        <p:spPr>
+          <a:xfrm>
+            <a:off x="5274128" y="3429000"/>
+            <a:ext cx="97972" cy="827314"/>
+          </a:xfrm>
+          <a:prstGeom prst="rect">
+            <a:avLst/>
+          </a:prstGeom>
+        </p:spPr>
+        <p:style>
+          <a:lnRef idx="2">
+            <a:schemeClr val="accent1">
+              <a:shade val="50000"/>
+            </a:schemeClr>
+          </a:lnRef>
+          <a:fillRef idx="1">
+            <a:schemeClr val="accent1"/>
+          </a:fillRef>
+          <a:effectRef idx="0">
+            <a:schemeClr val="accent1"/>
+          </a:effectRef>
+          <a:fontRef idx="minor">
+            <a:schemeClr val="lt1"/>
+          </a:fontRef>
+        </p:style>
+        <p:txBody>
+          <a:bodyPr rtlCol="0" anchor="ctr"/>
+          <a:lstStyle/>
+          <a:p>
+            <a:pPr algn="ctr"/>
+            <a:endParaRPr lang="fr-FR" dirty="0"/>
+          </a:p>
+        </p:txBody>
+      </p:sp>
+      <p:sp>
+        <p:nvSpPr>
+          <p:cNvPr id="8" name="ZoneTexte 7">
+            <a:extLst>
+              <a:ext uri="{FF2B5EF4-FFF2-40B4-BE49-F238E27FC236}">
+                <a16:creationId xmlns:a16="http://schemas.microsoft.com/office/drawing/2014/main" id="{5762A73C-60EC-44FE-9365-6A7654032F7E}"/>
+              </a:ext>
+            </a:extLst>
+          </p:cNvPr>
+          <p:cNvSpPr txBox="1"/>
+          <p:nvPr/>
+        </p:nvSpPr>
+        <p:spPr>
+          <a:xfrm>
+            <a:off x="5323114" y="3657991"/>
+            <a:ext cx="1162369" cy="369332"/>
+          </a:xfrm>
+          <a:prstGeom prst="rect">
+            <a:avLst/>
+          </a:prstGeom>
+          <a:noFill/>
+        </p:spPr>
+        <p:txBody>
+          <a:bodyPr wrap="none" rtlCol="0">
+            <a:spAutoFit/>
+          </a:bodyPr>
+          <a:lstStyle/>
+          <a:p>
+            <a:r>
+              <a:rPr lang="fr-FR" dirty="0"/>
+              <a:t>Partition 1</a:t>
+            </a:r>
+          </a:p>
+        </p:txBody>
+      </p:sp>
+      <p:sp>
+        <p:nvSpPr>
+          <p:cNvPr id="9" name="Rectangle 8">
+            <a:extLst>
+              <a:ext uri="{FF2B5EF4-FFF2-40B4-BE49-F238E27FC236}">
+                <a16:creationId xmlns:a16="http://schemas.microsoft.com/office/drawing/2014/main" id="{25D063A3-371B-4D0F-B28D-143CCE507C51}"/>
+              </a:ext>
+            </a:extLst>
+          </p:cNvPr>
+          <p:cNvSpPr/>
+          <p:nvPr/>
+        </p:nvSpPr>
+        <p:spPr>
+          <a:xfrm>
+            <a:off x="5274128" y="4808350"/>
+            <a:ext cx="97972" cy="827314"/>
+          </a:xfrm>
+          <a:prstGeom prst="rect">
+            <a:avLst/>
+          </a:prstGeom>
+        </p:spPr>
+        <p:style>
+          <a:lnRef idx="2">
+            <a:schemeClr val="accent1">
+              <a:shade val="50000"/>
+            </a:schemeClr>
+          </a:lnRef>
+          <a:fillRef idx="1">
+            <a:schemeClr val="accent1"/>
+          </a:fillRef>
+          <a:effectRef idx="0">
+            <a:schemeClr val="accent1"/>
+          </a:effectRef>
+          <a:fontRef idx="minor">
+            <a:schemeClr val="lt1"/>
+          </a:fontRef>
+        </p:style>
+        <p:txBody>
+          <a:bodyPr rtlCol="0" anchor="ctr"/>
+          <a:lstStyle/>
+          <a:p>
+            <a:pPr algn="ctr"/>
+            <a:endParaRPr lang="fr-FR" dirty="0"/>
+          </a:p>
+        </p:txBody>
+      </p:sp>
+      <p:sp>
+        <p:nvSpPr>
+          <p:cNvPr id="10" name="ZoneTexte 9">
+            <a:extLst>
+              <a:ext uri="{FF2B5EF4-FFF2-40B4-BE49-F238E27FC236}">
+                <a16:creationId xmlns:a16="http://schemas.microsoft.com/office/drawing/2014/main" id="{06675471-167A-4173-A9D1-4EF4C5EEA560}"/>
+              </a:ext>
+            </a:extLst>
+          </p:cNvPr>
+          <p:cNvSpPr txBox="1"/>
+          <p:nvPr/>
+        </p:nvSpPr>
+        <p:spPr>
+          <a:xfrm>
+            <a:off x="5323114" y="5037341"/>
+            <a:ext cx="1162369" cy="369332"/>
+          </a:xfrm>
+          <a:prstGeom prst="rect">
+            <a:avLst/>
+          </a:prstGeom>
+          <a:noFill/>
+        </p:spPr>
+        <p:txBody>
+          <a:bodyPr wrap="none" rtlCol="0">
+            <a:spAutoFit/>
+          </a:bodyPr>
+          <a:lstStyle/>
+          <a:p>
+            <a:r>
+              <a:rPr lang="fr-FR" dirty="0"/>
+              <a:t>Partition 8</a:t>
+            </a:r>
+          </a:p>
+        </p:txBody>
+      </p:sp>
+      <p:sp>
+        <p:nvSpPr>
+          <p:cNvPr id="11" name="Rectangle : coins arrondis 10">
+            <a:extLst>
+              <a:ext uri="{FF2B5EF4-FFF2-40B4-BE49-F238E27FC236}">
+                <a16:creationId xmlns:a16="http://schemas.microsoft.com/office/drawing/2014/main" id="{1EEFAF50-6849-49F0-BDA1-6F1558096E51}"/>
+              </a:ext>
+            </a:extLst>
+          </p:cNvPr>
+          <p:cNvSpPr/>
+          <p:nvPr/>
+        </p:nvSpPr>
+        <p:spPr>
+          <a:xfrm>
+            <a:off x="6961417" y="2510829"/>
+            <a:ext cx="1458686" cy="891544"/>
+          </a:xfrm>
+          <a:prstGeom prst="roundRect">
+            <a:avLst/>
+          </a:prstGeom>
+        </p:spPr>
+        <p:style>
+          <a:lnRef idx="2">
+            <a:schemeClr val="accent1">
+              <a:shade val="50000"/>
+            </a:schemeClr>
+          </a:lnRef>
+          <a:fillRef idx="1">
+            <a:schemeClr val="accent1"/>
+          </a:fillRef>
+          <a:effectRef idx="0">
+            <a:schemeClr val="accent1"/>
+          </a:effectRef>
+          <a:fontRef idx="minor">
+            <a:schemeClr val="lt1"/>
+          </a:fontRef>
+        </p:style>
+        <p:txBody>
+          <a:bodyPr rtlCol="0" anchor="ctr"/>
+          <a:lstStyle/>
+          <a:p>
+            <a:pPr algn="ctr"/>
+            <a:r>
+              <a:rPr lang="fr-FR" dirty="0" err="1"/>
+              <a:t>Task</a:t>
+            </a:r>
+            <a:r>
+              <a:rPr lang="fr-FR" dirty="0"/>
+              <a:t> 1.1</a:t>
+            </a:r>
+          </a:p>
+          <a:p>
+            <a:pPr algn="ctr"/>
+            <a:r>
+              <a:rPr lang="fr-FR" dirty="0"/>
+              <a:t>(partition 1)</a:t>
+            </a:r>
+          </a:p>
+        </p:txBody>
+      </p:sp>
+      <p:sp>
+        <p:nvSpPr>
+          <p:cNvPr id="12" name="ZoneTexte 11">
+            <a:extLst>
+              <a:ext uri="{FF2B5EF4-FFF2-40B4-BE49-F238E27FC236}">
+                <a16:creationId xmlns:a16="http://schemas.microsoft.com/office/drawing/2014/main" id="{97F06BB1-A51C-4065-831E-B1706E766686}"/>
+              </a:ext>
+            </a:extLst>
+          </p:cNvPr>
+          <p:cNvSpPr txBox="1"/>
+          <p:nvPr/>
+        </p:nvSpPr>
+        <p:spPr>
+          <a:xfrm>
+            <a:off x="8888189" y="2748021"/>
+            <a:ext cx="458780" cy="369332"/>
+          </a:xfrm>
+          <a:prstGeom prst="rect">
+            <a:avLst/>
+          </a:prstGeom>
+          <a:noFill/>
+        </p:spPr>
+        <p:txBody>
+          <a:bodyPr wrap="none" rtlCol="0">
+            <a:spAutoFit/>
+          </a:bodyPr>
+          <a:lstStyle/>
+          <a:p>
+            <a:r>
+              <a:rPr lang="fr-FR" dirty="0"/>
+              <a:t>…..</a:t>
+            </a:r>
+          </a:p>
+        </p:txBody>
+      </p:sp>
+      <p:sp>
+        <p:nvSpPr>
+          <p:cNvPr id="13" name="Rectangle : coins arrondis 12">
+            <a:extLst>
+              <a:ext uri="{FF2B5EF4-FFF2-40B4-BE49-F238E27FC236}">
+                <a16:creationId xmlns:a16="http://schemas.microsoft.com/office/drawing/2014/main" id="{9FEB2FFF-263D-47B4-8109-27546269F41E}"/>
+              </a:ext>
+            </a:extLst>
+          </p:cNvPr>
+          <p:cNvSpPr/>
+          <p:nvPr/>
+        </p:nvSpPr>
+        <p:spPr>
+          <a:xfrm>
+            <a:off x="9813474" y="2510829"/>
+            <a:ext cx="1458686" cy="891544"/>
+          </a:xfrm>
+          <a:prstGeom prst="roundRect">
+            <a:avLst/>
+          </a:prstGeom>
+        </p:spPr>
+        <p:style>
+          <a:lnRef idx="2">
+            <a:schemeClr val="accent1">
+              <a:shade val="50000"/>
+            </a:schemeClr>
+          </a:lnRef>
+          <a:fillRef idx="1">
+            <a:schemeClr val="accent1"/>
+          </a:fillRef>
+          <a:effectRef idx="0">
+            <a:schemeClr val="accent1"/>
+          </a:effectRef>
+          <a:fontRef idx="minor">
+            <a:schemeClr val="lt1"/>
+          </a:fontRef>
+        </p:style>
+        <p:txBody>
+          <a:bodyPr rtlCol="0" anchor="ctr"/>
+          <a:lstStyle/>
+          <a:p>
+            <a:pPr algn="ctr"/>
+            <a:r>
+              <a:rPr lang="fr-FR" dirty="0" err="1"/>
+              <a:t>Task</a:t>
+            </a:r>
+            <a:r>
+              <a:rPr lang="fr-FR" dirty="0"/>
+              <a:t> 1.8</a:t>
+            </a:r>
+          </a:p>
+          <a:p>
+            <a:pPr algn="ctr"/>
+            <a:r>
+              <a:rPr lang="fr-FR" dirty="0"/>
+              <a:t>(partition 8)</a:t>
+            </a:r>
+          </a:p>
+        </p:txBody>
+      </p:sp>
+      <p:sp>
+        <p:nvSpPr>
+          <p:cNvPr id="14" name="Rectangle : coins arrondis 13">
+            <a:extLst>
+              <a:ext uri="{FF2B5EF4-FFF2-40B4-BE49-F238E27FC236}">
+                <a16:creationId xmlns:a16="http://schemas.microsoft.com/office/drawing/2014/main" id="{5B5E4D66-1DD0-46F4-9F9E-EBBD14FCE941}"/>
+              </a:ext>
+            </a:extLst>
+          </p:cNvPr>
+          <p:cNvSpPr/>
+          <p:nvPr/>
+        </p:nvSpPr>
+        <p:spPr>
+          <a:xfrm>
+            <a:off x="6819902" y="4744120"/>
+            <a:ext cx="1741715" cy="891544"/>
+          </a:xfrm>
+          <a:prstGeom prst="roundRect">
+            <a:avLst/>
+          </a:prstGeom>
+        </p:spPr>
+        <p:style>
+          <a:lnRef idx="2">
+            <a:schemeClr val="accent1">
+              <a:shade val="50000"/>
+            </a:schemeClr>
+          </a:lnRef>
+          <a:fillRef idx="1">
+            <a:schemeClr val="accent1"/>
+          </a:fillRef>
+          <a:effectRef idx="0">
+            <a:schemeClr val="accent1"/>
+          </a:effectRef>
+          <a:fontRef idx="minor">
+            <a:schemeClr val="lt1"/>
+          </a:fontRef>
+        </p:style>
+        <p:txBody>
+          <a:bodyPr rtlCol="0" anchor="ctr"/>
+          <a:lstStyle/>
+          <a:p>
+            <a:pPr algn="ctr"/>
+            <a:r>
+              <a:rPr lang="fr-FR" dirty="0" err="1"/>
+              <a:t>Task</a:t>
+            </a:r>
+            <a:r>
+              <a:rPr lang="fr-FR" dirty="0"/>
+              <a:t> 2.1</a:t>
+            </a:r>
+          </a:p>
+          <a:p>
+            <a:pPr algn="ctr"/>
+            <a:r>
+              <a:rPr lang="fr-FR" dirty="0"/>
+              <a:t>(Paris, Rouen)</a:t>
+            </a:r>
+          </a:p>
+        </p:txBody>
+      </p:sp>
+      <p:sp>
+        <p:nvSpPr>
+          <p:cNvPr id="15" name="Rectangle : coins arrondis 14">
+            <a:extLst>
+              <a:ext uri="{FF2B5EF4-FFF2-40B4-BE49-F238E27FC236}">
+                <a16:creationId xmlns:a16="http://schemas.microsoft.com/office/drawing/2014/main" id="{3C228D19-B726-4693-A9A8-F0383219E5C7}"/>
+              </a:ext>
+            </a:extLst>
+          </p:cNvPr>
+          <p:cNvSpPr/>
+          <p:nvPr/>
+        </p:nvSpPr>
+        <p:spPr>
+          <a:xfrm>
+            <a:off x="9671959" y="4726389"/>
+            <a:ext cx="1741715" cy="891544"/>
+          </a:xfrm>
+          <a:prstGeom prst="roundRect">
+            <a:avLst/>
+          </a:prstGeom>
+        </p:spPr>
+        <p:style>
+          <a:lnRef idx="2">
+            <a:schemeClr val="accent1">
+              <a:shade val="50000"/>
+            </a:schemeClr>
+          </a:lnRef>
+          <a:fillRef idx="1">
+            <a:schemeClr val="accent1"/>
+          </a:fillRef>
+          <a:effectRef idx="0">
+            <a:schemeClr val="accent1"/>
+          </a:effectRef>
+          <a:fontRef idx="minor">
+            <a:schemeClr val="lt1"/>
+          </a:fontRef>
+        </p:style>
+        <p:txBody>
+          <a:bodyPr rtlCol="0" anchor="ctr"/>
+          <a:lstStyle/>
+          <a:p>
+            <a:pPr algn="ctr"/>
+            <a:r>
+              <a:rPr lang="fr-FR" dirty="0" err="1"/>
+              <a:t>Task</a:t>
+            </a:r>
+            <a:r>
+              <a:rPr lang="fr-FR" dirty="0"/>
+              <a:t> 2.1</a:t>
+            </a:r>
+          </a:p>
+          <a:p>
+            <a:pPr algn="ctr"/>
+            <a:r>
+              <a:rPr lang="fr-FR" dirty="0"/>
+              <a:t>(Toulouse, Marseille)</a:t>
+            </a:r>
+          </a:p>
+        </p:txBody>
+      </p:sp>
+      <p:cxnSp>
+        <p:nvCxnSpPr>
+          <p:cNvPr id="17" name="Connecteur droit avec flèche 16">
+            <a:extLst>
+              <a:ext uri="{FF2B5EF4-FFF2-40B4-BE49-F238E27FC236}">
+                <a16:creationId xmlns:a16="http://schemas.microsoft.com/office/drawing/2014/main" id="{87474D46-06AB-46F8-AEDF-B94F398909D9}"/>
+              </a:ext>
+            </a:extLst>
+          </p:cNvPr>
+          <p:cNvCxnSpPr>
+            <a:cxnSpLocks/>
+            <a:stCxn id="11" idx="2"/>
+            <a:endCxn id="14" idx="0"/>
+          </p:cNvCxnSpPr>
+          <p:nvPr/>
+        </p:nvCxnSpPr>
+        <p:spPr>
+          <a:xfrm>
+            <a:off x="7690760" y="3402373"/>
+            <a:ext cx="0" cy="1341747"/>
+          </a:xfrm>
+          <a:prstGeom prst="straightConnector1">
+            <a:avLst/>
+          </a:prstGeom>
+          <a:ln>
+            <a:tailEnd type="triangle"/>
+          </a:ln>
+        </p:spPr>
+        <p:style>
+          <a:lnRef idx="1">
+            <a:schemeClr val="accent1"/>
+          </a:lnRef>
+          <a:fillRef idx="0">
+            <a:schemeClr val="accent1"/>
+          </a:fillRef>
+          <a:effectRef idx="0">
+            <a:schemeClr val="accent1"/>
+          </a:effectRef>
+          <a:fontRef idx="minor">
+            <a:schemeClr val="tx1"/>
+          </a:fontRef>
+        </p:style>
+      </p:cxnSp>
+      <p:cxnSp>
+        <p:nvCxnSpPr>
+          <p:cNvPr id="19" name="Connecteur droit avec flèche 18">
+            <a:extLst>
+              <a:ext uri="{FF2B5EF4-FFF2-40B4-BE49-F238E27FC236}">
+                <a16:creationId xmlns:a16="http://schemas.microsoft.com/office/drawing/2014/main" id="{239DEB01-64BE-4C24-9CF6-EF1A1F40161F}"/>
+              </a:ext>
+            </a:extLst>
+          </p:cNvPr>
+          <p:cNvCxnSpPr>
+            <a:cxnSpLocks/>
+            <a:endCxn id="14" idx="0"/>
+          </p:cNvCxnSpPr>
+          <p:nvPr/>
+        </p:nvCxnSpPr>
+        <p:spPr>
+          <a:xfrm flipH="1">
+            <a:off x="7690760" y="3402373"/>
+            <a:ext cx="1057495" cy="1341747"/>
+          </a:xfrm>
+          <a:prstGeom prst="straightConnector1">
+            <a:avLst/>
+          </a:prstGeom>
+          <a:ln>
+            <a:tailEnd type="triangle"/>
+          </a:ln>
+        </p:spPr>
+        <p:style>
+          <a:lnRef idx="1">
+            <a:schemeClr val="accent1"/>
+          </a:lnRef>
+          <a:fillRef idx="0">
+            <a:schemeClr val="accent1"/>
+          </a:fillRef>
+          <a:effectRef idx="0">
+            <a:schemeClr val="accent1"/>
+          </a:effectRef>
+          <a:fontRef idx="minor">
+            <a:schemeClr val="tx1"/>
+          </a:fontRef>
+        </p:style>
+      </p:cxnSp>
+      <p:cxnSp>
+        <p:nvCxnSpPr>
+          <p:cNvPr id="21" name="Connecteur droit avec flèche 20">
+            <a:extLst>
+              <a:ext uri="{FF2B5EF4-FFF2-40B4-BE49-F238E27FC236}">
+                <a16:creationId xmlns:a16="http://schemas.microsoft.com/office/drawing/2014/main" id="{4993CD5F-6461-4B75-AF06-34BD374569C4}"/>
+              </a:ext>
+            </a:extLst>
+          </p:cNvPr>
+          <p:cNvCxnSpPr>
+            <a:cxnSpLocks/>
+            <a:endCxn id="14" idx="0"/>
+          </p:cNvCxnSpPr>
+          <p:nvPr/>
+        </p:nvCxnSpPr>
+        <p:spPr>
+          <a:xfrm flipH="1">
+            <a:off x="7690760" y="3473009"/>
+            <a:ext cx="1794561" cy="1271111"/>
+          </a:xfrm>
+          <a:prstGeom prst="straightConnector1">
+            <a:avLst/>
+          </a:prstGeom>
+          <a:ln>
+            <a:tailEnd type="triangle"/>
+          </a:ln>
+        </p:spPr>
+        <p:style>
+          <a:lnRef idx="1">
+            <a:schemeClr val="accent1"/>
+          </a:lnRef>
+          <a:fillRef idx="0">
+            <a:schemeClr val="accent1"/>
+          </a:fillRef>
+          <a:effectRef idx="0">
+            <a:schemeClr val="accent1"/>
+          </a:effectRef>
+          <a:fontRef idx="minor">
+            <a:schemeClr val="tx1"/>
+          </a:fontRef>
+        </p:style>
+      </p:cxnSp>
+      <p:cxnSp>
+        <p:nvCxnSpPr>
+          <p:cNvPr id="25" name="Connecteur droit avec flèche 24">
+            <a:extLst>
+              <a:ext uri="{FF2B5EF4-FFF2-40B4-BE49-F238E27FC236}">
+                <a16:creationId xmlns:a16="http://schemas.microsoft.com/office/drawing/2014/main" id="{7FFF1A83-5DC6-4763-BE44-B6166F191A81}"/>
+              </a:ext>
+            </a:extLst>
+          </p:cNvPr>
+          <p:cNvCxnSpPr>
+            <a:stCxn id="13" idx="2"/>
+            <a:endCxn id="14" idx="0"/>
+          </p:cNvCxnSpPr>
+          <p:nvPr/>
+        </p:nvCxnSpPr>
+        <p:spPr>
+          <a:xfrm flipH="1">
+            <a:off x="7690760" y="3402373"/>
+            <a:ext cx="2852057" cy="1341747"/>
+          </a:xfrm>
+          <a:prstGeom prst="straightConnector1">
+            <a:avLst/>
+          </a:prstGeom>
+          <a:ln>
+            <a:tailEnd type="triangle"/>
+          </a:ln>
+        </p:spPr>
+        <p:style>
+          <a:lnRef idx="1">
+            <a:schemeClr val="accent1"/>
+          </a:lnRef>
+          <a:fillRef idx="0">
+            <a:schemeClr val="accent1"/>
+          </a:fillRef>
+          <a:effectRef idx="0">
+            <a:schemeClr val="accent1"/>
+          </a:effectRef>
+          <a:fontRef idx="minor">
+            <a:schemeClr val="tx1"/>
+          </a:fontRef>
+        </p:style>
+      </p:cxnSp>
+      <p:cxnSp>
+        <p:nvCxnSpPr>
+          <p:cNvPr id="30" name="Connecteur droit avec flèche 29">
+            <a:extLst>
+              <a:ext uri="{FF2B5EF4-FFF2-40B4-BE49-F238E27FC236}">
+                <a16:creationId xmlns:a16="http://schemas.microsoft.com/office/drawing/2014/main" id="{18B84436-1F96-4A5F-A362-530D87BF8BBD}"/>
+              </a:ext>
+            </a:extLst>
+          </p:cNvPr>
+          <p:cNvCxnSpPr>
+            <a:stCxn id="11" idx="2"/>
+            <a:endCxn id="15" idx="0"/>
+          </p:cNvCxnSpPr>
+          <p:nvPr/>
+        </p:nvCxnSpPr>
+        <p:spPr>
+          <a:xfrm>
+            <a:off x="7690760" y="3402373"/>
+            <a:ext cx="2852057" cy="1324016"/>
+          </a:xfrm>
+          <a:prstGeom prst="straightConnector1">
+            <a:avLst/>
+          </a:prstGeom>
+          <a:ln>
+            <a:tailEnd type="triangle"/>
+          </a:ln>
+        </p:spPr>
+        <p:style>
+          <a:lnRef idx="1">
+            <a:schemeClr val="accent1"/>
+          </a:lnRef>
+          <a:fillRef idx="0">
+            <a:schemeClr val="accent1"/>
+          </a:fillRef>
+          <a:effectRef idx="0">
+            <a:schemeClr val="accent1"/>
+          </a:effectRef>
+          <a:fontRef idx="minor">
+            <a:schemeClr val="tx1"/>
+          </a:fontRef>
+        </p:style>
+      </p:cxnSp>
+      <p:cxnSp>
+        <p:nvCxnSpPr>
+          <p:cNvPr id="32" name="Connecteur droit avec flèche 31">
+            <a:extLst>
+              <a:ext uri="{FF2B5EF4-FFF2-40B4-BE49-F238E27FC236}">
+                <a16:creationId xmlns:a16="http://schemas.microsoft.com/office/drawing/2014/main" id="{160B4FE0-FB46-4A40-9FC5-17AF10EBC55F}"/>
+              </a:ext>
+            </a:extLst>
+          </p:cNvPr>
+          <p:cNvCxnSpPr>
+            <a:cxnSpLocks/>
+            <a:endCxn id="15" idx="0"/>
+          </p:cNvCxnSpPr>
+          <p:nvPr/>
+        </p:nvCxnSpPr>
+        <p:spPr>
+          <a:xfrm>
+            <a:off x="8748255" y="3411684"/>
+            <a:ext cx="1794562" cy="1314705"/>
+          </a:xfrm>
+          <a:prstGeom prst="straightConnector1">
+            <a:avLst/>
+          </a:prstGeom>
+          <a:ln>
+            <a:tailEnd type="triangle"/>
+          </a:ln>
+        </p:spPr>
+        <p:style>
+          <a:lnRef idx="1">
+            <a:schemeClr val="accent1"/>
+          </a:lnRef>
+          <a:fillRef idx="0">
+            <a:schemeClr val="accent1"/>
+          </a:fillRef>
+          <a:effectRef idx="0">
+            <a:schemeClr val="accent1"/>
+          </a:effectRef>
+          <a:fontRef idx="minor">
+            <a:schemeClr val="tx1"/>
+          </a:fontRef>
+        </p:style>
+      </p:cxnSp>
+      <p:cxnSp>
+        <p:nvCxnSpPr>
+          <p:cNvPr id="35" name="Connecteur droit avec flèche 34">
+            <a:extLst>
+              <a:ext uri="{FF2B5EF4-FFF2-40B4-BE49-F238E27FC236}">
+                <a16:creationId xmlns:a16="http://schemas.microsoft.com/office/drawing/2014/main" id="{C05DE6AF-1EC2-491C-B6DA-2B5C6C0A7C27}"/>
+              </a:ext>
+            </a:extLst>
+          </p:cNvPr>
+          <p:cNvCxnSpPr>
+            <a:cxnSpLocks/>
+            <a:endCxn id="15" idx="0"/>
+          </p:cNvCxnSpPr>
+          <p:nvPr/>
+        </p:nvCxnSpPr>
+        <p:spPr>
+          <a:xfrm>
+            <a:off x="9485321" y="3473009"/>
+            <a:ext cx="1057496" cy="1253380"/>
+          </a:xfrm>
+          <a:prstGeom prst="straightConnector1">
+            <a:avLst/>
+          </a:prstGeom>
+          <a:ln>
+            <a:tailEnd type="triangle"/>
+          </a:ln>
+        </p:spPr>
+        <p:style>
+          <a:lnRef idx="1">
+            <a:schemeClr val="accent1"/>
+          </a:lnRef>
+          <a:fillRef idx="0">
+            <a:schemeClr val="accent1"/>
+          </a:fillRef>
+          <a:effectRef idx="0">
+            <a:schemeClr val="accent1"/>
+          </a:effectRef>
+          <a:fontRef idx="minor">
+            <a:schemeClr val="tx1"/>
+          </a:fontRef>
+        </p:style>
+      </p:cxnSp>
+      <p:cxnSp>
+        <p:nvCxnSpPr>
+          <p:cNvPr id="38" name="Connecteur droit avec flèche 37">
+            <a:extLst>
+              <a:ext uri="{FF2B5EF4-FFF2-40B4-BE49-F238E27FC236}">
+                <a16:creationId xmlns:a16="http://schemas.microsoft.com/office/drawing/2014/main" id="{2CF06D96-AFFA-4D0E-BFD8-9D6EE0DF8CA6}"/>
+              </a:ext>
+            </a:extLst>
+          </p:cNvPr>
+          <p:cNvCxnSpPr>
+            <a:stCxn id="13" idx="2"/>
+          </p:cNvCxnSpPr>
+          <p:nvPr/>
+        </p:nvCxnSpPr>
+        <p:spPr>
+          <a:xfrm flipH="1">
+            <a:off x="10542815" y="3402373"/>
+            <a:ext cx="2" cy="1412383"/>
+          </a:xfrm>
+          <a:prstGeom prst="straightConnector1">
+            <a:avLst/>
+          </a:prstGeom>
+          <a:ln>
+            <a:tailEnd type="triangle"/>
+          </a:ln>
+        </p:spPr>
+        <p:style>
+          <a:lnRef idx="1">
+            <a:schemeClr val="accent1"/>
+          </a:lnRef>
+          <a:fillRef idx="0">
+            <a:schemeClr val="accent1"/>
+          </a:fillRef>
+          <a:effectRef idx="0">
+            <a:schemeClr val="accent1"/>
+          </a:effectRef>
+          <a:fontRef idx="minor">
+            <a:schemeClr val="tx1"/>
+          </a:fontRef>
+        </p:style>
+      </p:cxnSp>
+      <p:sp>
+        <p:nvSpPr>
+          <p:cNvPr id="39" name="TextBox 4">
+            <a:extLst>
+              <a:ext uri="{FF2B5EF4-FFF2-40B4-BE49-F238E27FC236}">
+                <a16:creationId xmlns:a16="http://schemas.microsoft.com/office/drawing/2014/main" id="{15A1ED72-5114-46CE-A794-B822B761E665}"/>
+              </a:ext>
+            </a:extLst>
+          </p:cNvPr>
+          <p:cNvSpPr txBox="1"/>
+          <p:nvPr/>
+        </p:nvSpPr>
+        <p:spPr>
+          <a:xfrm>
+            <a:off x="1036948" y="6143260"/>
+            <a:ext cx="9881423" cy="369332"/>
+          </a:xfrm>
+          <a:prstGeom prst="rect">
+            <a:avLst/>
+          </a:prstGeom>
+          <a:noFill/>
+        </p:spPr>
+        <p:txBody>
+          <a:bodyPr wrap="square" rtlCol="0">
+            <a:spAutoFit/>
+          </a:bodyPr>
+          <a:lstStyle/>
+          <a:p>
+            <a:r>
+              <a:rPr lang="fr-FR" dirty="0"/>
+              <a:t>No </a:t>
+            </a:r>
+            <a:r>
+              <a:rPr lang="fr-FR" dirty="0" err="1"/>
+              <a:t>shuffle</a:t>
+            </a:r>
+            <a:r>
+              <a:rPr lang="fr-FR" dirty="0"/>
+              <a:t> if </a:t>
+            </a:r>
+            <a:r>
+              <a:rPr lang="fr-FR" dirty="0" err="1"/>
+              <a:t>your</a:t>
+            </a:r>
+            <a:r>
+              <a:rPr lang="fr-FR" dirty="0"/>
+              <a:t> </a:t>
+            </a:r>
+            <a:r>
+              <a:rPr lang="fr-FR" dirty="0" err="1"/>
+              <a:t>dataset</a:t>
+            </a:r>
+            <a:r>
+              <a:rPr lang="fr-FR" dirty="0"/>
+              <a:t> </a:t>
+            </a:r>
+            <a:r>
+              <a:rPr lang="fr-FR" dirty="0" err="1"/>
+              <a:t>is</a:t>
+            </a:r>
+            <a:r>
+              <a:rPr lang="fr-FR" dirty="0"/>
+              <a:t> </a:t>
+            </a:r>
+            <a:r>
+              <a:rPr lang="fr-FR" dirty="0" err="1"/>
+              <a:t>already</a:t>
+            </a:r>
+            <a:r>
+              <a:rPr lang="fr-FR" dirty="0"/>
+              <a:t> </a:t>
+            </a:r>
+            <a:r>
+              <a:rPr lang="fr-FR" dirty="0" err="1"/>
+              <a:t>partitionned</a:t>
+            </a:r>
+            <a:r>
+              <a:rPr lang="fr-FR" dirty="0"/>
+              <a:t> by the key </a:t>
+            </a:r>
+            <a:r>
+              <a:rPr lang="fr-FR" dirty="0" err="1"/>
+              <a:t>you</a:t>
+            </a:r>
+            <a:r>
+              <a:rPr lang="fr-FR" dirty="0"/>
+              <a:t> </a:t>
+            </a:r>
+            <a:r>
+              <a:rPr lang="fr-FR" dirty="0" err="1"/>
+              <a:t>want</a:t>
+            </a:r>
+            <a:r>
+              <a:rPr lang="fr-FR" dirty="0"/>
+              <a:t> to </a:t>
+            </a:r>
+            <a:r>
+              <a:rPr lang="fr-FR" dirty="0" err="1"/>
+              <a:t>aggregate</a:t>
+            </a:r>
+            <a:r>
+              <a:rPr lang="fr-FR" dirty="0"/>
+              <a:t>-on !</a:t>
+            </a:r>
+          </a:p>
+        </p:txBody>
+      </p:sp>
+    </p:spTree>
+    <p:extLst>
+      <p:ext uri="{BB962C8B-B14F-4D97-AF65-F5344CB8AC3E}">
+        <p14:creationId xmlns:p14="http://schemas.microsoft.com/office/powerpoint/2010/main" val="1429408351"/>
+      </p:ext>
+    </p:extLst>
+  </p:cSld>
+  <p:clrMapOvr>
+    <a:masterClrMapping/>
+  </p:clrMapOvr>
+</p:sld>
+</file>
+
+<file path=ppt/slides/slide3.xml><?xml version="1.0" encoding="utf-8"?>
+<p:sld xmlns:a="http://schemas.openxmlformats.org/drawingml/2006/main" xmlns:r="http://schemas.openxmlformats.org/officeDocument/2006/relationships" xmlns:p="http://schemas.openxmlformats.org/presentationml/2006/main">
+  <p:cSld>
+    <p:spTree>
+      <p:nvGrpSpPr>
+        <p:cNvPr id="1" name=""/>
+        <p:cNvGrpSpPr/>
+        <p:nvPr/>
+      </p:nvGrpSpPr>
+      <p:grpSpPr>
+        <a:xfrm>
+          <a:off x="0" y="0"/>
+          <a:ext cx="0" cy="0"/>
+          <a:chOff x="0" y="0"/>
+          <a:chExt cx="0" cy="0"/>
+        </a:xfrm>
+      </p:grpSpPr>
+      <p:sp>
+        <p:nvSpPr>
+          <p:cNvPr id="2" name="Title 1">
+            <a:extLst>
+              <a:ext uri="{FF2B5EF4-FFF2-40B4-BE49-F238E27FC236}">
+                <a16:creationId xmlns:a16="http://schemas.microsoft.com/office/drawing/2014/main" id="{1EF77BFB-B82D-46E7-9ED3-A723BCC0A39C}"/>
+              </a:ext>
+            </a:extLst>
+          </p:cNvPr>
+          <p:cNvSpPr>
+            <a:spLocks noGrp="1"/>
+          </p:cNvSpPr>
+          <p:nvPr>
+            <p:ph type="title"/>
+          </p:nvPr>
+        </p:nvSpPr>
+        <p:spPr/>
+        <p:txBody>
+          <a:bodyPr/>
+          <a:lstStyle/>
+          <a:p>
+            <a:r>
+              <a:rPr lang="fr-FR" err="1"/>
+              <a:t>DataFrame</a:t>
+            </a:r>
+            <a:r>
+              <a:rPr lang="fr-FR"/>
+              <a:t> vs RDD</a:t>
+            </a:r>
+            <a:endParaRPr lang="en-US"/>
+          </a:p>
+        </p:txBody>
+      </p:sp>
+      <p:graphicFrame>
+        <p:nvGraphicFramePr>
+          <p:cNvPr id="3" name="Table 3">
+            <a:extLst>
+              <a:ext uri="{FF2B5EF4-FFF2-40B4-BE49-F238E27FC236}">
+                <a16:creationId xmlns:a16="http://schemas.microsoft.com/office/drawing/2014/main" id="{8AC5CF6B-3A9E-4753-8D79-A19BA46BDB37}"/>
+              </a:ext>
+            </a:extLst>
+          </p:cNvPr>
+          <p:cNvGraphicFramePr>
+            <a:graphicFrameLocks noGrp="1"/>
+          </p:cNvGraphicFramePr>
+          <p:nvPr>
+            <p:extLst>
+              <p:ext uri="{D42A27DB-BD31-4B8C-83A1-F6EECF244321}">
+                <p14:modId xmlns:p14="http://schemas.microsoft.com/office/powerpoint/2010/main" val="3240734895"/>
+              </p:ext>
+            </p:extLst>
+          </p:nvPr>
+        </p:nvGraphicFramePr>
+        <p:xfrm>
+          <a:off x="1758877" y="1980479"/>
+          <a:ext cx="8168638" cy="3187021"/>
+        </p:xfrm>
+        <a:graphic>
+          <a:graphicData uri="http://schemas.openxmlformats.org/drawingml/2006/table">
+            <a:tbl>
+              <a:tblPr firstRow="1" bandRow="1">
+                <a:tableStyleId>{5C22544A-7EE6-4342-B048-85BDC9FD1C3A}</a:tableStyleId>
+              </a:tblPr>
+              <a:tblGrid>
+                <a:gridCol w="1948295">
+                  <a:extLst>
+                    <a:ext uri="{9D8B030D-6E8A-4147-A177-3AD203B41FA5}">
+                      <a16:colId xmlns:a16="http://schemas.microsoft.com/office/drawing/2014/main" val="2054145470"/>
+                    </a:ext>
+                  </a:extLst>
+                </a:gridCol>
+                <a:gridCol w="3497464">
+                  <a:extLst>
+                    <a:ext uri="{9D8B030D-6E8A-4147-A177-3AD203B41FA5}">
+                      <a16:colId xmlns:a16="http://schemas.microsoft.com/office/drawing/2014/main" val="663163494"/>
+                    </a:ext>
+                  </a:extLst>
+                </a:gridCol>
+                <a:gridCol w="2722879">
+                  <a:extLst>
+                    <a:ext uri="{9D8B030D-6E8A-4147-A177-3AD203B41FA5}">
+                      <a16:colId xmlns:a16="http://schemas.microsoft.com/office/drawing/2014/main" val="1763996286"/>
+                    </a:ext>
+                  </a:extLst>
+                </a:gridCol>
+              </a:tblGrid>
+              <a:tr h="626701">
+                <a:tc>
+                  <a:txBody>
+                    <a:bodyPr/>
+                    <a:lstStyle/>
+                    <a:p>
+                      <a:r>
+                        <a:rPr lang="en-US"/>
+                        <a:t>Feature</a:t>
+                      </a:r>
+                    </a:p>
+                  </a:txBody>
+                  <a:tcPr/>
+                </a:tc>
+                <a:tc>
+                  <a:txBody>
+                    <a:bodyPr/>
+                    <a:lstStyle/>
+                    <a:p>
+                      <a:r>
+                        <a:rPr lang="en-US" err="1"/>
+                        <a:t>DataFrame</a:t>
+                      </a:r>
+                    </a:p>
+                  </a:txBody>
+                  <a:tcPr/>
+                </a:tc>
+                <a:tc>
+                  <a:txBody>
+                    <a:bodyPr/>
+                    <a:lstStyle/>
+                    <a:p>
+                      <a:r>
+                        <a:rPr lang="en-US"/>
+                        <a:t>RDD</a:t>
+                      </a:r>
+                    </a:p>
+                  </a:txBody>
+                  <a:tcPr/>
+                </a:tc>
+                <a:extLst>
+                  <a:ext uri="{0D108BD9-81ED-4DB2-BD59-A6C34878D82A}">
+                    <a16:rowId xmlns:a16="http://schemas.microsoft.com/office/drawing/2014/main" val="573614090"/>
+                  </a:ext>
+                </a:extLst>
+              </a:tr>
+              <a:tr h="626701">
+                <a:tc>
+                  <a:txBody>
+                    <a:bodyPr/>
+                    <a:lstStyle/>
+                    <a:p>
+                      <a:r>
+                        <a:rPr lang="en-US"/>
+                        <a:t>Data Format</a:t>
+                      </a:r>
+                    </a:p>
+                  </a:txBody>
+                  <a:tcPr/>
+                </a:tc>
+                <a:tc>
+                  <a:txBody>
+                    <a:bodyPr/>
+                    <a:lstStyle/>
+                    <a:p>
+                      <a:r>
+                        <a:rPr lang="en-US"/>
+                        <a:t>Structured, organized in columns</a:t>
+                      </a:r>
+                    </a:p>
+                  </a:txBody>
+                  <a:tcPr/>
+                </a:tc>
+                <a:tc>
+                  <a:txBody>
+                    <a:bodyPr/>
+                    <a:lstStyle/>
+                    <a:p>
+                      <a:r>
+                        <a:rPr lang="en-US"/>
+                        <a:t>Anything, but schema to be passed to spark.</a:t>
+                      </a:r>
+                    </a:p>
+                  </a:txBody>
+                  <a:tcPr/>
+                </a:tc>
+                <a:extLst>
+                  <a:ext uri="{0D108BD9-81ED-4DB2-BD59-A6C34878D82A}">
+                    <a16:rowId xmlns:a16="http://schemas.microsoft.com/office/drawing/2014/main" val="435315506"/>
+                  </a:ext>
+                </a:extLst>
+              </a:tr>
+              <a:tr h="626701">
+                <a:tc>
+                  <a:txBody>
+                    <a:bodyPr/>
+                    <a:lstStyle/>
+                    <a:p>
+                      <a:r>
+                        <a:rPr lang="en-US"/>
+                        <a:t>Compile-time safety</a:t>
+                      </a:r>
+                    </a:p>
+                  </a:txBody>
+                  <a:tcPr/>
+                </a:tc>
+                <a:tc>
+                  <a:txBody>
+                    <a:bodyPr/>
+                    <a:lstStyle/>
+                    <a:p>
+                      <a:r>
+                        <a:rPr lang="en-US"/>
+                        <a:t>No</a:t>
+                      </a:r>
+                    </a:p>
+                  </a:txBody>
+                  <a:tcPr/>
+                </a:tc>
+                <a:tc>
+                  <a:txBody>
+                    <a:bodyPr/>
+                    <a:lstStyle/>
+                    <a:p>
+                      <a:r>
+                        <a:rPr lang="en-US"/>
+                        <a:t>Yes</a:t>
+                      </a:r>
+                    </a:p>
+                  </a:txBody>
+                  <a:tcPr/>
+                </a:tc>
+                <a:extLst>
+                  <a:ext uri="{0D108BD9-81ED-4DB2-BD59-A6C34878D82A}">
+                    <a16:rowId xmlns:a16="http://schemas.microsoft.com/office/drawing/2014/main" val="2691982164"/>
+                  </a:ext>
+                </a:extLst>
+              </a:tr>
+              <a:tr h="626701">
+                <a:tc>
+                  <a:txBody>
+                    <a:bodyPr/>
+                    <a:lstStyle/>
+                    <a:p>
+                      <a:r>
+                        <a:rPr lang="en-US"/>
+                        <a:t>API</a:t>
+                      </a:r>
+                    </a:p>
+                  </a:txBody>
+                  <a:tcPr/>
+                </a:tc>
+                <a:tc>
+                  <a:txBody>
+                    <a:bodyPr/>
+                    <a:lstStyle/>
+                    <a:p>
+                      <a:r>
+                        <a:rPr lang="en-US"/>
+                        <a:t>High Level, spark take care of optimizations for you</a:t>
+                      </a:r>
+                    </a:p>
+                  </a:txBody>
+                  <a:tcPr/>
+                </a:tc>
+                <a:tc>
+                  <a:txBody>
+                    <a:bodyPr/>
+                    <a:lstStyle/>
+                    <a:p>
+                      <a:r>
+                        <a:rPr lang="en-US"/>
+                        <a:t>Low Level</a:t>
+                      </a:r>
+                    </a:p>
+                  </a:txBody>
+                  <a:tcPr/>
+                </a:tc>
+                <a:extLst>
+                  <a:ext uri="{0D108BD9-81ED-4DB2-BD59-A6C34878D82A}">
+                    <a16:rowId xmlns:a16="http://schemas.microsoft.com/office/drawing/2014/main" val="1165791648"/>
+                  </a:ext>
+                </a:extLst>
+              </a:tr>
+              <a:tr h="626701">
+                <a:tc>
+                  <a:txBody>
+                    <a:bodyPr/>
+                    <a:lstStyle/>
+                    <a:p>
+                      <a:r>
+                        <a:rPr lang="en-US"/>
+                        <a:t>Memory Management</a:t>
+                      </a:r>
+                    </a:p>
+                  </a:txBody>
+                  <a:tcPr/>
+                </a:tc>
+                <a:tc>
+                  <a:txBody>
+                    <a:bodyPr/>
+                    <a:lstStyle/>
+                    <a:p>
+                      <a:r>
+                        <a:rPr lang="en-US"/>
+                        <a:t>Off-heap (because spark knows the schema it is working with)</a:t>
+                      </a:r>
+                    </a:p>
+                  </a:txBody>
+                  <a:tcPr/>
+                </a:tc>
+                <a:tc>
+                  <a:txBody>
+                    <a:bodyPr/>
+                    <a:lstStyle/>
+                    <a:p>
+                      <a:r>
+                        <a:rPr lang="en-US"/>
+                        <a:t>Heap (implies serialization, garbage collection)</a:t>
+                      </a:r>
+                    </a:p>
+                  </a:txBody>
+                  <a:tcPr/>
+                </a:tc>
+                <a:extLst>
+                  <a:ext uri="{0D108BD9-81ED-4DB2-BD59-A6C34878D82A}">
+                    <a16:rowId xmlns:a16="http://schemas.microsoft.com/office/drawing/2014/main" val="2232703497"/>
+                  </a:ext>
+                </a:extLst>
+              </a:tr>
+            </a:tbl>
+          </a:graphicData>
+        </a:graphic>
+      </p:graphicFrame>
+    </p:spTree>
+    <p:extLst>
+      <p:ext uri="{BB962C8B-B14F-4D97-AF65-F5344CB8AC3E}">
+        <p14:creationId xmlns:p14="http://schemas.microsoft.com/office/powerpoint/2010/main" val="2929757071"/>
+      </p:ext>
+    </p:extLst>
+  </p:cSld>
+  <p:clrMapOvr>
+    <a:masterClrMapping/>
+  </p:clrMapOvr>
+</p:sld>
+</file>
+
+<file path=ppt/slides/slide4.xml><?xml version="1.0" encoding="utf-8"?>
+<p:sld xmlns:a="http://schemas.openxmlformats.org/drawingml/2006/main" xmlns:r="http://schemas.openxmlformats.org/officeDocument/2006/relationships" xmlns:p="http://schemas.openxmlformats.org/presentationml/2006/main">
+  <p:cSld>
+    <p:spTree>
+      <p:nvGrpSpPr>
+        <p:cNvPr id="1" name=""/>
+        <p:cNvGrpSpPr/>
+        <p:nvPr/>
+      </p:nvGrpSpPr>
+      <p:grpSpPr>
+        <a:xfrm>
+          <a:off x="0" y="0"/>
+          <a:ext cx="0" cy="0"/>
+          <a:chOff x="0" y="0"/>
+          <a:chExt cx="0" cy="0"/>
+        </a:xfrm>
+      </p:grpSpPr>
+      <p:sp>
+        <p:nvSpPr>
           <p:cNvPr id="2" name="Title 1">
             <a:extLst>
               <a:ext uri="{FF2B5EF4-FFF2-40B4-BE49-F238E27FC236}">
@@ -5920,7 +8229,7 @@
 </p:sld>
 </file>
 
-<file path=ppt/slides/slide3.xml><?xml version="1.0" encoding="utf-8"?>
+<file path=ppt/slides/slide5.xml><?xml version="1.0" encoding="utf-8"?>
 <p:sld xmlns:a="http://schemas.openxmlformats.org/drawingml/2006/main" xmlns:r="http://schemas.openxmlformats.org/officeDocument/2006/relationships" xmlns:p="http://schemas.openxmlformats.org/presentationml/2006/main">
   <p:cSld>
     <p:spTree>
@@ -7410,7 +9719,7 @@
 </p:sld>
 </file>
 
-<file path=ppt/slides/slide4.xml><?xml version="1.0" encoding="utf-8"?>
+<file path=ppt/slides/slide6.xml><?xml version="1.0" encoding="utf-8"?>
 <p:sld xmlns:a="http://schemas.openxmlformats.org/drawingml/2006/main" xmlns:r="http://schemas.openxmlformats.org/officeDocument/2006/relationships" xmlns:p="http://schemas.openxmlformats.org/presentationml/2006/main">
   <p:cSld>
     <p:spTree>
@@ -9090,7 +11399,7 @@
 </p:sld>
 </file>
 
-<file path=ppt/slides/slide5.xml><?xml version="1.0" encoding="utf-8"?>
+<file path=ppt/slides/slide7.xml><?xml version="1.0" encoding="utf-8"?>
 <p:sld xmlns:a="http://schemas.openxmlformats.org/drawingml/2006/main" xmlns:r="http://schemas.openxmlformats.org/officeDocument/2006/relationships" xmlns:p="http://schemas.openxmlformats.org/presentationml/2006/main">
   <p:cSld>
     <p:spTree>
@@ -10814,7 +13123,7 @@
 </p:sld>
 </file>
 
-<file path=ppt/slides/slide6.xml><?xml version="1.0" encoding="utf-8"?>
+<file path=ppt/slides/slide8.xml><?xml version="1.0" encoding="utf-8"?>
 <p:sld xmlns:a="http://schemas.openxmlformats.org/drawingml/2006/main" xmlns:r="http://schemas.openxmlformats.org/officeDocument/2006/relationships" xmlns:p="http://schemas.openxmlformats.org/presentationml/2006/main">
   <p:cSld>
     <p:spTree>
@@ -11635,873 +13944,6 @@
 </p:sld>
 </file>
 
-<file path=ppt/slides/slide7.xml><?xml version="1.0" encoding="utf-8"?>
-<p:sld xmlns:a="http://schemas.openxmlformats.org/drawingml/2006/main" xmlns:r="http://schemas.openxmlformats.org/officeDocument/2006/relationships" xmlns:p="http://schemas.openxmlformats.org/presentationml/2006/main">
-  <p:cSld>
-    <p:spTree>
-      <p:nvGrpSpPr>
-        <p:cNvPr id="1" name=""/>
-        <p:cNvGrpSpPr/>
-        <p:nvPr/>
-      </p:nvGrpSpPr>
-      <p:grpSpPr>
-        <a:xfrm>
-          <a:off x="0" y="0"/>
-          <a:ext cx="0" cy="0"/>
-          <a:chOff x="0" y="0"/>
-          <a:chExt cx="0" cy="0"/>
-        </a:xfrm>
-      </p:grpSpPr>
-      <p:sp>
-        <p:nvSpPr>
-          <p:cNvPr id="2" name="Title 1">
-            <a:extLst>
-              <a:ext uri="{FF2B5EF4-FFF2-40B4-BE49-F238E27FC236}">
-                <a16:creationId xmlns:a16="http://schemas.microsoft.com/office/drawing/2014/main" id="{1EF77BFB-B82D-46E7-9ED3-A723BCC0A39C}"/>
-              </a:ext>
-            </a:extLst>
-          </p:cNvPr>
-          <p:cNvSpPr>
-            <a:spLocks noGrp="1"/>
-          </p:cNvSpPr>
-          <p:nvPr>
-            <p:ph type="title"/>
-          </p:nvPr>
-        </p:nvSpPr>
-        <p:spPr/>
-        <p:txBody>
-          <a:bodyPr/>
-          <a:lstStyle/>
-          <a:p>
-            <a:r>
-              <a:rPr lang="fr-FR" err="1"/>
-              <a:t>Scraping</a:t>
-            </a:r>
-            <a:r>
-              <a:rPr lang="fr-FR"/>
-              <a:t> </a:t>
-            </a:r>
-            <a:r>
-              <a:rPr lang="fr-FR" err="1"/>
-              <a:t>around</a:t>
-            </a:r>
-            <a:r>
-              <a:rPr lang="fr-FR"/>
-              <a:t>...</a:t>
-            </a:r>
-            <a:endParaRPr lang="en-US"/>
-          </a:p>
-        </p:txBody>
-      </p:sp>
-      <p:sp>
-        <p:nvSpPr>
-          <p:cNvPr id="9" name="TextBox 4">
-            <a:extLst>
-              <a:ext uri="{FF2B5EF4-FFF2-40B4-BE49-F238E27FC236}">
-                <a16:creationId xmlns:a16="http://schemas.microsoft.com/office/drawing/2014/main" id="{4A862EC4-9979-42EA-87D4-2912983FD8C3}"/>
-              </a:ext>
-            </a:extLst>
-          </p:cNvPr>
-          <p:cNvSpPr txBox="1"/>
-          <p:nvPr/>
-        </p:nvSpPr>
-        <p:spPr>
-          <a:xfrm>
-            <a:off x="1036948" y="1432874"/>
-            <a:ext cx="10058400" cy="3785652"/>
-          </a:xfrm>
-          <a:prstGeom prst="rect">
-            <a:avLst/>
-          </a:prstGeom>
-          <a:noFill/>
-        </p:spPr>
-        <p:txBody>
-          <a:bodyPr wrap="square" lIns="91440" tIns="45720" rIns="91440" bIns="45720" rtlCol="0" anchor="t">
-            <a:spAutoFit/>
-          </a:bodyPr>
-          <a:lstStyle/>
-          <a:p>
-            <a:r>
-              <a:rPr lang="fr-FR" sz="2000" b="1" err="1">
-                <a:cs typeface="Calibri" panose="020F0502020204030204"/>
-              </a:rPr>
-              <a:t>Other</a:t>
-            </a:r>
-            <a:r>
-              <a:rPr lang="fr-FR" sz="2000" b="1" dirty="0">
-                <a:cs typeface="Calibri" panose="020F0502020204030204"/>
-              </a:rPr>
-              <a:t> </a:t>
-            </a:r>
-            <a:r>
-              <a:rPr lang="fr-FR" sz="2000" b="1" err="1">
-                <a:cs typeface="Calibri" panose="020F0502020204030204"/>
-              </a:rPr>
-              <a:t>operations</a:t>
-            </a:r>
-            <a:endParaRPr lang="fr-FR" sz="2000" b="1">
-              <a:cs typeface="Calibri" panose="020F0502020204030204"/>
-            </a:endParaRPr>
-          </a:p>
-          <a:p>
-            <a:pPr marL="285750" indent="-285750">
-              <a:buFontTx/>
-              <a:buChar char="-"/>
-            </a:pPr>
-            <a:r>
-              <a:rPr lang="fr-FR" sz="2000"/>
-              <a:t>Join</a:t>
-            </a:r>
-            <a:endParaRPr lang="fr-FR" sz="2000" err="1">
-              <a:cs typeface="Calibri"/>
-            </a:endParaRPr>
-          </a:p>
-          <a:p>
-            <a:pPr marL="285750" indent="-285750">
-              <a:buFontTx/>
-              <a:buChar char="-"/>
-            </a:pPr>
-            <a:r>
-              <a:rPr lang="fr-FR" sz="2000"/>
-              <a:t>Sort</a:t>
-            </a:r>
-            <a:endParaRPr lang="fr-FR" sz="2000">
-              <a:cs typeface="Calibri"/>
-            </a:endParaRPr>
-          </a:p>
-          <a:p>
-            <a:pPr marL="285750" indent="-285750">
-              <a:buChar char="-"/>
-            </a:pPr>
-            <a:r>
-              <a:rPr lang="fr-FR" sz="2000">
-                <a:cs typeface="Calibri"/>
-              </a:rPr>
-              <a:t>Windowing (when you need context on previous/following records to process a record, e.g. compute moving average, get the rank of a record...)</a:t>
-            </a:r>
-            <a:endParaRPr lang="fr-FR" sz="2000" dirty="0">
-              <a:cs typeface="Calibri"/>
-            </a:endParaRPr>
-          </a:p>
-          <a:p>
-            <a:endParaRPr lang="fr-FR" sz="2000">
-              <a:cs typeface="Calibri"/>
-            </a:endParaRPr>
-          </a:p>
-          <a:p>
-            <a:r>
-              <a:rPr lang="fr-FR" sz="2000" b="1">
-                <a:cs typeface="Calibri"/>
-              </a:rPr>
-              <a:t>SQL </a:t>
-            </a:r>
-            <a:r>
-              <a:rPr lang="fr-FR" sz="2000" b="1" err="1">
-                <a:cs typeface="Calibri"/>
-              </a:rPr>
-              <a:t>syntax</a:t>
-            </a:r>
-            <a:endParaRPr lang="fr-FR" sz="2000" b="1">
-              <a:cs typeface="Calibri"/>
-            </a:endParaRPr>
-          </a:p>
-          <a:p>
-            <a:r>
-              <a:rPr lang="fr-FR" sz="2000" err="1">
-                <a:ea typeface="+mn-lt"/>
-                <a:cs typeface="+mn-lt"/>
-              </a:rPr>
-              <a:t>ratings_df.createOrReplaceTempView</a:t>
-            </a:r>
-            <a:r>
-              <a:rPr lang="fr-FR" sz="2000">
-                <a:ea typeface="+mn-lt"/>
-                <a:cs typeface="+mn-lt"/>
-              </a:rPr>
-              <a:t>("Ratings")</a:t>
-            </a:r>
-            <a:endParaRPr lang="fr-FR"/>
-          </a:p>
-          <a:p>
-            <a:r>
-              <a:rPr lang="fr-FR" sz="2000" err="1">
-                <a:ea typeface="+mn-lt"/>
-                <a:cs typeface="+mn-lt"/>
-              </a:rPr>
-              <a:t>df</a:t>
-            </a:r>
-            <a:r>
-              <a:rPr lang="fr-FR" sz="2000">
-                <a:ea typeface="+mn-lt"/>
-                <a:cs typeface="+mn-lt"/>
-              </a:rPr>
-              <a:t> = </a:t>
-            </a:r>
-            <a:r>
-              <a:rPr lang="fr-FR" sz="2000" err="1">
-                <a:ea typeface="+mn-lt"/>
-                <a:cs typeface="+mn-lt"/>
-              </a:rPr>
-              <a:t>sql</a:t>
-            </a:r>
-            <a:r>
-              <a:rPr lang="fr-FR" sz="2000">
-                <a:ea typeface="+mn-lt"/>
-                <a:cs typeface="+mn-lt"/>
-              </a:rPr>
-              <a:t>('''select </a:t>
-            </a:r>
-            <a:r>
-              <a:rPr lang="fr-FR" sz="2000" err="1">
-                <a:ea typeface="+mn-lt"/>
-                <a:cs typeface="+mn-lt"/>
-              </a:rPr>
-              <a:t>Ratings.id_movie</a:t>
-            </a:r>
-            <a:r>
-              <a:rPr lang="fr-FR" sz="2000">
-                <a:ea typeface="+mn-lt"/>
-                <a:cs typeface="+mn-lt"/>
-              </a:rPr>
-              <a:t>, SUM(</a:t>
-            </a:r>
-            <a:r>
-              <a:rPr lang="fr-FR" sz="2000" err="1">
-                <a:ea typeface="+mn-lt"/>
-                <a:cs typeface="+mn-lt"/>
-              </a:rPr>
-              <a:t>Ratings.rating</a:t>
-            </a:r>
-            <a:r>
-              <a:rPr lang="fr-FR" sz="2000">
-                <a:ea typeface="+mn-lt"/>
-                <a:cs typeface="+mn-lt"/>
-              </a:rPr>
-              <a:t>) as s</a:t>
-            </a:r>
-            <a:endParaRPr lang="fr-FR">
-              <a:ea typeface="+mn-lt"/>
-              <a:cs typeface="+mn-lt"/>
-            </a:endParaRPr>
-          </a:p>
-          <a:p>
-            <a:r>
-              <a:rPr lang="fr-FR" sz="2000" dirty="0">
-                <a:ea typeface="+mn-lt"/>
-                <a:cs typeface="+mn-lt"/>
-              </a:rPr>
-              <a:t>                 </a:t>
-            </a:r>
-            <a:r>
-              <a:rPr lang="fr-FR" sz="2000" err="1">
-                <a:ea typeface="+mn-lt"/>
-                <a:cs typeface="+mn-lt"/>
-              </a:rPr>
-              <a:t>from</a:t>
-            </a:r>
-            <a:r>
-              <a:rPr lang="fr-FR" sz="2000">
-                <a:ea typeface="+mn-lt"/>
-                <a:cs typeface="+mn-lt"/>
-              </a:rPr>
-              <a:t> Ratings</a:t>
-            </a:r>
-            <a:br>
-              <a:rPr lang="fr-FR" sz="2000" dirty="0">
-                <a:ea typeface="+mn-lt"/>
-                <a:cs typeface="+mn-lt"/>
-              </a:rPr>
-            </a:br>
-            <a:r>
-              <a:rPr lang="fr-FR" sz="2000" dirty="0">
-                <a:ea typeface="+mn-lt"/>
-                <a:cs typeface="+mn-lt"/>
-              </a:rPr>
-              <a:t>                 </a:t>
-            </a:r>
-            <a:r>
-              <a:rPr lang="fr-FR" sz="2000" err="1">
-                <a:ea typeface="+mn-lt"/>
-                <a:cs typeface="+mn-lt"/>
-              </a:rPr>
-              <a:t>where</a:t>
-            </a:r>
-            <a:r>
-              <a:rPr lang="fr-FR" sz="2000" dirty="0">
-                <a:ea typeface="+mn-lt"/>
-                <a:cs typeface="+mn-lt"/>
-              </a:rPr>
-              <a:t> </a:t>
-            </a:r>
-            <a:r>
-              <a:rPr lang="fr-FR" sz="2000" err="1">
-                <a:ea typeface="+mn-lt"/>
-                <a:cs typeface="+mn-lt"/>
-              </a:rPr>
-              <a:t>Ratings.user_id</a:t>
-            </a:r>
-            <a:r>
-              <a:rPr lang="fr-FR" sz="2000">
-                <a:ea typeface="+mn-lt"/>
-                <a:cs typeface="+mn-lt"/>
-              </a:rPr>
-              <a:t>=2</a:t>
-            </a:r>
-            <a:br>
-              <a:rPr lang="fr-FR" sz="2000" dirty="0">
-                <a:ea typeface="+mn-lt"/>
-                <a:cs typeface="+mn-lt"/>
-              </a:rPr>
-            </a:br>
-            <a:r>
-              <a:rPr lang="fr-FR" sz="2000">
-                <a:ea typeface="+mn-lt"/>
-                <a:cs typeface="+mn-lt"/>
-              </a:rPr>
-              <a:t>                 group by </a:t>
-            </a:r>
-            <a:r>
-              <a:rPr lang="fr-FR" sz="2000" err="1">
-                <a:ea typeface="+mn-lt"/>
-                <a:cs typeface="+mn-lt"/>
-              </a:rPr>
-              <a:t>Ratings.id_movie</a:t>
-            </a:r>
-            <a:r>
-              <a:rPr lang="fr-FR" sz="2000">
-                <a:ea typeface="+mn-lt"/>
-                <a:cs typeface="+mn-lt"/>
-              </a:rPr>
-              <a:t>''')</a:t>
-            </a:r>
-            <a:endParaRPr lang="fr-FR">
-              <a:cs typeface="Calibri"/>
-            </a:endParaRPr>
-          </a:p>
-        </p:txBody>
-      </p:sp>
-    </p:spTree>
-    <p:extLst>
-      <p:ext uri="{BB962C8B-B14F-4D97-AF65-F5344CB8AC3E}">
-        <p14:creationId xmlns:p14="http://schemas.microsoft.com/office/powerpoint/2010/main" val="1252786671"/>
-      </p:ext>
-    </p:extLst>
-  </p:cSld>
-  <p:clrMapOvr>
-    <a:masterClrMapping/>
-  </p:clrMapOvr>
-</p:sld>
-</file>
-
-<file path=ppt/slides/slide8.xml><?xml version="1.0" encoding="utf-8"?>
-<p:sld xmlns:a="http://schemas.openxmlformats.org/drawingml/2006/main" xmlns:r="http://schemas.openxmlformats.org/officeDocument/2006/relationships" xmlns:p="http://schemas.openxmlformats.org/presentationml/2006/main">
-  <p:cSld>
-    <p:spTree>
-      <p:nvGrpSpPr>
-        <p:cNvPr id="1" name=""/>
-        <p:cNvGrpSpPr/>
-        <p:nvPr/>
-      </p:nvGrpSpPr>
-      <p:grpSpPr>
-        <a:xfrm>
-          <a:off x="0" y="0"/>
-          <a:ext cx="0" cy="0"/>
-          <a:chOff x="0" y="0"/>
-          <a:chExt cx="0" cy="0"/>
-        </a:xfrm>
-      </p:grpSpPr>
-      <p:sp>
-        <p:nvSpPr>
-          <p:cNvPr id="2" name="Title 1">
-            <a:extLst>
-              <a:ext uri="{FF2B5EF4-FFF2-40B4-BE49-F238E27FC236}">
-                <a16:creationId xmlns:a16="http://schemas.microsoft.com/office/drawing/2014/main" id="{CCEBEA0F-0285-4189-992D-2C894A4D4A61}"/>
-              </a:ext>
-            </a:extLst>
-          </p:cNvPr>
-          <p:cNvSpPr>
-            <a:spLocks noGrp="1"/>
-          </p:cNvSpPr>
-          <p:nvPr>
-            <p:ph type="title"/>
-          </p:nvPr>
-        </p:nvSpPr>
-        <p:spPr/>
-        <p:txBody>
-          <a:bodyPr/>
-          <a:lstStyle/>
-          <a:p>
-            <a:r>
-              <a:rPr lang="fr-FR"/>
-              <a:t>Appendix - </a:t>
-            </a:r>
-            <a:r>
-              <a:rPr lang="fr-FR" err="1"/>
-              <a:t>Explaining</a:t>
-            </a:r>
-            <a:r>
-              <a:rPr lang="fr-FR"/>
-              <a:t> </a:t>
-            </a:r>
-            <a:r>
-              <a:rPr lang="fr-FR" err="1"/>
-              <a:t>Explain</a:t>
-            </a:r>
-            <a:endParaRPr lang="en-US"/>
-          </a:p>
-        </p:txBody>
-      </p:sp>
-      <p:graphicFrame>
-        <p:nvGraphicFramePr>
-          <p:cNvPr id="6" name="Tableau 6">
-            <a:extLst>
-              <a:ext uri="{FF2B5EF4-FFF2-40B4-BE49-F238E27FC236}">
-                <a16:creationId xmlns:a16="http://schemas.microsoft.com/office/drawing/2014/main" id="{AF1C0C6C-8325-4157-A90A-6A1E1FB23A2D}"/>
-              </a:ext>
-            </a:extLst>
-          </p:cNvPr>
-          <p:cNvGraphicFramePr>
-            <a:graphicFrameLocks noGrp="1"/>
-          </p:cNvGraphicFramePr>
-          <p:nvPr>
-            <p:extLst>
-              <p:ext uri="{D42A27DB-BD31-4B8C-83A1-F6EECF244321}">
-                <p14:modId xmlns:p14="http://schemas.microsoft.com/office/powerpoint/2010/main" val="1791102191"/>
-              </p:ext>
-            </p:extLst>
-          </p:nvPr>
-        </p:nvGraphicFramePr>
-        <p:xfrm>
-          <a:off x="2187783" y="1885834"/>
-          <a:ext cx="7528893" cy="3769360"/>
-        </p:xfrm>
-        <a:graphic>
-          <a:graphicData uri="http://schemas.openxmlformats.org/drawingml/2006/table">
-            <a:tbl>
-              <a:tblPr firstRow="1" bandRow="1">
-                <a:tableStyleId>{5C22544A-7EE6-4342-B048-85BDC9FD1C3A}</a:tableStyleId>
-              </a:tblPr>
-              <a:tblGrid>
-                <a:gridCol w="3167253">
-                  <a:extLst>
-                    <a:ext uri="{9D8B030D-6E8A-4147-A177-3AD203B41FA5}">
-                      <a16:colId xmlns:a16="http://schemas.microsoft.com/office/drawing/2014/main" val="3427962586"/>
-                    </a:ext>
-                  </a:extLst>
-                </a:gridCol>
-                <a:gridCol w="4361640">
-                  <a:extLst>
-                    <a:ext uri="{9D8B030D-6E8A-4147-A177-3AD203B41FA5}">
-                      <a16:colId xmlns:a16="http://schemas.microsoft.com/office/drawing/2014/main" val="3365148309"/>
-                    </a:ext>
-                  </a:extLst>
-                </a:gridCol>
-              </a:tblGrid>
-              <a:tr h="0">
-                <a:tc>
-                  <a:txBody>
-                    <a:bodyPr/>
-                    <a:lstStyle/>
-                    <a:p>
-                      <a:r>
-                        <a:rPr lang="fr-FR"/>
-                        <a:t>Keyword</a:t>
-                      </a:r>
-                    </a:p>
-                  </a:txBody>
-                  <a:tcPr/>
-                </a:tc>
-                <a:tc>
-                  <a:txBody>
-                    <a:bodyPr/>
-                    <a:lstStyle/>
-                    <a:p>
-                      <a:r>
-                        <a:rPr lang="fr-FR" err="1"/>
-                        <a:t>Meaning</a:t>
-                      </a:r>
-                      <a:endParaRPr lang="fr-FR"/>
-                    </a:p>
-                  </a:txBody>
-                  <a:tcPr/>
-                </a:tc>
-                <a:extLst>
-                  <a:ext uri="{0D108BD9-81ED-4DB2-BD59-A6C34878D82A}">
-                    <a16:rowId xmlns:a16="http://schemas.microsoft.com/office/drawing/2014/main" val="3464255511"/>
-                  </a:ext>
-                </a:extLst>
-              </a:tr>
-              <a:tr h="370840">
-                <a:tc>
-                  <a:txBody>
-                    <a:bodyPr/>
-                    <a:lstStyle/>
-                    <a:p>
-                      <a:r>
-                        <a:rPr lang="fr-FR" err="1"/>
-                        <a:t>FileScan</a:t>
-                      </a:r>
-                      <a:endParaRPr lang="fr-FR"/>
-                    </a:p>
-                  </a:txBody>
-                  <a:tcPr/>
-                </a:tc>
-                <a:tc>
-                  <a:txBody>
-                    <a:bodyPr/>
-                    <a:lstStyle/>
-                    <a:p>
-                      <a:r>
-                        <a:rPr lang="fr-FR"/>
-                        <a:t>Data </a:t>
-                      </a:r>
-                      <a:r>
-                        <a:rPr lang="fr-FR" err="1"/>
-                        <a:t>read</a:t>
-                      </a:r>
-                      <a:endParaRPr lang="fr-FR"/>
-                    </a:p>
-                  </a:txBody>
-                  <a:tcPr/>
-                </a:tc>
-                <a:extLst>
-                  <a:ext uri="{0D108BD9-81ED-4DB2-BD59-A6C34878D82A}">
-                    <a16:rowId xmlns:a16="http://schemas.microsoft.com/office/drawing/2014/main" val="1975725446"/>
-                  </a:ext>
-                </a:extLst>
-              </a:tr>
-              <a:tr h="370840">
-                <a:tc>
-                  <a:txBody>
-                    <a:bodyPr/>
-                    <a:lstStyle/>
-                    <a:p>
-                      <a:r>
-                        <a:rPr lang="fr-FR" err="1"/>
-                        <a:t>InMemoryRelation</a:t>
-                      </a:r>
-                      <a:endParaRPr lang="fr-FR"/>
-                    </a:p>
-                    <a:p>
-                      <a:r>
-                        <a:rPr lang="fr-FR" err="1"/>
-                        <a:t>InMemoryTableScan</a:t>
-                      </a:r>
-                      <a:endParaRPr lang="fr-FR"/>
-                    </a:p>
-                  </a:txBody>
-                  <a:tcPr/>
-                </a:tc>
-                <a:tc>
-                  <a:txBody>
-                    <a:bodyPr/>
-                    <a:lstStyle/>
-                    <a:p>
-                      <a:r>
-                        <a:rPr lang="fr-FR" err="1"/>
-                        <a:t>When</a:t>
-                      </a:r>
-                      <a:r>
-                        <a:rPr lang="fr-FR"/>
-                        <a:t> </a:t>
-                      </a:r>
-                      <a:r>
-                        <a:rPr lang="fr-FR" err="1"/>
-                        <a:t>caching</a:t>
-                      </a:r>
-                      <a:r>
-                        <a:rPr lang="fr-FR"/>
-                        <a:t> has been </a:t>
-                      </a:r>
-                      <a:r>
-                        <a:rPr lang="fr-FR" err="1"/>
-                        <a:t>done</a:t>
-                      </a:r>
-                      <a:endParaRPr lang="fr-FR"/>
-                    </a:p>
-                  </a:txBody>
-                  <a:tcPr/>
-                </a:tc>
-                <a:extLst>
-                  <a:ext uri="{0D108BD9-81ED-4DB2-BD59-A6C34878D82A}">
-                    <a16:rowId xmlns:a16="http://schemas.microsoft.com/office/drawing/2014/main" val="2773974586"/>
-                  </a:ext>
-                </a:extLst>
-              </a:tr>
-              <a:tr h="370840">
-                <a:tc>
-                  <a:txBody>
-                    <a:bodyPr/>
-                    <a:lstStyle/>
-                    <a:p>
-                      <a:r>
-                        <a:rPr lang="fr-FR"/>
-                        <a:t>Exchange</a:t>
-                      </a:r>
-                    </a:p>
-                  </a:txBody>
-                  <a:tcPr/>
-                </a:tc>
-                <a:tc>
-                  <a:txBody>
-                    <a:bodyPr/>
-                    <a:lstStyle/>
-                    <a:p>
-                      <a:r>
-                        <a:rPr lang="fr-FR" err="1"/>
-                        <a:t>Shuffle</a:t>
-                      </a:r>
-                      <a:endParaRPr lang="fr-FR"/>
-                    </a:p>
-                  </a:txBody>
-                  <a:tcPr/>
-                </a:tc>
-                <a:extLst>
-                  <a:ext uri="{0D108BD9-81ED-4DB2-BD59-A6C34878D82A}">
-                    <a16:rowId xmlns:a16="http://schemas.microsoft.com/office/drawing/2014/main" val="3400787861"/>
-                  </a:ext>
-                </a:extLst>
-              </a:tr>
-              <a:tr h="370840">
-                <a:tc>
-                  <a:txBody>
-                    <a:bodyPr/>
-                    <a:lstStyle/>
-                    <a:p>
-                      <a:r>
-                        <a:rPr lang="fr-FR" err="1"/>
-                        <a:t>HashAggregate</a:t>
-                      </a:r>
-                      <a:endParaRPr lang="fr-FR"/>
-                    </a:p>
-                    <a:p>
-                      <a:r>
-                        <a:rPr lang="fr-FR" err="1"/>
-                        <a:t>SortAggregate</a:t>
-                      </a:r>
-                      <a:endParaRPr lang="fr-FR"/>
-                    </a:p>
-                  </a:txBody>
-                  <a:tcPr/>
-                </a:tc>
-                <a:tc>
-                  <a:txBody>
-                    <a:bodyPr/>
-                    <a:lstStyle/>
-                    <a:p>
-                      <a:r>
-                        <a:rPr lang="fr-FR" err="1"/>
-                        <a:t>When</a:t>
-                      </a:r>
-                      <a:r>
-                        <a:rPr lang="fr-FR"/>
-                        <a:t> </a:t>
-                      </a:r>
-                      <a:r>
-                        <a:rPr lang="fr-FR" err="1"/>
-                        <a:t>aggregating</a:t>
-                      </a:r>
-                      <a:r>
-                        <a:rPr lang="fr-FR"/>
-                        <a:t>!</a:t>
-                      </a:r>
-                    </a:p>
-                  </a:txBody>
-                  <a:tcPr/>
-                </a:tc>
-                <a:extLst>
-                  <a:ext uri="{0D108BD9-81ED-4DB2-BD59-A6C34878D82A}">
-                    <a16:rowId xmlns:a16="http://schemas.microsoft.com/office/drawing/2014/main" val="1645622270"/>
-                  </a:ext>
-                </a:extLst>
-              </a:tr>
-              <a:tr h="370840">
-                <a:tc>
-                  <a:txBody>
-                    <a:bodyPr/>
-                    <a:lstStyle/>
-                    <a:p>
-                      <a:r>
-                        <a:rPr lang="fr-FR" err="1"/>
-                        <a:t>BatchEvalPython</a:t>
-                      </a:r>
-                      <a:endParaRPr lang="fr-FR"/>
-                    </a:p>
-                  </a:txBody>
-                  <a:tcPr/>
-                </a:tc>
-                <a:tc>
-                  <a:txBody>
-                    <a:bodyPr/>
-                    <a:lstStyle/>
-                    <a:p>
-                      <a:r>
-                        <a:rPr lang="fr-FR"/>
-                        <a:t>User </a:t>
-                      </a:r>
-                      <a:r>
-                        <a:rPr lang="fr-FR" err="1"/>
-                        <a:t>defined</a:t>
-                      </a:r>
-                      <a:r>
-                        <a:rPr lang="fr-FR"/>
-                        <a:t> </a:t>
-                      </a:r>
-                      <a:r>
-                        <a:rPr lang="fr-FR" err="1"/>
-                        <a:t>function</a:t>
-                      </a:r>
-                      <a:endParaRPr lang="fr-FR"/>
-                    </a:p>
-                  </a:txBody>
-                  <a:tcPr/>
-                </a:tc>
-                <a:extLst>
-                  <a:ext uri="{0D108BD9-81ED-4DB2-BD59-A6C34878D82A}">
-                    <a16:rowId xmlns:a16="http://schemas.microsoft.com/office/drawing/2014/main" val="273080408"/>
-                  </a:ext>
-                </a:extLst>
-              </a:tr>
-              <a:tr h="370840">
-                <a:tc>
-                  <a:txBody>
-                    <a:bodyPr/>
-                    <a:lstStyle/>
-                    <a:p>
-                      <a:r>
-                        <a:rPr lang="fr-FR"/>
-                        <a:t>Project</a:t>
-                      </a:r>
-                    </a:p>
-                  </a:txBody>
-                  <a:tcPr/>
-                </a:tc>
-                <a:tc>
-                  <a:txBody>
-                    <a:bodyPr/>
-                    <a:lstStyle/>
-                    <a:p>
-                      <a:r>
-                        <a:rPr lang="fr-FR" err="1"/>
-                        <a:t>Defining</a:t>
-                      </a:r>
-                      <a:r>
-                        <a:rPr lang="fr-FR"/>
-                        <a:t> new </a:t>
-                      </a:r>
-                      <a:r>
-                        <a:rPr lang="fr-FR" err="1"/>
-                        <a:t>column</a:t>
-                      </a:r>
-                      <a:endParaRPr lang="fr-FR"/>
-                    </a:p>
-                  </a:txBody>
-                  <a:tcPr/>
-                </a:tc>
-                <a:extLst>
-                  <a:ext uri="{0D108BD9-81ED-4DB2-BD59-A6C34878D82A}">
-                    <a16:rowId xmlns:a16="http://schemas.microsoft.com/office/drawing/2014/main" val="1161682776"/>
-                  </a:ext>
-                </a:extLst>
-              </a:tr>
-              <a:tr h="370840">
-                <a:tc>
-                  <a:txBody>
-                    <a:bodyPr/>
-                    <a:lstStyle/>
-                    <a:p>
-                      <a:r>
-                        <a:rPr lang="fr-FR" err="1"/>
-                        <a:t>AdaptativeSparkPlan</a:t>
-                      </a:r>
-                    </a:p>
-                  </a:txBody>
-                  <a:tcPr/>
-                </a:tc>
-                <a:tc>
-                  <a:txBody>
-                    <a:bodyPr/>
-                    <a:lstStyle/>
-                    <a:p>
-                      <a:r>
-                        <a:rPr lang="fr-FR"/>
-                        <a:t>Spark </a:t>
-                      </a:r>
-                      <a:r>
-                        <a:rPr lang="fr-FR" err="1"/>
-                        <a:t>may</a:t>
-                      </a:r>
-                      <a:r>
-                        <a:rPr lang="fr-FR"/>
-                        <a:t> </a:t>
-                      </a:r>
-                      <a:r>
-                        <a:rPr lang="fr-FR" err="1"/>
-                        <a:t>want</a:t>
-                      </a:r>
-                      <a:r>
-                        <a:rPr lang="fr-FR"/>
-                        <a:t> to change the </a:t>
-                      </a:r>
-                      <a:r>
-                        <a:rPr lang="fr-FR" err="1"/>
-                        <a:t>physical</a:t>
-                      </a:r>
-                      <a:r>
-                        <a:rPr lang="fr-FR"/>
-                        <a:t> plan at runtime </a:t>
-                      </a:r>
-                      <a:r>
-                        <a:rPr lang="fr-FR" err="1"/>
-                        <a:t>based</a:t>
-                      </a:r>
-                      <a:r>
-                        <a:rPr lang="fr-FR"/>
-                        <a:t> on </a:t>
-                      </a:r>
-                      <a:r>
-                        <a:rPr lang="fr-FR" err="1"/>
-                        <a:t>statistics</a:t>
-                      </a:r>
-                      <a:r>
-                        <a:rPr lang="fr-FR"/>
-                        <a:t> </a:t>
-                      </a:r>
-                      <a:r>
-                        <a:rPr lang="fr-FR" err="1"/>
-                        <a:t>collected</a:t>
-                      </a:r>
-                      <a:r>
-                        <a:rPr lang="fr-FR"/>
-                        <a:t>.</a:t>
-                      </a:r>
-                    </a:p>
-                  </a:txBody>
-                  <a:tcPr/>
-                </a:tc>
-                <a:extLst>
-                  <a:ext uri="{0D108BD9-81ED-4DB2-BD59-A6C34878D82A}">
-                    <a16:rowId xmlns:a16="http://schemas.microsoft.com/office/drawing/2014/main" val="657081736"/>
-                  </a:ext>
-                </a:extLst>
-              </a:tr>
-            </a:tbl>
-          </a:graphicData>
-        </a:graphic>
-      </p:graphicFrame>
-    </p:spTree>
-    <p:extLst>
-      <p:ext uri="{BB962C8B-B14F-4D97-AF65-F5344CB8AC3E}">
-        <p14:creationId xmlns:p14="http://schemas.microsoft.com/office/powerpoint/2010/main" val="1807516561"/>
-      </p:ext>
-    </p:extLst>
-  </p:cSld>
-  <p:clrMapOvr>
-    <a:masterClrMapping/>
-  </p:clrMapOvr>
-</p:sld>
-</file>
-
 <file path=ppt/slides/slide9.xml><?xml version="1.0" encoding="utf-8"?>
 <p:sld xmlns:a="http://schemas.openxmlformats.org/drawingml/2006/main" xmlns:r="http://schemas.openxmlformats.org/officeDocument/2006/relationships" xmlns:p="http://schemas.openxmlformats.org/presentationml/2006/main">
   <p:cSld>
@@ -12524,7 +13966,7 @@
           <p:cNvPr id="2" name="Title 1">
             <a:extLst>
               <a:ext uri="{FF2B5EF4-FFF2-40B4-BE49-F238E27FC236}">
-                <a16:creationId xmlns:a16="http://schemas.microsoft.com/office/drawing/2014/main" id="{CCEBEA0F-0285-4189-992D-2C894A4D4A61}"/>
+                <a16:creationId xmlns:a16="http://schemas.microsoft.com/office/drawing/2014/main" id="{1EF77BFB-B82D-46E7-9ED3-A723BCC0A39C}"/>
               </a:ext>
             </a:extLst>
           </p:cNvPr>
@@ -12541,12 +13983,8 @@
           <a:lstStyle/>
           <a:p>
             <a:r>
-              <a:rPr lang="fr-FR"/>
-              <a:t>Appendix - </a:t>
-            </a:r>
-            <a:r>
               <a:rPr lang="fr-FR" err="1"/>
-              <a:t>Explaining</a:t>
+              <a:t>Scraping</a:t>
             </a:r>
             <a:r>
               <a:rPr lang="fr-FR"/>
@@ -12554,26 +13992,22 @@
             </a:r>
             <a:r>
               <a:rPr lang="fr-FR" err="1"/>
-              <a:t>Explain</a:t>
+              <a:t>around</a:t>
             </a:r>
             <a:r>
               <a:rPr lang="fr-FR"/>
-              <a:t> - </a:t>
-            </a:r>
-            <a:r>
-              <a:rPr lang="fr-FR" err="1"/>
-              <a:t>Partitionning</a:t>
-            </a:r>
-            <a:endParaRPr lang="en-US" err="1"/>
+              <a:t>...</a:t>
+            </a:r>
+            <a:endParaRPr lang="en-US"/>
           </a:p>
         </p:txBody>
       </p:sp>
       <p:sp>
         <p:nvSpPr>
-          <p:cNvPr id="3" name="TextBox 2">
-            <a:extLst>
-              <a:ext uri="{FF2B5EF4-FFF2-40B4-BE49-F238E27FC236}">
-                <a16:creationId xmlns:a16="http://schemas.microsoft.com/office/drawing/2014/main" id="{BC361A8F-D866-4182-888B-19A422A07044}"/>
+          <p:cNvPr id="9" name="TextBox 4">
+            <a:extLst>
+              <a:ext uri="{FF2B5EF4-FFF2-40B4-BE49-F238E27FC236}">
+                <a16:creationId xmlns:a16="http://schemas.microsoft.com/office/drawing/2014/main" id="{4A862EC4-9979-42EA-87D4-2912983FD8C3}"/>
               </a:ext>
             </a:extLst>
           </p:cNvPr>
@@ -12582,8 +14016,8 @@
         </p:nvSpPr>
         <p:spPr>
           <a:xfrm>
-            <a:off x="1211766" y="1434791"/>
-            <a:ext cx="9415346" cy="3970318"/>
+            <a:off x="1036948" y="1432874"/>
+            <a:ext cx="10058400" cy="3785652"/>
           </a:xfrm>
           <a:prstGeom prst="rect">
             <a:avLst/>
@@ -12591,212 +14025,274 @@
           <a:noFill/>
         </p:spPr>
         <p:txBody>
-          <a:bodyPr rot="0" spcFirstLastPara="0" vertOverflow="overflow" horzOverflow="overflow" vert="horz" wrap="square" lIns="91440" tIns="45720" rIns="91440" bIns="45720" numCol="1" spcCol="0" rtlCol="0" fromWordArt="0" anchor="t" anchorCtr="0" forceAA="0" compatLnSpc="1">
-            <a:prstTxWarp prst="textNoShape">
-              <a:avLst/>
-            </a:prstTxWarp>
+          <a:bodyPr wrap="square" lIns="91440" tIns="45720" rIns="91440" bIns="45720" rtlCol="0" anchor="t">
             <a:spAutoFit/>
           </a:bodyPr>
           <a:lstStyle/>
           <a:p>
             <a:r>
-              <a:rPr lang="en-US" dirty="0" err="1">
-                <a:cs typeface="Calibri"/>
-              </a:rPr>
-              <a:t>nb_records_by_key</a:t>
-            </a:r>
-            <a:r>
-              <a:rPr lang="en-US" dirty="0">
-                <a:cs typeface="Calibri"/>
-              </a:rPr>
-              <a:t> : </a:t>
-            </a:r>
-            <a:r>
-              <a:rPr lang="en-US" dirty="0" err="1">
-                <a:cs typeface="Calibri"/>
-              </a:rPr>
-              <a:t>dict</a:t>
-            </a:r>
-            <a:r>
-              <a:rPr lang="en-US" dirty="0">
-                <a:cs typeface="Calibri"/>
-              </a:rPr>
-              <a:t>&lt;string, int&gt; : amount of records in dataset, for each distinct key</a:t>
-            </a:r>
-            <a:endParaRPr lang="en-US" dirty="0"/>
-          </a:p>
-          <a:p>
-            <a:r>
-              <a:rPr lang="en-US" dirty="0">
-                <a:cs typeface="Calibri"/>
-              </a:rPr>
-              <a:t>n : total amount of records</a:t>
-            </a:r>
-            <a:endParaRPr lang="en-US" dirty="0"/>
-          </a:p>
-          <a:p>
-            <a:endParaRPr lang="en-US" dirty="0"/>
-          </a:p>
-          <a:p>
-            <a:r>
-              <a:rPr lang="en-US" b="1" dirty="0"/>
-              <a:t>Exchange </a:t>
-            </a:r>
-            <a:r>
-              <a:rPr lang="en-US" b="1" dirty="0" err="1"/>
-              <a:t>RangePartitioning</a:t>
-            </a:r>
-            <a:r>
-              <a:rPr lang="en-US" b="1" dirty="0"/>
-              <a:t>(k)</a:t>
-            </a:r>
-            <a:endParaRPr lang="en-US" b="1" dirty="0">
+              <a:rPr lang="fr-FR" sz="2000" b="1" err="1">
+                <a:cs typeface="Calibri" panose="020F0502020204030204"/>
+              </a:rPr>
+              <a:t>Other</a:t>
+            </a:r>
+            <a:r>
+              <a:rPr lang="fr-FR" sz="2000" b="1" dirty="0">
+                <a:cs typeface="Calibri" panose="020F0502020204030204"/>
+              </a:rPr>
+              <a:t> </a:t>
+            </a:r>
+            <a:r>
+              <a:rPr lang="fr-FR" sz="2000" b="1" err="1">
+                <a:cs typeface="Calibri" panose="020F0502020204030204"/>
+              </a:rPr>
+              <a:t>operations</a:t>
+            </a:r>
+            <a:endParaRPr lang="fr-FR" sz="2000" b="1">
+              <a:cs typeface="Calibri" panose="020F0502020204030204"/>
+            </a:endParaRPr>
+          </a:p>
+          <a:p>
+            <a:pPr marL="285750" indent="-285750">
+              <a:buFontTx/>
+              <a:buChar char="-"/>
+            </a:pPr>
+            <a:r>
+              <a:rPr lang="fr-FR" sz="2000"/>
+              <a:t>Join</a:t>
+            </a:r>
+            <a:endParaRPr lang="fr-FR" sz="2000" err="1">
               <a:cs typeface="Calibri"/>
             </a:endParaRPr>
           </a:p>
           <a:p>
             <a:pPr marL="285750" indent="-285750">
-              <a:buFont typeface="Arial"/>
-              <a:buChar char="•"/>
+              <a:buFontTx/>
+              <a:buChar char="-"/>
             </a:pPr>
             <a:r>
-              <a:rPr lang="en-US" dirty="0">
+              <a:rPr lang="fr-FR" sz="2000"/>
+              <a:t>Sort</a:t>
+            </a:r>
+            <a:endParaRPr lang="fr-FR" sz="2000">
+              <a:cs typeface="Calibri"/>
+            </a:endParaRPr>
+          </a:p>
+          <a:p>
+            <a:pPr marL="285750" indent="-285750">
+              <a:buChar char="-"/>
+            </a:pPr>
+            <a:r>
+              <a:rPr lang="fr-FR" sz="2000">
                 <a:cs typeface="Calibri"/>
               </a:rPr>
-              <a:t>Divides dataset in k partitions</a:t>
-            </a:r>
-          </a:p>
-          <a:p>
-            <a:pPr marL="285750" indent="-285750">
-              <a:buFont typeface="Arial"/>
-              <a:buChar char="•"/>
-            </a:pPr>
-            <a:r>
-              <a:rPr lang="en-US" dirty="0">
+              <a:t>Windowing (when you need context on previous/following records to process a record, e.g. compute moving average, get the rank of a record...)</a:t>
+            </a:r>
+            <a:endParaRPr lang="fr-FR" sz="2000" dirty="0">
+              <a:cs typeface="Calibri"/>
+            </a:endParaRPr>
+          </a:p>
+          <a:p>
+            <a:endParaRPr lang="fr-FR" sz="2000">
+              <a:cs typeface="Calibri"/>
+            </a:endParaRPr>
+          </a:p>
+          <a:p>
+            <a:r>
+              <a:rPr lang="fr-FR" sz="2000" b="1">
                 <a:cs typeface="Calibri"/>
               </a:rPr>
-              <a:t>Each partition contains all records with same key</a:t>
-            </a:r>
-          </a:p>
-          <a:p>
-            <a:pPr marL="285750" indent="-285750">
-              <a:buFont typeface="Arial"/>
-              <a:buChar char="•"/>
-            </a:pPr>
-            <a:r>
-              <a:rPr lang="en-US" dirty="0">
+              <a:t>SQL </a:t>
+            </a:r>
+            <a:r>
+              <a:rPr lang="fr-FR" sz="2000" b="1" err="1">
                 <a:cs typeface="Calibri"/>
               </a:rPr>
-              <a:t>Each partition roughly contains n/k records</a:t>
-            </a:r>
-          </a:p>
-          <a:p>
-            <a:pPr marL="285750" indent="-285750">
-              <a:buFont typeface="Arial"/>
-              <a:buChar char="•"/>
-            </a:pPr>
-            <a:r>
-              <a:rPr lang="en-US" i="1" dirty="0" err="1">
+              <a:t>syntax</a:t>
+            </a:r>
+            <a:endParaRPr lang="fr-FR" sz="2000" b="1">
+              <a:cs typeface="Calibri"/>
+            </a:endParaRPr>
+          </a:p>
+          <a:p>
+            <a:r>
+              <a:rPr lang="fr-FR" sz="2000" err="1">
                 <a:ea typeface="+mn-lt"/>
                 <a:cs typeface="+mn-lt"/>
               </a:rPr>
-              <a:t>nb_records_by_key</a:t>
-            </a:r>
-            <a:r>
-              <a:rPr lang="en-US" i="1" dirty="0">
+              <a:t>ratings_df.createOrReplaceTempView</a:t>
+            </a:r>
+            <a:r>
+              <a:rPr lang="fr-FR" sz="2000">
                 <a:ea typeface="+mn-lt"/>
                 <a:cs typeface="+mn-lt"/>
               </a:rPr>
-              <a:t> </a:t>
-            </a:r>
-            <a:r>
-              <a:rPr lang="en-US" dirty="0">
+              <a:t>("Ratings")</a:t>
+            </a:r>
+            <a:endParaRPr lang="fr-FR"/>
+          </a:p>
+          <a:p>
+            <a:r>
+              <a:rPr lang="fr-FR" sz="2000" err="1">
                 <a:ea typeface="+mn-lt"/>
                 <a:cs typeface="+mn-lt"/>
               </a:rPr>
-              <a:t>estimated with Reservoir Sampling algorithm</a:t>
-            </a:r>
-            <a:endParaRPr lang="en-US" i="1" dirty="0">
+              <a:t>df</a:t>
+            </a:r>
+            <a:r>
+              <a:rPr lang="fr-FR" sz="2000">
+                <a:ea typeface="+mn-lt"/>
+                <a:cs typeface="+mn-lt"/>
+              </a:rPr>
+              <a:t> = </a:t>
+            </a:r>
+            <a:r>
+              <a:rPr lang="fr-FR" sz="2000" err="1">
+                <a:ea typeface="+mn-lt"/>
+                <a:cs typeface="+mn-lt"/>
+              </a:rPr>
+              <a:t>sql</a:t>
+            </a:r>
+            <a:r>
+              <a:rPr lang="fr-FR" sz="2000">
+                <a:ea typeface="+mn-lt"/>
+                <a:cs typeface="+mn-lt"/>
+              </a:rPr>
+              <a:t>('''select </a:t>
+            </a:r>
+            <a:r>
+              <a:rPr lang="fr-FR" sz="2000" err="1">
+                <a:ea typeface="+mn-lt"/>
+                <a:cs typeface="+mn-lt"/>
+              </a:rPr>
+              <a:t>Ratings.id_movie</a:t>
+            </a:r>
+            <a:r>
+              <a:rPr lang="fr-FR" sz="2000">
+                <a:ea typeface="+mn-lt"/>
+                <a:cs typeface="+mn-lt"/>
+              </a:rPr>
+              <a:t>, SUM(</a:t>
+            </a:r>
+            <a:r>
+              <a:rPr lang="fr-FR" sz="2000" err="1">
+                <a:ea typeface="+mn-lt"/>
+                <a:cs typeface="+mn-lt"/>
+              </a:rPr>
+              <a:t>Ratings.rating</a:t>
+            </a:r>
+            <a:r>
+              <a:rPr lang="fr-FR" sz="2000">
+                <a:ea typeface="+mn-lt"/>
+                <a:cs typeface="+mn-lt"/>
+              </a:rPr>
+              <a:t>) as s</a:t>
+            </a:r>
+            <a:endParaRPr lang="fr-FR">
               <a:ea typeface="+mn-lt"/>
               <a:cs typeface="+mn-lt"/>
             </a:endParaRPr>
           </a:p>
           <a:p>
-            <a:pPr marL="285750" indent="-285750">
-              <a:buFont typeface="Arial"/>
-              <a:buChar char="•"/>
-            </a:pPr>
-            <a:endParaRPr lang="en-US" dirty="0">
+            <a:r>
+              <a:rPr lang="fr-FR" sz="2000" dirty="0">
+                <a:ea typeface="+mn-lt"/>
+                <a:cs typeface="+mn-lt"/>
+              </a:rPr>
+              <a:t>                 </a:t>
+            </a:r>
+            <a:r>
+              <a:rPr lang="fr-FR" sz="2000" err="1">
+                <a:ea typeface="+mn-lt"/>
+                <a:cs typeface="+mn-lt"/>
+              </a:rPr>
+              <a:t>from</a:t>
+            </a:r>
+            <a:r>
+              <a:rPr lang="fr-FR" sz="2000">
+                <a:ea typeface="+mn-lt"/>
+                <a:cs typeface="+mn-lt"/>
+              </a:rPr>
+              <a:t> Ratings</a:t>
+            </a:r>
+            <a:br>
+              <a:rPr lang="fr-FR" sz="2000" dirty="0">
+                <a:ea typeface="+mn-lt"/>
+                <a:cs typeface="+mn-lt"/>
+              </a:rPr>
+            </a:br>
+            <a:r>
+              <a:rPr lang="fr-FR" sz="2000" dirty="0">
+                <a:ea typeface="+mn-lt"/>
+                <a:cs typeface="+mn-lt"/>
+              </a:rPr>
+              <a:t>                 </a:t>
+            </a:r>
+            <a:r>
+              <a:rPr lang="fr-FR" sz="2000" err="1">
+                <a:ea typeface="+mn-lt"/>
+                <a:cs typeface="+mn-lt"/>
+              </a:rPr>
+              <a:t>where</a:t>
+            </a:r>
+            <a:r>
+              <a:rPr lang="fr-FR" sz="2000" dirty="0">
+                <a:ea typeface="+mn-lt"/>
+                <a:cs typeface="+mn-lt"/>
+              </a:rPr>
+              <a:t> </a:t>
+            </a:r>
+            <a:r>
+              <a:rPr lang="fr-FR" sz="2000" err="1">
+                <a:ea typeface="+mn-lt"/>
+                <a:cs typeface="+mn-lt"/>
+              </a:rPr>
+              <a:t>Ratings.user_id</a:t>
+            </a:r>
+            <a:r>
+              <a:rPr lang="fr-FR" sz="2000">
+                <a:ea typeface="+mn-lt"/>
+                <a:cs typeface="+mn-lt"/>
+              </a:rPr>
+              <a:t>=2</a:t>
+            </a:r>
+            <a:br>
+              <a:rPr lang="fr-FR" sz="2000" dirty="0">
+                <a:ea typeface="+mn-lt"/>
+                <a:cs typeface="+mn-lt"/>
+              </a:rPr>
+            </a:br>
+            <a:r>
+              <a:rPr lang="fr-FR" sz="2000">
+                <a:ea typeface="+mn-lt"/>
+                <a:cs typeface="+mn-lt"/>
+              </a:rPr>
+              <a:t>                 group by </a:t>
+            </a:r>
+            <a:r>
+              <a:rPr lang="fr-FR" sz="2000" err="1">
+                <a:ea typeface="+mn-lt"/>
+                <a:cs typeface="+mn-lt"/>
+              </a:rPr>
+              <a:t>Ratings.id_movie</a:t>
+            </a:r>
+            <a:r>
+              <a:rPr lang="fr-FR" sz="2000">
+                <a:ea typeface="+mn-lt"/>
+                <a:cs typeface="+mn-lt"/>
+              </a:rPr>
+              <a:t>''')</a:t>
+            </a:r>
+            <a:endParaRPr lang="fr-FR">
               <a:cs typeface="Calibri"/>
             </a:endParaRPr>
-          </a:p>
-          <a:p>
-            <a:r>
-              <a:rPr lang="en-US" b="1" dirty="0"/>
-              <a:t>Exchange </a:t>
-            </a:r>
-            <a:r>
-              <a:rPr lang="en-US" b="1" dirty="0" err="1"/>
-              <a:t>RoundRobinPartitioning</a:t>
-            </a:r>
-            <a:endParaRPr lang="en-US" b="1" dirty="0">
-              <a:cs typeface="Calibri"/>
-            </a:endParaRPr>
-          </a:p>
-          <a:p>
-            <a:pPr marL="285750" indent="-285750">
-              <a:buFont typeface="Arial"/>
-              <a:buChar char="•"/>
-            </a:pPr>
-            <a:r>
-              <a:rPr lang="en-US" dirty="0">
-                <a:cs typeface="Calibri"/>
-              </a:rPr>
-              <a:t>When called by repartition</a:t>
-            </a:r>
-          </a:p>
-          <a:p>
-            <a:pPr marL="285750" indent="-285750">
-              <a:buFont typeface="Arial"/>
-              <a:buChar char="•"/>
-            </a:pPr>
-            <a:r>
-              <a:rPr lang="en-US" dirty="0">
-                <a:cs typeface="Calibri"/>
-              </a:rPr>
-              <a:t>First record goes to first partition</a:t>
-            </a:r>
-          </a:p>
-          <a:p>
-            <a:pPr marL="285750" indent="-285750">
-              <a:buFont typeface="Arial"/>
-              <a:buChar char="•"/>
-            </a:pPr>
-            <a:r>
-              <a:rPr lang="en-US" dirty="0">
-                <a:cs typeface="Calibri"/>
-              </a:rPr>
-              <a:t>Second goes to second partition, etc...</a:t>
-            </a:r>
-          </a:p>
-          <a:p>
-            <a:pPr marL="285750" indent="-285750">
-              <a:buFont typeface="Arial"/>
-              <a:buChar char="•"/>
-            </a:pPr>
-            <a:r>
-              <a:rPr lang="en-US" dirty="0">
-                <a:cs typeface="Calibri"/>
-              </a:rPr>
-              <a:t>Modulo amount of partitions</a:t>
-            </a:r>
           </a:p>
         </p:txBody>
       </p:sp>
     </p:spTree>
     <p:extLst>
       <p:ext uri="{BB962C8B-B14F-4D97-AF65-F5344CB8AC3E}">
-        <p14:creationId xmlns:p14="http://schemas.microsoft.com/office/powerpoint/2010/main" val="3189802429"/>
+        <p14:creationId xmlns:p14="http://schemas.microsoft.com/office/powerpoint/2010/main" val="1252786671"/>
       </p:ext>
     </p:extLst>
   </p:cSld>

</xml_diff>

<commit_message>
Add slide on tasks and stages
</commit_message>
<xml_diff>
--- a/module4/td2/td2-spark-dataframe.pptx
+++ b/module4/td2/td2-spark-dataframe.pptx
@@ -7,18 +7,19 @@
   <p:sldIdLst>
     <p:sldId id="256" r:id="rId2"/>
     <p:sldId id="277" r:id="rId3"/>
-    <p:sldId id="270" r:id="rId4"/>
-    <p:sldId id="274" r:id="rId5"/>
-    <p:sldId id="264" r:id="rId6"/>
-    <p:sldId id="263" r:id="rId7"/>
-    <p:sldId id="266" r:id="rId8"/>
-    <p:sldId id="265" r:id="rId9"/>
-    <p:sldId id="271" r:id="rId10"/>
-    <p:sldId id="272" r:id="rId11"/>
-    <p:sldId id="273" r:id="rId12"/>
-    <p:sldId id="275" r:id="rId13"/>
-    <p:sldId id="276" r:id="rId14"/>
-    <p:sldId id="262" r:id="rId15"/>
+    <p:sldId id="278" r:id="rId4"/>
+    <p:sldId id="270" r:id="rId5"/>
+    <p:sldId id="274" r:id="rId6"/>
+    <p:sldId id="264" r:id="rId7"/>
+    <p:sldId id="263" r:id="rId8"/>
+    <p:sldId id="266" r:id="rId9"/>
+    <p:sldId id="265" r:id="rId10"/>
+    <p:sldId id="271" r:id="rId11"/>
+    <p:sldId id="272" r:id="rId12"/>
+    <p:sldId id="273" r:id="rId13"/>
+    <p:sldId id="275" r:id="rId14"/>
+    <p:sldId id="276" r:id="rId15"/>
+    <p:sldId id="262" r:id="rId16"/>
   </p:sldIdLst>
   <p:sldSz cx="12192000" cy="6858000"/>
   <p:notesSz cx="6858000" cy="9144000"/>
@@ -128,6 +129,7 @@
 <file path=ppt/revisionInfo.xml><?xml version="1.0" encoding="utf-8"?>
 <p1510:revInfo xmlns:a="http://schemas.openxmlformats.org/drawingml/2006/main" xmlns:r="http://schemas.openxmlformats.org/officeDocument/2006/relationships" xmlns:p1510="http://schemas.microsoft.com/office/powerpoint/2015/10/main">
   <p1510:revLst>
+    <p1510:client id="{424BAB5A-E71E-13CA-CA1B-F6D262786152}" v="603" dt="2022-02-09T15:29:28.149"/>
     <p1510:client id="{ABF4876D-44CB-C346-A1E8-22B467A5ADDC}" v="116" dt="2020-11-06T14:44:44.770"/>
   </p1510:revLst>
 </p1510:revInfo>
@@ -280,7 +282,7 @@
           <a:p>
             <a:fld id="{97D5A493-CCC9-418E-861C-802A9D3B9980}" type="datetimeFigureOut">
               <a:rPr lang="en-US" smtClean="0"/>
-              <a:t>1/25/2022</a:t>
+              <a:t>2/9/2022</a:t>
             </a:fld>
             <a:endParaRPr lang="en-US"/>
           </a:p>
@@ -334,7 +336,7 @@
           <a:p>
             <a:fld id="{EAF0293D-07D2-48DC-BE8F-8E4761C07219}" type="slidenum">
               <a:rPr lang="en-US" smtClean="0"/>
-              <a:t>‹N°›</a:t>
+              <a:t>‹#›</a:t>
             </a:fld>
             <a:endParaRPr lang="en-US"/>
           </a:p>
@@ -478,7 +480,7 @@
           <a:p>
             <a:fld id="{97D5A493-CCC9-418E-861C-802A9D3B9980}" type="datetimeFigureOut">
               <a:rPr lang="en-US" smtClean="0"/>
-              <a:t>1/25/2022</a:t>
+              <a:t>2/9/2022</a:t>
             </a:fld>
             <a:endParaRPr lang="en-US"/>
           </a:p>
@@ -532,7 +534,7 @@
           <a:p>
             <a:fld id="{EAF0293D-07D2-48DC-BE8F-8E4761C07219}" type="slidenum">
               <a:rPr lang="en-US" smtClean="0"/>
-              <a:t>‹N°›</a:t>
+              <a:t>‹#›</a:t>
             </a:fld>
             <a:endParaRPr lang="en-US"/>
           </a:p>
@@ -686,7 +688,7 @@
           <a:p>
             <a:fld id="{97D5A493-CCC9-418E-861C-802A9D3B9980}" type="datetimeFigureOut">
               <a:rPr lang="en-US" smtClean="0"/>
-              <a:t>1/25/2022</a:t>
+              <a:t>2/9/2022</a:t>
             </a:fld>
             <a:endParaRPr lang="en-US"/>
           </a:p>
@@ -740,7 +742,7 @@
           <a:p>
             <a:fld id="{EAF0293D-07D2-48DC-BE8F-8E4761C07219}" type="slidenum">
               <a:rPr lang="en-US" smtClean="0"/>
-              <a:t>‹N°›</a:t>
+              <a:t>‹#›</a:t>
             </a:fld>
             <a:endParaRPr lang="en-US"/>
           </a:p>
@@ -884,7 +886,7 @@
           <a:p>
             <a:fld id="{97D5A493-CCC9-418E-861C-802A9D3B9980}" type="datetimeFigureOut">
               <a:rPr lang="en-US" smtClean="0"/>
-              <a:t>1/25/2022</a:t>
+              <a:t>2/9/2022</a:t>
             </a:fld>
             <a:endParaRPr lang="en-US"/>
           </a:p>
@@ -938,7 +940,7 @@
           <a:p>
             <a:fld id="{EAF0293D-07D2-48DC-BE8F-8E4761C07219}" type="slidenum">
               <a:rPr lang="en-US" smtClean="0"/>
-              <a:t>‹N°›</a:t>
+              <a:t>‹#›</a:t>
             </a:fld>
             <a:endParaRPr lang="en-US"/>
           </a:p>
@@ -1159,7 +1161,7 @@
           <a:p>
             <a:fld id="{97D5A493-CCC9-418E-861C-802A9D3B9980}" type="datetimeFigureOut">
               <a:rPr lang="en-US" smtClean="0"/>
-              <a:t>1/25/2022</a:t>
+              <a:t>2/9/2022</a:t>
             </a:fld>
             <a:endParaRPr lang="en-US"/>
           </a:p>
@@ -1213,7 +1215,7 @@
           <a:p>
             <a:fld id="{EAF0293D-07D2-48DC-BE8F-8E4761C07219}" type="slidenum">
               <a:rPr lang="en-US" smtClean="0"/>
-              <a:t>‹N°›</a:t>
+              <a:t>‹#›</a:t>
             </a:fld>
             <a:endParaRPr lang="en-US"/>
           </a:p>
@@ -1424,7 +1426,7 @@
           <a:p>
             <a:fld id="{97D5A493-CCC9-418E-861C-802A9D3B9980}" type="datetimeFigureOut">
               <a:rPr lang="en-US" smtClean="0"/>
-              <a:t>1/25/2022</a:t>
+              <a:t>2/9/2022</a:t>
             </a:fld>
             <a:endParaRPr lang="en-US"/>
           </a:p>
@@ -1478,7 +1480,7 @@
           <a:p>
             <a:fld id="{EAF0293D-07D2-48DC-BE8F-8E4761C07219}" type="slidenum">
               <a:rPr lang="en-US" smtClean="0"/>
-              <a:t>‹N°›</a:t>
+              <a:t>‹#›</a:t>
             </a:fld>
             <a:endParaRPr lang="en-US"/>
           </a:p>
@@ -1836,7 +1838,7 @@
           <a:p>
             <a:fld id="{97D5A493-CCC9-418E-861C-802A9D3B9980}" type="datetimeFigureOut">
               <a:rPr lang="en-US" smtClean="0"/>
-              <a:t>1/25/2022</a:t>
+              <a:t>2/9/2022</a:t>
             </a:fld>
             <a:endParaRPr lang="en-US"/>
           </a:p>
@@ -1890,7 +1892,7 @@
           <a:p>
             <a:fld id="{EAF0293D-07D2-48DC-BE8F-8E4761C07219}" type="slidenum">
               <a:rPr lang="en-US" smtClean="0"/>
-              <a:t>‹N°›</a:t>
+              <a:t>‹#›</a:t>
             </a:fld>
             <a:endParaRPr lang="en-US"/>
           </a:p>
@@ -1977,7 +1979,7 @@
           <a:p>
             <a:fld id="{97D5A493-CCC9-418E-861C-802A9D3B9980}" type="datetimeFigureOut">
               <a:rPr lang="en-US" smtClean="0"/>
-              <a:t>1/25/2022</a:t>
+              <a:t>2/9/2022</a:t>
             </a:fld>
             <a:endParaRPr lang="en-US"/>
           </a:p>
@@ -2031,7 +2033,7 @@
           <a:p>
             <a:fld id="{EAF0293D-07D2-48DC-BE8F-8E4761C07219}" type="slidenum">
               <a:rPr lang="en-US" smtClean="0"/>
-              <a:t>‹N°›</a:t>
+              <a:t>‹#›</a:t>
             </a:fld>
             <a:endParaRPr lang="en-US"/>
           </a:p>
@@ -2090,7 +2092,7 @@
           <a:p>
             <a:fld id="{97D5A493-CCC9-418E-861C-802A9D3B9980}" type="datetimeFigureOut">
               <a:rPr lang="en-US" smtClean="0"/>
-              <a:t>1/25/2022</a:t>
+              <a:t>2/9/2022</a:t>
             </a:fld>
             <a:endParaRPr lang="en-US"/>
           </a:p>
@@ -2144,7 +2146,7 @@
           <a:p>
             <a:fld id="{EAF0293D-07D2-48DC-BE8F-8E4761C07219}" type="slidenum">
               <a:rPr lang="en-US" smtClean="0"/>
-              <a:t>‹N°›</a:t>
+              <a:t>‹#›</a:t>
             </a:fld>
             <a:endParaRPr lang="en-US"/>
           </a:p>
@@ -2401,7 +2403,7 @@
           <a:p>
             <a:fld id="{97D5A493-CCC9-418E-861C-802A9D3B9980}" type="datetimeFigureOut">
               <a:rPr lang="en-US" smtClean="0"/>
-              <a:t>1/25/2022</a:t>
+              <a:t>2/9/2022</a:t>
             </a:fld>
             <a:endParaRPr lang="en-US"/>
           </a:p>
@@ -2455,7 +2457,7 @@
           <a:p>
             <a:fld id="{EAF0293D-07D2-48DC-BE8F-8E4761C07219}" type="slidenum">
               <a:rPr lang="en-US" smtClean="0"/>
-              <a:t>‹N°›</a:t>
+              <a:t>‹#›</a:t>
             </a:fld>
             <a:endParaRPr lang="en-US"/>
           </a:p>
@@ -2689,7 +2691,7 @@
           <a:p>
             <a:fld id="{97D5A493-CCC9-418E-861C-802A9D3B9980}" type="datetimeFigureOut">
               <a:rPr lang="en-US" smtClean="0"/>
-              <a:t>1/25/2022</a:t>
+              <a:t>2/9/2022</a:t>
             </a:fld>
             <a:endParaRPr lang="en-US"/>
           </a:p>
@@ -2743,7 +2745,7 @@
           <a:p>
             <a:fld id="{EAF0293D-07D2-48DC-BE8F-8E4761C07219}" type="slidenum">
               <a:rPr lang="en-US" smtClean="0"/>
-              <a:t>‹N°›</a:t>
+              <a:t>‹#›</a:t>
             </a:fld>
             <a:endParaRPr lang="en-US"/>
           </a:p>
@@ -2930,7 +2932,7 @@
           <a:p>
             <a:fld id="{97D5A493-CCC9-418E-861C-802A9D3B9980}" type="datetimeFigureOut">
               <a:rPr lang="en-US" smtClean="0"/>
-              <a:t>1/25/2022</a:t>
+              <a:t>2/9/2022</a:t>
             </a:fld>
             <a:endParaRPr lang="en-US"/>
           </a:p>
@@ -3020,7 +3022,7 @@
           <a:p>
             <a:fld id="{EAF0293D-07D2-48DC-BE8F-8E4761C07219}" type="slidenum">
               <a:rPr lang="en-US" smtClean="0"/>
-              <a:t>‹N°›</a:t>
+              <a:t>‹#›</a:t>
             </a:fld>
             <a:endParaRPr lang="en-US"/>
           </a:p>
@@ -3437,6 +3439,364 @@
           <p:cNvPr id="2" name="Title 1">
             <a:extLst>
               <a:ext uri="{FF2B5EF4-FFF2-40B4-BE49-F238E27FC236}">
+                <a16:creationId xmlns:a16="http://schemas.microsoft.com/office/drawing/2014/main" id="{1EF77BFB-B82D-46E7-9ED3-A723BCC0A39C}"/>
+              </a:ext>
+            </a:extLst>
+          </p:cNvPr>
+          <p:cNvSpPr>
+            <a:spLocks noGrp="1"/>
+          </p:cNvSpPr>
+          <p:nvPr>
+            <p:ph type="title"/>
+          </p:nvPr>
+        </p:nvSpPr>
+        <p:spPr/>
+        <p:txBody>
+          <a:bodyPr/>
+          <a:lstStyle/>
+          <a:p>
+            <a:r>
+              <a:rPr lang="fr-FR" err="1"/>
+              <a:t>Scraping</a:t>
+            </a:r>
+            <a:r>
+              <a:rPr lang="fr-FR"/>
+              <a:t> </a:t>
+            </a:r>
+            <a:r>
+              <a:rPr lang="fr-FR" err="1"/>
+              <a:t>around</a:t>
+            </a:r>
+            <a:r>
+              <a:rPr lang="fr-FR"/>
+              <a:t>...</a:t>
+            </a:r>
+            <a:endParaRPr lang="en-US"/>
+          </a:p>
+        </p:txBody>
+      </p:sp>
+      <p:sp>
+        <p:nvSpPr>
+          <p:cNvPr id="9" name="TextBox 4">
+            <a:extLst>
+              <a:ext uri="{FF2B5EF4-FFF2-40B4-BE49-F238E27FC236}">
+                <a16:creationId xmlns:a16="http://schemas.microsoft.com/office/drawing/2014/main" id="{4A862EC4-9979-42EA-87D4-2912983FD8C3}"/>
+              </a:ext>
+            </a:extLst>
+          </p:cNvPr>
+          <p:cNvSpPr txBox="1"/>
+          <p:nvPr/>
+        </p:nvSpPr>
+        <p:spPr>
+          <a:xfrm>
+            <a:off x="1036948" y="1432874"/>
+            <a:ext cx="10058400" cy="3785652"/>
+          </a:xfrm>
+          <a:prstGeom prst="rect">
+            <a:avLst/>
+          </a:prstGeom>
+          <a:noFill/>
+        </p:spPr>
+        <p:txBody>
+          <a:bodyPr wrap="square" lIns="91440" tIns="45720" rIns="91440" bIns="45720" rtlCol="0" anchor="t">
+            <a:spAutoFit/>
+          </a:bodyPr>
+          <a:lstStyle/>
+          <a:p>
+            <a:r>
+              <a:rPr lang="fr-FR" sz="2000" b="1" err="1">
+                <a:cs typeface="Calibri" panose="020F0502020204030204"/>
+              </a:rPr>
+              <a:t>Other</a:t>
+            </a:r>
+            <a:r>
+              <a:rPr lang="fr-FR" sz="2000" b="1" dirty="0">
+                <a:cs typeface="Calibri" panose="020F0502020204030204"/>
+              </a:rPr>
+              <a:t> </a:t>
+            </a:r>
+            <a:r>
+              <a:rPr lang="fr-FR" sz="2000" b="1" err="1">
+                <a:cs typeface="Calibri" panose="020F0502020204030204"/>
+              </a:rPr>
+              <a:t>operations</a:t>
+            </a:r>
+            <a:endParaRPr lang="fr-FR" sz="2000" b="1">
+              <a:cs typeface="Calibri" panose="020F0502020204030204"/>
+            </a:endParaRPr>
+          </a:p>
+          <a:p>
+            <a:pPr marL="285750" indent="-285750">
+              <a:buFontTx/>
+              <a:buChar char="-"/>
+            </a:pPr>
+            <a:r>
+              <a:rPr lang="fr-FR" sz="2000"/>
+              <a:t>Join</a:t>
+            </a:r>
+            <a:endParaRPr lang="fr-FR" sz="2000" err="1">
+              <a:cs typeface="Calibri"/>
+            </a:endParaRPr>
+          </a:p>
+          <a:p>
+            <a:pPr marL="285750" indent="-285750">
+              <a:buFontTx/>
+              <a:buChar char="-"/>
+            </a:pPr>
+            <a:r>
+              <a:rPr lang="fr-FR" sz="2000"/>
+              <a:t>Sort</a:t>
+            </a:r>
+            <a:endParaRPr lang="fr-FR" sz="2000">
+              <a:cs typeface="Calibri"/>
+            </a:endParaRPr>
+          </a:p>
+          <a:p>
+            <a:pPr marL="285750" indent="-285750">
+              <a:buChar char="-"/>
+            </a:pPr>
+            <a:r>
+              <a:rPr lang="fr-FR" sz="2000">
+                <a:cs typeface="Calibri"/>
+              </a:rPr>
+              <a:t>Windowing (when you need context on previous/following records to process a record, e.g. compute moving average, get the rank of a record...)</a:t>
+            </a:r>
+            <a:endParaRPr lang="fr-FR" sz="2000" dirty="0">
+              <a:cs typeface="Calibri"/>
+            </a:endParaRPr>
+          </a:p>
+          <a:p>
+            <a:endParaRPr lang="fr-FR" sz="2000">
+              <a:cs typeface="Calibri"/>
+            </a:endParaRPr>
+          </a:p>
+          <a:p>
+            <a:r>
+              <a:rPr lang="fr-FR" sz="2000" b="1">
+                <a:cs typeface="Calibri"/>
+              </a:rPr>
+              <a:t>SQL </a:t>
+            </a:r>
+            <a:r>
+              <a:rPr lang="fr-FR" sz="2000" b="1" err="1">
+                <a:cs typeface="Calibri"/>
+              </a:rPr>
+              <a:t>syntax</a:t>
+            </a:r>
+            <a:endParaRPr lang="fr-FR" sz="2000" b="1">
+              <a:cs typeface="Calibri"/>
+            </a:endParaRPr>
+          </a:p>
+          <a:p>
+            <a:r>
+              <a:rPr lang="fr-FR" sz="2000" err="1">
+                <a:ea typeface="+mn-lt"/>
+                <a:cs typeface="+mn-lt"/>
+              </a:rPr>
+              <a:t>ratings_df.createOrReplaceTempView</a:t>
+            </a:r>
+            <a:r>
+              <a:rPr lang="fr-FR" sz="2000">
+                <a:ea typeface="+mn-lt"/>
+                <a:cs typeface="+mn-lt"/>
+              </a:rPr>
+              <a:t>("Ratings")</a:t>
+            </a:r>
+            <a:endParaRPr lang="fr-FR"/>
+          </a:p>
+          <a:p>
+            <a:r>
+              <a:rPr lang="fr-FR" sz="2000" err="1">
+                <a:ea typeface="+mn-lt"/>
+                <a:cs typeface="+mn-lt"/>
+              </a:rPr>
+              <a:t>df</a:t>
+            </a:r>
+            <a:r>
+              <a:rPr lang="fr-FR" sz="2000">
+                <a:ea typeface="+mn-lt"/>
+                <a:cs typeface="+mn-lt"/>
+              </a:rPr>
+              <a:t> = </a:t>
+            </a:r>
+            <a:r>
+              <a:rPr lang="fr-FR" sz="2000" err="1">
+                <a:ea typeface="+mn-lt"/>
+                <a:cs typeface="+mn-lt"/>
+              </a:rPr>
+              <a:t>sql</a:t>
+            </a:r>
+            <a:r>
+              <a:rPr lang="fr-FR" sz="2000">
+                <a:ea typeface="+mn-lt"/>
+                <a:cs typeface="+mn-lt"/>
+              </a:rPr>
+              <a:t>('''select </a:t>
+            </a:r>
+            <a:r>
+              <a:rPr lang="fr-FR" sz="2000" err="1">
+                <a:ea typeface="+mn-lt"/>
+                <a:cs typeface="+mn-lt"/>
+              </a:rPr>
+              <a:t>Ratings.id_movie</a:t>
+            </a:r>
+            <a:r>
+              <a:rPr lang="fr-FR" sz="2000">
+                <a:ea typeface="+mn-lt"/>
+                <a:cs typeface="+mn-lt"/>
+              </a:rPr>
+              <a:t>, SUM(</a:t>
+            </a:r>
+            <a:r>
+              <a:rPr lang="fr-FR" sz="2000" err="1">
+                <a:ea typeface="+mn-lt"/>
+                <a:cs typeface="+mn-lt"/>
+              </a:rPr>
+              <a:t>Ratings.rating</a:t>
+            </a:r>
+            <a:r>
+              <a:rPr lang="fr-FR" sz="2000">
+                <a:ea typeface="+mn-lt"/>
+                <a:cs typeface="+mn-lt"/>
+              </a:rPr>
+              <a:t>) as s</a:t>
+            </a:r>
+            <a:endParaRPr lang="fr-FR">
+              <a:ea typeface="+mn-lt"/>
+              <a:cs typeface="+mn-lt"/>
+            </a:endParaRPr>
+          </a:p>
+          <a:p>
+            <a:r>
+              <a:rPr lang="fr-FR" sz="2000" dirty="0">
+                <a:ea typeface="+mn-lt"/>
+                <a:cs typeface="+mn-lt"/>
+              </a:rPr>
+              <a:t>                 </a:t>
+            </a:r>
+            <a:r>
+              <a:rPr lang="fr-FR" sz="2000" err="1">
+                <a:ea typeface="+mn-lt"/>
+                <a:cs typeface="+mn-lt"/>
+              </a:rPr>
+              <a:t>from</a:t>
+            </a:r>
+            <a:r>
+              <a:rPr lang="fr-FR" sz="2000">
+                <a:ea typeface="+mn-lt"/>
+                <a:cs typeface="+mn-lt"/>
+              </a:rPr>
+              <a:t> Ratings</a:t>
+            </a:r>
+            <a:br>
+              <a:rPr lang="fr-FR" sz="2000" dirty="0">
+                <a:ea typeface="+mn-lt"/>
+                <a:cs typeface="+mn-lt"/>
+              </a:rPr>
+            </a:br>
+            <a:r>
+              <a:rPr lang="fr-FR" sz="2000" dirty="0">
+                <a:ea typeface="+mn-lt"/>
+                <a:cs typeface="+mn-lt"/>
+              </a:rPr>
+              <a:t>                 </a:t>
+            </a:r>
+            <a:r>
+              <a:rPr lang="fr-FR" sz="2000" err="1">
+                <a:ea typeface="+mn-lt"/>
+                <a:cs typeface="+mn-lt"/>
+              </a:rPr>
+              <a:t>where</a:t>
+            </a:r>
+            <a:r>
+              <a:rPr lang="fr-FR" sz="2000" dirty="0">
+                <a:ea typeface="+mn-lt"/>
+                <a:cs typeface="+mn-lt"/>
+              </a:rPr>
+              <a:t> </a:t>
+            </a:r>
+            <a:r>
+              <a:rPr lang="fr-FR" sz="2000" err="1">
+                <a:ea typeface="+mn-lt"/>
+                <a:cs typeface="+mn-lt"/>
+              </a:rPr>
+              <a:t>Ratings.user_id</a:t>
+            </a:r>
+            <a:r>
+              <a:rPr lang="fr-FR" sz="2000">
+                <a:ea typeface="+mn-lt"/>
+                <a:cs typeface="+mn-lt"/>
+              </a:rPr>
+              <a:t>=2</a:t>
+            </a:r>
+            <a:br>
+              <a:rPr lang="fr-FR" sz="2000" dirty="0">
+                <a:ea typeface="+mn-lt"/>
+                <a:cs typeface="+mn-lt"/>
+              </a:rPr>
+            </a:br>
+            <a:r>
+              <a:rPr lang="fr-FR" sz="2000">
+                <a:ea typeface="+mn-lt"/>
+                <a:cs typeface="+mn-lt"/>
+              </a:rPr>
+              <a:t>                 group by </a:t>
+            </a:r>
+            <a:r>
+              <a:rPr lang="fr-FR" sz="2000" err="1">
+                <a:ea typeface="+mn-lt"/>
+                <a:cs typeface="+mn-lt"/>
+              </a:rPr>
+              <a:t>Ratings.id_movie</a:t>
+            </a:r>
+            <a:r>
+              <a:rPr lang="fr-FR" sz="2000">
+                <a:ea typeface="+mn-lt"/>
+                <a:cs typeface="+mn-lt"/>
+              </a:rPr>
+              <a:t>''')</a:t>
+            </a:r>
+            <a:endParaRPr lang="fr-FR">
+              <a:cs typeface="Calibri"/>
+            </a:endParaRPr>
+          </a:p>
+        </p:txBody>
+      </p:sp>
+    </p:spTree>
+    <p:extLst>
+      <p:ext uri="{BB962C8B-B14F-4D97-AF65-F5344CB8AC3E}">
+        <p14:creationId xmlns:p14="http://schemas.microsoft.com/office/powerpoint/2010/main" val="1252786671"/>
+      </p:ext>
+    </p:extLst>
+  </p:cSld>
+  <p:clrMapOvr>
+    <a:masterClrMapping/>
+  </p:clrMapOvr>
+</p:sld>
+</file>
+
+<file path=ppt/slides/slide11.xml><?xml version="1.0" encoding="utf-8"?>
+<p:sld xmlns:a="http://schemas.openxmlformats.org/drawingml/2006/main" xmlns:r="http://schemas.openxmlformats.org/officeDocument/2006/relationships" xmlns:p="http://schemas.openxmlformats.org/presentationml/2006/main">
+  <p:cSld>
+    <p:spTree>
+      <p:nvGrpSpPr>
+        <p:cNvPr id="1" name=""/>
+        <p:cNvGrpSpPr/>
+        <p:nvPr/>
+      </p:nvGrpSpPr>
+      <p:grpSpPr>
+        <a:xfrm>
+          <a:off x="0" y="0"/>
+          <a:ext cx="0" cy="0"/>
+          <a:chOff x="0" y="0"/>
+          <a:chExt cx="0" cy="0"/>
+        </a:xfrm>
+      </p:grpSpPr>
+      <p:sp>
+        <p:nvSpPr>
+          <p:cNvPr id="2" name="Title 1">
+            <a:extLst>
+              <a:ext uri="{FF2B5EF4-FFF2-40B4-BE49-F238E27FC236}">
                 <a16:creationId xmlns:a16="http://schemas.microsoft.com/office/drawing/2014/main" id="{CCEBEA0F-0285-4189-992D-2C894A4D4A61}"/>
               </a:ext>
             </a:extLst>
@@ -3924,7 +4284,7 @@
 </p:sld>
 </file>
 
-<file path=ppt/slides/slide11.xml><?xml version="1.0" encoding="utf-8"?>
+<file path=ppt/slides/slide12.xml><?xml version="1.0" encoding="utf-8"?>
 <p:sld xmlns:a="http://schemas.openxmlformats.org/drawingml/2006/main" xmlns:r="http://schemas.openxmlformats.org/officeDocument/2006/relationships" xmlns:p="http://schemas.openxmlformats.org/presentationml/2006/main">
   <p:cSld>
     <p:spTree>
@@ -4228,7 +4588,7 @@
 </p:sld>
 </file>
 
-<file path=ppt/slides/slide12.xml><?xml version="1.0" encoding="utf-8"?>
+<file path=ppt/slides/slide13.xml><?xml version="1.0" encoding="utf-8"?>
 <p:sld xmlns:a="http://schemas.openxmlformats.org/drawingml/2006/main" xmlns:r="http://schemas.openxmlformats.org/officeDocument/2006/relationships" xmlns:p="http://schemas.openxmlformats.org/presentationml/2006/main">
   <p:cSld>
     <p:spTree>
@@ -4455,7 +4815,7 @@
 </p:sld>
 </file>
 
-<file path=ppt/slides/slide13.xml><?xml version="1.0" encoding="utf-8"?>
+<file path=ppt/slides/slide14.xml><?xml version="1.0" encoding="utf-8"?>
 <p:sld xmlns:a="http://schemas.openxmlformats.org/drawingml/2006/main" xmlns:r="http://schemas.openxmlformats.org/officeDocument/2006/relationships" xmlns:p="http://schemas.openxmlformats.org/presentationml/2006/main">
   <p:cSld>
     <p:spTree>
@@ -5760,7 +6120,7 @@
 </p:sld>
 </file>
 
-<file path=ppt/slides/slide14.xml><?xml version="1.0" encoding="utf-8"?>
+<file path=ppt/slides/slide15.xml><?xml version="1.0" encoding="utf-8"?>
 <p:sld xmlns:a="http://schemas.openxmlformats.org/drawingml/2006/main" xmlns:r="http://schemas.openxmlformats.org/officeDocument/2006/relationships" xmlns:p="http://schemas.openxmlformats.org/presentationml/2006/main">
   <p:cSld>
     <p:spTree>
@@ -5956,6 +6316,336 @@
 </file>
 
 <file path=ppt/slides/slide2.xml><?xml version="1.0" encoding="utf-8"?>
+<p:sld xmlns:a="http://schemas.openxmlformats.org/drawingml/2006/main" xmlns:r="http://schemas.openxmlformats.org/officeDocument/2006/relationships" xmlns:p="http://schemas.openxmlformats.org/presentationml/2006/main">
+  <p:cSld>
+    <p:spTree>
+      <p:nvGrpSpPr>
+        <p:cNvPr id="1" name=""/>
+        <p:cNvGrpSpPr/>
+        <p:nvPr/>
+      </p:nvGrpSpPr>
+      <p:grpSpPr>
+        <a:xfrm>
+          <a:off x="0" y="0"/>
+          <a:ext cx="0" cy="0"/>
+          <a:chOff x="0" y="0"/>
+          <a:chExt cx="0" cy="0"/>
+        </a:xfrm>
+      </p:grpSpPr>
+      <p:sp>
+        <p:nvSpPr>
+          <p:cNvPr id="4" name="Title 1">
+            <a:extLst>
+              <a:ext uri="{FF2B5EF4-FFF2-40B4-BE49-F238E27FC236}">
+                <a16:creationId xmlns:a16="http://schemas.microsoft.com/office/drawing/2014/main" id="{FEB0FEFD-B9BE-4607-93E8-F292419196C0}"/>
+              </a:ext>
+            </a:extLst>
+          </p:cNvPr>
+          <p:cNvSpPr>
+            <a:spLocks noGrp="1"/>
+          </p:cNvSpPr>
+          <p:nvPr>
+            <p:ph type="title"/>
+          </p:nvPr>
+        </p:nvSpPr>
+        <p:spPr>
+          <a:xfrm>
+            <a:off x="838200" y="365125"/>
+            <a:ext cx="10515600" cy="1325563"/>
+          </a:xfrm>
+        </p:spPr>
+        <p:txBody>
+          <a:bodyPr/>
+          <a:lstStyle/>
+          <a:p>
+            <a:r>
+              <a:rPr lang="fr-FR" dirty="0" err="1"/>
+              <a:t>Reminder</a:t>
+            </a:r>
+            <a:r>
+              <a:rPr lang="fr-FR" dirty="0"/>
+              <a:t> : </a:t>
+            </a:r>
+            <a:r>
+              <a:rPr lang="fr-FR" dirty="0" err="1"/>
+              <a:t>tasks</a:t>
+            </a:r>
+            <a:r>
+              <a:rPr lang="fr-FR" dirty="0"/>
+              <a:t>, stages and </a:t>
+            </a:r>
+            <a:r>
+              <a:rPr lang="fr-FR" dirty="0" err="1"/>
+              <a:t>lazy</a:t>
+            </a:r>
+            <a:r>
+              <a:rPr lang="fr-FR" dirty="0"/>
+              <a:t> operations</a:t>
+            </a:r>
+            <a:endParaRPr lang="fr-FR" dirty="0">
+              <a:cs typeface="Calibri Light"/>
+            </a:endParaRPr>
+          </a:p>
+        </p:txBody>
+      </p:sp>
+      <p:pic>
+        <p:nvPicPr>
+          <p:cNvPr id="2" name="Picture 2" descr="Diagram&#10;&#10;Description automatically generated">
+            <a:extLst>
+              <a:ext uri="{FF2B5EF4-FFF2-40B4-BE49-F238E27FC236}">
+                <a16:creationId xmlns:a16="http://schemas.microsoft.com/office/drawing/2014/main" id="{342E4BE0-E1E1-4F7B-B12E-A743D8EEEA81}"/>
+              </a:ext>
+            </a:extLst>
+          </p:cNvPr>
+          <p:cNvPicPr>
+            <a:picLocks noChangeAspect="1"/>
+          </p:cNvPicPr>
+          <p:nvPr/>
+        </p:nvPicPr>
+        <p:blipFill>
+          <a:blip r:embed="rId2"/>
+          <a:stretch>
+            <a:fillRect/>
+          </a:stretch>
+        </p:blipFill>
+        <p:spPr>
+          <a:xfrm>
+            <a:off x="37917" y="2138551"/>
+            <a:ext cx="5232399" cy="3110247"/>
+          </a:xfrm>
+          <a:prstGeom prst="rect">
+            <a:avLst/>
+          </a:prstGeom>
+        </p:spPr>
+      </p:pic>
+      <p:sp>
+        <p:nvSpPr>
+          <p:cNvPr id="6" name="TextBox 5">
+            <a:extLst>
+              <a:ext uri="{FF2B5EF4-FFF2-40B4-BE49-F238E27FC236}">
+                <a16:creationId xmlns:a16="http://schemas.microsoft.com/office/drawing/2014/main" id="{EC89BA43-B563-45D0-9354-DA81DED74FC9}"/>
+              </a:ext>
+            </a:extLst>
+          </p:cNvPr>
+          <p:cNvSpPr txBox="1"/>
+          <p:nvPr/>
+        </p:nvSpPr>
+        <p:spPr>
+          <a:xfrm>
+            <a:off x="5476875" y="1870075"/>
+            <a:ext cx="6553198" cy="3391698"/>
+          </a:xfrm>
+          <a:prstGeom prst="rect">
+            <a:avLst/>
+          </a:prstGeom>
+          <a:noFill/>
+        </p:spPr>
+        <p:txBody>
+          <a:bodyPr rot="0" spcFirstLastPara="0" vertOverflow="overflow" horzOverflow="overflow" vert="horz" wrap="square" lIns="91440" tIns="45720" rIns="91440" bIns="45720" numCol="1" spcCol="0" rtlCol="0" fromWordArt="0" anchor="t" anchorCtr="0" forceAA="0" compatLnSpc="1">
+            <a:prstTxWarp prst="textNoShape">
+              <a:avLst/>
+            </a:prstTxWarp>
+            <a:spAutoFit/>
+          </a:bodyPr>
+          <a:lstStyle/>
+          <a:p>
+            <a:pPr marL="285750" indent="-285750">
+              <a:lnSpc>
+                <a:spcPct val="150000"/>
+              </a:lnSpc>
+              <a:buFont typeface="Arial"/>
+              <a:buChar char="•"/>
+            </a:pPr>
+            <a:r>
+              <a:rPr lang="en-US" sz="2000" dirty="0">
+                <a:cs typeface="Calibri"/>
+              </a:rPr>
+              <a:t>Narrow transformations: parallel tasks</a:t>
+            </a:r>
+            <a:endParaRPr lang="en-US" dirty="0">
+              <a:cs typeface="Calibri" panose="020F0502020204030204"/>
+            </a:endParaRPr>
+          </a:p>
+          <a:p>
+            <a:pPr marL="800100" lvl="1" indent="-342900">
+              <a:lnSpc>
+                <a:spcPct val="150000"/>
+              </a:lnSpc>
+              <a:buFont typeface="Arial"/>
+              <a:buChar char="•"/>
+            </a:pPr>
+            <a:r>
+              <a:rPr lang="en-US" sz="2000" dirty="0">
+                <a:cs typeface="Calibri"/>
+              </a:rPr>
+              <a:t>map, </a:t>
+            </a:r>
+            <a:r>
+              <a:rPr lang="en-US" sz="2000" dirty="0" err="1">
+                <a:cs typeface="Calibri"/>
+              </a:rPr>
+              <a:t>mapValues</a:t>
+            </a:r>
+            <a:r>
+              <a:rPr lang="en-US" sz="2000" dirty="0">
+                <a:cs typeface="Calibri"/>
+              </a:rPr>
+              <a:t>, filter...</a:t>
+            </a:r>
+          </a:p>
+          <a:p>
+            <a:pPr marL="285750" indent="-285750">
+              <a:lnSpc>
+                <a:spcPct val="150000"/>
+              </a:lnSpc>
+              <a:buFont typeface="Arial"/>
+              <a:buChar char="•"/>
+            </a:pPr>
+            <a:r>
+              <a:rPr lang="en-US" sz="2000" dirty="0">
+                <a:cs typeface="Calibri"/>
+              </a:rPr>
+              <a:t>Shuffle operations: move data across workers</a:t>
+            </a:r>
+          </a:p>
+          <a:p>
+            <a:pPr marL="742950" lvl="1" indent="-285750">
+              <a:lnSpc>
+                <a:spcPct val="150000"/>
+              </a:lnSpc>
+              <a:buFont typeface="Arial"/>
+              <a:buChar char="•"/>
+            </a:pPr>
+            <a:r>
+              <a:rPr lang="en-US" sz="2000" dirty="0" err="1">
+                <a:cs typeface="Calibri"/>
+              </a:rPr>
+              <a:t>reduceByKey</a:t>
+            </a:r>
+            <a:r>
+              <a:rPr lang="en-US" sz="2000" dirty="0">
+                <a:cs typeface="Calibri"/>
+              </a:rPr>
+              <a:t>, join...</a:t>
+            </a:r>
+            <a:endParaRPr lang="en-US" dirty="0">
+              <a:cs typeface="Calibri" panose="020F0502020204030204"/>
+            </a:endParaRPr>
+          </a:p>
+          <a:p>
+            <a:pPr marL="285750" indent="-285750">
+              <a:lnSpc>
+                <a:spcPct val="150000"/>
+              </a:lnSpc>
+              <a:buFont typeface="Arial"/>
+              <a:buChar char="•"/>
+            </a:pPr>
+            <a:r>
+              <a:rPr lang="en-US" sz="2000" dirty="0">
+                <a:cs typeface="Calibri"/>
+              </a:rPr>
+              <a:t>Actions: evaluate</a:t>
+            </a:r>
+          </a:p>
+          <a:p>
+            <a:pPr marL="800100" lvl="1" indent="-342900">
+              <a:lnSpc>
+                <a:spcPct val="150000"/>
+              </a:lnSpc>
+              <a:buFont typeface="Arial"/>
+              <a:buChar char="•"/>
+            </a:pPr>
+            <a:r>
+              <a:rPr lang="en-US" sz="2000" dirty="0">
+                <a:cs typeface="Calibri"/>
+              </a:rPr>
+              <a:t>count, take, collect</a:t>
+            </a:r>
+          </a:p>
+          <a:p>
+            <a:pPr marL="342900" indent="-342900">
+              <a:lnSpc>
+                <a:spcPct val="150000"/>
+              </a:lnSpc>
+              <a:buFont typeface="Arial"/>
+              <a:buChar char="•"/>
+            </a:pPr>
+            <a:r>
+              <a:rPr lang="fr-FR" sz="2000" dirty="0">
+                <a:ea typeface="+mn-lt"/>
+                <a:cs typeface="+mn-lt"/>
+              </a:rPr>
+              <a:t>Stage: </a:t>
+            </a:r>
+            <a:r>
+              <a:rPr lang="fr-FR" sz="2000" dirty="0" err="1">
+                <a:ea typeface="+mn-lt"/>
+                <a:cs typeface="+mn-lt"/>
+              </a:rPr>
+              <a:t>sequence</a:t>
+            </a:r>
+            <a:r>
+              <a:rPr lang="fr-FR" sz="2000" dirty="0">
+                <a:ea typeface="+mn-lt"/>
+                <a:cs typeface="+mn-lt"/>
+              </a:rPr>
+              <a:t> of </a:t>
+            </a:r>
+            <a:r>
+              <a:rPr lang="fr-FR" sz="2000" dirty="0" err="1">
+                <a:ea typeface="+mn-lt"/>
+                <a:cs typeface="+mn-lt"/>
+              </a:rPr>
+              <a:t>tasks</a:t>
+            </a:r>
+            <a:r>
+              <a:rPr lang="fr-FR" sz="2000" dirty="0">
+                <a:ea typeface="+mn-lt"/>
+                <a:cs typeface="+mn-lt"/>
+              </a:rPr>
+              <a:t> </a:t>
+            </a:r>
+            <a:r>
+              <a:rPr lang="fr-FR" sz="2000" dirty="0" err="1">
+                <a:ea typeface="+mn-lt"/>
+                <a:cs typeface="+mn-lt"/>
+              </a:rPr>
+              <a:t>between</a:t>
+            </a:r>
+            <a:r>
+              <a:rPr lang="fr-FR" sz="2000" dirty="0">
+                <a:ea typeface="+mn-lt"/>
+                <a:cs typeface="+mn-lt"/>
+              </a:rPr>
+              <a:t> </a:t>
+            </a:r>
+            <a:r>
+              <a:rPr lang="fr-FR" sz="2000" dirty="0" err="1">
+                <a:ea typeface="+mn-lt"/>
+                <a:cs typeface="+mn-lt"/>
+              </a:rPr>
+              <a:t>shuffles</a:t>
+            </a:r>
+            <a:endParaRPr lang="fr-FR" sz="2000" dirty="0" err="1">
+              <a:cs typeface="Calibri"/>
+            </a:endParaRPr>
+          </a:p>
+        </p:txBody>
+      </p:sp>
+    </p:spTree>
+    <p:extLst>
+      <p:ext uri="{BB962C8B-B14F-4D97-AF65-F5344CB8AC3E}">
+        <p14:creationId xmlns:p14="http://schemas.microsoft.com/office/powerpoint/2010/main" val="1429408351"/>
+      </p:ext>
+    </p:extLst>
+  </p:cSld>
+  <p:clrMapOvr>
+    <a:masterClrMapping/>
+  </p:clrMapOvr>
+</p:sld>
+</file>
+
+<file path=ppt/slides/slide3.xml><?xml version="1.0" encoding="utf-8"?>
 <p:sld xmlns:a="http://schemas.openxmlformats.org/drawingml/2006/main" xmlns:r="http://schemas.openxmlformats.org/officeDocument/2006/relationships" xmlns:p="http://schemas.openxmlformats.org/presentationml/2006/main">
   <p:cSld>
     <p:spTree>
@@ -7354,7 +8044,7 @@
     </p:spTree>
     <p:extLst>
       <p:ext uri="{BB962C8B-B14F-4D97-AF65-F5344CB8AC3E}">
-        <p14:creationId xmlns:p14="http://schemas.microsoft.com/office/powerpoint/2010/main" val="1429408351"/>
+        <p14:creationId xmlns:p14="http://schemas.microsoft.com/office/powerpoint/2010/main" val="192693108"/>
       </p:ext>
     </p:extLst>
   </p:cSld>
@@ -7364,7 +8054,7 @@
 </p:sld>
 </file>
 
-<file path=ppt/slides/slide3.xml><?xml version="1.0" encoding="utf-8"?>
+<file path=ppt/slides/slide4.xml><?xml version="1.0" encoding="utf-8"?>
 <p:sld xmlns:a="http://schemas.openxmlformats.org/drawingml/2006/main" xmlns:r="http://schemas.openxmlformats.org/officeDocument/2006/relationships" xmlns:p="http://schemas.openxmlformats.org/presentationml/2006/main">
   <p:cSld>
     <p:spTree>
@@ -7714,7 +8404,7 @@
 </p:sld>
 </file>
 
-<file path=ppt/slides/slide4.xml><?xml version="1.0" encoding="utf-8"?>
+<file path=ppt/slides/slide5.xml><?xml version="1.0" encoding="utf-8"?>
 <p:sld xmlns:a="http://schemas.openxmlformats.org/drawingml/2006/main" xmlns:r="http://schemas.openxmlformats.org/officeDocument/2006/relationships" xmlns:p="http://schemas.openxmlformats.org/presentationml/2006/main">
   <p:cSld>
     <p:spTree>
@@ -8229,7 +8919,7 @@
 </p:sld>
 </file>
 
-<file path=ppt/slides/slide5.xml><?xml version="1.0" encoding="utf-8"?>
+<file path=ppt/slides/slide6.xml><?xml version="1.0" encoding="utf-8"?>
 <p:sld xmlns:a="http://schemas.openxmlformats.org/drawingml/2006/main" xmlns:r="http://schemas.openxmlformats.org/officeDocument/2006/relationships" xmlns:p="http://schemas.openxmlformats.org/presentationml/2006/main">
   <p:cSld>
     <p:spTree>
@@ -9719,7 +10409,7 @@
 </p:sld>
 </file>
 
-<file path=ppt/slides/slide6.xml><?xml version="1.0" encoding="utf-8"?>
+<file path=ppt/slides/slide7.xml><?xml version="1.0" encoding="utf-8"?>
 <p:sld xmlns:a="http://schemas.openxmlformats.org/drawingml/2006/main" xmlns:r="http://schemas.openxmlformats.org/officeDocument/2006/relationships" xmlns:p="http://schemas.openxmlformats.org/presentationml/2006/main">
   <p:cSld>
     <p:spTree>
@@ -11399,7 +12089,7 @@
 </p:sld>
 </file>
 
-<file path=ppt/slides/slide7.xml><?xml version="1.0" encoding="utf-8"?>
+<file path=ppt/slides/slide8.xml><?xml version="1.0" encoding="utf-8"?>
 <p:sld xmlns:a="http://schemas.openxmlformats.org/drawingml/2006/main" xmlns:r="http://schemas.openxmlformats.org/officeDocument/2006/relationships" xmlns:p="http://schemas.openxmlformats.org/presentationml/2006/main">
   <p:cSld>
     <p:spTree>
@@ -13123,7 +13813,7 @@
 </p:sld>
 </file>
 
-<file path=ppt/slides/slide8.xml><?xml version="1.0" encoding="utf-8"?>
+<file path=ppt/slides/slide9.xml><?xml version="1.0" encoding="utf-8"?>
 <p:sld xmlns:a="http://schemas.openxmlformats.org/drawingml/2006/main" xmlns:r="http://schemas.openxmlformats.org/officeDocument/2006/relationships" xmlns:p="http://schemas.openxmlformats.org/presentationml/2006/main">
   <p:cSld>
     <p:spTree>
@@ -13935,364 +14625,6 @@
     <p:extLst>
       <p:ext uri="{BB962C8B-B14F-4D97-AF65-F5344CB8AC3E}">
         <p14:creationId xmlns:p14="http://schemas.microsoft.com/office/powerpoint/2010/main" val="2482890917"/>
-      </p:ext>
-    </p:extLst>
-  </p:cSld>
-  <p:clrMapOvr>
-    <a:masterClrMapping/>
-  </p:clrMapOvr>
-</p:sld>
-</file>
-
-<file path=ppt/slides/slide9.xml><?xml version="1.0" encoding="utf-8"?>
-<p:sld xmlns:a="http://schemas.openxmlformats.org/drawingml/2006/main" xmlns:r="http://schemas.openxmlformats.org/officeDocument/2006/relationships" xmlns:p="http://schemas.openxmlformats.org/presentationml/2006/main">
-  <p:cSld>
-    <p:spTree>
-      <p:nvGrpSpPr>
-        <p:cNvPr id="1" name=""/>
-        <p:cNvGrpSpPr/>
-        <p:nvPr/>
-      </p:nvGrpSpPr>
-      <p:grpSpPr>
-        <a:xfrm>
-          <a:off x="0" y="0"/>
-          <a:ext cx="0" cy="0"/>
-          <a:chOff x="0" y="0"/>
-          <a:chExt cx="0" cy="0"/>
-        </a:xfrm>
-      </p:grpSpPr>
-      <p:sp>
-        <p:nvSpPr>
-          <p:cNvPr id="2" name="Title 1">
-            <a:extLst>
-              <a:ext uri="{FF2B5EF4-FFF2-40B4-BE49-F238E27FC236}">
-                <a16:creationId xmlns:a16="http://schemas.microsoft.com/office/drawing/2014/main" id="{1EF77BFB-B82D-46E7-9ED3-A723BCC0A39C}"/>
-              </a:ext>
-            </a:extLst>
-          </p:cNvPr>
-          <p:cNvSpPr>
-            <a:spLocks noGrp="1"/>
-          </p:cNvSpPr>
-          <p:nvPr>
-            <p:ph type="title"/>
-          </p:nvPr>
-        </p:nvSpPr>
-        <p:spPr/>
-        <p:txBody>
-          <a:bodyPr/>
-          <a:lstStyle/>
-          <a:p>
-            <a:r>
-              <a:rPr lang="fr-FR" err="1"/>
-              <a:t>Scraping</a:t>
-            </a:r>
-            <a:r>
-              <a:rPr lang="fr-FR"/>
-              <a:t> </a:t>
-            </a:r>
-            <a:r>
-              <a:rPr lang="fr-FR" err="1"/>
-              <a:t>around</a:t>
-            </a:r>
-            <a:r>
-              <a:rPr lang="fr-FR"/>
-              <a:t>...</a:t>
-            </a:r>
-            <a:endParaRPr lang="en-US"/>
-          </a:p>
-        </p:txBody>
-      </p:sp>
-      <p:sp>
-        <p:nvSpPr>
-          <p:cNvPr id="9" name="TextBox 4">
-            <a:extLst>
-              <a:ext uri="{FF2B5EF4-FFF2-40B4-BE49-F238E27FC236}">
-                <a16:creationId xmlns:a16="http://schemas.microsoft.com/office/drawing/2014/main" id="{4A862EC4-9979-42EA-87D4-2912983FD8C3}"/>
-              </a:ext>
-            </a:extLst>
-          </p:cNvPr>
-          <p:cNvSpPr txBox="1"/>
-          <p:nvPr/>
-        </p:nvSpPr>
-        <p:spPr>
-          <a:xfrm>
-            <a:off x="1036948" y="1432874"/>
-            <a:ext cx="10058400" cy="3785652"/>
-          </a:xfrm>
-          <a:prstGeom prst="rect">
-            <a:avLst/>
-          </a:prstGeom>
-          <a:noFill/>
-        </p:spPr>
-        <p:txBody>
-          <a:bodyPr wrap="square" lIns="91440" tIns="45720" rIns="91440" bIns="45720" rtlCol="0" anchor="t">
-            <a:spAutoFit/>
-          </a:bodyPr>
-          <a:lstStyle/>
-          <a:p>
-            <a:r>
-              <a:rPr lang="fr-FR" sz="2000" b="1" err="1">
-                <a:cs typeface="Calibri" panose="020F0502020204030204"/>
-              </a:rPr>
-              <a:t>Other</a:t>
-            </a:r>
-            <a:r>
-              <a:rPr lang="fr-FR" sz="2000" b="1" dirty="0">
-                <a:cs typeface="Calibri" panose="020F0502020204030204"/>
-              </a:rPr>
-              <a:t> </a:t>
-            </a:r>
-            <a:r>
-              <a:rPr lang="fr-FR" sz="2000" b="1" err="1">
-                <a:cs typeface="Calibri" panose="020F0502020204030204"/>
-              </a:rPr>
-              <a:t>operations</a:t>
-            </a:r>
-            <a:endParaRPr lang="fr-FR" sz="2000" b="1">
-              <a:cs typeface="Calibri" panose="020F0502020204030204"/>
-            </a:endParaRPr>
-          </a:p>
-          <a:p>
-            <a:pPr marL="285750" indent="-285750">
-              <a:buFontTx/>
-              <a:buChar char="-"/>
-            </a:pPr>
-            <a:r>
-              <a:rPr lang="fr-FR" sz="2000"/>
-              <a:t>Join</a:t>
-            </a:r>
-            <a:endParaRPr lang="fr-FR" sz="2000" err="1">
-              <a:cs typeface="Calibri"/>
-            </a:endParaRPr>
-          </a:p>
-          <a:p>
-            <a:pPr marL="285750" indent="-285750">
-              <a:buFontTx/>
-              <a:buChar char="-"/>
-            </a:pPr>
-            <a:r>
-              <a:rPr lang="fr-FR" sz="2000"/>
-              <a:t>Sort</a:t>
-            </a:r>
-            <a:endParaRPr lang="fr-FR" sz="2000">
-              <a:cs typeface="Calibri"/>
-            </a:endParaRPr>
-          </a:p>
-          <a:p>
-            <a:pPr marL="285750" indent="-285750">
-              <a:buChar char="-"/>
-            </a:pPr>
-            <a:r>
-              <a:rPr lang="fr-FR" sz="2000">
-                <a:cs typeface="Calibri"/>
-              </a:rPr>
-              <a:t>Windowing (when you need context on previous/following records to process a record, e.g. compute moving average, get the rank of a record...)</a:t>
-            </a:r>
-            <a:endParaRPr lang="fr-FR" sz="2000" dirty="0">
-              <a:cs typeface="Calibri"/>
-            </a:endParaRPr>
-          </a:p>
-          <a:p>
-            <a:endParaRPr lang="fr-FR" sz="2000">
-              <a:cs typeface="Calibri"/>
-            </a:endParaRPr>
-          </a:p>
-          <a:p>
-            <a:r>
-              <a:rPr lang="fr-FR" sz="2000" b="1">
-                <a:cs typeface="Calibri"/>
-              </a:rPr>
-              <a:t>SQL </a:t>
-            </a:r>
-            <a:r>
-              <a:rPr lang="fr-FR" sz="2000" b="1" err="1">
-                <a:cs typeface="Calibri"/>
-              </a:rPr>
-              <a:t>syntax</a:t>
-            </a:r>
-            <a:endParaRPr lang="fr-FR" sz="2000" b="1">
-              <a:cs typeface="Calibri"/>
-            </a:endParaRPr>
-          </a:p>
-          <a:p>
-            <a:r>
-              <a:rPr lang="fr-FR" sz="2000" err="1">
-                <a:ea typeface="+mn-lt"/>
-                <a:cs typeface="+mn-lt"/>
-              </a:rPr>
-              <a:t>ratings_df.createOrReplaceTempView</a:t>
-            </a:r>
-            <a:r>
-              <a:rPr lang="fr-FR" sz="2000">
-                <a:ea typeface="+mn-lt"/>
-                <a:cs typeface="+mn-lt"/>
-              </a:rPr>
-              <a:t>("Ratings")</a:t>
-            </a:r>
-            <a:endParaRPr lang="fr-FR"/>
-          </a:p>
-          <a:p>
-            <a:r>
-              <a:rPr lang="fr-FR" sz="2000" err="1">
-                <a:ea typeface="+mn-lt"/>
-                <a:cs typeface="+mn-lt"/>
-              </a:rPr>
-              <a:t>df</a:t>
-            </a:r>
-            <a:r>
-              <a:rPr lang="fr-FR" sz="2000">
-                <a:ea typeface="+mn-lt"/>
-                <a:cs typeface="+mn-lt"/>
-              </a:rPr>
-              <a:t> = </a:t>
-            </a:r>
-            <a:r>
-              <a:rPr lang="fr-FR" sz="2000" err="1">
-                <a:ea typeface="+mn-lt"/>
-                <a:cs typeface="+mn-lt"/>
-              </a:rPr>
-              <a:t>sql</a:t>
-            </a:r>
-            <a:r>
-              <a:rPr lang="fr-FR" sz="2000">
-                <a:ea typeface="+mn-lt"/>
-                <a:cs typeface="+mn-lt"/>
-              </a:rPr>
-              <a:t>('''select </a:t>
-            </a:r>
-            <a:r>
-              <a:rPr lang="fr-FR" sz="2000" err="1">
-                <a:ea typeface="+mn-lt"/>
-                <a:cs typeface="+mn-lt"/>
-              </a:rPr>
-              <a:t>Ratings.id_movie</a:t>
-            </a:r>
-            <a:r>
-              <a:rPr lang="fr-FR" sz="2000">
-                <a:ea typeface="+mn-lt"/>
-                <a:cs typeface="+mn-lt"/>
-              </a:rPr>
-              <a:t>, SUM(</a:t>
-            </a:r>
-            <a:r>
-              <a:rPr lang="fr-FR" sz="2000" err="1">
-                <a:ea typeface="+mn-lt"/>
-                <a:cs typeface="+mn-lt"/>
-              </a:rPr>
-              <a:t>Ratings.rating</a:t>
-            </a:r>
-            <a:r>
-              <a:rPr lang="fr-FR" sz="2000">
-                <a:ea typeface="+mn-lt"/>
-                <a:cs typeface="+mn-lt"/>
-              </a:rPr>
-              <a:t>) as s</a:t>
-            </a:r>
-            <a:endParaRPr lang="fr-FR">
-              <a:ea typeface="+mn-lt"/>
-              <a:cs typeface="+mn-lt"/>
-            </a:endParaRPr>
-          </a:p>
-          <a:p>
-            <a:r>
-              <a:rPr lang="fr-FR" sz="2000" dirty="0">
-                <a:ea typeface="+mn-lt"/>
-                <a:cs typeface="+mn-lt"/>
-              </a:rPr>
-              <a:t>                 </a:t>
-            </a:r>
-            <a:r>
-              <a:rPr lang="fr-FR" sz="2000" err="1">
-                <a:ea typeface="+mn-lt"/>
-                <a:cs typeface="+mn-lt"/>
-              </a:rPr>
-              <a:t>from</a:t>
-            </a:r>
-            <a:r>
-              <a:rPr lang="fr-FR" sz="2000">
-                <a:ea typeface="+mn-lt"/>
-                <a:cs typeface="+mn-lt"/>
-              </a:rPr>
-              <a:t> Ratings</a:t>
-            </a:r>
-            <a:br>
-              <a:rPr lang="fr-FR" sz="2000" dirty="0">
-                <a:ea typeface="+mn-lt"/>
-                <a:cs typeface="+mn-lt"/>
-              </a:rPr>
-            </a:br>
-            <a:r>
-              <a:rPr lang="fr-FR" sz="2000" dirty="0">
-                <a:ea typeface="+mn-lt"/>
-                <a:cs typeface="+mn-lt"/>
-              </a:rPr>
-              <a:t>                 </a:t>
-            </a:r>
-            <a:r>
-              <a:rPr lang="fr-FR" sz="2000" err="1">
-                <a:ea typeface="+mn-lt"/>
-                <a:cs typeface="+mn-lt"/>
-              </a:rPr>
-              <a:t>where</a:t>
-            </a:r>
-            <a:r>
-              <a:rPr lang="fr-FR" sz="2000" dirty="0">
-                <a:ea typeface="+mn-lt"/>
-                <a:cs typeface="+mn-lt"/>
-              </a:rPr>
-              <a:t> </a:t>
-            </a:r>
-            <a:r>
-              <a:rPr lang="fr-FR" sz="2000" err="1">
-                <a:ea typeface="+mn-lt"/>
-                <a:cs typeface="+mn-lt"/>
-              </a:rPr>
-              <a:t>Ratings.user_id</a:t>
-            </a:r>
-            <a:r>
-              <a:rPr lang="fr-FR" sz="2000">
-                <a:ea typeface="+mn-lt"/>
-                <a:cs typeface="+mn-lt"/>
-              </a:rPr>
-              <a:t>=2</a:t>
-            </a:r>
-            <a:br>
-              <a:rPr lang="fr-FR" sz="2000" dirty="0">
-                <a:ea typeface="+mn-lt"/>
-                <a:cs typeface="+mn-lt"/>
-              </a:rPr>
-            </a:br>
-            <a:r>
-              <a:rPr lang="fr-FR" sz="2000">
-                <a:ea typeface="+mn-lt"/>
-                <a:cs typeface="+mn-lt"/>
-              </a:rPr>
-              <a:t>                 group by </a:t>
-            </a:r>
-            <a:r>
-              <a:rPr lang="fr-FR" sz="2000" err="1">
-                <a:ea typeface="+mn-lt"/>
-                <a:cs typeface="+mn-lt"/>
-              </a:rPr>
-              <a:t>Ratings.id_movie</a:t>
-            </a:r>
-            <a:r>
-              <a:rPr lang="fr-FR" sz="2000">
-                <a:ea typeface="+mn-lt"/>
-                <a:cs typeface="+mn-lt"/>
-              </a:rPr>
-              <a:t>''')</a:t>
-            </a:r>
-            <a:endParaRPr lang="fr-FR">
-              <a:cs typeface="Calibri"/>
-            </a:endParaRPr>
-          </a:p>
-        </p:txBody>
-      </p:sp>
-    </p:spTree>
-    <p:extLst>
-      <p:ext uri="{BB962C8B-B14F-4D97-AF65-F5344CB8AC3E}">
-        <p14:creationId xmlns:p14="http://schemas.microsoft.com/office/powerpoint/2010/main" val="1252786671"/>
       </p:ext>
     </p:extLst>
   </p:cSld>

</xml_diff>

<commit_message>
[Module 4] Update the slides of the td2
</commit_message>
<xml_diff>
--- a/module4/td2/td2-spark-dataframe.pptx
+++ b/module4/td2/td2-spark-dataframe.pptx
@@ -130,6 +130,7 @@
 <p1510:revInfo xmlns:a="http://schemas.openxmlformats.org/drawingml/2006/main" xmlns:r="http://schemas.openxmlformats.org/officeDocument/2006/relationships" xmlns:p1510="http://schemas.microsoft.com/office/powerpoint/2015/10/main">
   <p1510:revLst>
     <p1510:client id="{424BAB5A-E71E-13CA-CA1B-F6D262786152}" v="603" dt="2022-02-09T15:29:28.149"/>
+    <p1510:client id="{A6562958-1B74-C30F-A957-48CDD74E28C5}" v="473" dt="2022-12-14T14:47:06.690"/>
     <p1510:client id="{ABF4876D-44CB-C346-A1E8-22B467A5ADDC}" v="116" dt="2020-11-06T14:44:44.770"/>
   </p1510:revLst>
 </p1510:revInfo>
@@ -282,7 +283,7 @@
           <a:p>
             <a:fld id="{97D5A493-CCC9-418E-861C-802A9D3B9980}" type="datetimeFigureOut">
               <a:rPr lang="en-US" smtClean="0"/>
-              <a:t>2/9/2022</a:t>
+              <a:t>12/14/2022</a:t>
             </a:fld>
             <a:endParaRPr lang="en-US"/>
           </a:p>
@@ -480,7 +481,7 @@
           <a:p>
             <a:fld id="{97D5A493-CCC9-418E-861C-802A9D3B9980}" type="datetimeFigureOut">
               <a:rPr lang="en-US" smtClean="0"/>
-              <a:t>2/9/2022</a:t>
+              <a:t>12/14/2022</a:t>
             </a:fld>
             <a:endParaRPr lang="en-US"/>
           </a:p>
@@ -688,7 +689,7 @@
           <a:p>
             <a:fld id="{97D5A493-CCC9-418E-861C-802A9D3B9980}" type="datetimeFigureOut">
               <a:rPr lang="en-US" smtClean="0"/>
-              <a:t>2/9/2022</a:t>
+              <a:t>12/14/2022</a:t>
             </a:fld>
             <a:endParaRPr lang="en-US"/>
           </a:p>
@@ -886,7 +887,7 @@
           <a:p>
             <a:fld id="{97D5A493-CCC9-418E-861C-802A9D3B9980}" type="datetimeFigureOut">
               <a:rPr lang="en-US" smtClean="0"/>
-              <a:t>2/9/2022</a:t>
+              <a:t>12/14/2022</a:t>
             </a:fld>
             <a:endParaRPr lang="en-US"/>
           </a:p>
@@ -1161,7 +1162,7 @@
           <a:p>
             <a:fld id="{97D5A493-CCC9-418E-861C-802A9D3B9980}" type="datetimeFigureOut">
               <a:rPr lang="en-US" smtClean="0"/>
-              <a:t>2/9/2022</a:t>
+              <a:t>12/14/2022</a:t>
             </a:fld>
             <a:endParaRPr lang="en-US"/>
           </a:p>
@@ -1426,7 +1427,7 @@
           <a:p>
             <a:fld id="{97D5A493-CCC9-418E-861C-802A9D3B9980}" type="datetimeFigureOut">
               <a:rPr lang="en-US" smtClean="0"/>
-              <a:t>2/9/2022</a:t>
+              <a:t>12/14/2022</a:t>
             </a:fld>
             <a:endParaRPr lang="en-US"/>
           </a:p>
@@ -1838,7 +1839,7 @@
           <a:p>
             <a:fld id="{97D5A493-CCC9-418E-861C-802A9D3B9980}" type="datetimeFigureOut">
               <a:rPr lang="en-US" smtClean="0"/>
-              <a:t>2/9/2022</a:t>
+              <a:t>12/14/2022</a:t>
             </a:fld>
             <a:endParaRPr lang="en-US"/>
           </a:p>
@@ -1979,7 +1980,7 @@
           <a:p>
             <a:fld id="{97D5A493-CCC9-418E-861C-802A9D3B9980}" type="datetimeFigureOut">
               <a:rPr lang="en-US" smtClean="0"/>
-              <a:t>2/9/2022</a:t>
+              <a:t>12/14/2022</a:t>
             </a:fld>
             <a:endParaRPr lang="en-US"/>
           </a:p>
@@ -2092,7 +2093,7 @@
           <a:p>
             <a:fld id="{97D5A493-CCC9-418E-861C-802A9D3B9980}" type="datetimeFigureOut">
               <a:rPr lang="en-US" smtClean="0"/>
-              <a:t>2/9/2022</a:t>
+              <a:t>12/14/2022</a:t>
             </a:fld>
             <a:endParaRPr lang="en-US"/>
           </a:p>
@@ -2403,7 +2404,7 @@
           <a:p>
             <a:fld id="{97D5A493-CCC9-418E-861C-802A9D3B9980}" type="datetimeFigureOut">
               <a:rPr lang="en-US" smtClean="0"/>
-              <a:t>2/9/2022</a:t>
+              <a:t>12/14/2022</a:t>
             </a:fld>
             <a:endParaRPr lang="en-US"/>
           </a:p>
@@ -2691,7 +2692,7 @@
           <a:p>
             <a:fld id="{97D5A493-CCC9-418E-861C-802A9D3B9980}" type="datetimeFigureOut">
               <a:rPr lang="en-US" smtClean="0"/>
-              <a:t>2/9/2022</a:t>
+              <a:t>12/14/2022</a:t>
             </a:fld>
             <a:endParaRPr lang="en-US"/>
           </a:p>
@@ -2932,7 +2933,7 @@
           <a:p>
             <a:fld id="{97D5A493-CCC9-418E-861C-802A9D3B9980}" type="datetimeFigureOut">
               <a:rPr lang="en-US" smtClean="0"/>
-              <a:t>2/9/2022</a:t>
+              <a:t>12/14/2022</a:t>
             </a:fld>
             <a:endParaRPr lang="en-US"/>
           </a:p>
@@ -9011,15 +9012,17 @@
           </a:fontRef>
         </p:style>
         <p:txBody>
-          <a:bodyPr rtlCol="0" anchor="ctr"/>
+          <a:bodyPr lIns="91440" tIns="45720" rIns="91440" bIns="45720" rtlCol="0" anchor="ctr"/>
           <a:lstStyle/>
           <a:p>
             <a:pPr algn="ctr"/>
             <a:r>
-              <a:rPr lang="fr-FR"/>
+              <a:rPr lang="fr-FR" b="1" dirty="0"/>
               <a:t>count</a:t>
             </a:r>
-            <a:endParaRPr lang="en-US"/>
+            <a:endParaRPr lang="en-US" b="1" dirty="0">
+              <a:cs typeface="Calibri"/>
+            </a:endParaRPr>
           </a:p>
         </p:txBody>
       </p:sp>
@@ -9117,7 +9120,13 @@
           <p:cNvGraphicFramePr>
             <a:graphicFrameLocks noGrp="1"/>
           </p:cNvGraphicFramePr>
-          <p:nvPr/>
+          <p:nvPr>
+            <p:extLst>
+              <p:ext uri="{D42A27DB-BD31-4B8C-83A1-F6EECF244321}">
+                <p14:modId xmlns:p14="http://schemas.microsoft.com/office/powerpoint/2010/main" val="3718013897"/>
+              </p:ext>
+            </p:extLst>
+          </p:nvPr>
         </p:nvGraphicFramePr>
         <p:xfrm>
           <a:off x="336282" y="1371359"/>
@@ -9144,11 +9153,16 @@
                     <a:bodyPr/>
                     <a:lstStyle/>
                     <a:p>
-                      <a:r>
-                        <a:rPr lang="fr-FR" sz="1600"/>
-                        <a:t>Row</a:t>
-                      </a:r>
-                      <a:endParaRPr lang="en-US" sz="1600"/>
+                      <a:pPr lvl="0">
+                        <a:buNone/>
+                      </a:pPr>
+                      <a:r>
+                        <a:rPr lang="fr-FR" sz="1600" b="1" i="0" u="none" strike="noStrike" noProof="0" dirty="0">
+                          <a:latin typeface="Calibri"/>
+                        </a:rPr>
+                        <a:t>RDD</a:t>
+                      </a:r>
+                      <a:endParaRPr lang="en-US" dirty="0"/>
                     </a:p>
                   </a:txBody>
                   <a:tcPr/>
@@ -9166,23 +9180,23 @@
                     <a:lstStyle/>
                     <a:p>
                       <a:r>
-                        <a:rPr lang="en-US" sz="1600"/>
+                        <a:rPr lang="en-US" sz="1600" dirty="0"/>
                         <a:t>{"</a:t>
                       </a:r>
                       <a:r>
-                        <a:rPr lang="en-US" sz="1600" err="1"/>
+                        <a:rPr lang="en-US" sz="1600" dirty="0" err="1"/>
                         <a:t>user":"John</a:t>
                       </a:r>
                       <a:r>
-                        <a:rPr lang="en-US" sz="1600"/>
+                        <a:rPr lang="en-US" sz="1600" dirty="0"/>
                         <a:t>", "</a:t>
                       </a:r>
                       <a:r>
-                        <a:rPr lang="en-US" sz="1600" err="1"/>
+                        <a:rPr lang="en-US" sz="1600" dirty="0" err="1"/>
                         <a:t>movie":"Blade</a:t>
                       </a:r>
                       <a:r>
-                        <a:rPr lang="en-US" sz="1600"/>
+                        <a:rPr lang="en-US" sz="1600" dirty="0"/>
                         <a:t> Runner", "rating":5.0}</a:t>
                       </a:r>
                     </a:p>
@@ -9202,23 +9216,23 @@
                     <a:lstStyle/>
                     <a:p>
                       <a:r>
-                        <a:rPr lang="en-US" sz="1600"/>
+                        <a:rPr lang="en-US" sz="1600" dirty="0"/>
                         <a:t>{"</a:t>
                       </a:r>
                       <a:r>
-                        <a:rPr lang="en-US" sz="1600" err="1"/>
+                        <a:rPr lang="en-US" sz="1600" dirty="0" err="1"/>
                         <a:t>user":"Louise</a:t>
                       </a:r>
                       <a:r>
-                        <a:rPr lang="en-US" sz="1600"/>
+                        <a:rPr lang="en-US" sz="1600" dirty="0"/>
                         <a:t>", "</a:t>
                       </a:r>
                       <a:r>
-                        <a:rPr lang="en-US" sz="1600" err="1"/>
+                        <a:rPr lang="en-US" sz="1600" dirty="0" err="1"/>
                         <a:t>movie":"Dirty</a:t>
                       </a:r>
                       <a:r>
-                        <a:rPr lang="en-US" sz="1600"/>
+                        <a:rPr lang="en-US" sz="1600" dirty="0"/>
                         <a:t> dancing", "rating":5.0}</a:t>
                       </a:r>
                     </a:p>
@@ -9255,23 +9269,23 @@
                         <a:defRPr/>
                       </a:pPr>
                       <a:r>
-                        <a:rPr lang="en-US" sz="1600"/>
+                        <a:rPr lang="en-US" sz="1600" dirty="0"/>
                         <a:t>{"</a:t>
                       </a:r>
                       <a:r>
-                        <a:rPr lang="en-US" sz="1600" err="1"/>
-                        <a:t>user":“Sam</a:t>
-                      </a:r>
-                      <a:r>
-                        <a:rPr lang="en-US" sz="1600"/>
+                        <a:rPr lang="en-US" sz="1600" dirty="0" err="1"/>
+                        <a:t>user":"Sam</a:t>
+                      </a:r>
+                      <a:r>
+                        <a:rPr lang="en-US" sz="1600" dirty="0"/>
                         <a:t>", "</a:t>
                       </a:r>
                       <a:r>
-                        <a:rPr lang="en-US" sz="1600" err="1"/>
-                        <a:t>movie":“Blade</a:t>
-                      </a:r>
-                      <a:r>
-                        <a:rPr lang="en-US" sz="1600"/>
+                        <a:rPr lang="en-US" sz="1600" dirty="0" err="1"/>
+                        <a:t>movie":"Blade</a:t>
+                      </a:r>
+                      <a:r>
+                        <a:rPr lang="en-US" sz="1600" dirty="0"/>
                         <a:t> Runner", "rating":3.5}</a:t>
                       </a:r>
                     </a:p>
@@ -9302,7 +9316,7 @@
         </p:nvSpPr>
         <p:spPr>
           <a:xfrm>
-            <a:off x="6096000" y="3487130"/>
+            <a:off x="6096000" y="3427197"/>
             <a:ext cx="2374085" cy="780176"/>
           </a:xfrm>
           <a:prstGeom prst="roundRect">
@@ -9326,19 +9340,21 @@
           </a:fontRef>
         </p:style>
         <p:txBody>
-          <a:bodyPr rtlCol="0" anchor="ctr"/>
+          <a:bodyPr lIns="91440" tIns="45720" rIns="91440" bIns="45720" rtlCol="0" anchor="ctr"/>
           <a:lstStyle/>
           <a:p>
             <a:pPr algn="ctr"/>
             <a:r>
-              <a:rPr lang="fr-FR" err="1"/>
+              <a:rPr lang="fr-FR" b="1" dirty="0" err="1"/>
               <a:t>take</a:t>
             </a:r>
             <a:r>
-              <a:rPr lang="fr-FR"/>
+              <a:rPr lang="fr-FR" b="1" dirty="0"/>
               <a:t>(2)</a:t>
             </a:r>
-            <a:endParaRPr lang="en-US"/>
+            <a:endParaRPr lang="en-US" b="1">
+              <a:cs typeface="Calibri"/>
+            </a:endParaRPr>
           </a:p>
         </p:txBody>
       </p:sp>
@@ -9439,7 +9455,7 @@
           <p:nvPr>
             <p:extLst>
               <p:ext uri="{D42A27DB-BD31-4B8C-83A1-F6EECF244321}">
-                <p14:modId xmlns:p14="http://schemas.microsoft.com/office/powerpoint/2010/main" val="1976910992"/>
+                <p14:modId xmlns:p14="http://schemas.microsoft.com/office/powerpoint/2010/main" val="12083945"/>
               </p:ext>
             </p:extLst>
           </p:nvPr>
@@ -9469,11 +9485,16 @@
                     <a:bodyPr/>
                     <a:lstStyle/>
                     <a:p>
-                      <a:r>
-                        <a:rPr lang="fr-FR" sz="1600"/>
-                        <a:t>Row</a:t>
-                      </a:r>
-                      <a:endParaRPr lang="en-US" sz="1600"/>
+                      <a:pPr lvl="0">
+                        <a:buNone/>
+                      </a:pPr>
+                      <a:r>
+                        <a:rPr lang="fr-FR" sz="1600" b="1" i="0" u="none" strike="noStrike" noProof="0" dirty="0" err="1">
+                          <a:latin typeface="Calibri"/>
+                        </a:rPr>
+                        <a:t>list</a:t>
+                      </a:r>
+                      <a:endParaRPr lang="en-US" dirty="0" err="1"/>
                     </a:p>
                   </a:txBody>
                   <a:tcPr/>
@@ -9491,16 +9512,16 @@
                     <a:lstStyle/>
                     <a:p>
                       <a:r>
-                        <a:rPr lang="en-US" sz="1600"/>
+                        <a:rPr lang="en-US" sz="1600" dirty="0"/>
                         <a:t>{"</a:t>
                       </a:r>
                       <a:r>
-                        <a:rPr lang="en-US" sz="1600" err="1"/>
+                        <a:rPr lang="en-US" sz="1600" dirty="0" err="1"/>
                         <a:t>user":"John</a:t>
                       </a:r>
                       <a:r>
-                        <a:rPr lang="en-US" sz="1600"/>
-                        <a:t>“}</a:t>
+                        <a:rPr lang="en-US" sz="1600" dirty="0"/>
+                        <a:t>"}</a:t>
                       </a:r>
                     </a:p>
                   </a:txBody>
@@ -9519,16 +9540,16 @@
                     <a:lstStyle/>
                     <a:p>
                       <a:r>
-                        <a:rPr lang="en-US" sz="1600"/>
+                        <a:rPr lang="en-US" sz="1600" dirty="0"/>
                         <a:t>{"</a:t>
                       </a:r>
                       <a:r>
-                        <a:rPr lang="en-US" sz="1600" err="1"/>
+                        <a:rPr lang="en-US" sz="1600" dirty="0" err="1"/>
                         <a:t>user":"Louise</a:t>
                       </a:r>
                       <a:r>
-                        <a:rPr lang="en-US" sz="1600"/>
-                        <a:t>“}</a:t>
+                        <a:rPr lang="en-US" sz="1600" dirty="0"/>
+                        <a:t>"}</a:t>
                       </a:r>
                     </a:p>
                   </a:txBody>
@@ -9559,7 +9580,7 @@
           <p:nvPr>
             <p:extLst>
               <p:ext uri="{D42A27DB-BD31-4B8C-83A1-F6EECF244321}">
-                <p14:modId xmlns:p14="http://schemas.microsoft.com/office/powerpoint/2010/main" val="3203822827"/>
+                <p14:modId xmlns:p14="http://schemas.microsoft.com/office/powerpoint/2010/main" val="1571896400"/>
               </p:ext>
             </p:extLst>
           </p:nvPr>
@@ -9589,11 +9610,16 @@
                     <a:bodyPr/>
                     <a:lstStyle/>
                     <a:p>
-                      <a:r>
-                        <a:rPr lang="fr-FR" sz="1600"/>
-                        <a:t>Row</a:t>
-                      </a:r>
-                      <a:endParaRPr lang="en-US" sz="1600"/>
+                      <a:pPr lvl="0">
+                        <a:buNone/>
+                      </a:pPr>
+                      <a:r>
+                        <a:rPr lang="fr-FR" sz="1600" b="1" i="0" u="none" strike="noStrike" noProof="0" dirty="0">
+                          <a:latin typeface="Calibri"/>
+                        </a:rPr>
+                        <a:t>RDD</a:t>
+                      </a:r>
+                      <a:endParaRPr lang="en-US" dirty="0"/>
                     </a:p>
                   </a:txBody>
                   <a:tcPr/>
@@ -9611,16 +9637,16 @@
                     <a:lstStyle/>
                     <a:p>
                       <a:r>
-                        <a:rPr lang="en-US" sz="1600"/>
+                        <a:rPr lang="en-US" sz="1600" dirty="0"/>
                         <a:t>{"</a:t>
                       </a:r>
                       <a:r>
-                        <a:rPr lang="en-US" sz="1600" err="1"/>
+                        <a:rPr lang="en-US" sz="1600" dirty="0" err="1"/>
                         <a:t>user":"John</a:t>
                       </a:r>
                       <a:r>
-                        <a:rPr lang="en-US" sz="1600"/>
-                        <a:t>“}</a:t>
+                        <a:rPr lang="en-US" sz="1600" dirty="0"/>
+                        <a:t>"}</a:t>
                       </a:r>
                     </a:p>
                   </a:txBody>
@@ -9639,16 +9665,16 @@
                     <a:lstStyle/>
                     <a:p>
                       <a:r>
-                        <a:rPr lang="en-US" sz="1600"/>
+                        <a:rPr lang="en-US" sz="1600" dirty="0"/>
                         <a:t>{"</a:t>
                       </a:r>
                       <a:r>
-                        <a:rPr lang="en-US" sz="1600" err="1"/>
+                        <a:rPr lang="en-US" sz="1600" dirty="0" err="1"/>
                         <a:t>user":"Louise</a:t>
                       </a:r>
                       <a:r>
-                        <a:rPr lang="en-US" sz="1600"/>
-                        <a:t>“}</a:t>
+                        <a:rPr lang="en-US" sz="1600" dirty="0"/>
+                        <a:t>"}</a:t>
                       </a:r>
                     </a:p>
                   </a:txBody>
@@ -9684,16 +9710,16 @@
                         <a:defRPr/>
                       </a:pPr>
                       <a:r>
-                        <a:rPr lang="en-US" sz="1600"/>
+                        <a:rPr lang="en-US" sz="1600" dirty="0"/>
                         <a:t>{"</a:t>
                       </a:r>
                       <a:r>
-                        <a:rPr lang="en-US" sz="1600" err="1"/>
-                        <a:t>user":“Sam</a:t>
-                      </a:r>
-                      <a:r>
-                        <a:rPr lang="en-US" sz="1600"/>
-                        <a:t>“}</a:t>
+                        <a:rPr lang="en-US" sz="1600" dirty="0" err="1"/>
+                        <a:t>user":"Sam</a:t>
+                      </a:r>
+                      <a:r>
+                        <a:rPr lang="en-US" sz="1600" dirty="0"/>
+                        <a:t>"}</a:t>
                       </a:r>
                     </a:p>
                   </a:txBody>
@@ -9783,19 +9809,21 @@
           </a:fontRef>
         </p:style>
         <p:txBody>
-          <a:bodyPr rtlCol="0" anchor="ctr"/>
+          <a:bodyPr lIns="91440" tIns="45720" rIns="91440" bIns="45720" rtlCol="0" anchor="ctr"/>
           <a:lstStyle/>
           <a:p>
             <a:pPr algn="ctr"/>
             <a:r>
-              <a:rPr lang="fr-FR" err="1"/>
+              <a:rPr lang="fr-FR" b="1" dirty="0" err="1"/>
               <a:t>collect</a:t>
             </a:r>
             <a:r>
-              <a:rPr lang="fr-FR"/>
+              <a:rPr lang="fr-FR" b="1" dirty="0"/>
               <a:t>()</a:t>
             </a:r>
-            <a:endParaRPr lang="en-US"/>
+            <a:endParaRPr lang="en-US" b="1" dirty="0">
+              <a:cs typeface="Calibri"/>
+            </a:endParaRPr>
           </a:p>
         </p:txBody>
       </p:sp>
@@ -9896,7 +9924,7 @@
           <p:nvPr>
             <p:extLst>
               <p:ext uri="{D42A27DB-BD31-4B8C-83A1-F6EECF244321}">
-                <p14:modId xmlns:p14="http://schemas.microsoft.com/office/powerpoint/2010/main" val="2817214379"/>
+                <p14:modId xmlns:p14="http://schemas.microsoft.com/office/powerpoint/2010/main" val="2250449775"/>
               </p:ext>
             </p:extLst>
           </p:nvPr>
@@ -9926,11 +9954,16 @@
                     <a:bodyPr/>
                     <a:lstStyle/>
                     <a:p>
-                      <a:r>
-                        <a:rPr lang="fr-FR" sz="1600"/>
-                        <a:t>Row</a:t>
-                      </a:r>
-                      <a:endParaRPr lang="en-US" sz="1600"/>
+                      <a:pPr lvl="0">
+                        <a:buNone/>
+                      </a:pPr>
+                      <a:r>
+                        <a:rPr lang="fr-FR" sz="1600" b="1" i="0" u="none" strike="noStrike" noProof="0" dirty="0">
+                          <a:latin typeface="Calibri"/>
+                        </a:rPr>
+                        <a:t>RDD</a:t>
+                      </a:r>
+                      <a:endParaRPr lang="en-US" dirty="0"/>
                     </a:p>
                   </a:txBody>
                   <a:tcPr/>
@@ -9948,16 +9981,16 @@
                     <a:lstStyle/>
                     <a:p>
                       <a:r>
-                        <a:rPr lang="en-US" sz="1600"/>
+                        <a:rPr lang="en-US" sz="1600" dirty="0"/>
                         <a:t>{"</a:t>
                       </a:r>
                       <a:r>
-                        <a:rPr lang="en-US" sz="1600" err="1"/>
+                        <a:rPr lang="en-US" sz="1600" dirty="0" err="1"/>
                         <a:t>user":"John</a:t>
                       </a:r>
                       <a:r>
-                        <a:rPr lang="en-US" sz="1600"/>
-                        <a:t>“}</a:t>
+                        <a:rPr lang="en-US" sz="1600" dirty="0"/>
+                        <a:t>"}</a:t>
                       </a:r>
                     </a:p>
                   </a:txBody>
@@ -9976,7 +10009,7 @@
                     <a:lstStyle/>
                     <a:p>
                       <a:r>
-                        <a:rPr lang="en-US" sz="1600"/>
+                        <a:rPr lang="en-US" sz="1600" dirty="0"/>
                         <a:t>….</a:t>
                       </a:r>
                     </a:p>
@@ -10013,16 +10046,16 @@
                         <a:defRPr/>
                       </a:pPr>
                       <a:r>
-                        <a:rPr lang="en-US" sz="1600"/>
+                        <a:rPr lang="en-US" sz="1600" dirty="0"/>
                         <a:t>{"</a:t>
                       </a:r>
                       <a:r>
-                        <a:rPr lang="en-US" sz="1600" err="1"/>
-                        <a:t>user":“Sam</a:t>
-                      </a:r>
-                      <a:r>
-                        <a:rPr lang="en-US" sz="1600"/>
-                        <a:t>“}</a:t>
+                        <a:rPr lang="en-US" sz="1600" dirty="0" err="1"/>
+                        <a:t>user":"Sam</a:t>
+                      </a:r>
+                      <a:r>
+                        <a:rPr lang="en-US" sz="1600" dirty="0"/>
+                        <a:t>"}</a:t>
                       </a:r>
                     </a:p>
                   </a:txBody>
@@ -10053,7 +10086,7 @@
           <p:nvPr>
             <p:extLst>
               <p:ext uri="{D42A27DB-BD31-4B8C-83A1-F6EECF244321}">
-                <p14:modId xmlns:p14="http://schemas.microsoft.com/office/powerpoint/2010/main" val="1945901971"/>
+                <p14:modId xmlns:p14="http://schemas.microsoft.com/office/powerpoint/2010/main" val="27994726"/>
               </p:ext>
             </p:extLst>
           </p:nvPr>
@@ -10083,11 +10116,16 @@
                     <a:bodyPr/>
                     <a:lstStyle/>
                     <a:p>
-                      <a:r>
-                        <a:rPr lang="fr-FR" sz="1600"/>
-                        <a:t>Row</a:t>
-                      </a:r>
-                      <a:endParaRPr lang="en-US" sz="1600"/>
+                      <a:pPr lvl="0">
+                        <a:buNone/>
+                      </a:pPr>
+                      <a:r>
+                        <a:rPr lang="fr-FR" sz="1600" b="1" i="0" u="none" strike="noStrike" noProof="0" dirty="0" err="1">
+                          <a:latin typeface="Calibri"/>
+                        </a:rPr>
+                        <a:t>list</a:t>
+                      </a:r>
+                      <a:endParaRPr lang="en-US" dirty="0" err="1"/>
                     </a:p>
                   </a:txBody>
                   <a:tcPr/>
@@ -10105,16 +10143,16 @@
                     <a:lstStyle/>
                     <a:p>
                       <a:r>
-                        <a:rPr lang="en-US" sz="1600"/>
+                        <a:rPr lang="en-US" sz="1600" dirty="0"/>
                         <a:t>{"</a:t>
                       </a:r>
                       <a:r>
-                        <a:rPr lang="en-US" sz="1600" err="1"/>
+                        <a:rPr lang="en-US" sz="1600" dirty="0" err="1"/>
                         <a:t>user":"John</a:t>
                       </a:r>
                       <a:r>
-                        <a:rPr lang="en-US" sz="1600"/>
-                        <a:t>“}</a:t>
+                        <a:rPr lang="en-US" sz="1600" dirty="0"/>
+                        <a:t>"}</a:t>
                       </a:r>
                     </a:p>
                   </a:txBody>
@@ -10133,7 +10171,7 @@
                     <a:lstStyle/>
                     <a:p>
                       <a:r>
-                        <a:rPr lang="en-US" sz="1600"/>
+                        <a:rPr lang="en-US" sz="1600" dirty="0"/>
                         <a:t>….</a:t>
                       </a:r>
                     </a:p>
@@ -10170,16 +10208,16 @@
                         <a:defRPr/>
                       </a:pPr>
                       <a:r>
-                        <a:rPr lang="en-US" sz="1600"/>
+                        <a:rPr lang="en-US" sz="1600" dirty="0"/>
                         <a:t>{"</a:t>
                       </a:r>
                       <a:r>
-                        <a:rPr lang="en-US" sz="1600" err="1"/>
-                        <a:t>user":“Sam</a:t>
-                      </a:r>
-                      <a:r>
-                        <a:rPr lang="en-US" sz="1600"/>
-                        <a:t>“}</a:t>
+                        <a:rPr lang="en-US" sz="1600" dirty="0" err="1"/>
+                        <a:t>user":"Sam</a:t>
+                      </a:r>
+                      <a:r>
+                        <a:rPr lang="en-US" sz="1600" dirty="0"/>
+                        <a:t>"}</a:t>
                       </a:r>
                     </a:p>
                   </a:txBody>
@@ -10501,37 +10539,37 @@
           </a:fontRef>
         </p:style>
         <p:txBody>
-          <a:bodyPr rtlCol="0" anchor="ctr"/>
+          <a:bodyPr lIns="91440" tIns="45720" rIns="91440" bIns="45720" rtlCol="0" anchor="ctr"/>
           <a:lstStyle/>
           <a:p>
             <a:pPr algn="ctr"/>
             <a:r>
-              <a:rPr lang="fr-FR" err="1"/>
+              <a:rPr lang="fr-FR" b="1" dirty="0" err="1"/>
               <a:t>map</a:t>
             </a:r>
             <a:r>
-              <a:rPr lang="fr-FR"/>
+              <a:rPr lang="fr-FR" b="1" dirty="0"/>
               <a:t>(lambda: x</a:t>
             </a:r>
             <a:r>
-              <a:rPr lang="fr-FR">
+              <a:rPr lang="fr-FR" b="1" dirty="0">
                 <a:sym typeface="Wingdings" panose="05000000000000000000" pitchFamily="2" charset="2"/>
               </a:rPr>
-              <a:t> x[‘</a:t>
-            </a:r>
-            <a:r>
-              <a:rPr lang="fr-FR" err="1">
+              <a:t> x['</a:t>
+            </a:r>
+            <a:r>
+              <a:rPr lang="fr-FR" b="1" dirty="0" err="1">
                 <a:sym typeface="Wingdings" panose="05000000000000000000" pitchFamily="2" charset="2"/>
               </a:rPr>
               <a:t>movie</a:t>
             </a:r>
             <a:r>
-              <a:rPr lang="fr-FR">
+              <a:rPr lang="fr-FR" b="1" dirty="0">
                 <a:sym typeface="Wingdings" panose="05000000000000000000" pitchFamily="2" charset="2"/>
               </a:rPr>
-              <a:t>’])</a:t>
-            </a:r>
-            <a:endParaRPr lang="en-US"/>
+              <a:t>'])</a:t>
+            </a:r>
+            <a:endParaRPr lang="en-US" b="1" dirty="0"/>
           </a:p>
         </p:txBody>
       </p:sp>
@@ -10632,14 +10670,14 @@
           <p:nvPr>
             <p:extLst>
               <p:ext uri="{D42A27DB-BD31-4B8C-83A1-F6EECF244321}">
-                <p14:modId xmlns:p14="http://schemas.microsoft.com/office/powerpoint/2010/main" val="2515917153"/>
+                <p14:modId xmlns:p14="http://schemas.microsoft.com/office/powerpoint/2010/main" val="1367173784"/>
               </p:ext>
             </p:extLst>
           </p:nvPr>
         </p:nvGraphicFramePr>
         <p:xfrm>
           <a:off x="9167069" y="1377072"/>
-          <a:ext cx="1435267" cy="1479749"/>
+          <a:ext cx="1829135" cy="1479749"/>
         </p:xfrm>
         <a:graphic>
           <a:graphicData uri="http://schemas.openxmlformats.org/drawingml/2006/table">
@@ -10648,7 +10686,7 @@
                 <a:tableStyleId>{5C22544A-7EE6-4342-B048-85BDC9FD1C3A}</a:tableStyleId>
               </a:tblPr>
               <a:tblGrid>
-                <a:gridCol w="1435267">
+                <a:gridCol w="1829135">
                   <a:extLst>
                     <a:ext uri="{9D8B030D-6E8A-4147-A177-3AD203B41FA5}">
                       <a16:colId xmlns:a16="http://schemas.microsoft.com/office/drawing/2014/main" val="2061391393"/>
@@ -10662,11 +10700,16 @@
                     <a:bodyPr/>
                     <a:lstStyle/>
                     <a:p>
-                      <a:r>
-                        <a:rPr lang="fr-FR" sz="1600"/>
-                        <a:t>Row</a:t>
-                      </a:r>
-                      <a:endParaRPr lang="en-US" sz="1600"/>
+                      <a:pPr lvl="0">
+                        <a:buNone/>
+                      </a:pPr>
+                      <a:r>
+                        <a:rPr lang="fr-FR" sz="1600" b="1" i="0" u="none" strike="noStrike" noProof="0" dirty="0">
+                          <a:latin typeface="Calibri"/>
+                        </a:rPr>
+                        <a:t>RDD</a:t>
+                      </a:r>
+                      <a:endParaRPr lang="en-US" dirty="0"/>
                     </a:p>
                   </a:txBody>
                   <a:tcPr/>
@@ -10684,10 +10727,10 @@
                     <a:lstStyle/>
                     <a:p>
                       <a:r>
-                        <a:rPr lang="fr-FR" sz="1600"/>
-                        <a:t>Blade Runner</a:t>
-                      </a:r>
-                      <a:endParaRPr lang="en-US" sz="1600"/>
+                        <a:rPr lang="fr-FR" sz="1600" dirty="0"/>
+                        <a:t>"Blade Runner"</a:t>
+                      </a:r>
+                      <a:endParaRPr lang="en-US" sz="1600" dirty="0"/>
                     </a:p>
                   </a:txBody>
                   <a:tcPr/>
@@ -10705,10 +10748,10 @@
                     <a:lstStyle/>
                     <a:p>
                       <a:r>
-                        <a:rPr lang="fr-FR" sz="1600"/>
-                        <a:t>Dirty Dancing</a:t>
-                      </a:r>
-                      <a:endParaRPr lang="en-US" sz="1600"/>
+                        <a:rPr lang="fr-FR" sz="1600" dirty="0"/>
+                        <a:t>"Dirty Dancing"</a:t>
+                      </a:r>
+                      <a:endParaRPr lang="en-US" sz="1600" dirty="0"/>
                     </a:p>
                   </a:txBody>
                   <a:tcPr/>
@@ -10743,10 +10786,10 @@
                         <a:defRPr/>
                       </a:pPr>
                       <a:r>
-                        <a:rPr lang="fr-FR" sz="1600"/>
-                        <a:t>Blade Runner</a:t>
-                      </a:r>
-                      <a:endParaRPr lang="en-US" sz="1600"/>
+                        <a:rPr lang="fr-FR" sz="1600" dirty="0"/>
+                        <a:t>"Blade Runner"</a:t>
+                      </a:r>
+                      <a:endParaRPr lang="en-US" sz="1600" dirty="0"/>
                     </a:p>
                   </a:txBody>
                   <a:tcPr/>
@@ -10776,7 +10819,7 @@
           <p:nvPr>
             <p:extLst>
               <p:ext uri="{D42A27DB-BD31-4B8C-83A1-F6EECF244321}">
-                <p14:modId xmlns:p14="http://schemas.microsoft.com/office/powerpoint/2010/main" val="3266313943"/>
+                <p14:modId xmlns:p14="http://schemas.microsoft.com/office/powerpoint/2010/main" val="3847335304"/>
               </p:ext>
             </p:extLst>
           </p:nvPr>
@@ -10806,11 +10849,16 @@
                     <a:bodyPr/>
                     <a:lstStyle/>
                     <a:p>
-                      <a:r>
-                        <a:rPr lang="fr-FR" sz="1600"/>
-                        <a:t>Row</a:t>
-                      </a:r>
-                      <a:endParaRPr lang="en-US" sz="1600"/>
+                      <a:pPr lvl="0">
+                        <a:buNone/>
+                      </a:pPr>
+                      <a:r>
+                        <a:rPr lang="fr-FR" sz="1600" b="1" i="0" u="none" strike="noStrike" noProof="0" dirty="0">
+                          <a:latin typeface="Calibri"/>
+                        </a:rPr>
+                        <a:t>RDD</a:t>
+                      </a:r>
+                      <a:endParaRPr lang="en-US" dirty="0"/>
                     </a:p>
                   </a:txBody>
                   <a:tcPr/>
@@ -10828,23 +10876,23 @@
                     <a:lstStyle/>
                     <a:p>
                       <a:r>
-                        <a:rPr lang="en-US" sz="1600"/>
+                        <a:rPr lang="en-US" sz="1600" dirty="0"/>
                         <a:t>{"</a:t>
                       </a:r>
                       <a:r>
-                        <a:rPr lang="en-US" sz="1600" err="1"/>
+                        <a:rPr lang="en-US" sz="1600" dirty="0" err="1"/>
                         <a:t>user":"John</a:t>
                       </a:r>
                       <a:r>
-                        <a:rPr lang="en-US" sz="1600"/>
+                        <a:rPr lang="en-US" sz="1600" dirty="0"/>
                         <a:t>", "</a:t>
                       </a:r>
                       <a:r>
-                        <a:rPr lang="en-US" sz="1600" err="1"/>
+                        <a:rPr lang="en-US" sz="1600" dirty="0" err="1"/>
                         <a:t>movie":"Blade</a:t>
                       </a:r>
                       <a:r>
-                        <a:rPr lang="en-US" sz="1600"/>
+                        <a:rPr lang="en-US" sz="1600" dirty="0"/>
                         <a:t> Runner", "rating":5.0}</a:t>
                       </a:r>
                     </a:p>
@@ -10864,23 +10912,23 @@
                     <a:lstStyle/>
                     <a:p>
                       <a:r>
-                        <a:rPr lang="en-US" sz="1600"/>
+                        <a:rPr lang="en-US" sz="1600" dirty="0"/>
                         <a:t>{"</a:t>
                       </a:r>
                       <a:r>
-                        <a:rPr lang="en-US" sz="1600" err="1"/>
+                        <a:rPr lang="en-US" sz="1600" dirty="0" err="1"/>
                         <a:t>user":"Louise</a:t>
                       </a:r>
                       <a:r>
-                        <a:rPr lang="en-US" sz="1600"/>
+                        <a:rPr lang="en-US" sz="1600" dirty="0"/>
                         <a:t>", "</a:t>
                       </a:r>
                       <a:r>
-                        <a:rPr lang="en-US" sz="1600" err="1"/>
+                        <a:rPr lang="en-US" sz="1600" dirty="0" err="1"/>
                         <a:t>movie":"Dirty</a:t>
                       </a:r>
                       <a:r>
-                        <a:rPr lang="en-US" sz="1600"/>
+                        <a:rPr lang="en-US" sz="1600" dirty="0"/>
                         <a:t> dancing", "rating":5.0}</a:t>
                       </a:r>
                     </a:p>
@@ -10917,23 +10965,23 @@
                         <a:defRPr/>
                       </a:pPr>
                       <a:r>
-                        <a:rPr lang="en-US" sz="1600"/>
+                        <a:rPr lang="en-US" sz="1600" dirty="0"/>
                         <a:t>{"</a:t>
                       </a:r>
                       <a:r>
-                        <a:rPr lang="en-US" sz="1600" err="1"/>
-                        <a:t>user":“Sam</a:t>
-                      </a:r>
-                      <a:r>
-                        <a:rPr lang="en-US" sz="1600"/>
+                        <a:rPr lang="en-US" sz="1600" dirty="0" err="1"/>
+                        <a:t>user":"Sam</a:t>
+                      </a:r>
+                      <a:r>
+                        <a:rPr lang="en-US" sz="1600" dirty="0"/>
                         <a:t>", "</a:t>
                       </a:r>
                       <a:r>
-                        <a:rPr lang="en-US" sz="1600" err="1"/>
-                        <a:t>movie":“Blade</a:t>
-                      </a:r>
-                      <a:r>
-                        <a:rPr lang="en-US" sz="1600"/>
+                        <a:rPr lang="en-US" sz="1600" dirty="0" err="1"/>
+                        <a:t>movie":"Blade</a:t>
+                      </a:r>
+                      <a:r>
+                        <a:rPr lang="en-US" sz="1600" dirty="0"/>
                         <a:t> Runner", "rating":3.5}</a:t>
                       </a:r>
                     </a:p>
@@ -10988,37 +11036,37 @@
           </a:fontRef>
         </p:style>
         <p:txBody>
-          <a:bodyPr rtlCol="0" anchor="ctr"/>
+          <a:bodyPr lIns="91440" tIns="45720" rIns="91440" bIns="45720" rtlCol="0" anchor="ctr"/>
           <a:lstStyle/>
           <a:p>
             <a:pPr algn="ctr"/>
             <a:r>
-              <a:rPr lang="fr-FR" err="1"/>
+              <a:rPr lang="fr-FR" b="1" dirty="0" err="1"/>
               <a:t>mapValues</a:t>
             </a:r>
             <a:r>
-              <a:rPr lang="fr-FR"/>
-              <a:t>(lambda x: </a:t>
-            </a:r>
-            <a:r>
-              <a:rPr lang="fr-FR">
+              <a:rPr lang="fr-FR" b="1" dirty="0"/>
+              <a:t>(lambda x: </a:t>
+            </a:r>
+            <a:r>
+              <a:rPr lang="fr-FR" b="1" dirty="0">
                 <a:sym typeface="Wingdings" panose="05000000000000000000" pitchFamily="2" charset="2"/>
               </a:rPr>
               <a:t> </a:t>
             </a:r>
             <a:r>
-              <a:rPr lang="fr-FR" err="1">
+              <a:rPr lang="fr-FR" b="1" dirty="0" err="1">
                 <a:sym typeface="Wingdings" panose="05000000000000000000" pitchFamily="2" charset="2"/>
               </a:rPr>
               <a:t>len</a:t>
             </a:r>
             <a:r>
-              <a:rPr lang="fr-FR">
+              <a:rPr lang="fr-FR" b="1" dirty="0">
                 <a:sym typeface="Wingdings" panose="05000000000000000000" pitchFamily="2" charset="2"/>
               </a:rPr>
               <a:t>(x[1]))</a:t>
             </a:r>
-            <a:endParaRPr lang="en-US"/>
+            <a:endParaRPr lang="en-US" b="1" dirty="0"/>
           </a:p>
         </p:txBody>
       </p:sp>
@@ -11119,14 +11167,14 @@
           <p:nvPr>
             <p:extLst>
               <p:ext uri="{D42A27DB-BD31-4B8C-83A1-F6EECF244321}">
-                <p14:modId xmlns:p14="http://schemas.microsoft.com/office/powerpoint/2010/main" val="1576811487"/>
+                <p14:modId xmlns:p14="http://schemas.microsoft.com/office/powerpoint/2010/main" val="3008244716"/>
               </p:ext>
             </p:extLst>
           </p:nvPr>
         </p:nvGraphicFramePr>
         <p:xfrm>
           <a:off x="9167069" y="3094735"/>
-          <a:ext cx="1435267" cy="1479749"/>
+          <a:ext cx="1923321" cy="1584960"/>
         </p:xfrm>
         <a:graphic>
           <a:graphicData uri="http://schemas.openxmlformats.org/drawingml/2006/table">
@@ -11135,7 +11183,7 @@
                 <a:tableStyleId>{5C22544A-7EE6-4342-B048-85BDC9FD1C3A}</a:tableStyleId>
               </a:tblPr>
               <a:tblGrid>
-                <a:gridCol w="1435267">
+                <a:gridCol w="1923321">
                   <a:extLst>
                     <a:ext uri="{9D8B030D-6E8A-4147-A177-3AD203B41FA5}">
                       <a16:colId xmlns:a16="http://schemas.microsoft.com/office/drawing/2014/main" val="2061391393"/>
@@ -11149,11 +11197,30 @@
                     <a:bodyPr/>
                     <a:lstStyle/>
                     <a:p>
-                      <a:r>
-                        <a:rPr lang="fr-FR" sz="1600"/>
-                        <a:t>Row</a:t>
-                      </a:r>
-                      <a:endParaRPr lang="en-US" sz="1600"/>
+                      <a:pPr lvl="0" algn="l">
+                        <a:lnSpc>
+                          <a:spcPct val="100000"/>
+                        </a:lnSpc>
+                        <a:spcBef>
+                          <a:spcPts val="0"/>
+                        </a:spcBef>
+                        <a:spcAft>
+                          <a:spcPts val="0"/>
+                        </a:spcAft>
+                        <a:buNone/>
+                      </a:pPr>
+                      <a:r>
+                        <a:rPr lang="fr-FR" sz="1600" b="1" i="0" u="none" strike="noStrike" noProof="0" dirty="0">
+                          <a:latin typeface="Calibri"/>
+                        </a:rPr>
+                        <a:t>RDD of (K, V) pairs</a:t>
+                      </a:r>
+                    </a:p>
+                    <a:p>
+                      <a:pPr lvl="0">
+                        <a:buNone/>
+                      </a:pPr>
+                      <a:endParaRPr lang="fr-FR" sz="1600" dirty="0"/>
                     </a:p>
                   </a:txBody>
                   <a:tcPr/>
@@ -11171,12 +11238,12 @@
                     <a:lstStyle/>
                     <a:p>
                       <a:r>
-                        <a:rPr lang="fr-FR" sz="1600"/>
+                        <a:rPr lang="fr-FR" sz="1600" dirty="0"/>
                         <a:t>(</a:t>
                       </a:r>
                       <a:r>
-                        <a:rPr lang="en-US" sz="1600"/>
-                        <a:t>"John“, 12)</a:t>
+                        <a:rPr lang="en-US" sz="1600" dirty="0"/>
+                        <a:t>"John", 12)</a:t>
                       </a:r>
                     </a:p>
                   </a:txBody>
@@ -11195,12 +11262,12 @@
                     <a:lstStyle/>
                     <a:p>
                       <a:r>
-                        <a:rPr lang="fr-FR" sz="1600"/>
-                        <a:t>(</a:t>
-                      </a:r>
-                      <a:r>
-                        <a:rPr lang="en-US" sz="1600"/>
-                        <a:t>“Louise“, 13)</a:t>
+                        <a:rPr lang="fr-FR" sz="1600" dirty="0"/>
+                        <a:t>("</a:t>
+                      </a:r>
+                      <a:r>
+                        <a:rPr lang="en-US" sz="1600" dirty="0"/>
+                        <a:t>Louise", 13)</a:t>
                       </a:r>
                     </a:p>
                   </a:txBody>
@@ -11219,12 +11286,12 @@
                     <a:lstStyle/>
                     <a:p>
                       <a:r>
-                        <a:rPr lang="fr-FR" sz="1600"/>
-                        <a:t>(</a:t>
-                      </a:r>
-                      <a:r>
-                        <a:rPr lang="en-US" sz="1600"/>
-                        <a:t>“Sam“, 12)</a:t>
+                        <a:rPr lang="fr-FR" sz="1600" dirty="0"/>
+                        <a:t>("</a:t>
+                      </a:r>
+                      <a:r>
+                        <a:rPr lang="en-US" sz="1600" dirty="0"/>
+                        <a:t>Sam", 12)</a:t>
                       </a:r>
                     </a:p>
                   </a:txBody>
@@ -11255,7 +11322,7 @@
           <p:nvPr>
             <p:extLst>
               <p:ext uri="{D42A27DB-BD31-4B8C-83A1-F6EECF244321}">
-                <p14:modId xmlns:p14="http://schemas.microsoft.com/office/powerpoint/2010/main" val="3697608656"/>
+                <p14:modId xmlns:p14="http://schemas.microsoft.com/office/powerpoint/2010/main" val="3433902006"/>
               </p:ext>
             </p:extLst>
           </p:nvPr>
@@ -11285,11 +11352,22 @@
                     <a:bodyPr/>
                     <a:lstStyle/>
                     <a:p>
-                      <a:r>
-                        <a:rPr lang="fr-FR" sz="1600"/>
-                        <a:t>Row</a:t>
-                      </a:r>
-                      <a:endParaRPr lang="en-US" sz="1600"/>
+                      <a:pPr lvl="0" algn="l">
+                        <a:lnSpc>
+                          <a:spcPct val="100000"/>
+                        </a:lnSpc>
+                        <a:spcBef>
+                          <a:spcPts val="0"/>
+                        </a:spcBef>
+                        <a:spcAft>
+                          <a:spcPts val="0"/>
+                        </a:spcAft>
+                        <a:buNone/>
+                      </a:pPr>
+                      <a:r>
+                        <a:rPr lang="fr-FR" sz="1600" b="1" i="0" u="none" strike="noStrike" noProof="0" dirty="0"/>
+                        <a:t>RDD of (K, V) pairs</a:t>
+                      </a:r>
                     </a:p>
                   </a:txBody>
                   <a:tcPr/>
@@ -11307,7 +11385,7 @@
                     <a:lstStyle/>
                     <a:p>
                       <a:r>
-                        <a:rPr lang="en-US" sz="1600"/>
+                        <a:rPr lang="en-US" sz="1600" dirty="0"/>
                         <a:t>("John", "Blade Runner")</a:t>
                       </a:r>
                     </a:p>
@@ -11327,8 +11405,8 @@
                     <a:lstStyle/>
                     <a:p>
                       <a:r>
-                        <a:rPr lang="en-US" sz="1600"/>
-                        <a:t>("Louise“, "Dirty dancing")</a:t>
+                        <a:rPr lang="en-US" sz="1600" dirty="0"/>
+                        <a:t>("Louise", "Dirty dancing")</a:t>
                       </a:r>
                     </a:p>
                   </a:txBody>
@@ -11364,8 +11442,8 @@
                         <a:defRPr/>
                       </a:pPr>
                       <a:r>
-                        <a:rPr lang="en-US" sz="1600"/>
-                        <a:t>(“Sam“, “Blade Runner")</a:t>
+                        <a:rPr lang="en-US" sz="1600" dirty="0"/>
+                        <a:t>("Sam“, "Blade Runner")</a:t>
                       </a:r>
                     </a:p>
                   </a:txBody>
@@ -11419,25 +11497,25 @@
           </a:fontRef>
         </p:style>
         <p:txBody>
-          <a:bodyPr rtlCol="0" anchor="ctr"/>
+          <a:bodyPr lIns="91440" tIns="45720" rIns="91440" bIns="45720" rtlCol="0" anchor="ctr"/>
           <a:lstStyle/>
           <a:p>
             <a:pPr algn="ctr"/>
             <a:r>
-              <a:rPr lang="fr-FR" err="1"/>
+              <a:rPr lang="fr-FR" b="1" dirty="0" err="1"/>
               <a:t>filter</a:t>
             </a:r>
             <a:r>
-              <a:rPr lang="fr-FR"/>
+              <a:rPr lang="fr-FR" b="1" dirty="0"/>
               <a:t>(lambda x:</a:t>
             </a:r>
             <a:r>
-              <a:rPr lang="fr-FR">
+              <a:rPr lang="fr-FR" b="1" dirty="0">
                 <a:sym typeface="Wingdings" panose="05000000000000000000" pitchFamily="2" charset="2"/>
               </a:rPr>
-              <a:t> x[‘rating’]&gt;4.0)</a:t>
-            </a:r>
-            <a:endParaRPr lang="en-US"/>
+              <a:t> x['rating']&gt;4.0)</a:t>
+            </a:r>
+            <a:endParaRPr lang="en-US" b="1" dirty="0"/>
           </a:p>
         </p:txBody>
       </p:sp>
@@ -11538,7 +11616,7 @@
           <p:nvPr>
             <p:extLst>
               <p:ext uri="{D42A27DB-BD31-4B8C-83A1-F6EECF244321}">
-                <p14:modId xmlns:p14="http://schemas.microsoft.com/office/powerpoint/2010/main" val="857981943"/>
+                <p14:modId xmlns:p14="http://schemas.microsoft.com/office/powerpoint/2010/main" val="1039612278"/>
               </p:ext>
             </p:extLst>
           </p:nvPr>
@@ -11568,11 +11646,16 @@
                     <a:bodyPr/>
                     <a:lstStyle/>
                     <a:p>
-                      <a:r>
-                        <a:rPr lang="fr-FR" sz="1600"/>
-                        <a:t>Row</a:t>
-                      </a:r>
-                      <a:endParaRPr lang="en-US" sz="1600"/>
+                      <a:pPr lvl="0">
+                        <a:buNone/>
+                      </a:pPr>
+                      <a:r>
+                        <a:rPr lang="fr-FR" sz="1600" b="1" i="0" u="none" strike="noStrike" noProof="0" dirty="0">
+                          <a:latin typeface="Calibri"/>
+                        </a:rPr>
+                        <a:t>RDD</a:t>
+                      </a:r>
+                      <a:endParaRPr lang="en-US" dirty="0"/>
                     </a:p>
                   </a:txBody>
                   <a:tcPr/>
@@ -11590,23 +11673,23 @@
                     <a:lstStyle/>
                     <a:p>
                       <a:r>
-                        <a:rPr lang="en-US" sz="1600"/>
+                        <a:rPr lang="en-US" sz="1600" dirty="0"/>
                         <a:t>{"</a:t>
                       </a:r>
                       <a:r>
-                        <a:rPr lang="en-US" sz="1600" err="1"/>
+                        <a:rPr lang="en-US" sz="1600" dirty="0" err="1"/>
                         <a:t>user":"John</a:t>
                       </a:r>
                       <a:r>
-                        <a:rPr lang="en-US" sz="1600"/>
+                        <a:rPr lang="en-US" sz="1600" dirty="0"/>
                         <a:t>", "</a:t>
                       </a:r>
                       <a:r>
-                        <a:rPr lang="en-US" sz="1600" err="1"/>
+                        <a:rPr lang="en-US" sz="1600" dirty="0" err="1"/>
                         <a:t>movie":"Bl</a:t>
                       </a:r>
                       <a:r>
-                        <a:rPr lang="en-US" sz="1600"/>
+                        <a:rPr lang="en-US" sz="1600" dirty="0"/>
                         <a:t>…</a:t>
                       </a:r>
                     </a:p>
@@ -11626,23 +11709,23 @@
                     <a:lstStyle/>
                     <a:p>
                       <a:r>
-                        <a:rPr lang="en-US" sz="1600"/>
+                        <a:rPr lang="en-US" sz="1600" dirty="0"/>
                         <a:t>{"</a:t>
                       </a:r>
                       <a:r>
-                        <a:rPr lang="en-US" sz="1600" err="1"/>
+                        <a:rPr lang="en-US" sz="1600" dirty="0" err="1"/>
                         <a:t>user":"Louise</a:t>
                       </a:r>
                       <a:r>
-                        <a:rPr lang="en-US" sz="1600"/>
+                        <a:rPr lang="en-US" sz="1600" dirty="0"/>
                         <a:t>", "</a:t>
                       </a:r>
                       <a:r>
-                        <a:rPr lang="en-US" sz="1600" err="1"/>
+                        <a:rPr lang="en-US" sz="1600" dirty="0" err="1"/>
                         <a:t>movie":"Dir</a:t>
                       </a:r>
                       <a:r>
-                        <a:rPr lang="en-US" sz="1600"/>
+                        <a:rPr lang="en-US" sz="1600" dirty="0"/>
                         <a:t>…</a:t>
                       </a:r>
                     </a:p>
@@ -11674,7 +11757,7 @@
           <p:nvPr>
             <p:extLst>
               <p:ext uri="{D42A27DB-BD31-4B8C-83A1-F6EECF244321}">
-                <p14:modId xmlns:p14="http://schemas.microsoft.com/office/powerpoint/2010/main" val="2990560406"/>
+                <p14:modId xmlns:p14="http://schemas.microsoft.com/office/powerpoint/2010/main" val="837293288"/>
               </p:ext>
             </p:extLst>
           </p:nvPr>
@@ -11704,11 +11787,16 @@
                     <a:bodyPr/>
                     <a:lstStyle/>
                     <a:p>
-                      <a:r>
-                        <a:rPr lang="fr-FR" sz="1600"/>
-                        <a:t>Row</a:t>
-                      </a:r>
-                      <a:endParaRPr lang="en-US" sz="1600"/>
+                      <a:pPr lvl="0">
+                        <a:buNone/>
+                      </a:pPr>
+                      <a:r>
+                        <a:rPr lang="fr-FR" sz="1600" b="1" i="0" u="none" strike="noStrike" noProof="0" dirty="0">
+                          <a:latin typeface="Calibri"/>
+                        </a:rPr>
+                        <a:t>RDD</a:t>
+                      </a:r>
+                      <a:endParaRPr lang="en-US" dirty="0"/>
                     </a:p>
                   </a:txBody>
                   <a:tcPr/>
@@ -11726,23 +11814,23 @@
                     <a:lstStyle/>
                     <a:p>
                       <a:r>
-                        <a:rPr lang="en-US" sz="1600"/>
+                        <a:rPr lang="en-US" sz="1600" dirty="0"/>
                         <a:t>{"</a:t>
                       </a:r>
                       <a:r>
-                        <a:rPr lang="en-US" sz="1600" err="1"/>
+                        <a:rPr lang="en-US" sz="1600" dirty="0" err="1"/>
                         <a:t>user":"John</a:t>
                       </a:r>
                       <a:r>
-                        <a:rPr lang="en-US" sz="1600"/>
+                        <a:rPr lang="en-US" sz="1600" dirty="0"/>
                         <a:t>", "</a:t>
                       </a:r>
                       <a:r>
-                        <a:rPr lang="en-US" sz="1600" err="1"/>
+                        <a:rPr lang="en-US" sz="1600" dirty="0" err="1"/>
                         <a:t>movie":"Blade</a:t>
                       </a:r>
                       <a:r>
-                        <a:rPr lang="en-US" sz="1600"/>
+                        <a:rPr lang="en-US" sz="1600" dirty="0"/>
                         <a:t> Runner", "rating":5.0}</a:t>
                       </a:r>
                     </a:p>
@@ -11762,23 +11850,23 @@
                     <a:lstStyle/>
                     <a:p>
                       <a:r>
-                        <a:rPr lang="en-US" sz="1600"/>
+                        <a:rPr lang="en-US" sz="1600" dirty="0"/>
                         <a:t>{"</a:t>
                       </a:r>
                       <a:r>
-                        <a:rPr lang="en-US" sz="1600" err="1"/>
+                        <a:rPr lang="en-US" sz="1600" dirty="0" err="1"/>
                         <a:t>user":"Louise</a:t>
                       </a:r>
                       <a:r>
-                        <a:rPr lang="en-US" sz="1600"/>
+                        <a:rPr lang="en-US" sz="1600" dirty="0"/>
                         <a:t>", "</a:t>
                       </a:r>
                       <a:r>
-                        <a:rPr lang="en-US" sz="1600" err="1"/>
+                        <a:rPr lang="en-US" sz="1600" dirty="0" err="1"/>
                         <a:t>movie":"Dirty</a:t>
                       </a:r>
                       <a:r>
-                        <a:rPr lang="en-US" sz="1600"/>
+                        <a:rPr lang="en-US" sz="1600" dirty="0"/>
                         <a:t> dancing", "rating":5.0}</a:t>
                       </a:r>
                     </a:p>
@@ -11815,23 +11903,23 @@
                         <a:defRPr/>
                       </a:pPr>
                       <a:r>
-                        <a:rPr lang="en-US" sz="1600"/>
+                        <a:rPr lang="en-US" sz="1600" dirty="0"/>
                         <a:t>{"</a:t>
                       </a:r>
                       <a:r>
-                        <a:rPr lang="en-US" sz="1600" err="1"/>
-                        <a:t>user":“Sam</a:t>
-                      </a:r>
-                      <a:r>
-                        <a:rPr lang="en-US" sz="1600"/>
+                        <a:rPr lang="en-US" sz="1600" dirty="0" err="1"/>
+                        <a:t>user":"Sam</a:t>
+                      </a:r>
+                      <a:r>
+                        <a:rPr lang="en-US" sz="1600" dirty="0"/>
                         <a:t>", "</a:t>
                       </a:r>
                       <a:r>
-                        <a:rPr lang="en-US" sz="1600" err="1"/>
-                        <a:t>movie":“Blade</a:t>
-                      </a:r>
-                      <a:r>
-                        <a:rPr lang="en-US" sz="1600"/>
+                        <a:rPr lang="en-US" sz="1600" dirty="0" err="1"/>
+                        <a:t>movie":"Blade</a:t>
+                      </a:r>
+                      <a:r>
+                        <a:rPr lang="en-US" sz="1600" dirty="0"/>
                         <a:t> Runner", "rating":3.5}</a:t>
                       </a:r>
                     </a:p>
@@ -11871,13 +11959,13 @@
           <a:noFill/>
         </p:spPr>
         <p:txBody>
-          <a:bodyPr wrap="none" rtlCol="0">
+          <a:bodyPr wrap="none" lIns="91440" tIns="45720" rIns="91440" bIns="45720" rtlCol="0" anchor="t">
             <a:spAutoFit/>
           </a:bodyPr>
           <a:lstStyle/>
           <a:p>
             <a:r>
-              <a:rPr lang="fr-FR" b="1" i="1" err="1">
+              <a:rPr lang="fr-FR" b="1" i="1" dirty="0" err="1">
                 <a:solidFill>
                   <a:schemeClr val="accent6">
                     <a:lumMod val="75000"/>
@@ -11887,17 +11975,17 @@
               <a:t>df.select</a:t>
             </a:r>
             <a:r>
-              <a:rPr lang="fr-FR" b="1" i="1">
+              <a:rPr lang="fr-FR" b="1" i="1" dirty="0">
                 <a:solidFill>
                   <a:schemeClr val="accent6">
                     <a:lumMod val="75000"/>
                   </a:schemeClr>
                 </a:solidFill>
               </a:rPr>
-              <a:t>(‘</a:t>
-            </a:r>
-            <a:r>
-              <a:rPr lang="fr-FR" b="1" i="1" err="1">
+              <a:t>('</a:t>
+            </a:r>
+            <a:r>
+              <a:rPr lang="fr-FR" b="1" i="1" dirty="0" err="1">
                 <a:solidFill>
                   <a:schemeClr val="accent6">
                     <a:lumMod val="75000"/>
@@ -11907,19 +11995,19 @@
               <a:t>movie</a:t>
             </a:r>
             <a:r>
-              <a:rPr lang="fr-FR" b="1" i="1">
+              <a:rPr lang="fr-FR" b="1" i="1" dirty="0">
                 <a:solidFill>
                   <a:schemeClr val="accent6">
                     <a:lumMod val="75000"/>
                   </a:schemeClr>
                 </a:solidFill>
               </a:rPr>
-              <a:t>’)</a:t>
-            </a:r>
-          </a:p>
-          <a:p>
-            <a:r>
-              <a:rPr lang="fr-FR" b="1" i="1" err="1">
+              <a:t>')</a:t>
+            </a:r>
+          </a:p>
+          <a:p>
+            <a:r>
+              <a:rPr lang="fr-FR" b="1" i="1" dirty="0" err="1">
                 <a:solidFill>
                   <a:schemeClr val="accent6">
                     <a:lumMod val="75000"/>
@@ -11929,7 +12017,7 @@
               <a:t>Df.withColumn</a:t>
             </a:r>
             <a:r>
-              <a:rPr lang="fr-FR" b="1" i="1">
+              <a:rPr lang="fr-FR" b="1" i="1" dirty="0">
                 <a:solidFill>
                   <a:schemeClr val="accent6">
                     <a:lumMod val="75000"/>
@@ -11938,6 +12026,14 @@
               </a:rPr>
               <a:t>(…)</a:t>
             </a:r>
+            <a:endParaRPr lang="fr-FR" b="1" i="1" dirty="0">
+              <a:solidFill>
+                <a:schemeClr val="accent6">
+                  <a:lumMod val="75000"/>
+                </a:schemeClr>
+              </a:solidFill>
+              <a:cs typeface="Calibri"/>
+            </a:endParaRPr>
           </a:p>
         </p:txBody>
       </p:sp>
@@ -12007,13 +12103,13 @@
           <a:noFill/>
         </p:spPr>
         <p:txBody>
-          <a:bodyPr wrap="none" rtlCol="0">
+          <a:bodyPr wrap="none" lIns="91440" tIns="45720" rIns="91440" bIns="45720" rtlCol="0" anchor="t">
             <a:spAutoFit/>
           </a:bodyPr>
           <a:lstStyle/>
           <a:p>
             <a:r>
-              <a:rPr lang="fr-FR" b="1" i="1" err="1">
+              <a:rPr lang="fr-FR" b="1" i="1" dirty="0" err="1">
                 <a:solidFill>
                   <a:schemeClr val="accent6">
                     <a:lumMod val="75000"/>
@@ -12023,14 +12119,14 @@
               <a:t>df.filter</a:t>
             </a:r>
             <a:r>
-              <a:rPr lang="fr-FR" b="1" i="1">
+              <a:rPr lang="fr-FR" b="1" i="1" dirty="0">
                 <a:solidFill>
                   <a:schemeClr val="accent6">
                     <a:lumMod val="75000"/>
                   </a:schemeClr>
                 </a:solidFill>
               </a:rPr>
-              <a:t>(‘rating&gt;3.5’)</a:t>
+              <a:t>('rating&gt;3.5')</a:t>
             </a:r>
           </a:p>
         </p:txBody>
@@ -12185,45 +12281,47 @@
           </a:fontRef>
         </p:style>
         <p:txBody>
-          <a:bodyPr rtlCol="0" anchor="ctr"/>
+          <a:bodyPr lIns="91440" tIns="45720" rIns="91440" bIns="45720" rtlCol="0" anchor="ctr"/>
           <a:lstStyle/>
           <a:p>
             <a:pPr algn="ctr"/>
             <a:r>
-              <a:rPr lang="fr-FR" err="1"/>
+              <a:rPr lang="fr-FR" b="1" dirty="0" err="1"/>
               <a:t>reduce</a:t>
             </a:r>
             <a:r>
-              <a:rPr lang="fr-FR"/>
+              <a:rPr lang="fr-FR" b="1" dirty="0"/>
               <a:t>(lambda </a:t>
             </a:r>
             <a:r>
-              <a:rPr lang="fr-FR" err="1"/>
+              <a:rPr lang="fr-FR" b="1" dirty="0" err="1"/>
               <a:t>x,y</a:t>
             </a:r>
             <a:r>
-              <a:rPr lang="fr-FR"/>
-              <a:t>: </a:t>
-            </a:r>
-            <a:r>
-              <a:rPr lang="fr-FR">
+              <a:rPr lang="fr-FR" b="1" dirty="0"/>
+              <a:t>: </a:t>
+            </a:r>
+            <a:r>
+              <a:rPr lang="fr-FR" b="1" dirty="0">
                 <a:sym typeface="Wingdings" panose="05000000000000000000" pitchFamily="2" charset="2"/>
               </a:rPr>
               <a:t> </a:t>
             </a:r>
             <a:r>
-              <a:rPr lang="fr-FR" err="1">
+              <a:rPr lang="fr-FR" b="1" dirty="0" err="1">
                 <a:sym typeface="Wingdings" panose="05000000000000000000" pitchFamily="2" charset="2"/>
               </a:rPr>
               <a:t>x+y</a:t>
             </a:r>
             <a:r>
-              <a:rPr lang="fr-FR">
+              <a:rPr lang="fr-FR" b="1" dirty="0">
                 <a:sym typeface="Wingdings" panose="05000000000000000000" pitchFamily="2" charset="2"/>
               </a:rPr>
               <a:t>)</a:t>
             </a:r>
-            <a:endParaRPr lang="en-US"/>
+            <a:endParaRPr lang="en-US">
+              <a:cs typeface="Calibri" panose="020F0502020204030204"/>
+            </a:endParaRPr>
           </a:p>
         </p:txBody>
       </p:sp>
@@ -12311,10 +12409,10 @@
       </p:cxnSp>
       <p:graphicFrame>
         <p:nvGraphicFramePr>
-          <p:cNvPr id="21" name="Table 6">
-            <a:extLst>
-              <a:ext uri="{FF2B5EF4-FFF2-40B4-BE49-F238E27FC236}">
-                <a16:creationId xmlns:a16="http://schemas.microsoft.com/office/drawing/2014/main" id="{3B363A25-A424-4A7F-AC1C-675D5AA95527}"/>
+          <p:cNvPr id="22" name="Table 6">
+            <a:extLst>
+              <a:ext uri="{FF2B5EF4-FFF2-40B4-BE49-F238E27FC236}">
+                <a16:creationId xmlns:a16="http://schemas.microsoft.com/office/drawing/2014/main" id="{14F2891B-DE06-4BA6-B53E-8E439C13B6B4}"/>
               </a:ext>
             </a:extLst>
           </p:cNvPr>
@@ -12324,91 +12422,7 @@
           <p:nvPr>
             <p:extLst>
               <p:ext uri="{D42A27DB-BD31-4B8C-83A1-F6EECF244321}">
-                <p14:modId xmlns:p14="http://schemas.microsoft.com/office/powerpoint/2010/main" val="2419580124"/>
-              </p:ext>
-            </p:extLst>
-          </p:nvPr>
-        </p:nvGraphicFramePr>
-        <p:xfrm>
-          <a:off x="9142255" y="3102271"/>
-          <a:ext cx="2804021" cy="797871"/>
-        </p:xfrm>
-        <a:graphic>
-          <a:graphicData uri="http://schemas.openxmlformats.org/drawingml/2006/table">
-            <a:tbl>
-              <a:tblPr firstRow="1" bandRow="1">
-                <a:tableStyleId>{5C22544A-7EE6-4342-B048-85BDC9FD1C3A}</a:tableStyleId>
-              </a:tblPr>
-              <a:tblGrid>
-                <a:gridCol w="2804021">
-                  <a:extLst>
-                    <a:ext uri="{9D8B030D-6E8A-4147-A177-3AD203B41FA5}">
-                      <a16:colId xmlns:a16="http://schemas.microsoft.com/office/drawing/2014/main" val="2061391393"/>
-                    </a:ext>
-                  </a:extLst>
-                </a:gridCol>
-              </a:tblGrid>
-              <a:tr h="462591">
-                <a:tc>
-                  <a:txBody>
-                    <a:bodyPr/>
-                    <a:lstStyle/>
-                    <a:p>
-                      <a:r>
-                        <a:rPr lang="fr-FR" sz="1600"/>
-                        <a:t>Rating</a:t>
-                      </a:r>
-                      <a:endParaRPr lang="en-US" sz="1600"/>
-                    </a:p>
-                  </a:txBody>
-                  <a:tcPr/>
-                </a:tc>
-                <a:extLst>
-                  <a:ext uri="{0D108BD9-81ED-4DB2-BD59-A6C34878D82A}">
-                    <a16:rowId xmlns:a16="http://schemas.microsoft.com/office/drawing/2014/main" val="235972142"/>
-                  </a:ext>
-                </a:extLst>
-              </a:tr>
-              <a:tr h="283885">
-                <a:tc>
-                  <a:txBody>
-                    <a:bodyPr/>
-                    <a:lstStyle/>
-                    <a:p>
-                      <a:r>
-                        <a:rPr lang="en-US" sz="1600"/>
-                        <a:t>13.5</a:t>
-                      </a:r>
-                    </a:p>
-                  </a:txBody>
-                  <a:tcPr/>
-                </a:tc>
-                <a:extLst>
-                  <a:ext uri="{0D108BD9-81ED-4DB2-BD59-A6C34878D82A}">
-                    <a16:rowId xmlns:a16="http://schemas.microsoft.com/office/drawing/2014/main" val="1215558195"/>
-                  </a:ext>
-                </a:extLst>
-              </a:tr>
-            </a:tbl>
-          </a:graphicData>
-        </a:graphic>
-      </p:graphicFrame>
-      <p:graphicFrame>
-        <p:nvGraphicFramePr>
-          <p:cNvPr id="22" name="Table 6">
-            <a:extLst>
-              <a:ext uri="{FF2B5EF4-FFF2-40B4-BE49-F238E27FC236}">
-                <a16:creationId xmlns:a16="http://schemas.microsoft.com/office/drawing/2014/main" id="{14F2891B-DE06-4BA6-B53E-8E439C13B6B4}"/>
-              </a:ext>
-            </a:extLst>
-          </p:cNvPr>
-          <p:cNvGraphicFramePr>
-            <a:graphicFrameLocks noGrp="1"/>
-          </p:cNvGraphicFramePr>
-          <p:nvPr>
-            <p:extLst>
-              <p:ext uri="{D42A27DB-BD31-4B8C-83A1-F6EECF244321}">
-                <p14:modId xmlns:p14="http://schemas.microsoft.com/office/powerpoint/2010/main" val="3546400370"/>
+                <p14:modId xmlns:p14="http://schemas.microsoft.com/office/powerpoint/2010/main" val="4177299743"/>
               </p:ext>
             </p:extLst>
           </p:nvPr>
@@ -12438,11 +12452,16 @@
                     <a:bodyPr/>
                     <a:lstStyle/>
                     <a:p>
-                      <a:r>
-                        <a:rPr lang="fr-FR" sz="1600"/>
-                        <a:t>Rating</a:t>
-                      </a:r>
-                      <a:endParaRPr lang="en-US" sz="1600"/>
+                      <a:pPr lvl="0">
+                        <a:buNone/>
+                      </a:pPr>
+                      <a:r>
+                        <a:rPr lang="fr-FR" sz="1600" b="1" i="0" u="none" strike="noStrike" noProof="0" dirty="0">
+                          <a:latin typeface="Calibri"/>
+                        </a:rPr>
+                        <a:t>RDD</a:t>
+                      </a:r>
+                      <a:endParaRPr lang="en-US" dirty="0"/>
                     </a:p>
                   </a:txBody>
                   <a:tcPr/>
@@ -12460,7 +12479,7 @@
                     <a:lstStyle/>
                     <a:p>
                       <a:r>
-                        <a:rPr lang="en-US" sz="1600"/>
+                        <a:rPr lang="en-US" sz="1600" dirty="0"/>
                         <a:t>5.0</a:t>
                       </a:r>
                     </a:p>
@@ -12480,7 +12499,7 @@
                     <a:lstStyle/>
                     <a:p>
                       <a:r>
-                        <a:rPr lang="en-US" sz="1600"/>
+                        <a:rPr lang="en-US" sz="1600" dirty="0"/>
                         <a:t>5.0</a:t>
                       </a:r>
                     </a:p>
@@ -12517,11 +12536,11 @@
                         <a:defRPr/>
                       </a:pPr>
                       <a:r>
-                        <a:rPr lang="fr-FR" sz="1600"/>
+                        <a:rPr lang="fr-FR" sz="1600" dirty="0"/>
                         <a:t>3</a:t>
                       </a:r>
                       <a:r>
-                        <a:rPr lang="en-US" sz="1600"/>
+                        <a:rPr lang="en-US" sz="1600" dirty="0"/>
                         <a:t>.5</a:t>
                       </a:r>
                     </a:p>
@@ -12576,41 +12595,43 @@
           </a:fontRef>
         </p:style>
         <p:txBody>
-          <a:bodyPr rtlCol="0" anchor="ctr"/>
+          <a:bodyPr lIns="91440" tIns="45720" rIns="91440" bIns="45720" rtlCol="0" anchor="ctr"/>
           <a:lstStyle/>
           <a:p>
             <a:pPr algn="ctr"/>
             <a:r>
-              <a:rPr lang="fr-FR" err="1"/>
+              <a:rPr lang="fr-FR" b="1" dirty="0" err="1"/>
               <a:t>reduceByKey</a:t>
             </a:r>
             <a:r>
-              <a:rPr lang="fr-FR"/>
+              <a:rPr lang="fr-FR" b="1" dirty="0"/>
               <a:t>(lambda </a:t>
             </a:r>
             <a:r>
-              <a:rPr lang="fr-FR" err="1"/>
+              <a:rPr lang="fr-FR" b="1" dirty="0" err="1"/>
               <a:t>x,y</a:t>
             </a:r>
             <a:r>
-              <a:rPr lang="fr-FR">
+              <a:rPr lang="fr-FR" b="1" dirty="0">
                 <a:sym typeface="Wingdings" panose="05000000000000000000" pitchFamily="2" charset="2"/>
               </a:rPr>
-              <a:t> : x</a:t>
-            </a:r>
-            <a:r>
-              <a:rPr lang="fr-FR" err="1">
+              <a:t> : </a:t>
+            </a:r>
+            <a:r>
+              <a:rPr lang="fr-FR" b="1" dirty="0" err="1">
                 <a:sym typeface="Wingdings" panose="05000000000000000000" pitchFamily="2" charset="2"/>
               </a:rPr>
-              <a:t>+y</a:t>
-            </a:r>
-            <a:r>
-              <a:rPr lang="fr-FR">
+              <a:t>x+y</a:t>
+            </a:r>
+            <a:r>
+              <a:rPr lang="fr-FR" b="1" dirty="0">
                 <a:sym typeface="Wingdings" panose="05000000000000000000" pitchFamily="2" charset="2"/>
               </a:rPr>
               <a:t>)</a:t>
             </a:r>
-            <a:endParaRPr lang="en-US"/>
+            <a:endParaRPr lang="en-US">
+              <a:cs typeface="Calibri" panose="020F0502020204030204"/>
+            </a:endParaRPr>
           </a:p>
         </p:txBody>
       </p:sp>
@@ -12711,7 +12732,7 @@
           <p:nvPr>
             <p:extLst>
               <p:ext uri="{D42A27DB-BD31-4B8C-83A1-F6EECF244321}">
-                <p14:modId xmlns:p14="http://schemas.microsoft.com/office/powerpoint/2010/main" val="3331258320"/>
+                <p14:modId xmlns:p14="http://schemas.microsoft.com/office/powerpoint/2010/main" val="2551510985"/>
               </p:ext>
             </p:extLst>
           </p:nvPr>
@@ -12741,11 +12762,24 @@
                     <a:bodyPr/>
                     <a:lstStyle/>
                     <a:p>
-                      <a:r>
-                        <a:rPr lang="fr-FR" sz="1600"/>
-                        <a:t>Row</a:t>
-                      </a:r>
-                      <a:endParaRPr lang="en-US" sz="1600"/>
+                      <a:pPr lvl="0" algn="l">
+                        <a:lnSpc>
+                          <a:spcPct val="100000"/>
+                        </a:lnSpc>
+                        <a:spcBef>
+                          <a:spcPts val="0"/>
+                        </a:spcBef>
+                        <a:spcAft>
+                          <a:spcPts val="0"/>
+                        </a:spcAft>
+                        <a:buNone/>
+                      </a:pPr>
+                      <a:r>
+                        <a:rPr lang="fr-FR" sz="1600" b="1" i="0" u="none" strike="noStrike" noProof="0" dirty="0">
+                          <a:latin typeface="Calibri"/>
+                        </a:rPr>
+                        <a:t>RDD of (K, V) pairs</a:t>
+                      </a:r>
                     </a:p>
                   </a:txBody>
                   <a:tcPr/>
@@ -12763,8 +12797,28 @@
                     <a:lstStyle/>
                     <a:p>
                       <a:r>
-                        <a:rPr lang="en-US" sz="1600"/>
-                        <a:t>(“Blade Runner", 8.5)</a:t>
+                        <a:rPr lang="en-US" sz="1600" dirty="0"/>
+                        <a:t>(</a:t>
+                      </a:r>
+                      <a:r>
+                        <a:rPr lang="en-US" sz="1600" b="0" i="0" u="none" strike="noStrike" noProof="0" dirty="0">
+                          <a:latin typeface="Calibri"/>
+                        </a:rPr>
+                        <a:t>"</a:t>
+                      </a:r>
+                      <a:r>
+                        <a:rPr lang="en-US" sz="1600" dirty="0"/>
+                        <a:t>Blade Runner</a:t>
+                      </a:r>
+                      <a:r>
+                        <a:rPr lang="en-US" sz="1600" b="0" i="0" u="none" strike="noStrike" noProof="0" dirty="0">
+                          <a:latin typeface="Calibri"/>
+                        </a:rPr>
+                        <a:t>"</a:t>
+                      </a:r>
+                      <a:r>
+                        <a:rPr lang="en-US" sz="1600" dirty="0"/>
+                        <a:t>, 8.5)</a:t>
                       </a:r>
                     </a:p>
                   </a:txBody>
@@ -12783,8 +12837,18 @@
                     <a:lstStyle/>
                     <a:p>
                       <a:r>
-                        <a:rPr lang="en-US" sz="1600"/>
-                        <a:t>("Dirty dancing", 5.0)</a:t>
+                        <a:rPr lang="en-US" sz="1600" dirty="0"/>
+                        <a:t>("Dirty dancing</a:t>
+                      </a:r>
+                      <a:r>
+                        <a:rPr lang="en-US" sz="1600" b="0" i="0" u="none" strike="noStrike" noProof="0" dirty="0">
+                          <a:latin typeface="Calibri"/>
+                        </a:rPr>
+                        <a:t>"</a:t>
+                      </a:r>
+                      <a:r>
+                        <a:rPr lang="en-US" sz="1600" dirty="0"/>
+                        <a:t>, 5.0)</a:t>
                       </a:r>
                     </a:p>
                   </a:txBody>
@@ -12815,7 +12879,7 @@
           <p:nvPr>
             <p:extLst>
               <p:ext uri="{D42A27DB-BD31-4B8C-83A1-F6EECF244321}">
-                <p14:modId xmlns:p14="http://schemas.microsoft.com/office/powerpoint/2010/main" val="1884969929"/>
+                <p14:modId xmlns:p14="http://schemas.microsoft.com/office/powerpoint/2010/main" val="1944810526"/>
               </p:ext>
             </p:extLst>
           </p:nvPr>
@@ -12845,11 +12909,16 @@
                     <a:bodyPr/>
                     <a:lstStyle/>
                     <a:p>
-                      <a:r>
-                        <a:rPr lang="fr-FR" sz="1600"/>
-                        <a:t>Row</a:t>
-                      </a:r>
-                      <a:endParaRPr lang="en-US" sz="1600"/>
+                      <a:pPr lvl="0">
+                        <a:buNone/>
+                      </a:pPr>
+                      <a:r>
+                        <a:rPr lang="fr-FR" sz="1600" b="1" i="0" u="none" strike="noStrike" noProof="0" dirty="0">
+                          <a:latin typeface="Calibri"/>
+                        </a:rPr>
+                        <a:t>RDD</a:t>
+                      </a:r>
+                      <a:endParaRPr lang="en-US" dirty="0"/>
                     </a:p>
                   </a:txBody>
                   <a:tcPr/>
@@ -12867,23 +12936,23 @@
                     <a:lstStyle/>
                     <a:p>
                       <a:r>
-                        <a:rPr lang="en-US" sz="1600"/>
+                        <a:rPr lang="en-US" sz="1600" dirty="0"/>
                         <a:t>{"</a:t>
                       </a:r>
                       <a:r>
-                        <a:rPr lang="en-US" sz="1600" err="1"/>
+                        <a:rPr lang="en-US" sz="1600" dirty="0" err="1"/>
                         <a:t>user":"John</a:t>
                       </a:r>
                       <a:r>
-                        <a:rPr lang="en-US" sz="1600"/>
+                        <a:rPr lang="en-US" sz="1600" dirty="0"/>
                         <a:t>", "</a:t>
                       </a:r>
                       <a:r>
-                        <a:rPr lang="en-US" sz="1600" err="1"/>
+                        <a:rPr lang="en-US" sz="1600" dirty="0" err="1"/>
                         <a:t>movie":"Blade</a:t>
                       </a:r>
                       <a:r>
-                        <a:rPr lang="en-US" sz="1600"/>
+                        <a:rPr lang="en-US" sz="1600" dirty="0"/>
                         <a:t> Runner", "rating":5.0}</a:t>
                       </a:r>
                     </a:p>
@@ -12903,23 +12972,23 @@
                     <a:lstStyle/>
                     <a:p>
                       <a:r>
-                        <a:rPr lang="en-US" sz="1600"/>
+                        <a:rPr lang="en-US" sz="1600" dirty="0"/>
                         <a:t>{"</a:t>
                       </a:r>
                       <a:r>
-                        <a:rPr lang="en-US" sz="1600" err="1"/>
+                        <a:rPr lang="en-US" sz="1600" dirty="0" err="1"/>
                         <a:t>user":"Louise</a:t>
                       </a:r>
                       <a:r>
-                        <a:rPr lang="en-US" sz="1600"/>
+                        <a:rPr lang="en-US" sz="1600" dirty="0"/>
                         <a:t>", "</a:t>
                       </a:r>
                       <a:r>
-                        <a:rPr lang="en-US" sz="1600" err="1"/>
+                        <a:rPr lang="en-US" sz="1600" dirty="0" err="1"/>
                         <a:t>movie":"Dirty</a:t>
                       </a:r>
                       <a:r>
-                        <a:rPr lang="en-US" sz="1600"/>
+                        <a:rPr lang="en-US" sz="1600" dirty="0"/>
                         <a:t> dancing", "rating":5.0}</a:t>
                       </a:r>
                     </a:p>
@@ -12956,23 +13025,23 @@
                         <a:defRPr/>
                       </a:pPr>
                       <a:r>
-                        <a:rPr lang="en-US" sz="1600"/>
+                        <a:rPr lang="en-US" sz="1600" dirty="0"/>
                         <a:t>{"</a:t>
                       </a:r>
                       <a:r>
-                        <a:rPr lang="en-US" sz="1600" err="1"/>
-                        <a:t>user":“Sam</a:t>
-                      </a:r>
-                      <a:r>
-                        <a:rPr lang="en-US" sz="1600"/>
+                        <a:rPr lang="en-US" sz="1600" dirty="0" err="1"/>
+                        <a:t>user":"Sam</a:t>
+                      </a:r>
+                      <a:r>
+                        <a:rPr lang="en-US" sz="1600" dirty="0"/>
                         <a:t>", "</a:t>
                       </a:r>
                       <a:r>
-                        <a:rPr lang="en-US" sz="1600" err="1"/>
-                        <a:t>movie":“Blade</a:t>
-                      </a:r>
-                      <a:r>
-                        <a:rPr lang="en-US" sz="1600"/>
+                        <a:rPr lang="en-US" sz="1600" dirty="0" err="1"/>
+                        <a:t>movie":"Blade</a:t>
+                      </a:r>
+                      <a:r>
+                        <a:rPr lang="en-US" sz="1600" dirty="0"/>
                         <a:t> Runner", "rating":3.5}</a:t>
                       </a:r>
                     </a:p>
@@ -13012,13 +13081,13 @@
           <a:noFill/>
         </p:spPr>
         <p:txBody>
-          <a:bodyPr wrap="none" rtlCol="0">
+          <a:bodyPr wrap="none" lIns="91440" tIns="45720" rIns="91440" bIns="45720" rtlCol="0" anchor="t">
             <a:spAutoFit/>
           </a:bodyPr>
           <a:lstStyle/>
           <a:p>
             <a:r>
-              <a:rPr lang="fr-FR" b="1" i="1">
+              <a:rPr lang="fr-FR" b="1" i="1" dirty="0">
                 <a:solidFill>
                   <a:schemeClr val="accent6">
                     <a:lumMod val="75000"/>
@@ -13028,7 +13097,7 @@
               <a:t>import </a:t>
             </a:r>
             <a:r>
-              <a:rPr lang="fr-FR" b="1" i="1" err="1">
+              <a:rPr lang="fr-FR" b="1" i="1" dirty="0" err="1">
                 <a:solidFill>
                   <a:schemeClr val="accent6">
                     <a:lumMod val="75000"/>
@@ -13038,7 +13107,7 @@
               <a:t>pyspark.sql.functions</a:t>
             </a:r>
             <a:r>
-              <a:rPr lang="fr-FR" b="1" i="1">
+              <a:rPr lang="fr-FR" b="1" i="1" dirty="0">
                 <a:solidFill>
                   <a:schemeClr val="accent6">
                     <a:lumMod val="75000"/>
@@ -13050,7 +13119,7 @@
           </a:p>
           <a:p>
             <a:r>
-              <a:rPr lang="fr-FR" b="1" i="1" err="1">
+              <a:rPr lang="fr-FR" b="1" i="1" dirty="0" err="1">
                 <a:solidFill>
                   <a:schemeClr val="accent6">
                     <a:lumMod val="75000"/>
@@ -13060,7 +13129,7 @@
               <a:t>df.select</a:t>
             </a:r>
             <a:r>
-              <a:rPr lang="fr-FR" b="1" i="1">
+              <a:rPr lang="fr-FR" b="1" i="1" dirty="0">
                 <a:solidFill>
                   <a:schemeClr val="accent6">
                     <a:lumMod val="75000"/>
@@ -13070,7 +13139,7 @@
               <a:t>(</a:t>
             </a:r>
             <a:r>
-              <a:rPr lang="fr-FR" b="1" i="1" err="1">
+              <a:rPr lang="fr-FR" b="1" i="1" dirty="0" err="1">
                 <a:solidFill>
                   <a:schemeClr val="accent6">
                     <a:lumMod val="75000"/>
@@ -13080,15 +13149,23 @@
               <a:t>F.sum</a:t>
             </a:r>
             <a:r>
-              <a:rPr lang="fr-FR" b="1" i="1">
+              <a:rPr lang="fr-FR" b="1" i="1" dirty="0">
                 <a:solidFill>
                   <a:schemeClr val="accent6">
                     <a:lumMod val="75000"/>
                   </a:schemeClr>
                 </a:solidFill>
               </a:rPr>
-              <a:t>(‘rating’))</a:t>
-            </a:r>
+              <a:t>('rating'))</a:t>
+            </a:r>
+            <a:endParaRPr lang="fr-FR" b="1" i="1" dirty="0">
+              <a:solidFill>
+                <a:schemeClr val="accent6">
+                  <a:lumMod val="75000"/>
+                </a:schemeClr>
+              </a:solidFill>
+              <a:cs typeface="Calibri"/>
+            </a:endParaRPr>
           </a:p>
         </p:txBody>
       </p:sp>
@@ -13107,7 +13184,7 @@
         <p:spPr>
           <a:xfrm>
             <a:off x="5448724" y="5856967"/>
-            <a:ext cx="4103496" cy="1200329"/>
+            <a:ext cx="3916457" cy="1200329"/>
           </a:xfrm>
           <a:prstGeom prst="rect">
             <a:avLst/>
@@ -13115,13 +13192,13 @@
           <a:noFill/>
         </p:spPr>
         <p:txBody>
-          <a:bodyPr wrap="none" rtlCol="0">
+          <a:bodyPr wrap="none" lIns="91440" tIns="45720" rIns="91440" bIns="45720" rtlCol="0" anchor="t">
             <a:spAutoFit/>
           </a:bodyPr>
           <a:lstStyle/>
           <a:p>
             <a:r>
-              <a:rPr lang="fr-FR" b="1" i="1">
+              <a:rPr lang="fr-FR" b="1" i="1" dirty="0">
                 <a:solidFill>
                   <a:schemeClr val="accent6">
                     <a:lumMod val="75000"/>
@@ -13131,7 +13208,7 @@
               <a:t>import </a:t>
             </a:r>
             <a:r>
-              <a:rPr lang="fr-FR" b="1" i="1" err="1">
+              <a:rPr lang="fr-FR" b="1" i="1" dirty="0" err="1">
                 <a:solidFill>
                   <a:schemeClr val="accent6">
                     <a:lumMod val="75000"/>
@@ -13141,7 +13218,7 @@
               <a:t>pyspark.sql.functions</a:t>
             </a:r>
             <a:r>
-              <a:rPr lang="fr-FR" b="1" i="1">
+              <a:rPr lang="fr-FR" b="1" i="1" dirty="0">
                 <a:solidFill>
                   <a:schemeClr val="accent6">
                     <a:lumMod val="75000"/>
@@ -13153,7 +13230,7 @@
           </a:p>
           <a:p>
             <a:r>
-              <a:rPr lang="fr-FR" b="1" i="1" err="1">
+              <a:rPr lang="fr-FR" b="1" i="1" dirty="0" err="1">
                 <a:solidFill>
                   <a:schemeClr val="accent6">
                     <a:lumMod val="75000"/>
@@ -13163,17 +13240,17 @@
               <a:t>df.groupBy</a:t>
             </a:r>
             <a:r>
-              <a:rPr lang="fr-FR" b="1" i="1">
+              <a:rPr lang="fr-FR" b="1" i="1" dirty="0">
                 <a:solidFill>
                   <a:schemeClr val="accent6">
                     <a:lumMod val="75000"/>
                   </a:schemeClr>
                 </a:solidFill>
               </a:rPr>
-              <a:t>(‘user’).</a:t>
-            </a:r>
-            <a:r>
-              <a:rPr lang="fr-FR" b="1" i="1" err="1">
+              <a:t>('user').</a:t>
+            </a:r>
+            <a:r>
+              <a:rPr lang="fr-FR" b="1" i="1" dirty="0" err="1">
                 <a:solidFill>
                   <a:schemeClr val="accent6">
                     <a:lumMod val="75000"/>
@@ -13183,7 +13260,7 @@
               <a:t>agg</a:t>
             </a:r>
             <a:r>
-              <a:rPr lang="fr-FR" b="1" i="1">
+              <a:rPr lang="fr-FR" b="1" i="1" dirty="0">
                 <a:solidFill>
                   <a:schemeClr val="accent6">
                     <a:lumMod val="75000"/>
@@ -13193,7 +13270,7 @@
               <a:t> (</a:t>
             </a:r>
             <a:r>
-              <a:rPr lang="fr-FR" b="1" i="1" err="1">
+              <a:rPr lang="fr-FR" b="1" i="1" dirty="0" err="1">
                 <a:solidFill>
                   <a:schemeClr val="accent6">
                     <a:lumMod val="75000"/>
@@ -13203,19 +13280,27 @@
               <a:t>F.sum</a:t>
             </a:r>
             <a:r>
-              <a:rPr lang="fr-FR" b="1" i="1">
+              <a:rPr lang="fr-FR" b="1" i="1" dirty="0">
                 <a:solidFill>
                   <a:schemeClr val="accent6">
                     <a:lumMod val="75000"/>
                   </a:schemeClr>
                 </a:solidFill>
               </a:rPr>
-              <a:t>(‘rating’))</a:t>
-            </a:r>
-          </a:p>
-          <a:p>
-            <a:r>
-              <a:rPr lang="fr-FR" b="1" i="1" err="1">
+              <a:t>('rating'))</a:t>
+            </a:r>
+            <a:endParaRPr lang="fr-FR" b="1" i="1" dirty="0">
+              <a:solidFill>
+                <a:schemeClr val="accent6">
+                  <a:lumMod val="75000"/>
+                </a:schemeClr>
+              </a:solidFill>
+              <a:cs typeface="Calibri"/>
+            </a:endParaRPr>
+          </a:p>
+          <a:p>
+            <a:r>
+              <a:rPr lang="fr-FR" b="1" i="1" dirty="0" err="1">
                 <a:solidFill>
                   <a:schemeClr val="accent6">
                     <a:lumMod val="40000"/>
@@ -13226,7 +13311,7 @@
               <a:t>df.groupBy</a:t>
             </a:r>
             <a:r>
-              <a:rPr lang="fr-FR" b="1" i="1">
+              <a:rPr lang="fr-FR" b="1" i="1" dirty="0">
                 <a:solidFill>
                   <a:schemeClr val="accent6">
                     <a:lumMod val="40000"/>
@@ -13234,10 +13319,10 @@
                   </a:schemeClr>
                 </a:solidFill>
               </a:rPr>
-              <a:t>(‘user’).</a:t>
-            </a:r>
-            <a:r>
-              <a:rPr lang="fr-FR" b="1" i="1" err="1">
+              <a:t>('user').</a:t>
+            </a:r>
+            <a:r>
+              <a:rPr lang="fr-FR" b="1" i="1" dirty="0" err="1">
                 <a:solidFill>
                   <a:schemeClr val="accent6">
                     <a:lumMod val="40000"/>
@@ -13248,7 +13333,7 @@
               <a:t>agg</a:t>
             </a:r>
             <a:r>
-              <a:rPr lang="fr-FR" b="1" i="1">
+              <a:rPr lang="fr-FR" b="1" i="1" dirty="0">
                 <a:solidFill>
                   <a:schemeClr val="accent6">
                     <a:lumMod val="40000"/>
@@ -13256,10 +13341,10 @@
                   </a:schemeClr>
                 </a:solidFill>
               </a:rPr>
-              <a:t> ({‘rating’:’</a:t>
-            </a:r>
-            <a:r>
-              <a:rPr lang="fr-FR" b="1" i="1" err="1">
+              <a:t> ({'rating':'</a:t>
+            </a:r>
+            <a:r>
+              <a:rPr lang="fr-FR" b="1" i="1" dirty="0" err="1">
                 <a:solidFill>
                   <a:schemeClr val="accent6">
                     <a:lumMod val="40000"/>
@@ -13270,7 +13355,7 @@
               <a:t>sum</a:t>
             </a:r>
             <a:r>
-              <a:rPr lang="fr-FR" b="1" i="1">
+              <a:rPr lang="fr-FR" b="1" i="1" dirty="0">
                 <a:solidFill>
                   <a:schemeClr val="accent6">
                     <a:lumMod val="40000"/>
@@ -13278,8 +13363,17 @@
                   </a:schemeClr>
                 </a:solidFill>
               </a:rPr>
-              <a:t>’})</a:t>
-            </a:r>
+              <a:t>'})</a:t>
+            </a:r>
+            <a:endParaRPr lang="fr-FR" b="1" i="1" dirty="0">
+              <a:solidFill>
+                <a:schemeClr val="accent6">
+                  <a:lumMod val="40000"/>
+                  <a:lumOff val="60000"/>
+                </a:schemeClr>
+              </a:solidFill>
+              <a:cs typeface="Calibri"/>
+            </a:endParaRPr>
           </a:p>
           <a:p>
             <a:endParaRPr lang="fr-FR" b="1" i="1">
@@ -13330,25 +13424,25 @@
           </a:fontRef>
         </p:style>
         <p:txBody>
-          <a:bodyPr rtlCol="0" anchor="ctr"/>
+          <a:bodyPr lIns="91440" tIns="45720" rIns="91440" bIns="45720" rtlCol="0" anchor="ctr"/>
           <a:lstStyle/>
           <a:p>
             <a:pPr algn="ctr"/>
             <a:r>
-              <a:rPr lang="fr-FR" err="1"/>
+              <a:rPr lang="fr-FR" b="1" dirty="0" err="1"/>
               <a:t>keyBy</a:t>
             </a:r>
             <a:r>
-              <a:rPr lang="fr-FR"/>
+              <a:rPr lang="fr-FR" b="1" dirty="0"/>
               <a:t>(lambda x:</a:t>
             </a:r>
             <a:r>
-              <a:rPr lang="fr-FR">
+              <a:rPr lang="fr-FR" b="1" dirty="0">
                 <a:sym typeface="Wingdings" panose="05000000000000000000" pitchFamily="2" charset="2"/>
               </a:rPr>
-              <a:t> x[‘user’])</a:t>
-            </a:r>
-            <a:endParaRPr lang="en-US"/>
+              <a:t> x['user'])</a:t>
+            </a:r>
+            <a:endParaRPr lang="en-US" b="1" dirty="0"/>
           </a:p>
         </p:txBody>
       </p:sp>
@@ -13449,14 +13543,14 @@
           <p:nvPr>
             <p:extLst>
               <p:ext uri="{D42A27DB-BD31-4B8C-83A1-F6EECF244321}">
-                <p14:modId xmlns:p14="http://schemas.microsoft.com/office/powerpoint/2010/main" val="1153715756"/>
+                <p14:modId xmlns:p14="http://schemas.microsoft.com/office/powerpoint/2010/main" val="453859449"/>
               </p:ext>
             </p:extLst>
           </p:nvPr>
         </p:nvGraphicFramePr>
         <p:xfrm>
           <a:off x="9240849" y="1325337"/>
-          <a:ext cx="1435267" cy="1479749"/>
+          <a:ext cx="2043195" cy="1584960"/>
         </p:xfrm>
         <a:graphic>
           <a:graphicData uri="http://schemas.openxmlformats.org/drawingml/2006/table">
@@ -13465,7 +13559,7 @@
                 <a:tableStyleId>{5C22544A-7EE6-4342-B048-85BDC9FD1C3A}</a:tableStyleId>
               </a:tblPr>
               <a:tblGrid>
-                <a:gridCol w="1435267">
+                <a:gridCol w="2043195">
                   <a:extLst>
                     <a:ext uri="{9D8B030D-6E8A-4147-A177-3AD203B41FA5}">
                       <a16:colId xmlns:a16="http://schemas.microsoft.com/office/drawing/2014/main" val="2061391393"/>
@@ -13479,11 +13573,30 @@
                     <a:bodyPr/>
                     <a:lstStyle/>
                     <a:p>
-                      <a:r>
-                        <a:rPr lang="fr-FR" sz="1600"/>
-                        <a:t>Row</a:t>
-                      </a:r>
-                      <a:endParaRPr lang="en-US" sz="1600"/>
+                      <a:pPr lvl="0" algn="l">
+                        <a:lnSpc>
+                          <a:spcPct val="100000"/>
+                        </a:lnSpc>
+                        <a:spcBef>
+                          <a:spcPts val="0"/>
+                        </a:spcBef>
+                        <a:spcAft>
+                          <a:spcPts val="0"/>
+                        </a:spcAft>
+                        <a:buNone/>
+                      </a:pPr>
+                      <a:r>
+                        <a:rPr lang="fr-FR" sz="1600" b="1" i="0" u="none" strike="noStrike" noProof="0" dirty="0">
+                          <a:latin typeface="Calibri"/>
+                        </a:rPr>
+                        <a:t>RDD of (K, V) pairs</a:t>
+                      </a:r>
+                    </a:p>
+                    <a:p>
+                      <a:pPr lvl="0">
+                        <a:buNone/>
+                      </a:pPr>
+                      <a:endParaRPr lang="fr-FR" sz="1600" dirty="0"/>
                     </a:p>
                   </a:txBody>
                   <a:tcPr/>
@@ -13501,11 +13614,11 @@
                     <a:lstStyle/>
                     <a:p>
                       <a:r>
-                        <a:rPr lang="fr-FR" sz="1600"/>
+                        <a:rPr lang="fr-FR" sz="1600" dirty="0"/>
                         <a:t>(</a:t>
                       </a:r>
                       <a:r>
-                        <a:rPr lang="en-US" sz="1600"/>
+                        <a:rPr lang="en-US" sz="1600" dirty="0"/>
                         <a:t>"John“, …)</a:t>
                       </a:r>
                     </a:p>
@@ -13525,11 +13638,11 @@
                     <a:lstStyle/>
                     <a:p>
                       <a:r>
-                        <a:rPr lang="fr-FR" sz="1600"/>
+                        <a:rPr lang="fr-FR" sz="1600" dirty="0"/>
                         <a:t>(</a:t>
                       </a:r>
                       <a:r>
-                        <a:rPr lang="en-US" sz="1600"/>
+                        <a:rPr lang="en-US" sz="1600" dirty="0"/>
                         <a:t>“Louise“, …)</a:t>
                       </a:r>
                     </a:p>
@@ -13549,11 +13662,11 @@
                     <a:lstStyle/>
                     <a:p>
                       <a:r>
-                        <a:rPr lang="fr-FR" sz="1600"/>
+                        <a:rPr lang="fr-FR" sz="1600" dirty="0"/>
                         <a:t>(</a:t>
                       </a:r>
                       <a:r>
-                        <a:rPr lang="en-US" sz="1600"/>
+                        <a:rPr lang="en-US" sz="1600" dirty="0"/>
                         <a:t>“Sam“, …)</a:t>
                       </a:r>
                     </a:p>
@@ -13585,7 +13698,7 @@
           <p:nvPr>
             <p:extLst>
               <p:ext uri="{D42A27DB-BD31-4B8C-83A1-F6EECF244321}">
-                <p14:modId xmlns:p14="http://schemas.microsoft.com/office/powerpoint/2010/main" val="3757726331"/>
+                <p14:modId xmlns:p14="http://schemas.microsoft.com/office/powerpoint/2010/main" val="514348416"/>
               </p:ext>
             </p:extLst>
           </p:nvPr>
@@ -13615,11 +13728,16 @@
                     <a:bodyPr/>
                     <a:lstStyle/>
                     <a:p>
-                      <a:r>
-                        <a:rPr lang="fr-FR" sz="1600"/>
-                        <a:t>Row</a:t>
-                      </a:r>
-                      <a:endParaRPr lang="en-US" sz="1600"/>
+                      <a:pPr lvl="0">
+                        <a:buNone/>
+                      </a:pPr>
+                      <a:r>
+                        <a:rPr lang="fr-FR" sz="1600" b="1" i="0" u="none" strike="noStrike" noProof="0" dirty="0">
+                          <a:latin typeface="Calibri"/>
+                        </a:rPr>
+                        <a:t>RDD</a:t>
+                      </a:r>
+                      <a:endParaRPr lang="en-US" dirty="0"/>
                     </a:p>
                   </a:txBody>
                   <a:tcPr/>
@@ -13637,23 +13755,23 @@
                     <a:lstStyle/>
                     <a:p>
                       <a:r>
-                        <a:rPr lang="en-US" sz="1600"/>
+                        <a:rPr lang="en-US" sz="1600" dirty="0"/>
                         <a:t>{"</a:t>
                       </a:r>
                       <a:r>
-                        <a:rPr lang="en-US" sz="1600" err="1"/>
+                        <a:rPr lang="en-US" sz="1600" dirty="0" err="1"/>
                         <a:t>user":"John</a:t>
                       </a:r>
                       <a:r>
-                        <a:rPr lang="en-US" sz="1600"/>
+                        <a:rPr lang="en-US" sz="1600" dirty="0"/>
                         <a:t>", "</a:t>
                       </a:r>
                       <a:r>
-                        <a:rPr lang="en-US" sz="1600" err="1"/>
+                        <a:rPr lang="en-US" sz="1600" dirty="0" err="1"/>
                         <a:t>movie":"Blade</a:t>
                       </a:r>
                       <a:r>
-                        <a:rPr lang="en-US" sz="1600"/>
+                        <a:rPr lang="en-US" sz="1600" dirty="0"/>
                         <a:t> Runner", "rating":5.0}</a:t>
                       </a:r>
                     </a:p>
@@ -13673,23 +13791,23 @@
                     <a:lstStyle/>
                     <a:p>
                       <a:r>
-                        <a:rPr lang="en-US" sz="1600"/>
+                        <a:rPr lang="en-US" sz="1600" dirty="0"/>
                         <a:t>{"</a:t>
                       </a:r>
                       <a:r>
-                        <a:rPr lang="en-US" sz="1600" err="1"/>
+                        <a:rPr lang="en-US" sz="1600" dirty="0" err="1"/>
                         <a:t>user":"Louise</a:t>
                       </a:r>
                       <a:r>
-                        <a:rPr lang="en-US" sz="1600"/>
+                        <a:rPr lang="en-US" sz="1600" dirty="0"/>
                         <a:t>", "</a:t>
                       </a:r>
                       <a:r>
-                        <a:rPr lang="en-US" sz="1600" err="1"/>
+                        <a:rPr lang="en-US" sz="1600" dirty="0" err="1"/>
                         <a:t>movie":"Dirty</a:t>
                       </a:r>
                       <a:r>
-                        <a:rPr lang="en-US" sz="1600"/>
+                        <a:rPr lang="en-US" sz="1600" dirty="0"/>
                         <a:t> dancing", "rating":5.0}</a:t>
                       </a:r>
                     </a:p>
@@ -13726,23 +13844,23 @@
                         <a:defRPr/>
                       </a:pPr>
                       <a:r>
-                        <a:rPr lang="en-US" sz="1600"/>
+                        <a:rPr lang="en-US" sz="1600" dirty="0"/>
                         <a:t>{"</a:t>
                       </a:r>
                       <a:r>
-                        <a:rPr lang="en-US" sz="1600" err="1"/>
+                        <a:rPr lang="en-US" sz="1600" dirty="0" err="1"/>
                         <a:t>user":“Sam</a:t>
                       </a:r>
                       <a:r>
-                        <a:rPr lang="en-US" sz="1600"/>
+                        <a:rPr lang="en-US" sz="1600" dirty="0"/>
                         <a:t>", "</a:t>
                       </a:r>
                       <a:r>
-                        <a:rPr lang="en-US" sz="1600" err="1"/>
+                        <a:rPr lang="en-US" sz="1600" dirty="0" err="1"/>
                         <a:t>movie":“Blade</a:t>
                       </a:r>
                       <a:r>
-                        <a:rPr lang="en-US" sz="1600"/>
+                        <a:rPr lang="en-US" sz="1600" dirty="0"/>
                         <a:t> Runner", "rating":3.5}</a:t>
                       </a:r>
                     </a:p>
@@ -13800,6 +13918,136 @@
           </a:fontRef>
         </p:style>
       </p:cxnSp>
+      <p:sp>
+        <p:nvSpPr>
+          <p:cNvPr id="3" name="TextBox 1">
+            <a:extLst>
+              <a:ext uri="{FF2B5EF4-FFF2-40B4-BE49-F238E27FC236}">
+                <a16:creationId xmlns:a16="http://schemas.microsoft.com/office/drawing/2014/main" id="{387DA3E5-AF0D-6CD2-8A65-AE0C8DF8521D}"/>
+              </a:ext>
+            </a:extLst>
+          </p:cNvPr>
+          <p:cNvSpPr txBox="1"/>
+          <p:nvPr/>
+        </p:nvSpPr>
+        <p:spPr>
+          <a:xfrm>
+            <a:off x="9686567" y="3393978"/>
+            <a:ext cx="732893" cy="461665"/>
+          </a:xfrm>
+          <a:prstGeom prst="rect">
+            <a:avLst/>
+          </a:prstGeom>
+          <a:noFill/>
+        </p:spPr>
+        <p:txBody>
+          <a:bodyPr wrap="none" lIns="91440" tIns="45720" rIns="91440" bIns="45720" rtlCol="0" anchor="t">
+            <a:spAutoFit/>
+          </a:bodyPr>
+          <a:lstStyle>
+            <a:defPPr>
+              <a:defRPr lang="en-US"/>
+            </a:defPPr>
+            <a:lvl1pPr marL="0" algn="l" defTabSz="914400" rtl="0" eaLnBrk="1" latinLnBrk="0" hangingPunct="1">
+              <a:defRPr sz="1800" kern="1200">
+                <a:solidFill>
+                  <a:schemeClr val="tx1"/>
+                </a:solidFill>
+                <a:latin typeface="+mn-lt"/>
+                <a:ea typeface="+mn-ea"/>
+                <a:cs typeface="+mn-cs"/>
+              </a:defRPr>
+            </a:lvl1pPr>
+            <a:lvl2pPr marL="457200" algn="l" defTabSz="914400" rtl="0" eaLnBrk="1" latinLnBrk="0" hangingPunct="1">
+              <a:defRPr sz="1800" kern="1200">
+                <a:solidFill>
+                  <a:schemeClr val="tx1"/>
+                </a:solidFill>
+                <a:latin typeface="+mn-lt"/>
+                <a:ea typeface="+mn-ea"/>
+                <a:cs typeface="+mn-cs"/>
+              </a:defRPr>
+            </a:lvl2pPr>
+            <a:lvl3pPr marL="914400" algn="l" defTabSz="914400" rtl="0" eaLnBrk="1" latinLnBrk="0" hangingPunct="1">
+              <a:defRPr sz="1800" kern="1200">
+                <a:solidFill>
+                  <a:schemeClr val="tx1"/>
+                </a:solidFill>
+                <a:latin typeface="+mn-lt"/>
+                <a:ea typeface="+mn-ea"/>
+                <a:cs typeface="+mn-cs"/>
+              </a:defRPr>
+            </a:lvl3pPr>
+            <a:lvl4pPr marL="1371600" algn="l" defTabSz="914400" rtl="0" eaLnBrk="1" latinLnBrk="0" hangingPunct="1">
+              <a:defRPr sz="1800" kern="1200">
+                <a:solidFill>
+                  <a:schemeClr val="tx1"/>
+                </a:solidFill>
+                <a:latin typeface="+mn-lt"/>
+                <a:ea typeface="+mn-ea"/>
+                <a:cs typeface="+mn-cs"/>
+              </a:defRPr>
+            </a:lvl4pPr>
+            <a:lvl5pPr marL="1828800" algn="l" defTabSz="914400" rtl="0" eaLnBrk="1" latinLnBrk="0" hangingPunct="1">
+              <a:defRPr sz="1800" kern="1200">
+                <a:solidFill>
+                  <a:schemeClr val="tx1"/>
+                </a:solidFill>
+                <a:latin typeface="+mn-lt"/>
+                <a:ea typeface="+mn-ea"/>
+                <a:cs typeface="+mn-cs"/>
+              </a:defRPr>
+            </a:lvl5pPr>
+            <a:lvl6pPr marL="2286000" algn="l" defTabSz="914400" rtl="0" eaLnBrk="1" latinLnBrk="0" hangingPunct="1">
+              <a:defRPr sz="1800" kern="1200">
+                <a:solidFill>
+                  <a:schemeClr val="tx1"/>
+                </a:solidFill>
+                <a:latin typeface="+mn-lt"/>
+                <a:ea typeface="+mn-ea"/>
+                <a:cs typeface="+mn-cs"/>
+              </a:defRPr>
+            </a:lvl6pPr>
+            <a:lvl7pPr marL="2743200" algn="l" defTabSz="914400" rtl="0" eaLnBrk="1" latinLnBrk="0" hangingPunct="1">
+              <a:defRPr sz="1800" kern="1200">
+                <a:solidFill>
+                  <a:schemeClr val="tx1"/>
+                </a:solidFill>
+                <a:latin typeface="+mn-lt"/>
+                <a:ea typeface="+mn-ea"/>
+                <a:cs typeface="+mn-cs"/>
+              </a:defRPr>
+            </a:lvl7pPr>
+            <a:lvl8pPr marL="3200400" algn="l" defTabSz="914400" rtl="0" eaLnBrk="1" latinLnBrk="0" hangingPunct="1">
+              <a:defRPr sz="1800" kern="1200">
+                <a:solidFill>
+                  <a:schemeClr val="tx1"/>
+                </a:solidFill>
+                <a:latin typeface="+mn-lt"/>
+                <a:ea typeface="+mn-ea"/>
+                <a:cs typeface="+mn-cs"/>
+              </a:defRPr>
+            </a:lvl8pPr>
+            <a:lvl9pPr marL="3657600" algn="l" defTabSz="914400" rtl="0" eaLnBrk="1" latinLnBrk="0" hangingPunct="1">
+              <a:defRPr sz="1800" kern="1200">
+                <a:solidFill>
+                  <a:schemeClr val="tx1"/>
+                </a:solidFill>
+                <a:latin typeface="+mn-lt"/>
+                <a:ea typeface="+mn-ea"/>
+                <a:cs typeface="+mn-cs"/>
+              </a:defRPr>
+            </a:lvl9pPr>
+          </a:lstStyle>
+          <a:p>
+            <a:r>
+              <a:rPr lang="fr-FR" sz="2400" b="1" dirty="0"/>
+              <a:t>13.5</a:t>
+            </a:r>
+            <a:endParaRPr lang="en-US" sz="2400" b="1" dirty="0"/>
+          </a:p>
+        </p:txBody>
+      </p:sp>
     </p:spTree>
     <p:extLst>
       <p:ext uri="{BB962C8B-B14F-4D97-AF65-F5344CB8AC3E}">
@@ -13905,25 +14153,44 @@
           </a:fontRef>
         </p:style>
         <p:txBody>
-          <a:bodyPr rtlCol="0" anchor="ctr"/>
+          <a:bodyPr lIns="91440" tIns="45720" rIns="91440" bIns="45720" rtlCol="0" anchor="ctr"/>
           <a:lstStyle/>
           <a:p>
             <a:pPr algn="ctr"/>
             <a:r>
-              <a:rPr lang="fr-FR" err="1"/>
+              <a:rPr lang="fr-FR" b="1" dirty="0" err="1"/>
               <a:t>flatmap</a:t>
             </a:r>
             <a:r>
-              <a:rPr lang="fr-FR"/>
-              <a:t>(x </a:t>
-            </a:r>
-            <a:r>
-              <a:rPr lang="fr-FR">
+              <a:rPr lang="fr-FR" b="1" dirty="0"/>
+              <a:t>(</a:t>
+            </a:r>
+            <a:r>
+              <a:rPr lang="fr-FR" b="1" dirty="0">
+                <a:ea typeface="+mn-lt"/>
+                <a:cs typeface="+mn-lt"/>
+              </a:rPr>
+              <a:t>lambda</a:t>
+            </a:r>
+            <a:r>
+              <a:rPr lang="fr-FR" b="1" dirty="0">
+                <a:ea typeface="+mn-lt"/>
+                <a:cs typeface="+mn-lt"/>
                 <a:sym typeface="Wingdings" panose="05000000000000000000" pitchFamily="2" charset="2"/>
               </a:rPr>
-              <a:t> x[‘genres’].split(‘;’))</a:t>
-            </a:r>
-            <a:endParaRPr lang="en-US"/>
+              <a:t> </a:t>
+            </a:r>
+            <a:r>
+              <a:rPr lang="fr-FR" b="1" dirty="0"/>
+              <a:t>x:</a:t>
+            </a:r>
+            <a:r>
+              <a:rPr lang="fr-FR" b="1" dirty="0">
+                <a:sym typeface="Wingdings" panose="05000000000000000000" pitchFamily="2" charset="2"/>
+              </a:rPr>
+              <a:t> x['genres'].split(';'))</a:t>
+            </a:r>
+            <a:endParaRPr lang="en-US" b="1" dirty="0"/>
           </a:p>
         </p:txBody>
       </p:sp>
@@ -14024,7 +14291,7 @@
           <p:nvPr>
             <p:extLst>
               <p:ext uri="{D42A27DB-BD31-4B8C-83A1-F6EECF244321}">
-                <p14:modId xmlns:p14="http://schemas.microsoft.com/office/powerpoint/2010/main" val="3247897374"/>
+                <p14:modId xmlns:p14="http://schemas.microsoft.com/office/powerpoint/2010/main" val="767747873"/>
               </p:ext>
             </p:extLst>
           </p:nvPr>
@@ -14054,11 +14321,16 @@
                     <a:bodyPr/>
                     <a:lstStyle/>
                     <a:p>
-                      <a:r>
-                        <a:rPr lang="fr-FR" sz="1600"/>
-                        <a:t>Row</a:t>
-                      </a:r>
-                      <a:endParaRPr lang="en-US" sz="1600"/>
+                      <a:pPr lvl="0">
+                        <a:buNone/>
+                      </a:pPr>
+                      <a:r>
+                        <a:rPr lang="fr-FR" sz="1600" b="1" i="0" u="none" strike="noStrike" noProof="0" dirty="0">
+                          <a:latin typeface="Calibri"/>
+                        </a:rPr>
+                        <a:t>RDD</a:t>
+                      </a:r>
+                      <a:endParaRPr lang="en-US" dirty="0"/>
                     </a:p>
                   </a:txBody>
                   <a:tcPr/>
@@ -14075,11 +14347,26 @@
                     <a:bodyPr/>
                     <a:lstStyle/>
                     <a:p>
-                      <a:r>
-                        <a:rPr lang="fr-FR" sz="1600"/>
+                      <a:pPr lvl="0">
+                        <a:buNone/>
+                      </a:pPr>
+                      <a:r>
+                        <a:rPr lang="fr-FR" sz="1600" b="0" i="0" u="none" strike="noStrike" noProof="0" dirty="0">
+                          <a:latin typeface="Calibri"/>
+                        </a:rPr>
+                        <a:t>"</a:t>
+                      </a:r>
+                      <a:r>
+                        <a:rPr lang="fr-FR" sz="1600" dirty="0"/>
                         <a:t>cyberpunk</a:t>
                       </a:r>
-                      <a:endParaRPr lang="en-US" sz="1600"/>
+                      <a:r>
+                        <a:rPr lang="fr-FR" sz="1600" b="0" i="0" u="none" strike="noStrike" noProof="0" dirty="0">
+                          <a:latin typeface="Calibri"/>
+                        </a:rPr>
+                        <a:t>"</a:t>
+                      </a:r>
+                      <a:endParaRPr lang="en-US" sz="1600" dirty="0"/>
                     </a:p>
                   </a:txBody>
                   <a:tcPr/>
@@ -14096,11 +14383,26 @@
                     <a:bodyPr/>
                     <a:lstStyle/>
                     <a:p>
-                      <a:r>
-                        <a:rPr lang="fr-FR" sz="1600" err="1"/>
+                      <a:pPr lvl="0">
+                        <a:buNone/>
+                      </a:pPr>
+                      <a:r>
+                        <a:rPr lang="fr-FR" sz="1600" b="0" i="0" u="none" strike="noStrike" noProof="0" dirty="0">
+                          <a:latin typeface="Calibri"/>
+                        </a:rPr>
+                        <a:t>"</a:t>
+                      </a:r>
+                      <a:r>
+                        <a:rPr lang="fr-FR" sz="1600" dirty="0" err="1"/>
                         <a:t>scifi</a:t>
                       </a:r>
-                      <a:endParaRPr lang="en-US" sz="1600"/>
+                      <a:r>
+                        <a:rPr lang="fr-FR" sz="1600" b="0" i="0" u="none" strike="noStrike" noProof="0" dirty="0">
+                          <a:latin typeface="Calibri"/>
+                        </a:rPr>
+                        <a:t>"</a:t>
+                      </a:r>
+                      <a:endParaRPr lang="en-US" sz="1600" dirty="0"/>
                     </a:p>
                   </a:txBody>
                   <a:tcPr/>
@@ -14117,7 +14419,7 @@
                     <a:bodyPr/>
                     <a:lstStyle/>
                     <a:p>
-                      <a:pPr marL="0" marR="0" lvl="0" indent="0" algn="l" defTabSz="914400" rtl="0" eaLnBrk="1" fontAlgn="auto" latinLnBrk="0" hangingPunct="1">
+                      <a:pPr marL="0" marR="0" lvl="0" indent="0" algn="l" defTabSz="914400">
                         <a:lnSpc>
                           <a:spcPct val="100000"/>
                         </a:lnSpc>
@@ -14127,18 +14429,27 @@
                         <a:spcAft>
                           <a:spcPts val="0"/>
                         </a:spcAft>
-                        <a:buClrTx/>
-                        <a:buSzTx/>
-                        <a:buFontTx/>
                         <a:buNone/>
                         <a:tabLst/>
                         <a:defRPr/>
                       </a:pPr>
                       <a:r>
-                        <a:rPr lang="fr-FR" sz="1600"/>
+                        <a:rPr lang="fr-FR" sz="1600" b="0" i="0" u="none" strike="noStrike" noProof="0" dirty="0">
+                          <a:latin typeface="Calibri"/>
+                        </a:rPr>
+                        <a:t>"</a:t>
+                      </a:r>
+                      <a:r>
+                        <a:rPr lang="fr-FR" sz="1600" dirty="0"/>
                         <a:t>action</a:t>
                       </a:r>
-                      <a:endParaRPr lang="en-US" sz="1600"/>
+                      <a:r>
+                        <a:rPr lang="fr-FR" sz="1600" b="0" i="0" u="none" strike="noStrike" noProof="0" dirty="0">
+                          <a:latin typeface="Calibri"/>
+                        </a:rPr>
+                        <a:t>"</a:t>
+                      </a:r>
+                      <a:endParaRPr lang="en-US" sz="1600" dirty="0"/>
                     </a:p>
                   </a:txBody>
                   <a:tcPr/>
@@ -14155,7 +14466,7 @@
                     <a:bodyPr/>
                     <a:lstStyle/>
                     <a:p>
-                      <a:pPr marL="0" marR="0" lvl="0" indent="0" algn="l" defTabSz="914400" rtl="0" eaLnBrk="1" fontAlgn="auto" latinLnBrk="0" hangingPunct="1">
+                      <a:pPr marL="0" marR="0" lvl="0" indent="0" algn="l" defTabSz="914400">
                         <a:lnSpc>
                           <a:spcPct val="100000"/>
                         </a:lnSpc>
@@ -14165,18 +14476,27 @@
                         <a:spcAft>
                           <a:spcPts val="0"/>
                         </a:spcAft>
-                        <a:buClrTx/>
-                        <a:buSzTx/>
-                        <a:buFontTx/>
                         <a:buNone/>
                         <a:tabLst/>
                         <a:defRPr/>
                       </a:pPr>
                       <a:r>
-                        <a:rPr lang="fr-FR" sz="1600"/>
+                        <a:rPr lang="fr-FR" sz="1600" b="0" i="0" u="none" strike="noStrike" noProof="0" dirty="0">
+                          <a:latin typeface="Calibri"/>
+                        </a:rPr>
+                        <a:t>"</a:t>
+                      </a:r>
+                      <a:r>
+                        <a:rPr lang="fr-FR" sz="1600" dirty="0"/>
                         <a:t>music</a:t>
                       </a:r>
-                      <a:endParaRPr lang="en-US" sz="1600"/>
+                      <a:r>
+                        <a:rPr lang="fr-FR" sz="1600" b="0" i="0" u="none" strike="noStrike" noProof="0" dirty="0">
+                          <a:latin typeface="Calibri"/>
+                        </a:rPr>
+                        <a:t>"</a:t>
+                      </a:r>
+                      <a:endParaRPr lang="en-US" dirty="0"/>
                     </a:p>
                   </a:txBody>
                   <a:tcPr/>
@@ -14193,7 +14513,7 @@
                     <a:bodyPr/>
                     <a:lstStyle/>
                     <a:p>
-                      <a:pPr marL="0" marR="0" lvl="0" indent="0" algn="l" defTabSz="914400" rtl="0" eaLnBrk="1" fontAlgn="auto" latinLnBrk="0" hangingPunct="1">
+                      <a:pPr marL="0" marR="0" lvl="0" indent="0" algn="l" defTabSz="914400">
                         <a:lnSpc>
                           <a:spcPct val="100000"/>
                         </a:lnSpc>
@@ -14203,18 +14523,27 @@
                         <a:spcAft>
                           <a:spcPts val="0"/>
                         </a:spcAft>
-                        <a:buClrTx/>
-                        <a:buSzTx/>
-                        <a:buFontTx/>
                         <a:buNone/>
                         <a:tabLst/>
                         <a:defRPr/>
                       </a:pPr>
                       <a:r>
-                        <a:rPr lang="fr-FR" sz="1600"/>
+                        <a:rPr lang="fr-FR" sz="1600" b="0" i="0" u="none" strike="noStrike" noProof="0" dirty="0">
+                          <a:latin typeface="Calibri"/>
+                        </a:rPr>
+                        <a:t>"</a:t>
+                      </a:r>
+                      <a:r>
+                        <a:rPr lang="fr-FR" sz="1600" dirty="0"/>
                         <a:t>danse</a:t>
                       </a:r>
-                      <a:endParaRPr lang="en-US" sz="1600"/>
+                      <a:r>
+                        <a:rPr lang="fr-FR" sz="1600" b="0" i="0" u="none" strike="noStrike" noProof="0" dirty="0">
+                          <a:latin typeface="Calibri"/>
+                        </a:rPr>
+                        <a:t>"</a:t>
+                      </a:r>
+                      <a:endParaRPr lang="en-US" sz="1600" dirty="0"/>
                     </a:p>
                   </a:txBody>
                   <a:tcPr/>
@@ -14231,7 +14560,7 @@
                     <a:bodyPr/>
                     <a:lstStyle/>
                     <a:p>
-                      <a:pPr marL="0" marR="0" lvl="0" indent="0" algn="l" defTabSz="914400" rtl="0" eaLnBrk="1" fontAlgn="auto" latinLnBrk="0" hangingPunct="1">
+                      <a:pPr marL="0" marR="0" lvl="0" indent="0" algn="l" defTabSz="914400">
                         <a:lnSpc>
                           <a:spcPct val="100000"/>
                         </a:lnSpc>
@@ -14241,18 +14570,27 @@
                         <a:spcAft>
                           <a:spcPts val="0"/>
                         </a:spcAft>
-                        <a:buClrTx/>
-                        <a:buSzTx/>
-                        <a:buFontTx/>
                         <a:buNone/>
                         <a:tabLst/>
                         <a:defRPr/>
                       </a:pPr>
                       <a:r>
-                        <a:rPr lang="fr-FR" sz="1600"/>
+                        <a:rPr lang="fr-FR" sz="1600" b="0" i="0" u="none" strike="noStrike" noProof="0" dirty="0">
+                          <a:latin typeface="Calibri"/>
+                        </a:rPr>
+                        <a:t>"</a:t>
+                      </a:r>
+                      <a:r>
+                        <a:rPr lang="fr-FR" sz="1600" dirty="0"/>
                         <a:t>romance</a:t>
                       </a:r>
-                      <a:endParaRPr lang="en-US" sz="1600"/>
+                      <a:r>
+                        <a:rPr lang="fr-FR" sz="1600" b="0" i="0" u="none" strike="noStrike" noProof="0" dirty="0">
+                          <a:latin typeface="Calibri"/>
+                        </a:rPr>
+                        <a:t>"</a:t>
+                      </a:r>
+                      <a:endParaRPr lang="en-US" sz="1600" dirty="0"/>
                     </a:p>
                   </a:txBody>
                   <a:tcPr/>
@@ -14282,7 +14620,7 @@
           <p:nvPr>
             <p:extLst>
               <p:ext uri="{D42A27DB-BD31-4B8C-83A1-F6EECF244321}">
-                <p14:modId xmlns:p14="http://schemas.microsoft.com/office/powerpoint/2010/main" val="2756594863"/>
+                <p14:modId xmlns:p14="http://schemas.microsoft.com/office/powerpoint/2010/main" val="908329871"/>
               </p:ext>
             </p:extLst>
           </p:nvPr>
@@ -14312,11 +14650,16 @@
                     <a:bodyPr/>
                     <a:lstStyle/>
                     <a:p>
-                      <a:r>
-                        <a:rPr lang="fr-FR" sz="1600"/>
-                        <a:t>Row</a:t>
-                      </a:r>
-                      <a:endParaRPr lang="en-US" sz="1600"/>
+                      <a:pPr lvl="0">
+                        <a:buNone/>
+                      </a:pPr>
+                      <a:r>
+                        <a:rPr lang="fr-FR" sz="1600" b="1" i="0" u="none" strike="noStrike" noProof="0" dirty="0">
+                          <a:latin typeface="Calibri"/>
+                        </a:rPr>
+                        <a:t>RDD</a:t>
+                      </a:r>
+                      <a:endParaRPr lang="en-US" dirty="0"/>
                     </a:p>
                   </a:txBody>
                   <a:tcPr/>
@@ -14334,24 +14677,24 @@
                     <a:lstStyle/>
                     <a:p>
                       <a:r>
-                        <a:rPr lang="en-US" sz="1600"/>
+                        <a:rPr lang="en-US" sz="1600" dirty="0"/>
                         <a:t>{"</a:t>
                       </a:r>
                       <a:r>
-                        <a:rPr lang="en-US" sz="1600" err="1"/>
+                        <a:rPr lang="en-US" sz="1600" dirty="0" err="1"/>
                         <a:t>movie":"Blade</a:t>
                       </a:r>
                       <a:r>
-                        <a:rPr lang="en-US" sz="1600"/>
-                        <a:t> Runner", “genres":”</a:t>
-                      </a:r>
-                      <a:r>
-                        <a:rPr lang="en-US" sz="1600" err="1"/>
+                        <a:rPr lang="en-US" sz="1600" dirty="0"/>
+                        <a:t> Runner", "genres":"</a:t>
+                      </a:r>
+                      <a:r>
+                        <a:rPr lang="en-US" sz="1600" dirty="0" err="1"/>
                         <a:t>cyberpunk|scifi|action</a:t>
                       </a:r>
                       <a:r>
-                        <a:rPr lang="en-US" sz="1600"/>
-                        <a:t>”}</a:t>
+                        <a:rPr lang="en-US" sz="1600" dirty="0"/>
+                        <a:t>"}</a:t>
                       </a:r>
                     </a:p>
                   </a:txBody>
@@ -14370,24 +14713,24 @@
                     <a:lstStyle/>
                     <a:p>
                       <a:r>
-                        <a:rPr lang="en-US" sz="1600"/>
+                        <a:rPr lang="en-US" sz="1600" dirty="0"/>
                         <a:t>{"</a:t>
                       </a:r>
                       <a:r>
-                        <a:rPr lang="en-US" sz="1600" err="1"/>
+                        <a:rPr lang="en-US" sz="1600" dirty="0" err="1"/>
                         <a:t>movie":"Dirty</a:t>
                       </a:r>
                       <a:r>
-                        <a:rPr lang="en-US" sz="1600"/>
-                        <a:t> dancing", “genres":”</a:t>
-                      </a:r>
-                      <a:r>
-                        <a:rPr lang="en-US" sz="1600" err="1"/>
+                        <a:rPr lang="en-US" sz="1600" dirty="0"/>
+                        <a:t> dancing", "genres":"</a:t>
+                      </a:r>
+                      <a:r>
+                        <a:rPr lang="en-US" sz="1600" dirty="0" err="1"/>
                         <a:t>music|danse|romance</a:t>
                       </a:r>
                       <a:r>
-                        <a:rPr lang="en-US" sz="1600"/>
-                        <a:t>”}</a:t>
+                        <a:rPr lang="en-US" sz="1600" dirty="0"/>
+                        <a:t>"}</a:t>
                       </a:r>
                     </a:p>
                   </a:txBody>
@@ -14417,7 +14760,7 @@
         </p:nvSpPr>
         <p:spPr>
           <a:xfrm>
-            <a:off x="5774996" y="2690336"/>
+            <a:off x="5578075" y="2801639"/>
             <a:ext cx="4408450" cy="1754326"/>
           </a:xfrm>
           <a:prstGeom prst="rect">

</xml_diff>

<commit_message>
[Module 4] Update the slides of TD2 (#37)
</commit_message>
<xml_diff>
--- a/module4/td2/td2-spark-dataframe.pptx
+++ b/module4/td2/td2-spark-dataframe.pptx
@@ -130,6 +130,7 @@
 <p1510:revInfo xmlns:a="http://schemas.openxmlformats.org/drawingml/2006/main" xmlns:r="http://schemas.openxmlformats.org/officeDocument/2006/relationships" xmlns:p1510="http://schemas.microsoft.com/office/powerpoint/2015/10/main">
   <p1510:revLst>
     <p1510:client id="{424BAB5A-E71E-13CA-CA1B-F6D262786152}" v="603" dt="2022-02-09T15:29:28.149"/>
+    <p1510:client id="{A6562958-1B74-C30F-A957-48CDD74E28C5}" v="473" dt="2022-12-14T14:47:06.690"/>
     <p1510:client id="{ABF4876D-44CB-C346-A1E8-22B467A5ADDC}" v="116" dt="2020-11-06T14:44:44.770"/>
   </p1510:revLst>
 </p1510:revInfo>
@@ -282,7 +283,7 @@
           <a:p>
             <a:fld id="{97D5A493-CCC9-418E-861C-802A9D3B9980}" type="datetimeFigureOut">
               <a:rPr lang="en-US" smtClean="0"/>
-              <a:t>2/9/2022</a:t>
+              <a:t>12/14/2022</a:t>
             </a:fld>
             <a:endParaRPr lang="en-US"/>
           </a:p>
@@ -480,7 +481,7 @@
           <a:p>
             <a:fld id="{97D5A493-CCC9-418E-861C-802A9D3B9980}" type="datetimeFigureOut">
               <a:rPr lang="en-US" smtClean="0"/>
-              <a:t>2/9/2022</a:t>
+              <a:t>12/14/2022</a:t>
             </a:fld>
             <a:endParaRPr lang="en-US"/>
           </a:p>
@@ -688,7 +689,7 @@
           <a:p>
             <a:fld id="{97D5A493-CCC9-418E-861C-802A9D3B9980}" type="datetimeFigureOut">
               <a:rPr lang="en-US" smtClean="0"/>
-              <a:t>2/9/2022</a:t>
+              <a:t>12/14/2022</a:t>
             </a:fld>
             <a:endParaRPr lang="en-US"/>
           </a:p>
@@ -886,7 +887,7 @@
           <a:p>
             <a:fld id="{97D5A493-CCC9-418E-861C-802A9D3B9980}" type="datetimeFigureOut">
               <a:rPr lang="en-US" smtClean="0"/>
-              <a:t>2/9/2022</a:t>
+              <a:t>12/14/2022</a:t>
             </a:fld>
             <a:endParaRPr lang="en-US"/>
           </a:p>
@@ -1161,7 +1162,7 @@
           <a:p>
             <a:fld id="{97D5A493-CCC9-418E-861C-802A9D3B9980}" type="datetimeFigureOut">
               <a:rPr lang="en-US" smtClean="0"/>
-              <a:t>2/9/2022</a:t>
+              <a:t>12/14/2022</a:t>
             </a:fld>
             <a:endParaRPr lang="en-US"/>
           </a:p>
@@ -1426,7 +1427,7 @@
           <a:p>
             <a:fld id="{97D5A493-CCC9-418E-861C-802A9D3B9980}" type="datetimeFigureOut">
               <a:rPr lang="en-US" smtClean="0"/>
-              <a:t>2/9/2022</a:t>
+              <a:t>12/14/2022</a:t>
             </a:fld>
             <a:endParaRPr lang="en-US"/>
           </a:p>
@@ -1838,7 +1839,7 @@
           <a:p>
             <a:fld id="{97D5A493-CCC9-418E-861C-802A9D3B9980}" type="datetimeFigureOut">
               <a:rPr lang="en-US" smtClean="0"/>
-              <a:t>2/9/2022</a:t>
+              <a:t>12/14/2022</a:t>
             </a:fld>
             <a:endParaRPr lang="en-US"/>
           </a:p>
@@ -1979,7 +1980,7 @@
           <a:p>
             <a:fld id="{97D5A493-CCC9-418E-861C-802A9D3B9980}" type="datetimeFigureOut">
               <a:rPr lang="en-US" smtClean="0"/>
-              <a:t>2/9/2022</a:t>
+              <a:t>12/14/2022</a:t>
             </a:fld>
             <a:endParaRPr lang="en-US"/>
           </a:p>
@@ -2092,7 +2093,7 @@
           <a:p>
             <a:fld id="{97D5A493-CCC9-418E-861C-802A9D3B9980}" type="datetimeFigureOut">
               <a:rPr lang="en-US" smtClean="0"/>
-              <a:t>2/9/2022</a:t>
+              <a:t>12/14/2022</a:t>
             </a:fld>
             <a:endParaRPr lang="en-US"/>
           </a:p>
@@ -2403,7 +2404,7 @@
           <a:p>
             <a:fld id="{97D5A493-CCC9-418E-861C-802A9D3B9980}" type="datetimeFigureOut">
               <a:rPr lang="en-US" smtClean="0"/>
-              <a:t>2/9/2022</a:t>
+              <a:t>12/14/2022</a:t>
             </a:fld>
             <a:endParaRPr lang="en-US"/>
           </a:p>
@@ -2691,7 +2692,7 @@
           <a:p>
             <a:fld id="{97D5A493-CCC9-418E-861C-802A9D3B9980}" type="datetimeFigureOut">
               <a:rPr lang="en-US" smtClean="0"/>
-              <a:t>2/9/2022</a:t>
+              <a:t>12/14/2022</a:t>
             </a:fld>
             <a:endParaRPr lang="en-US"/>
           </a:p>
@@ -2932,7 +2933,7 @@
           <a:p>
             <a:fld id="{97D5A493-CCC9-418E-861C-802A9D3B9980}" type="datetimeFigureOut">
               <a:rPr lang="en-US" smtClean="0"/>
-              <a:t>2/9/2022</a:t>
+              <a:t>12/14/2022</a:t>
             </a:fld>
             <a:endParaRPr lang="en-US"/>
           </a:p>
@@ -9011,15 +9012,17 @@
           </a:fontRef>
         </p:style>
         <p:txBody>
-          <a:bodyPr rtlCol="0" anchor="ctr"/>
+          <a:bodyPr lIns="91440" tIns="45720" rIns="91440" bIns="45720" rtlCol="0" anchor="ctr"/>
           <a:lstStyle/>
           <a:p>
             <a:pPr algn="ctr"/>
             <a:r>
-              <a:rPr lang="fr-FR"/>
+              <a:rPr lang="fr-FR" b="1" dirty="0"/>
               <a:t>count</a:t>
             </a:r>
-            <a:endParaRPr lang="en-US"/>
+            <a:endParaRPr lang="en-US" b="1" dirty="0">
+              <a:cs typeface="Calibri"/>
+            </a:endParaRPr>
           </a:p>
         </p:txBody>
       </p:sp>
@@ -9117,7 +9120,13 @@
           <p:cNvGraphicFramePr>
             <a:graphicFrameLocks noGrp="1"/>
           </p:cNvGraphicFramePr>
-          <p:nvPr/>
+          <p:nvPr>
+            <p:extLst>
+              <p:ext uri="{D42A27DB-BD31-4B8C-83A1-F6EECF244321}">
+                <p14:modId xmlns:p14="http://schemas.microsoft.com/office/powerpoint/2010/main" val="3718013897"/>
+              </p:ext>
+            </p:extLst>
+          </p:nvPr>
         </p:nvGraphicFramePr>
         <p:xfrm>
           <a:off x="336282" y="1371359"/>
@@ -9144,11 +9153,16 @@
                     <a:bodyPr/>
                     <a:lstStyle/>
                     <a:p>
-                      <a:r>
-                        <a:rPr lang="fr-FR" sz="1600"/>
-                        <a:t>Row</a:t>
-                      </a:r>
-                      <a:endParaRPr lang="en-US" sz="1600"/>
+                      <a:pPr lvl="0">
+                        <a:buNone/>
+                      </a:pPr>
+                      <a:r>
+                        <a:rPr lang="fr-FR" sz="1600" b="1" i="0" u="none" strike="noStrike" noProof="0" dirty="0">
+                          <a:latin typeface="Calibri"/>
+                        </a:rPr>
+                        <a:t>RDD</a:t>
+                      </a:r>
+                      <a:endParaRPr lang="en-US" dirty="0"/>
                     </a:p>
                   </a:txBody>
                   <a:tcPr/>
@@ -9166,23 +9180,23 @@
                     <a:lstStyle/>
                     <a:p>
                       <a:r>
-                        <a:rPr lang="en-US" sz="1600"/>
+                        <a:rPr lang="en-US" sz="1600" dirty="0"/>
                         <a:t>{"</a:t>
                       </a:r>
                       <a:r>
-                        <a:rPr lang="en-US" sz="1600" err="1"/>
+                        <a:rPr lang="en-US" sz="1600" dirty="0" err="1"/>
                         <a:t>user":"John</a:t>
                       </a:r>
                       <a:r>
-                        <a:rPr lang="en-US" sz="1600"/>
+                        <a:rPr lang="en-US" sz="1600" dirty="0"/>
                         <a:t>", "</a:t>
                       </a:r>
                       <a:r>
-                        <a:rPr lang="en-US" sz="1600" err="1"/>
+                        <a:rPr lang="en-US" sz="1600" dirty="0" err="1"/>
                         <a:t>movie":"Blade</a:t>
                       </a:r>
                       <a:r>
-                        <a:rPr lang="en-US" sz="1600"/>
+                        <a:rPr lang="en-US" sz="1600" dirty="0"/>
                         <a:t> Runner", "rating":5.0}</a:t>
                       </a:r>
                     </a:p>
@@ -9202,23 +9216,23 @@
                     <a:lstStyle/>
                     <a:p>
                       <a:r>
-                        <a:rPr lang="en-US" sz="1600"/>
+                        <a:rPr lang="en-US" sz="1600" dirty="0"/>
                         <a:t>{"</a:t>
                       </a:r>
                       <a:r>
-                        <a:rPr lang="en-US" sz="1600" err="1"/>
+                        <a:rPr lang="en-US" sz="1600" dirty="0" err="1"/>
                         <a:t>user":"Louise</a:t>
                       </a:r>
                       <a:r>
-                        <a:rPr lang="en-US" sz="1600"/>
+                        <a:rPr lang="en-US" sz="1600" dirty="0"/>
                         <a:t>", "</a:t>
                       </a:r>
                       <a:r>
-                        <a:rPr lang="en-US" sz="1600" err="1"/>
+                        <a:rPr lang="en-US" sz="1600" dirty="0" err="1"/>
                         <a:t>movie":"Dirty</a:t>
                       </a:r>
                       <a:r>
-                        <a:rPr lang="en-US" sz="1600"/>
+                        <a:rPr lang="en-US" sz="1600" dirty="0"/>
                         <a:t> dancing", "rating":5.0}</a:t>
                       </a:r>
                     </a:p>
@@ -9255,23 +9269,23 @@
                         <a:defRPr/>
                       </a:pPr>
                       <a:r>
-                        <a:rPr lang="en-US" sz="1600"/>
+                        <a:rPr lang="en-US" sz="1600" dirty="0"/>
                         <a:t>{"</a:t>
                       </a:r>
                       <a:r>
-                        <a:rPr lang="en-US" sz="1600" err="1"/>
-                        <a:t>user":“Sam</a:t>
-                      </a:r>
-                      <a:r>
-                        <a:rPr lang="en-US" sz="1600"/>
+                        <a:rPr lang="en-US" sz="1600" dirty="0" err="1"/>
+                        <a:t>user":"Sam</a:t>
+                      </a:r>
+                      <a:r>
+                        <a:rPr lang="en-US" sz="1600" dirty="0"/>
                         <a:t>", "</a:t>
                       </a:r>
                       <a:r>
-                        <a:rPr lang="en-US" sz="1600" err="1"/>
-                        <a:t>movie":“Blade</a:t>
-                      </a:r>
-                      <a:r>
-                        <a:rPr lang="en-US" sz="1600"/>
+                        <a:rPr lang="en-US" sz="1600" dirty="0" err="1"/>
+                        <a:t>movie":"Blade</a:t>
+                      </a:r>
+                      <a:r>
+                        <a:rPr lang="en-US" sz="1600" dirty="0"/>
                         <a:t> Runner", "rating":3.5}</a:t>
                       </a:r>
                     </a:p>
@@ -9302,7 +9316,7 @@
         </p:nvSpPr>
         <p:spPr>
           <a:xfrm>
-            <a:off x="6096000" y="3487130"/>
+            <a:off x="6096000" y="3427197"/>
             <a:ext cx="2374085" cy="780176"/>
           </a:xfrm>
           <a:prstGeom prst="roundRect">
@@ -9326,19 +9340,21 @@
           </a:fontRef>
         </p:style>
         <p:txBody>
-          <a:bodyPr rtlCol="0" anchor="ctr"/>
+          <a:bodyPr lIns="91440" tIns="45720" rIns="91440" bIns="45720" rtlCol="0" anchor="ctr"/>
           <a:lstStyle/>
           <a:p>
             <a:pPr algn="ctr"/>
             <a:r>
-              <a:rPr lang="fr-FR" err="1"/>
+              <a:rPr lang="fr-FR" b="1" dirty="0" err="1"/>
               <a:t>take</a:t>
             </a:r>
             <a:r>
-              <a:rPr lang="fr-FR"/>
+              <a:rPr lang="fr-FR" b="1" dirty="0"/>
               <a:t>(2)</a:t>
             </a:r>
-            <a:endParaRPr lang="en-US"/>
+            <a:endParaRPr lang="en-US" b="1">
+              <a:cs typeface="Calibri"/>
+            </a:endParaRPr>
           </a:p>
         </p:txBody>
       </p:sp>
@@ -9439,7 +9455,7 @@
           <p:nvPr>
             <p:extLst>
               <p:ext uri="{D42A27DB-BD31-4B8C-83A1-F6EECF244321}">
-                <p14:modId xmlns:p14="http://schemas.microsoft.com/office/powerpoint/2010/main" val="1976910992"/>
+                <p14:modId xmlns:p14="http://schemas.microsoft.com/office/powerpoint/2010/main" val="12083945"/>
               </p:ext>
             </p:extLst>
           </p:nvPr>
@@ -9469,11 +9485,16 @@
                     <a:bodyPr/>
                     <a:lstStyle/>
                     <a:p>
-                      <a:r>
-                        <a:rPr lang="fr-FR" sz="1600"/>
-                        <a:t>Row</a:t>
-                      </a:r>
-                      <a:endParaRPr lang="en-US" sz="1600"/>
+                      <a:pPr lvl="0">
+                        <a:buNone/>
+                      </a:pPr>
+                      <a:r>
+                        <a:rPr lang="fr-FR" sz="1600" b="1" i="0" u="none" strike="noStrike" noProof="0" dirty="0" err="1">
+                          <a:latin typeface="Calibri"/>
+                        </a:rPr>
+                        <a:t>list</a:t>
+                      </a:r>
+                      <a:endParaRPr lang="en-US" dirty="0" err="1"/>
                     </a:p>
                   </a:txBody>
                   <a:tcPr/>
@@ -9491,16 +9512,16 @@
                     <a:lstStyle/>
                     <a:p>
                       <a:r>
-                        <a:rPr lang="en-US" sz="1600"/>
+                        <a:rPr lang="en-US" sz="1600" dirty="0"/>
                         <a:t>{"</a:t>
                       </a:r>
                       <a:r>
-                        <a:rPr lang="en-US" sz="1600" err="1"/>
+                        <a:rPr lang="en-US" sz="1600" dirty="0" err="1"/>
                         <a:t>user":"John</a:t>
                       </a:r>
                       <a:r>
-                        <a:rPr lang="en-US" sz="1600"/>
-                        <a:t>“}</a:t>
+                        <a:rPr lang="en-US" sz="1600" dirty="0"/>
+                        <a:t>"}</a:t>
                       </a:r>
                     </a:p>
                   </a:txBody>
@@ -9519,16 +9540,16 @@
                     <a:lstStyle/>
                     <a:p>
                       <a:r>
-                        <a:rPr lang="en-US" sz="1600"/>
+                        <a:rPr lang="en-US" sz="1600" dirty="0"/>
                         <a:t>{"</a:t>
                       </a:r>
                       <a:r>
-                        <a:rPr lang="en-US" sz="1600" err="1"/>
+                        <a:rPr lang="en-US" sz="1600" dirty="0" err="1"/>
                         <a:t>user":"Louise</a:t>
                       </a:r>
                       <a:r>
-                        <a:rPr lang="en-US" sz="1600"/>
-                        <a:t>“}</a:t>
+                        <a:rPr lang="en-US" sz="1600" dirty="0"/>
+                        <a:t>"}</a:t>
                       </a:r>
                     </a:p>
                   </a:txBody>
@@ -9559,7 +9580,7 @@
           <p:nvPr>
             <p:extLst>
               <p:ext uri="{D42A27DB-BD31-4B8C-83A1-F6EECF244321}">
-                <p14:modId xmlns:p14="http://schemas.microsoft.com/office/powerpoint/2010/main" val="3203822827"/>
+                <p14:modId xmlns:p14="http://schemas.microsoft.com/office/powerpoint/2010/main" val="1571896400"/>
               </p:ext>
             </p:extLst>
           </p:nvPr>
@@ -9589,11 +9610,16 @@
                     <a:bodyPr/>
                     <a:lstStyle/>
                     <a:p>
-                      <a:r>
-                        <a:rPr lang="fr-FR" sz="1600"/>
-                        <a:t>Row</a:t>
-                      </a:r>
-                      <a:endParaRPr lang="en-US" sz="1600"/>
+                      <a:pPr lvl="0">
+                        <a:buNone/>
+                      </a:pPr>
+                      <a:r>
+                        <a:rPr lang="fr-FR" sz="1600" b="1" i="0" u="none" strike="noStrike" noProof="0" dirty="0">
+                          <a:latin typeface="Calibri"/>
+                        </a:rPr>
+                        <a:t>RDD</a:t>
+                      </a:r>
+                      <a:endParaRPr lang="en-US" dirty="0"/>
                     </a:p>
                   </a:txBody>
                   <a:tcPr/>
@@ -9611,16 +9637,16 @@
                     <a:lstStyle/>
                     <a:p>
                       <a:r>
-                        <a:rPr lang="en-US" sz="1600"/>
+                        <a:rPr lang="en-US" sz="1600" dirty="0"/>
                         <a:t>{"</a:t>
                       </a:r>
                       <a:r>
-                        <a:rPr lang="en-US" sz="1600" err="1"/>
+                        <a:rPr lang="en-US" sz="1600" dirty="0" err="1"/>
                         <a:t>user":"John</a:t>
                       </a:r>
                       <a:r>
-                        <a:rPr lang="en-US" sz="1600"/>
-                        <a:t>“}</a:t>
+                        <a:rPr lang="en-US" sz="1600" dirty="0"/>
+                        <a:t>"}</a:t>
                       </a:r>
                     </a:p>
                   </a:txBody>
@@ -9639,16 +9665,16 @@
                     <a:lstStyle/>
                     <a:p>
                       <a:r>
-                        <a:rPr lang="en-US" sz="1600"/>
+                        <a:rPr lang="en-US" sz="1600" dirty="0"/>
                         <a:t>{"</a:t>
                       </a:r>
                       <a:r>
-                        <a:rPr lang="en-US" sz="1600" err="1"/>
+                        <a:rPr lang="en-US" sz="1600" dirty="0" err="1"/>
                         <a:t>user":"Louise</a:t>
                       </a:r>
                       <a:r>
-                        <a:rPr lang="en-US" sz="1600"/>
-                        <a:t>“}</a:t>
+                        <a:rPr lang="en-US" sz="1600" dirty="0"/>
+                        <a:t>"}</a:t>
                       </a:r>
                     </a:p>
                   </a:txBody>
@@ -9684,16 +9710,16 @@
                         <a:defRPr/>
                       </a:pPr>
                       <a:r>
-                        <a:rPr lang="en-US" sz="1600"/>
+                        <a:rPr lang="en-US" sz="1600" dirty="0"/>
                         <a:t>{"</a:t>
                       </a:r>
                       <a:r>
-                        <a:rPr lang="en-US" sz="1600" err="1"/>
-                        <a:t>user":“Sam</a:t>
-                      </a:r>
-                      <a:r>
-                        <a:rPr lang="en-US" sz="1600"/>
-                        <a:t>“}</a:t>
+                        <a:rPr lang="en-US" sz="1600" dirty="0" err="1"/>
+                        <a:t>user":"Sam</a:t>
+                      </a:r>
+                      <a:r>
+                        <a:rPr lang="en-US" sz="1600" dirty="0"/>
+                        <a:t>"}</a:t>
                       </a:r>
                     </a:p>
                   </a:txBody>
@@ -9783,19 +9809,21 @@
           </a:fontRef>
         </p:style>
         <p:txBody>
-          <a:bodyPr rtlCol="0" anchor="ctr"/>
+          <a:bodyPr lIns="91440" tIns="45720" rIns="91440" bIns="45720" rtlCol="0" anchor="ctr"/>
           <a:lstStyle/>
           <a:p>
             <a:pPr algn="ctr"/>
             <a:r>
-              <a:rPr lang="fr-FR" err="1"/>
+              <a:rPr lang="fr-FR" b="1" dirty="0" err="1"/>
               <a:t>collect</a:t>
             </a:r>
             <a:r>
-              <a:rPr lang="fr-FR"/>
+              <a:rPr lang="fr-FR" b="1" dirty="0"/>
               <a:t>()</a:t>
             </a:r>
-            <a:endParaRPr lang="en-US"/>
+            <a:endParaRPr lang="en-US" b="1" dirty="0">
+              <a:cs typeface="Calibri"/>
+            </a:endParaRPr>
           </a:p>
         </p:txBody>
       </p:sp>
@@ -9896,7 +9924,7 @@
           <p:nvPr>
             <p:extLst>
               <p:ext uri="{D42A27DB-BD31-4B8C-83A1-F6EECF244321}">
-                <p14:modId xmlns:p14="http://schemas.microsoft.com/office/powerpoint/2010/main" val="2817214379"/>
+                <p14:modId xmlns:p14="http://schemas.microsoft.com/office/powerpoint/2010/main" val="2250449775"/>
               </p:ext>
             </p:extLst>
           </p:nvPr>
@@ -9926,11 +9954,16 @@
                     <a:bodyPr/>
                     <a:lstStyle/>
                     <a:p>
-                      <a:r>
-                        <a:rPr lang="fr-FR" sz="1600"/>
-                        <a:t>Row</a:t>
-                      </a:r>
-                      <a:endParaRPr lang="en-US" sz="1600"/>
+                      <a:pPr lvl="0">
+                        <a:buNone/>
+                      </a:pPr>
+                      <a:r>
+                        <a:rPr lang="fr-FR" sz="1600" b="1" i="0" u="none" strike="noStrike" noProof="0" dirty="0">
+                          <a:latin typeface="Calibri"/>
+                        </a:rPr>
+                        <a:t>RDD</a:t>
+                      </a:r>
+                      <a:endParaRPr lang="en-US" dirty="0"/>
                     </a:p>
                   </a:txBody>
                   <a:tcPr/>
@@ -9948,16 +9981,16 @@
                     <a:lstStyle/>
                     <a:p>
                       <a:r>
-                        <a:rPr lang="en-US" sz="1600"/>
+                        <a:rPr lang="en-US" sz="1600" dirty="0"/>
                         <a:t>{"</a:t>
                       </a:r>
                       <a:r>
-                        <a:rPr lang="en-US" sz="1600" err="1"/>
+                        <a:rPr lang="en-US" sz="1600" dirty="0" err="1"/>
                         <a:t>user":"John</a:t>
                       </a:r>
                       <a:r>
-                        <a:rPr lang="en-US" sz="1600"/>
-                        <a:t>“}</a:t>
+                        <a:rPr lang="en-US" sz="1600" dirty="0"/>
+                        <a:t>"}</a:t>
                       </a:r>
                     </a:p>
                   </a:txBody>
@@ -9976,7 +10009,7 @@
                     <a:lstStyle/>
                     <a:p>
                       <a:r>
-                        <a:rPr lang="en-US" sz="1600"/>
+                        <a:rPr lang="en-US" sz="1600" dirty="0"/>
                         <a:t>….</a:t>
                       </a:r>
                     </a:p>
@@ -10013,16 +10046,16 @@
                         <a:defRPr/>
                       </a:pPr>
                       <a:r>
-                        <a:rPr lang="en-US" sz="1600"/>
+                        <a:rPr lang="en-US" sz="1600" dirty="0"/>
                         <a:t>{"</a:t>
                       </a:r>
                       <a:r>
-                        <a:rPr lang="en-US" sz="1600" err="1"/>
-                        <a:t>user":“Sam</a:t>
-                      </a:r>
-                      <a:r>
-                        <a:rPr lang="en-US" sz="1600"/>
-                        <a:t>“}</a:t>
+                        <a:rPr lang="en-US" sz="1600" dirty="0" err="1"/>
+                        <a:t>user":"Sam</a:t>
+                      </a:r>
+                      <a:r>
+                        <a:rPr lang="en-US" sz="1600" dirty="0"/>
+                        <a:t>"}</a:t>
                       </a:r>
                     </a:p>
                   </a:txBody>
@@ -10053,7 +10086,7 @@
           <p:nvPr>
             <p:extLst>
               <p:ext uri="{D42A27DB-BD31-4B8C-83A1-F6EECF244321}">
-                <p14:modId xmlns:p14="http://schemas.microsoft.com/office/powerpoint/2010/main" val="1945901971"/>
+                <p14:modId xmlns:p14="http://schemas.microsoft.com/office/powerpoint/2010/main" val="27994726"/>
               </p:ext>
             </p:extLst>
           </p:nvPr>
@@ -10083,11 +10116,16 @@
                     <a:bodyPr/>
                     <a:lstStyle/>
                     <a:p>
-                      <a:r>
-                        <a:rPr lang="fr-FR" sz="1600"/>
-                        <a:t>Row</a:t>
-                      </a:r>
-                      <a:endParaRPr lang="en-US" sz="1600"/>
+                      <a:pPr lvl="0">
+                        <a:buNone/>
+                      </a:pPr>
+                      <a:r>
+                        <a:rPr lang="fr-FR" sz="1600" b="1" i="0" u="none" strike="noStrike" noProof="0" dirty="0" err="1">
+                          <a:latin typeface="Calibri"/>
+                        </a:rPr>
+                        <a:t>list</a:t>
+                      </a:r>
+                      <a:endParaRPr lang="en-US" dirty="0" err="1"/>
                     </a:p>
                   </a:txBody>
                   <a:tcPr/>
@@ -10105,16 +10143,16 @@
                     <a:lstStyle/>
                     <a:p>
                       <a:r>
-                        <a:rPr lang="en-US" sz="1600"/>
+                        <a:rPr lang="en-US" sz="1600" dirty="0"/>
                         <a:t>{"</a:t>
                       </a:r>
                       <a:r>
-                        <a:rPr lang="en-US" sz="1600" err="1"/>
+                        <a:rPr lang="en-US" sz="1600" dirty="0" err="1"/>
                         <a:t>user":"John</a:t>
                       </a:r>
                       <a:r>
-                        <a:rPr lang="en-US" sz="1600"/>
-                        <a:t>“}</a:t>
+                        <a:rPr lang="en-US" sz="1600" dirty="0"/>
+                        <a:t>"}</a:t>
                       </a:r>
                     </a:p>
                   </a:txBody>
@@ -10133,7 +10171,7 @@
                     <a:lstStyle/>
                     <a:p>
                       <a:r>
-                        <a:rPr lang="en-US" sz="1600"/>
+                        <a:rPr lang="en-US" sz="1600" dirty="0"/>
                         <a:t>….</a:t>
                       </a:r>
                     </a:p>
@@ -10170,16 +10208,16 @@
                         <a:defRPr/>
                       </a:pPr>
                       <a:r>
-                        <a:rPr lang="en-US" sz="1600"/>
+                        <a:rPr lang="en-US" sz="1600" dirty="0"/>
                         <a:t>{"</a:t>
                       </a:r>
                       <a:r>
-                        <a:rPr lang="en-US" sz="1600" err="1"/>
-                        <a:t>user":“Sam</a:t>
-                      </a:r>
-                      <a:r>
-                        <a:rPr lang="en-US" sz="1600"/>
-                        <a:t>“}</a:t>
+                        <a:rPr lang="en-US" sz="1600" dirty="0" err="1"/>
+                        <a:t>user":"Sam</a:t>
+                      </a:r>
+                      <a:r>
+                        <a:rPr lang="en-US" sz="1600" dirty="0"/>
+                        <a:t>"}</a:t>
                       </a:r>
                     </a:p>
                   </a:txBody>
@@ -10501,37 +10539,37 @@
           </a:fontRef>
         </p:style>
         <p:txBody>
-          <a:bodyPr rtlCol="0" anchor="ctr"/>
+          <a:bodyPr lIns="91440" tIns="45720" rIns="91440" bIns="45720" rtlCol="0" anchor="ctr"/>
           <a:lstStyle/>
           <a:p>
             <a:pPr algn="ctr"/>
             <a:r>
-              <a:rPr lang="fr-FR" err="1"/>
+              <a:rPr lang="fr-FR" b="1" dirty="0" err="1"/>
               <a:t>map</a:t>
             </a:r>
             <a:r>
-              <a:rPr lang="fr-FR"/>
+              <a:rPr lang="fr-FR" b="1" dirty="0"/>
               <a:t>(lambda: x</a:t>
             </a:r>
             <a:r>
-              <a:rPr lang="fr-FR">
+              <a:rPr lang="fr-FR" b="1" dirty="0">
                 <a:sym typeface="Wingdings" panose="05000000000000000000" pitchFamily="2" charset="2"/>
               </a:rPr>
-              <a:t> x[‘</a:t>
-            </a:r>
-            <a:r>
-              <a:rPr lang="fr-FR" err="1">
+              <a:t> x['</a:t>
+            </a:r>
+            <a:r>
+              <a:rPr lang="fr-FR" b="1" dirty="0" err="1">
                 <a:sym typeface="Wingdings" panose="05000000000000000000" pitchFamily="2" charset="2"/>
               </a:rPr>
               <a:t>movie</a:t>
             </a:r>
             <a:r>
-              <a:rPr lang="fr-FR">
+              <a:rPr lang="fr-FR" b="1" dirty="0">
                 <a:sym typeface="Wingdings" panose="05000000000000000000" pitchFamily="2" charset="2"/>
               </a:rPr>
-              <a:t>’])</a:t>
-            </a:r>
-            <a:endParaRPr lang="en-US"/>
+              <a:t>'])</a:t>
+            </a:r>
+            <a:endParaRPr lang="en-US" b="1" dirty="0"/>
           </a:p>
         </p:txBody>
       </p:sp>
@@ -10632,14 +10670,14 @@
           <p:nvPr>
             <p:extLst>
               <p:ext uri="{D42A27DB-BD31-4B8C-83A1-F6EECF244321}">
-                <p14:modId xmlns:p14="http://schemas.microsoft.com/office/powerpoint/2010/main" val="2515917153"/>
+                <p14:modId xmlns:p14="http://schemas.microsoft.com/office/powerpoint/2010/main" val="1367173784"/>
               </p:ext>
             </p:extLst>
           </p:nvPr>
         </p:nvGraphicFramePr>
         <p:xfrm>
           <a:off x="9167069" y="1377072"/>
-          <a:ext cx="1435267" cy="1479749"/>
+          <a:ext cx="1829135" cy="1479749"/>
         </p:xfrm>
         <a:graphic>
           <a:graphicData uri="http://schemas.openxmlformats.org/drawingml/2006/table">
@@ -10648,7 +10686,7 @@
                 <a:tableStyleId>{5C22544A-7EE6-4342-B048-85BDC9FD1C3A}</a:tableStyleId>
               </a:tblPr>
               <a:tblGrid>
-                <a:gridCol w="1435267">
+                <a:gridCol w="1829135">
                   <a:extLst>
                     <a:ext uri="{9D8B030D-6E8A-4147-A177-3AD203B41FA5}">
                       <a16:colId xmlns:a16="http://schemas.microsoft.com/office/drawing/2014/main" val="2061391393"/>
@@ -10662,11 +10700,16 @@
                     <a:bodyPr/>
                     <a:lstStyle/>
                     <a:p>
-                      <a:r>
-                        <a:rPr lang="fr-FR" sz="1600"/>
-                        <a:t>Row</a:t>
-                      </a:r>
-                      <a:endParaRPr lang="en-US" sz="1600"/>
+                      <a:pPr lvl="0">
+                        <a:buNone/>
+                      </a:pPr>
+                      <a:r>
+                        <a:rPr lang="fr-FR" sz="1600" b="1" i="0" u="none" strike="noStrike" noProof="0" dirty="0">
+                          <a:latin typeface="Calibri"/>
+                        </a:rPr>
+                        <a:t>RDD</a:t>
+                      </a:r>
+                      <a:endParaRPr lang="en-US" dirty="0"/>
                     </a:p>
                   </a:txBody>
                   <a:tcPr/>
@@ -10684,10 +10727,10 @@
                     <a:lstStyle/>
                     <a:p>
                       <a:r>
-                        <a:rPr lang="fr-FR" sz="1600"/>
-                        <a:t>Blade Runner</a:t>
-                      </a:r>
-                      <a:endParaRPr lang="en-US" sz="1600"/>
+                        <a:rPr lang="fr-FR" sz="1600" dirty="0"/>
+                        <a:t>"Blade Runner"</a:t>
+                      </a:r>
+                      <a:endParaRPr lang="en-US" sz="1600" dirty="0"/>
                     </a:p>
                   </a:txBody>
                   <a:tcPr/>
@@ -10705,10 +10748,10 @@
                     <a:lstStyle/>
                     <a:p>
                       <a:r>
-                        <a:rPr lang="fr-FR" sz="1600"/>
-                        <a:t>Dirty Dancing</a:t>
-                      </a:r>
-                      <a:endParaRPr lang="en-US" sz="1600"/>
+                        <a:rPr lang="fr-FR" sz="1600" dirty="0"/>
+                        <a:t>"Dirty Dancing"</a:t>
+                      </a:r>
+                      <a:endParaRPr lang="en-US" sz="1600" dirty="0"/>
                     </a:p>
                   </a:txBody>
                   <a:tcPr/>
@@ -10743,10 +10786,10 @@
                         <a:defRPr/>
                       </a:pPr>
                       <a:r>
-                        <a:rPr lang="fr-FR" sz="1600"/>
-                        <a:t>Blade Runner</a:t>
-                      </a:r>
-                      <a:endParaRPr lang="en-US" sz="1600"/>
+                        <a:rPr lang="fr-FR" sz="1600" dirty="0"/>
+                        <a:t>"Blade Runner"</a:t>
+                      </a:r>
+                      <a:endParaRPr lang="en-US" sz="1600" dirty="0"/>
                     </a:p>
                   </a:txBody>
                   <a:tcPr/>
@@ -10776,7 +10819,7 @@
           <p:nvPr>
             <p:extLst>
               <p:ext uri="{D42A27DB-BD31-4B8C-83A1-F6EECF244321}">
-                <p14:modId xmlns:p14="http://schemas.microsoft.com/office/powerpoint/2010/main" val="3266313943"/>
+                <p14:modId xmlns:p14="http://schemas.microsoft.com/office/powerpoint/2010/main" val="3847335304"/>
               </p:ext>
             </p:extLst>
           </p:nvPr>
@@ -10806,11 +10849,16 @@
                     <a:bodyPr/>
                     <a:lstStyle/>
                     <a:p>
-                      <a:r>
-                        <a:rPr lang="fr-FR" sz="1600"/>
-                        <a:t>Row</a:t>
-                      </a:r>
-                      <a:endParaRPr lang="en-US" sz="1600"/>
+                      <a:pPr lvl="0">
+                        <a:buNone/>
+                      </a:pPr>
+                      <a:r>
+                        <a:rPr lang="fr-FR" sz="1600" b="1" i="0" u="none" strike="noStrike" noProof="0" dirty="0">
+                          <a:latin typeface="Calibri"/>
+                        </a:rPr>
+                        <a:t>RDD</a:t>
+                      </a:r>
+                      <a:endParaRPr lang="en-US" dirty="0"/>
                     </a:p>
                   </a:txBody>
                   <a:tcPr/>
@@ -10828,23 +10876,23 @@
                     <a:lstStyle/>
                     <a:p>
                       <a:r>
-                        <a:rPr lang="en-US" sz="1600"/>
+                        <a:rPr lang="en-US" sz="1600" dirty="0"/>
                         <a:t>{"</a:t>
                       </a:r>
                       <a:r>
-                        <a:rPr lang="en-US" sz="1600" err="1"/>
+                        <a:rPr lang="en-US" sz="1600" dirty="0" err="1"/>
                         <a:t>user":"John</a:t>
                       </a:r>
                       <a:r>
-                        <a:rPr lang="en-US" sz="1600"/>
+                        <a:rPr lang="en-US" sz="1600" dirty="0"/>
                         <a:t>", "</a:t>
                       </a:r>
                       <a:r>
-                        <a:rPr lang="en-US" sz="1600" err="1"/>
+                        <a:rPr lang="en-US" sz="1600" dirty="0" err="1"/>
                         <a:t>movie":"Blade</a:t>
                       </a:r>
                       <a:r>
-                        <a:rPr lang="en-US" sz="1600"/>
+                        <a:rPr lang="en-US" sz="1600" dirty="0"/>
                         <a:t> Runner", "rating":5.0}</a:t>
                       </a:r>
                     </a:p>
@@ -10864,23 +10912,23 @@
                     <a:lstStyle/>
                     <a:p>
                       <a:r>
-                        <a:rPr lang="en-US" sz="1600"/>
+                        <a:rPr lang="en-US" sz="1600" dirty="0"/>
                         <a:t>{"</a:t>
                       </a:r>
                       <a:r>
-                        <a:rPr lang="en-US" sz="1600" err="1"/>
+                        <a:rPr lang="en-US" sz="1600" dirty="0" err="1"/>
                         <a:t>user":"Louise</a:t>
                       </a:r>
                       <a:r>
-                        <a:rPr lang="en-US" sz="1600"/>
+                        <a:rPr lang="en-US" sz="1600" dirty="0"/>
                         <a:t>", "</a:t>
                       </a:r>
                       <a:r>
-                        <a:rPr lang="en-US" sz="1600" err="1"/>
+                        <a:rPr lang="en-US" sz="1600" dirty="0" err="1"/>
                         <a:t>movie":"Dirty</a:t>
                       </a:r>
                       <a:r>
-                        <a:rPr lang="en-US" sz="1600"/>
+                        <a:rPr lang="en-US" sz="1600" dirty="0"/>
                         <a:t> dancing", "rating":5.0}</a:t>
                       </a:r>
                     </a:p>
@@ -10917,23 +10965,23 @@
                         <a:defRPr/>
                       </a:pPr>
                       <a:r>
-                        <a:rPr lang="en-US" sz="1600"/>
+                        <a:rPr lang="en-US" sz="1600" dirty="0"/>
                         <a:t>{"</a:t>
                       </a:r>
                       <a:r>
-                        <a:rPr lang="en-US" sz="1600" err="1"/>
-                        <a:t>user":“Sam</a:t>
-                      </a:r>
-                      <a:r>
-                        <a:rPr lang="en-US" sz="1600"/>
+                        <a:rPr lang="en-US" sz="1600" dirty="0" err="1"/>
+                        <a:t>user":"Sam</a:t>
+                      </a:r>
+                      <a:r>
+                        <a:rPr lang="en-US" sz="1600" dirty="0"/>
                         <a:t>", "</a:t>
                       </a:r>
                       <a:r>
-                        <a:rPr lang="en-US" sz="1600" err="1"/>
-                        <a:t>movie":“Blade</a:t>
-                      </a:r>
-                      <a:r>
-                        <a:rPr lang="en-US" sz="1600"/>
+                        <a:rPr lang="en-US" sz="1600" dirty="0" err="1"/>
+                        <a:t>movie":"Blade</a:t>
+                      </a:r>
+                      <a:r>
+                        <a:rPr lang="en-US" sz="1600" dirty="0"/>
                         <a:t> Runner", "rating":3.5}</a:t>
                       </a:r>
                     </a:p>
@@ -10988,37 +11036,37 @@
           </a:fontRef>
         </p:style>
         <p:txBody>
-          <a:bodyPr rtlCol="0" anchor="ctr"/>
+          <a:bodyPr lIns="91440" tIns="45720" rIns="91440" bIns="45720" rtlCol="0" anchor="ctr"/>
           <a:lstStyle/>
           <a:p>
             <a:pPr algn="ctr"/>
             <a:r>
-              <a:rPr lang="fr-FR" err="1"/>
+              <a:rPr lang="fr-FR" b="1" dirty="0" err="1"/>
               <a:t>mapValues</a:t>
             </a:r>
             <a:r>
-              <a:rPr lang="fr-FR"/>
-              <a:t>(lambda x: </a:t>
-            </a:r>
-            <a:r>
-              <a:rPr lang="fr-FR">
+              <a:rPr lang="fr-FR" b="1" dirty="0"/>
+              <a:t>(lambda x: </a:t>
+            </a:r>
+            <a:r>
+              <a:rPr lang="fr-FR" b="1" dirty="0">
                 <a:sym typeface="Wingdings" panose="05000000000000000000" pitchFamily="2" charset="2"/>
               </a:rPr>
               <a:t> </a:t>
             </a:r>
             <a:r>
-              <a:rPr lang="fr-FR" err="1">
+              <a:rPr lang="fr-FR" b="1" dirty="0" err="1">
                 <a:sym typeface="Wingdings" panose="05000000000000000000" pitchFamily="2" charset="2"/>
               </a:rPr>
               <a:t>len</a:t>
             </a:r>
             <a:r>
-              <a:rPr lang="fr-FR">
+              <a:rPr lang="fr-FR" b="1" dirty="0">
                 <a:sym typeface="Wingdings" panose="05000000000000000000" pitchFamily="2" charset="2"/>
               </a:rPr>
               <a:t>(x[1]))</a:t>
             </a:r>
-            <a:endParaRPr lang="en-US"/>
+            <a:endParaRPr lang="en-US" b="1" dirty="0"/>
           </a:p>
         </p:txBody>
       </p:sp>
@@ -11119,14 +11167,14 @@
           <p:nvPr>
             <p:extLst>
               <p:ext uri="{D42A27DB-BD31-4B8C-83A1-F6EECF244321}">
-                <p14:modId xmlns:p14="http://schemas.microsoft.com/office/powerpoint/2010/main" val="1576811487"/>
+                <p14:modId xmlns:p14="http://schemas.microsoft.com/office/powerpoint/2010/main" val="3008244716"/>
               </p:ext>
             </p:extLst>
           </p:nvPr>
         </p:nvGraphicFramePr>
         <p:xfrm>
           <a:off x="9167069" y="3094735"/>
-          <a:ext cx="1435267" cy="1479749"/>
+          <a:ext cx="1923321" cy="1584960"/>
         </p:xfrm>
         <a:graphic>
           <a:graphicData uri="http://schemas.openxmlformats.org/drawingml/2006/table">
@@ -11135,7 +11183,7 @@
                 <a:tableStyleId>{5C22544A-7EE6-4342-B048-85BDC9FD1C3A}</a:tableStyleId>
               </a:tblPr>
               <a:tblGrid>
-                <a:gridCol w="1435267">
+                <a:gridCol w="1923321">
                   <a:extLst>
                     <a:ext uri="{9D8B030D-6E8A-4147-A177-3AD203B41FA5}">
                       <a16:colId xmlns:a16="http://schemas.microsoft.com/office/drawing/2014/main" val="2061391393"/>
@@ -11149,11 +11197,30 @@
                     <a:bodyPr/>
                     <a:lstStyle/>
                     <a:p>
-                      <a:r>
-                        <a:rPr lang="fr-FR" sz="1600"/>
-                        <a:t>Row</a:t>
-                      </a:r>
-                      <a:endParaRPr lang="en-US" sz="1600"/>
+                      <a:pPr lvl="0" algn="l">
+                        <a:lnSpc>
+                          <a:spcPct val="100000"/>
+                        </a:lnSpc>
+                        <a:spcBef>
+                          <a:spcPts val="0"/>
+                        </a:spcBef>
+                        <a:spcAft>
+                          <a:spcPts val="0"/>
+                        </a:spcAft>
+                        <a:buNone/>
+                      </a:pPr>
+                      <a:r>
+                        <a:rPr lang="fr-FR" sz="1600" b="1" i="0" u="none" strike="noStrike" noProof="0" dirty="0">
+                          <a:latin typeface="Calibri"/>
+                        </a:rPr>
+                        <a:t>RDD of (K, V) pairs</a:t>
+                      </a:r>
+                    </a:p>
+                    <a:p>
+                      <a:pPr lvl="0">
+                        <a:buNone/>
+                      </a:pPr>
+                      <a:endParaRPr lang="fr-FR" sz="1600" dirty="0"/>
                     </a:p>
                   </a:txBody>
                   <a:tcPr/>
@@ -11171,12 +11238,12 @@
                     <a:lstStyle/>
                     <a:p>
                       <a:r>
-                        <a:rPr lang="fr-FR" sz="1600"/>
+                        <a:rPr lang="fr-FR" sz="1600" dirty="0"/>
                         <a:t>(</a:t>
                       </a:r>
                       <a:r>
-                        <a:rPr lang="en-US" sz="1600"/>
-                        <a:t>"John“, 12)</a:t>
+                        <a:rPr lang="en-US" sz="1600" dirty="0"/>
+                        <a:t>"John", 12)</a:t>
                       </a:r>
                     </a:p>
                   </a:txBody>
@@ -11195,12 +11262,12 @@
                     <a:lstStyle/>
                     <a:p>
                       <a:r>
-                        <a:rPr lang="fr-FR" sz="1600"/>
-                        <a:t>(</a:t>
-                      </a:r>
-                      <a:r>
-                        <a:rPr lang="en-US" sz="1600"/>
-                        <a:t>“Louise“, 13)</a:t>
+                        <a:rPr lang="fr-FR" sz="1600" dirty="0"/>
+                        <a:t>("</a:t>
+                      </a:r>
+                      <a:r>
+                        <a:rPr lang="en-US" sz="1600" dirty="0"/>
+                        <a:t>Louise", 13)</a:t>
                       </a:r>
                     </a:p>
                   </a:txBody>
@@ -11219,12 +11286,12 @@
                     <a:lstStyle/>
                     <a:p>
                       <a:r>
-                        <a:rPr lang="fr-FR" sz="1600"/>
-                        <a:t>(</a:t>
-                      </a:r>
-                      <a:r>
-                        <a:rPr lang="en-US" sz="1600"/>
-                        <a:t>“Sam“, 12)</a:t>
+                        <a:rPr lang="fr-FR" sz="1600" dirty="0"/>
+                        <a:t>("</a:t>
+                      </a:r>
+                      <a:r>
+                        <a:rPr lang="en-US" sz="1600" dirty="0"/>
+                        <a:t>Sam", 12)</a:t>
                       </a:r>
                     </a:p>
                   </a:txBody>
@@ -11255,7 +11322,7 @@
           <p:nvPr>
             <p:extLst>
               <p:ext uri="{D42A27DB-BD31-4B8C-83A1-F6EECF244321}">
-                <p14:modId xmlns:p14="http://schemas.microsoft.com/office/powerpoint/2010/main" val="3697608656"/>
+                <p14:modId xmlns:p14="http://schemas.microsoft.com/office/powerpoint/2010/main" val="3433902006"/>
               </p:ext>
             </p:extLst>
           </p:nvPr>
@@ -11285,11 +11352,22 @@
                     <a:bodyPr/>
                     <a:lstStyle/>
                     <a:p>
-                      <a:r>
-                        <a:rPr lang="fr-FR" sz="1600"/>
-                        <a:t>Row</a:t>
-                      </a:r>
-                      <a:endParaRPr lang="en-US" sz="1600"/>
+                      <a:pPr lvl="0" algn="l">
+                        <a:lnSpc>
+                          <a:spcPct val="100000"/>
+                        </a:lnSpc>
+                        <a:spcBef>
+                          <a:spcPts val="0"/>
+                        </a:spcBef>
+                        <a:spcAft>
+                          <a:spcPts val="0"/>
+                        </a:spcAft>
+                        <a:buNone/>
+                      </a:pPr>
+                      <a:r>
+                        <a:rPr lang="fr-FR" sz="1600" b="1" i="0" u="none" strike="noStrike" noProof="0" dirty="0"/>
+                        <a:t>RDD of (K, V) pairs</a:t>
+                      </a:r>
                     </a:p>
                   </a:txBody>
                   <a:tcPr/>
@@ -11307,7 +11385,7 @@
                     <a:lstStyle/>
                     <a:p>
                       <a:r>
-                        <a:rPr lang="en-US" sz="1600"/>
+                        <a:rPr lang="en-US" sz="1600" dirty="0"/>
                         <a:t>("John", "Blade Runner")</a:t>
                       </a:r>
                     </a:p>
@@ -11327,8 +11405,8 @@
                     <a:lstStyle/>
                     <a:p>
                       <a:r>
-                        <a:rPr lang="en-US" sz="1600"/>
-                        <a:t>("Louise“, "Dirty dancing")</a:t>
+                        <a:rPr lang="en-US" sz="1600" dirty="0"/>
+                        <a:t>("Louise", "Dirty dancing")</a:t>
                       </a:r>
                     </a:p>
                   </a:txBody>
@@ -11364,8 +11442,8 @@
                         <a:defRPr/>
                       </a:pPr>
                       <a:r>
-                        <a:rPr lang="en-US" sz="1600"/>
-                        <a:t>(“Sam“, “Blade Runner")</a:t>
+                        <a:rPr lang="en-US" sz="1600" dirty="0"/>
+                        <a:t>("Sam“, "Blade Runner")</a:t>
                       </a:r>
                     </a:p>
                   </a:txBody>
@@ -11419,25 +11497,25 @@
           </a:fontRef>
         </p:style>
         <p:txBody>
-          <a:bodyPr rtlCol="0" anchor="ctr"/>
+          <a:bodyPr lIns="91440" tIns="45720" rIns="91440" bIns="45720" rtlCol="0" anchor="ctr"/>
           <a:lstStyle/>
           <a:p>
             <a:pPr algn="ctr"/>
             <a:r>
-              <a:rPr lang="fr-FR" err="1"/>
+              <a:rPr lang="fr-FR" b="1" dirty="0" err="1"/>
               <a:t>filter</a:t>
             </a:r>
             <a:r>
-              <a:rPr lang="fr-FR"/>
+              <a:rPr lang="fr-FR" b="1" dirty="0"/>
               <a:t>(lambda x:</a:t>
             </a:r>
             <a:r>
-              <a:rPr lang="fr-FR">
+              <a:rPr lang="fr-FR" b="1" dirty="0">
                 <a:sym typeface="Wingdings" panose="05000000000000000000" pitchFamily="2" charset="2"/>
               </a:rPr>
-              <a:t> x[‘rating’]&gt;4.0)</a:t>
-            </a:r>
-            <a:endParaRPr lang="en-US"/>
+              <a:t> x['rating']&gt;4.0)</a:t>
+            </a:r>
+            <a:endParaRPr lang="en-US" b="1" dirty="0"/>
           </a:p>
         </p:txBody>
       </p:sp>
@@ -11538,7 +11616,7 @@
           <p:nvPr>
             <p:extLst>
               <p:ext uri="{D42A27DB-BD31-4B8C-83A1-F6EECF244321}">
-                <p14:modId xmlns:p14="http://schemas.microsoft.com/office/powerpoint/2010/main" val="857981943"/>
+                <p14:modId xmlns:p14="http://schemas.microsoft.com/office/powerpoint/2010/main" val="1039612278"/>
               </p:ext>
             </p:extLst>
           </p:nvPr>
@@ -11568,11 +11646,16 @@
                     <a:bodyPr/>
                     <a:lstStyle/>
                     <a:p>
-                      <a:r>
-                        <a:rPr lang="fr-FR" sz="1600"/>
-                        <a:t>Row</a:t>
-                      </a:r>
-                      <a:endParaRPr lang="en-US" sz="1600"/>
+                      <a:pPr lvl="0">
+                        <a:buNone/>
+                      </a:pPr>
+                      <a:r>
+                        <a:rPr lang="fr-FR" sz="1600" b="1" i="0" u="none" strike="noStrike" noProof="0" dirty="0">
+                          <a:latin typeface="Calibri"/>
+                        </a:rPr>
+                        <a:t>RDD</a:t>
+                      </a:r>
+                      <a:endParaRPr lang="en-US" dirty="0"/>
                     </a:p>
                   </a:txBody>
                   <a:tcPr/>
@@ -11590,23 +11673,23 @@
                     <a:lstStyle/>
                     <a:p>
                       <a:r>
-                        <a:rPr lang="en-US" sz="1600"/>
+                        <a:rPr lang="en-US" sz="1600" dirty="0"/>
                         <a:t>{"</a:t>
                       </a:r>
                       <a:r>
-                        <a:rPr lang="en-US" sz="1600" err="1"/>
+                        <a:rPr lang="en-US" sz="1600" dirty="0" err="1"/>
                         <a:t>user":"John</a:t>
                       </a:r>
                       <a:r>
-                        <a:rPr lang="en-US" sz="1600"/>
+                        <a:rPr lang="en-US" sz="1600" dirty="0"/>
                         <a:t>", "</a:t>
                       </a:r>
                       <a:r>
-                        <a:rPr lang="en-US" sz="1600" err="1"/>
+                        <a:rPr lang="en-US" sz="1600" dirty="0" err="1"/>
                         <a:t>movie":"Bl</a:t>
                       </a:r>
                       <a:r>
-                        <a:rPr lang="en-US" sz="1600"/>
+                        <a:rPr lang="en-US" sz="1600" dirty="0"/>
                         <a:t>…</a:t>
                       </a:r>
                     </a:p>
@@ -11626,23 +11709,23 @@
                     <a:lstStyle/>
                     <a:p>
                       <a:r>
-                        <a:rPr lang="en-US" sz="1600"/>
+                        <a:rPr lang="en-US" sz="1600" dirty="0"/>
                         <a:t>{"</a:t>
                       </a:r>
                       <a:r>
-                        <a:rPr lang="en-US" sz="1600" err="1"/>
+                        <a:rPr lang="en-US" sz="1600" dirty="0" err="1"/>
                         <a:t>user":"Louise</a:t>
                       </a:r>
                       <a:r>
-                        <a:rPr lang="en-US" sz="1600"/>
+                        <a:rPr lang="en-US" sz="1600" dirty="0"/>
                         <a:t>", "</a:t>
                       </a:r>
                       <a:r>
-                        <a:rPr lang="en-US" sz="1600" err="1"/>
+                        <a:rPr lang="en-US" sz="1600" dirty="0" err="1"/>
                         <a:t>movie":"Dir</a:t>
                       </a:r>
                       <a:r>
-                        <a:rPr lang="en-US" sz="1600"/>
+                        <a:rPr lang="en-US" sz="1600" dirty="0"/>
                         <a:t>…</a:t>
                       </a:r>
                     </a:p>
@@ -11674,7 +11757,7 @@
           <p:nvPr>
             <p:extLst>
               <p:ext uri="{D42A27DB-BD31-4B8C-83A1-F6EECF244321}">
-                <p14:modId xmlns:p14="http://schemas.microsoft.com/office/powerpoint/2010/main" val="2990560406"/>
+                <p14:modId xmlns:p14="http://schemas.microsoft.com/office/powerpoint/2010/main" val="837293288"/>
               </p:ext>
             </p:extLst>
           </p:nvPr>
@@ -11704,11 +11787,16 @@
                     <a:bodyPr/>
                     <a:lstStyle/>
                     <a:p>
-                      <a:r>
-                        <a:rPr lang="fr-FR" sz="1600"/>
-                        <a:t>Row</a:t>
-                      </a:r>
-                      <a:endParaRPr lang="en-US" sz="1600"/>
+                      <a:pPr lvl="0">
+                        <a:buNone/>
+                      </a:pPr>
+                      <a:r>
+                        <a:rPr lang="fr-FR" sz="1600" b="1" i="0" u="none" strike="noStrike" noProof="0" dirty="0">
+                          <a:latin typeface="Calibri"/>
+                        </a:rPr>
+                        <a:t>RDD</a:t>
+                      </a:r>
+                      <a:endParaRPr lang="en-US" dirty="0"/>
                     </a:p>
                   </a:txBody>
                   <a:tcPr/>
@@ -11726,23 +11814,23 @@
                     <a:lstStyle/>
                     <a:p>
                       <a:r>
-                        <a:rPr lang="en-US" sz="1600"/>
+                        <a:rPr lang="en-US" sz="1600" dirty="0"/>
                         <a:t>{"</a:t>
                       </a:r>
                       <a:r>
-                        <a:rPr lang="en-US" sz="1600" err="1"/>
+                        <a:rPr lang="en-US" sz="1600" dirty="0" err="1"/>
                         <a:t>user":"John</a:t>
                       </a:r>
                       <a:r>
-                        <a:rPr lang="en-US" sz="1600"/>
+                        <a:rPr lang="en-US" sz="1600" dirty="0"/>
                         <a:t>", "</a:t>
                       </a:r>
                       <a:r>
-                        <a:rPr lang="en-US" sz="1600" err="1"/>
+                        <a:rPr lang="en-US" sz="1600" dirty="0" err="1"/>
                         <a:t>movie":"Blade</a:t>
                       </a:r>
                       <a:r>
-                        <a:rPr lang="en-US" sz="1600"/>
+                        <a:rPr lang="en-US" sz="1600" dirty="0"/>
                         <a:t> Runner", "rating":5.0}</a:t>
                       </a:r>
                     </a:p>
@@ -11762,23 +11850,23 @@
                     <a:lstStyle/>
                     <a:p>
                       <a:r>
-                        <a:rPr lang="en-US" sz="1600"/>
+                        <a:rPr lang="en-US" sz="1600" dirty="0"/>
                         <a:t>{"</a:t>
                       </a:r>
                       <a:r>
-                        <a:rPr lang="en-US" sz="1600" err="1"/>
+                        <a:rPr lang="en-US" sz="1600" dirty="0" err="1"/>
                         <a:t>user":"Louise</a:t>
                       </a:r>
                       <a:r>
-                        <a:rPr lang="en-US" sz="1600"/>
+                        <a:rPr lang="en-US" sz="1600" dirty="0"/>
                         <a:t>", "</a:t>
                       </a:r>
                       <a:r>
-                        <a:rPr lang="en-US" sz="1600" err="1"/>
+                        <a:rPr lang="en-US" sz="1600" dirty="0" err="1"/>
                         <a:t>movie":"Dirty</a:t>
                       </a:r>
                       <a:r>
-                        <a:rPr lang="en-US" sz="1600"/>
+                        <a:rPr lang="en-US" sz="1600" dirty="0"/>
                         <a:t> dancing", "rating":5.0}</a:t>
                       </a:r>
                     </a:p>
@@ -11815,23 +11903,23 @@
                         <a:defRPr/>
                       </a:pPr>
                       <a:r>
-                        <a:rPr lang="en-US" sz="1600"/>
+                        <a:rPr lang="en-US" sz="1600" dirty="0"/>
                         <a:t>{"</a:t>
                       </a:r>
                       <a:r>
-                        <a:rPr lang="en-US" sz="1600" err="1"/>
-                        <a:t>user":“Sam</a:t>
-                      </a:r>
-                      <a:r>
-                        <a:rPr lang="en-US" sz="1600"/>
+                        <a:rPr lang="en-US" sz="1600" dirty="0" err="1"/>
+                        <a:t>user":"Sam</a:t>
+                      </a:r>
+                      <a:r>
+                        <a:rPr lang="en-US" sz="1600" dirty="0"/>
                         <a:t>", "</a:t>
                       </a:r>
                       <a:r>
-                        <a:rPr lang="en-US" sz="1600" err="1"/>
-                        <a:t>movie":“Blade</a:t>
-                      </a:r>
-                      <a:r>
-                        <a:rPr lang="en-US" sz="1600"/>
+                        <a:rPr lang="en-US" sz="1600" dirty="0" err="1"/>
+                        <a:t>movie":"Blade</a:t>
+                      </a:r>
+                      <a:r>
+                        <a:rPr lang="en-US" sz="1600" dirty="0"/>
                         <a:t> Runner", "rating":3.5}</a:t>
                       </a:r>
                     </a:p>
@@ -11871,13 +11959,13 @@
           <a:noFill/>
         </p:spPr>
         <p:txBody>
-          <a:bodyPr wrap="none" rtlCol="0">
+          <a:bodyPr wrap="none" lIns="91440" tIns="45720" rIns="91440" bIns="45720" rtlCol="0" anchor="t">
             <a:spAutoFit/>
           </a:bodyPr>
           <a:lstStyle/>
           <a:p>
             <a:r>
-              <a:rPr lang="fr-FR" b="1" i="1" err="1">
+              <a:rPr lang="fr-FR" b="1" i="1" dirty="0" err="1">
                 <a:solidFill>
                   <a:schemeClr val="accent6">
                     <a:lumMod val="75000"/>
@@ -11887,17 +11975,17 @@
               <a:t>df.select</a:t>
             </a:r>
             <a:r>
-              <a:rPr lang="fr-FR" b="1" i="1">
+              <a:rPr lang="fr-FR" b="1" i="1" dirty="0">
                 <a:solidFill>
                   <a:schemeClr val="accent6">
                     <a:lumMod val="75000"/>
                   </a:schemeClr>
                 </a:solidFill>
               </a:rPr>
-              <a:t>(‘</a:t>
-            </a:r>
-            <a:r>
-              <a:rPr lang="fr-FR" b="1" i="1" err="1">
+              <a:t>('</a:t>
+            </a:r>
+            <a:r>
+              <a:rPr lang="fr-FR" b="1" i="1" dirty="0" err="1">
                 <a:solidFill>
                   <a:schemeClr val="accent6">
                     <a:lumMod val="75000"/>
@@ -11907,19 +11995,19 @@
               <a:t>movie</a:t>
             </a:r>
             <a:r>
-              <a:rPr lang="fr-FR" b="1" i="1">
+              <a:rPr lang="fr-FR" b="1" i="1" dirty="0">
                 <a:solidFill>
                   <a:schemeClr val="accent6">
                     <a:lumMod val="75000"/>
                   </a:schemeClr>
                 </a:solidFill>
               </a:rPr>
-              <a:t>’)</a:t>
-            </a:r>
-          </a:p>
-          <a:p>
-            <a:r>
-              <a:rPr lang="fr-FR" b="1" i="1" err="1">
+              <a:t>')</a:t>
+            </a:r>
+          </a:p>
+          <a:p>
+            <a:r>
+              <a:rPr lang="fr-FR" b="1" i="1" dirty="0" err="1">
                 <a:solidFill>
                   <a:schemeClr val="accent6">
                     <a:lumMod val="75000"/>
@@ -11929,7 +12017,7 @@
               <a:t>Df.withColumn</a:t>
             </a:r>
             <a:r>
-              <a:rPr lang="fr-FR" b="1" i="1">
+              <a:rPr lang="fr-FR" b="1" i="1" dirty="0">
                 <a:solidFill>
                   <a:schemeClr val="accent6">
                     <a:lumMod val="75000"/>
@@ -11938,6 +12026,14 @@
               </a:rPr>
               <a:t>(…)</a:t>
             </a:r>
+            <a:endParaRPr lang="fr-FR" b="1" i="1" dirty="0">
+              <a:solidFill>
+                <a:schemeClr val="accent6">
+                  <a:lumMod val="75000"/>
+                </a:schemeClr>
+              </a:solidFill>
+              <a:cs typeface="Calibri"/>
+            </a:endParaRPr>
           </a:p>
         </p:txBody>
       </p:sp>
@@ -12007,13 +12103,13 @@
           <a:noFill/>
         </p:spPr>
         <p:txBody>
-          <a:bodyPr wrap="none" rtlCol="0">
+          <a:bodyPr wrap="none" lIns="91440" tIns="45720" rIns="91440" bIns="45720" rtlCol="0" anchor="t">
             <a:spAutoFit/>
           </a:bodyPr>
           <a:lstStyle/>
           <a:p>
             <a:r>
-              <a:rPr lang="fr-FR" b="1" i="1" err="1">
+              <a:rPr lang="fr-FR" b="1" i="1" dirty="0" err="1">
                 <a:solidFill>
                   <a:schemeClr val="accent6">
                     <a:lumMod val="75000"/>
@@ -12023,14 +12119,14 @@
               <a:t>df.filter</a:t>
             </a:r>
             <a:r>
-              <a:rPr lang="fr-FR" b="1" i="1">
+              <a:rPr lang="fr-FR" b="1" i="1" dirty="0">
                 <a:solidFill>
                   <a:schemeClr val="accent6">
                     <a:lumMod val="75000"/>
                   </a:schemeClr>
                 </a:solidFill>
               </a:rPr>
-              <a:t>(‘rating&gt;3.5’)</a:t>
+              <a:t>('rating&gt;3.5')</a:t>
             </a:r>
           </a:p>
         </p:txBody>
@@ -12185,45 +12281,47 @@
           </a:fontRef>
         </p:style>
         <p:txBody>
-          <a:bodyPr rtlCol="0" anchor="ctr"/>
+          <a:bodyPr lIns="91440" tIns="45720" rIns="91440" bIns="45720" rtlCol="0" anchor="ctr"/>
           <a:lstStyle/>
           <a:p>
             <a:pPr algn="ctr"/>
             <a:r>
-              <a:rPr lang="fr-FR" err="1"/>
+              <a:rPr lang="fr-FR" b="1" dirty="0" err="1"/>
               <a:t>reduce</a:t>
             </a:r>
             <a:r>
-              <a:rPr lang="fr-FR"/>
+              <a:rPr lang="fr-FR" b="1" dirty="0"/>
               <a:t>(lambda </a:t>
             </a:r>
             <a:r>
-              <a:rPr lang="fr-FR" err="1"/>
+              <a:rPr lang="fr-FR" b="1" dirty="0" err="1"/>
               <a:t>x,y</a:t>
             </a:r>
             <a:r>
-              <a:rPr lang="fr-FR"/>
-              <a:t>: </a:t>
-            </a:r>
-            <a:r>
-              <a:rPr lang="fr-FR">
+              <a:rPr lang="fr-FR" b="1" dirty="0"/>
+              <a:t>: </a:t>
+            </a:r>
+            <a:r>
+              <a:rPr lang="fr-FR" b="1" dirty="0">
                 <a:sym typeface="Wingdings" panose="05000000000000000000" pitchFamily="2" charset="2"/>
               </a:rPr>
               <a:t> </a:t>
             </a:r>
             <a:r>
-              <a:rPr lang="fr-FR" err="1">
+              <a:rPr lang="fr-FR" b="1" dirty="0" err="1">
                 <a:sym typeface="Wingdings" panose="05000000000000000000" pitchFamily="2" charset="2"/>
               </a:rPr>
               <a:t>x+y</a:t>
             </a:r>
             <a:r>
-              <a:rPr lang="fr-FR">
+              <a:rPr lang="fr-FR" b="1" dirty="0">
                 <a:sym typeface="Wingdings" panose="05000000000000000000" pitchFamily="2" charset="2"/>
               </a:rPr>
               <a:t>)</a:t>
             </a:r>
-            <a:endParaRPr lang="en-US"/>
+            <a:endParaRPr lang="en-US">
+              <a:cs typeface="Calibri" panose="020F0502020204030204"/>
+            </a:endParaRPr>
           </a:p>
         </p:txBody>
       </p:sp>
@@ -12311,10 +12409,10 @@
       </p:cxnSp>
       <p:graphicFrame>
         <p:nvGraphicFramePr>
-          <p:cNvPr id="21" name="Table 6">
-            <a:extLst>
-              <a:ext uri="{FF2B5EF4-FFF2-40B4-BE49-F238E27FC236}">
-                <a16:creationId xmlns:a16="http://schemas.microsoft.com/office/drawing/2014/main" id="{3B363A25-A424-4A7F-AC1C-675D5AA95527}"/>
+          <p:cNvPr id="22" name="Table 6">
+            <a:extLst>
+              <a:ext uri="{FF2B5EF4-FFF2-40B4-BE49-F238E27FC236}">
+                <a16:creationId xmlns:a16="http://schemas.microsoft.com/office/drawing/2014/main" id="{14F2891B-DE06-4BA6-B53E-8E439C13B6B4}"/>
               </a:ext>
             </a:extLst>
           </p:cNvPr>
@@ -12324,91 +12422,7 @@
           <p:nvPr>
             <p:extLst>
               <p:ext uri="{D42A27DB-BD31-4B8C-83A1-F6EECF244321}">
-                <p14:modId xmlns:p14="http://schemas.microsoft.com/office/powerpoint/2010/main" val="2419580124"/>
-              </p:ext>
-            </p:extLst>
-          </p:nvPr>
-        </p:nvGraphicFramePr>
-        <p:xfrm>
-          <a:off x="9142255" y="3102271"/>
-          <a:ext cx="2804021" cy="797871"/>
-        </p:xfrm>
-        <a:graphic>
-          <a:graphicData uri="http://schemas.openxmlformats.org/drawingml/2006/table">
-            <a:tbl>
-              <a:tblPr firstRow="1" bandRow="1">
-                <a:tableStyleId>{5C22544A-7EE6-4342-B048-85BDC9FD1C3A}</a:tableStyleId>
-              </a:tblPr>
-              <a:tblGrid>
-                <a:gridCol w="2804021">
-                  <a:extLst>
-                    <a:ext uri="{9D8B030D-6E8A-4147-A177-3AD203B41FA5}">
-                      <a16:colId xmlns:a16="http://schemas.microsoft.com/office/drawing/2014/main" val="2061391393"/>
-                    </a:ext>
-                  </a:extLst>
-                </a:gridCol>
-              </a:tblGrid>
-              <a:tr h="462591">
-                <a:tc>
-                  <a:txBody>
-                    <a:bodyPr/>
-                    <a:lstStyle/>
-                    <a:p>
-                      <a:r>
-                        <a:rPr lang="fr-FR" sz="1600"/>
-                        <a:t>Rating</a:t>
-                      </a:r>
-                      <a:endParaRPr lang="en-US" sz="1600"/>
-                    </a:p>
-                  </a:txBody>
-                  <a:tcPr/>
-                </a:tc>
-                <a:extLst>
-                  <a:ext uri="{0D108BD9-81ED-4DB2-BD59-A6C34878D82A}">
-                    <a16:rowId xmlns:a16="http://schemas.microsoft.com/office/drawing/2014/main" val="235972142"/>
-                  </a:ext>
-                </a:extLst>
-              </a:tr>
-              <a:tr h="283885">
-                <a:tc>
-                  <a:txBody>
-                    <a:bodyPr/>
-                    <a:lstStyle/>
-                    <a:p>
-                      <a:r>
-                        <a:rPr lang="en-US" sz="1600"/>
-                        <a:t>13.5</a:t>
-                      </a:r>
-                    </a:p>
-                  </a:txBody>
-                  <a:tcPr/>
-                </a:tc>
-                <a:extLst>
-                  <a:ext uri="{0D108BD9-81ED-4DB2-BD59-A6C34878D82A}">
-                    <a16:rowId xmlns:a16="http://schemas.microsoft.com/office/drawing/2014/main" val="1215558195"/>
-                  </a:ext>
-                </a:extLst>
-              </a:tr>
-            </a:tbl>
-          </a:graphicData>
-        </a:graphic>
-      </p:graphicFrame>
-      <p:graphicFrame>
-        <p:nvGraphicFramePr>
-          <p:cNvPr id="22" name="Table 6">
-            <a:extLst>
-              <a:ext uri="{FF2B5EF4-FFF2-40B4-BE49-F238E27FC236}">
-                <a16:creationId xmlns:a16="http://schemas.microsoft.com/office/drawing/2014/main" id="{14F2891B-DE06-4BA6-B53E-8E439C13B6B4}"/>
-              </a:ext>
-            </a:extLst>
-          </p:cNvPr>
-          <p:cNvGraphicFramePr>
-            <a:graphicFrameLocks noGrp="1"/>
-          </p:cNvGraphicFramePr>
-          <p:nvPr>
-            <p:extLst>
-              <p:ext uri="{D42A27DB-BD31-4B8C-83A1-F6EECF244321}">
-                <p14:modId xmlns:p14="http://schemas.microsoft.com/office/powerpoint/2010/main" val="3546400370"/>
+                <p14:modId xmlns:p14="http://schemas.microsoft.com/office/powerpoint/2010/main" val="4177299743"/>
               </p:ext>
             </p:extLst>
           </p:nvPr>
@@ -12438,11 +12452,16 @@
                     <a:bodyPr/>
                     <a:lstStyle/>
                     <a:p>
-                      <a:r>
-                        <a:rPr lang="fr-FR" sz="1600"/>
-                        <a:t>Rating</a:t>
-                      </a:r>
-                      <a:endParaRPr lang="en-US" sz="1600"/>
+                      <a:pPr lvl="0">
+                        <a:buNone/>
+                      </a:pPr>
+                      <a:r>
+                        <a:rPr lang="fr-FR" sz="1600" b="1" i="0" u="none" strike="noStrike" noProof="0" dirty="0">
+                          <a:latin typeface="Calibri"/>
+                        </a:rPr>
+                        <a:t>RDD</a:t>
+                      </a:r>
+                      <a:endParaRPr lang="en-US" dirty="0"/>
                     </a:p>
                   </a:txBody>
                   <a:tcPr/>
@@ -12460,7 +12479,7 @@
                     <a:lstStyle/>
                     <a:p>
                       <a:r>
-                        <a:rPr lang="en-US" sz="1600"/>
+                        <a:rPr lang="en-US" sz="1600" dirty="0"/>
                         <a:t>5.0</a:t>
                       </a:r>
                     </a:p>
@@ -12480,7 +12499,7 @@
                     <a:lstStyle/>
                     <a:p>
                       <a:r>
-                        <a:rPr lang="en-US" sz="1600"/>
+                        <a:rPr lang="en-US" sz="1600" dirty="0"/>
                         <a:t>5.0</a:t>
                       </a:r>
                     </a:p>
@@ -12517,11 +12536,11 @@
                         <a:defRPr/>
                       </a:pPr>
                       <a:r>
-                        <a:rPr lang="fr-FR" sz="1600"/>
+                        <a:rPr lang="fr-FR" sz="1600" dirty="0"/>
                         <a:t>3</a:t>
                       </a:r>
                       <a:r>
-                        <a:rPr lang="en-US" sz="1600"/>
+                        <a:rPr lang="en-US" sz="1600" dirty="0"/>
                         <a:t>.5</a:t>
                       </a:r>
                     </a:p>
@@ -12576,41 +12595,43 @@
           </a:fontRef>
         </p:style>
         <p:txBody>
-          <a:bodyPr rtlCol="0" anchor="ctr"/>
+          <a:bodyPr lIns="91440" tIns="45720" rIns="91440" bIns="45720" rtlCol="0" anchor="ctr"/>
           <a:lstStyle/>
           <a:p>
             <a:pPr algn="ctr"/>
             <a:r>
-              <a:rPr lang="fr-FR" err="1"/>
+              <a:rPr lang="fr-FR" b="1" dirty="0" err="1"/>
               <a:t>reduceByKey</a:t>
             </a:r>
             <a:r>
-              <a:rPr lang="fr-FR"/>
+              <a:rPr lang="fr-FR" b="1" dirty="0"/>
               <a:t>(lambda </a:t>
             </a:r>
             <a:r>
-              <a:rPr lang="fr-FR" err="1"/>
+              <a:rPr lang="fr-FR" b="1" dirty="0" err="1"/>
               <a:t>x,y</a:t>
             </a:r>
             <a:r>
-              <a:rPr lang="fr-FR">
+              <a:rPr lang="fr-FR" b="1" dirty="0">
                 <a:sym typeface="Wingdings" panose="05000000000000000000" pitchFamily="2" charset="2"/>
               </a:rPr>
-              <a:t> : x</a:t>
-            </a:r>
-            <a:r>
-              <a:rPr lang="fr-FR" err="1">
+              <a:t> : </a:t>
+            </a:r>
+            <a:r>
+              <a:rPr lang="fr-FR" b="1" dirty="0" err="1">
                 <a:sym typeface="Wingdings" panose="05000000000000000000" pitchFamily="2" charset="2"/>
               </a:rPr>
-              <a:t>+y</a:t>
-            </a:r>
-            <a:r>
-              <a:rPr lang="fr-FR">
+              <a:t>x+y</a:t>
+            </a:r>
+            <a:r>
+              <a:rPr lang="fr-FR" b="1" dirty="0">
                 <a:sym typeface="Wingdings" panose="05000000000000000000" pitchFamily="2" charset="2"/>
               </a:rPr>
               <a:t>)</a:t>
             </a:r>
-            <a:endParaRPr lang="en-US"/>
+            <a:endParaRPr lang="en-US">
+              <a:cs typeface="Calibri" panose="020F0502020204030204"/>
+            </a:endParaRPr>
           </a:p>
         </p:txBody>
       </p:sp>
@@ -12711,7 +12732,7 @@
           <p:nvPr>
             <p:extLst>
               <p:ext uri="{D42A27DB-BD31-4B8C-83A1-F6EECF244321}">
-                <p14:modId xmlns:p14="http://schemas.microsoft.com/office/powerpoint/2010/main" val="3331258320"/>
+                <p14:modId xmlns:p14="http://schemas.microsoft.com/office/powerpoint/2010/main" val="2551510985"/>
               </p:ext>
             </p:extLst>
           </p:nvPr>
@@ -12741,11 +12762,24 @@
                     <a:bodyPr/>
                     <a:lstStyle/>
                     <a:p>
-                      <a:r>
-                        <a:rPr lang="fr-FR" sz="1600"/>
-                        <a:t>Row</a:t>
-                      </a:r>
-                      <a:endParaRPr lang="en-US" sz="1600"/>
+                      <a:pPr lvl="0" algn="l">
+                        <a:lnSpc>
+                          <a:spcPct val="100000"/>
+                        </a:lnSpc>
+                        <a:spcBef>
+                          <a:spcPts val="0"/>
+                        </a:spcBef>
+                        <a:spcAft>
+                          <a:spcPts val="0"/>
+                        </a:spcAft>
+                        <a:buNone/>
+                      </a:pPr>
+                      <a:r>
+                        <a:rPr lang="fr-FR" sz="1600" b="1" i="0" u="none" strike="noStrike" noProof="0" dirty="0">
+                          <a:latin typeface="Calibri"/>
+                        </a:rPr>
+                        <a:t>RDD of (K, V) pairs</a:t>
+                      </a:r>
                     </a:p>
                   </a:txBody>
                   <a:tcPr/>
@@ -12763,8 +12797,28 @@
                     <a:lstStyle/>
                     <a:p>
                       <a:r>
-                        <a:rPr lang="en-US" sz="1600"/>
-                        <a:t>(“Blade Runner", 8.5)</a:t>
+                        <a:rPr lang="en-US" sz="1600" dirty="0"/>
+                        <a:t>(</a:t>
+                      </a:r>
+                      <a:r>
+                        <a:rPr lang="en-US" sz="1600" b="0" i="0" u="none" strike="noStrike" noProof="0" dirty="0">
+                          <a:latin typeface="Calibri"/>
+                        </a:rPr>
+                        <a:t>"</a:t>
+                      </a:r>
+                      <a:r>
+                        <a:rPr lang="en-US" sz="1600" dirty="0"/>
+                        <a:t>Blade Runner</a:t>
+                      </a:r>
+                      <a:r>
+                        <a:rPr lang="en-US" sz="1600" b="0" i="0" u="none" strike="noStrike" noProof="0" dirty="0">
+                          <a:latin typeface="Calibri"/>
+                        </a:rPr>
+                        <a:t>"</a:t>
+                      </a:r>
+                      <a:r>
+                        <a:rPr lang="en-US" sz="1600" dirty="0"/>
+                        <a:t>, 8.5)</a:t>
                       </a:r>
                     </a:p>
                   </a:txBody>
@@ -12783,8 +12837,18 @@
                     <a:lstStyle/>
                     <a:p>
                       <a:r>
-                        <a:rPr lang="en-US" sz="1600"/>
-                        <a:t>("Dirty dancing", 5.0)</a:t>
+                        <a:rPr lang="en-US" sz="1600" dirty="0"/>
+                        <a:t>("Dirty dancing</a:t>
+                      </a:r>
+                      <a:r>
+                        <a:rPr lang="en-US" sz="1600" b="0" i="0" u="none" strike="noStrike" noProof="0" dirty="0">
+                          <a:latin typeface="Calibri"/>
+                        </a:rPr>
+                        <a:t>"</a:t>
+                      </a:r>
+                      <a:r>
+                        <a:rPr lang="en-US" sz="1600" dirty="0"/>
+                        <a:t>, 5.0)</a:t>
                       </a:r>
                     </a:p>
                   </a:txBody>
@@ -12815,7 +12879,7 @@
           <p:nvPr>
             <p:extLst>
               <p:ext uri="{D42A27DB-BD31-4B8C-83A1-F6EECF244321}">
-                <p14:modId xmlns:p14="http://schemas.microsoft.com/office/powerpoint/2010/main" val="1884969929"/>
+                <p14:modId xmlns:p14="http://schemas.microsoft.com/office/powerpoint/2010/main" val="1944810526"/>
               </p:ext>
             </p:extLst>
           </p:nvPr>
@@ -12845,11 +12909,16 @@
                     <a:bodyPr/>
                     <a:lstStyle/>
                     <a:p>
-                      <a:r>
-                        <a:rPr lang="fr-FR" sz="1600"/>
-                        <a:t>Row</a:t>
-                      </a:r>
-                      <a:endParaRPr lang="en-US" sz="1600"/>
+                      <a:pPr lvl="0">
+                        <a:buNone/>
+                      </a:pPr>
+                      <a:r>
+                        <a:rPr lang="fr-FR" sz="1600" b="1" i="0" u="none" strike="noStrike" noProof="0" dirty="0">
+                          <a:latin typeface="Calibri"/>
+                        </a:rPr>
+                        <a:t>RDD</a:t>
+                      </a:r>
+                      <a:endParaRPr lang="en-US" dirty="0"/>
                     </a:p>
                   </a:txBody>
                   <a:tcPr/>
@@ -12867,23 +12936,23 @@
                     <a:lstStyle/>
                     <a:p>
                       <a:r>
-                        <a:rPr lang="en-US" sz="1600"/>
+                        <a:rPr lang="en-US" sz="1600" dirty="0"/>
                         <a:t>{"</a:t>
                       </a:r>
                       <a:r>
-                        <a:rPr lang="en-US" sz="1600" err="1"/>
+                        <a:rPr lang="en-US" sz="1600" dirty="0" err="1"/>
                         <a:t>user":"John</a:t>
                       </a:r>
                       <a:r>
-                        <a:rPr lang="en-US" sz="1600"/>
+                        <a:rPr lang="en-US" sz="1600" dirty="0"/>
                         <a:t>", "</a:t>
                       </a:r>
                       <a:r>
-                        <a:rPr lang="en-US" sz="1600" err="1"/>
+                        <a:rPr lang="en-US" sz="1600" dirty="0" err="1"/>
                         <a:t>movie":"Blade</a:t>
                       </a:r>
                       <a:r>
-                        <a:rPr lang="en-US" sz="1600"/>
+                        <a:rPr lang="en-US" sz="1600" dirty="0"/>
                         <a:t> Runner", "rating":5.0}</a:t>
                       </a:r>
                     </a:p>
@@ -12903,23 +12972,23 @@
                     <a:lstStyle/>
                     <a:p>
                       <a:r>
-                        <a:rPr lang="en-US" sz="1600"/>
+                        <a:rPr lang="en-US" sz="1600" dirty="0"/>
                         <a:t>{"</a:t>
                       </a:r>
                       <a:r>
-                        <a:rPr lang="en-US" sz="1600" err="1"/>
+                        <a:rPr lang="en-US" sz="1600" dirty="0" err="1"/>
                         <a:t>user":"Louise</a:t>
                       </a:r>
                       <a:r>
-                        <a:rPr lang="en-US" sz="1600"/>
+                        <a:rPr lang="en-US" sz="1600" dirty="0"/>
                         <a:t>", "</a:t>
                       </a:r>
                       <a:r>
-                        <a:rPr lang="en-US" sz="1600" err="1"/>
+                        <a:rPr lang="en-US" sz="1600" dirty="0" err="1"/>
                         <a:t>movie":"Dirty</a:t>
                       </a:r>
                       <a:r>
-                        <a:rPr lang="en-US" sz="1600"/>
+                        <a:rPr lang="en-US" sz="1600" dirty="0"/>
                         <a:t> dancing", "rating":5.0}</a:t>
                       </a:r>
                     </a:p>
@@ -12956,23 +13025,23 @@
                         <a:defRPr/>
                       </a:pPr>
                       <a:r>
-                        <a:rPr lang="en-US" sz="1600"/>
+                        <a:rPr lang="en-US" sz="1600" dirty="0"/>
                         <a:t>{"</a:t>
                       </a:r>
                       <a:r>
-                        <a:rPr lang="en-US" sz="1600" err="1"/>
-                        <a:t>user":“Sam</a:t>
-                      </a:r>
-                      <a:r>
-                        <a:rPr lang="en-US" sz="1600"/>
+                        <a:rPr lang="en-US" sz="1600" dirty="0" err="1"/>
+                        <a:t>user":"Sam</a:t>
+                      </a:r>
+                      <a:r>
+                        <a:rPr lang="en-US" sz="1600" dirty="0"/>
                         <a:t>", "</a:t>
                       </a:r>
                       <a:r>
-                        <a:rPr lang="en-US" sz="1600" err="1"/>
-                        <a:t>movie":“Blade</a:t>
-                      </a:r>
-                      <a:r>
-                        <a:rPr lang="en-US" sz="1600"/>
+                        <a:rPr lang="en-US" sz="1600" dirty="0" err="1"/>
+                        <a:t>movie":"Blade</a:t>
+                      </a:r>
+                      <a:r>
+                        <a:rPr lang="en-US" sz="1600" dirty="0"/>
                         <a:t> Runner", "rating":3.5}</a:t>
                       </a:r>
                     </a:p>
@@ -13012,13 +13081,13 @@
           <a:noFill/>
         </p:spPr>
         <p:txBody>
-          <a:bodyPr wrap="none" rtlCol="0">
+          <a:bodyPr wrap="none" lIns="91440" tIns="45720" rIns="91440" bIns="45720" rtlCol="0" anchor="t">
             <a:spAutoFit/>
           </a:bodyPr>
           <a:lstStyle/>
           <a:p>
             <a:r>
-              <a:rPr lang="fr-FR" b="1" i="1">
+              <a:rPr lang="fr-FR" b="1" i="1" dirty="0">
                 <a:solidFill>
                   <a:schemeClr val="accent6">
                     <a:lumMod val="75000"/>
@@ -13028,7 +13097,7 @@
               <a:t>import </a:t>
             </a:r>
             <a:r>
-              <a:rPr lang="fr-FR" b="1" i="1" err="1">
+              <a:rPr lang="fr-FR" b="1" i="1" dirty="0" err="1">
                 <a:solidFill>
                   <a:schemeClr val="accent6">
                     <a:lumMod val="75000"/>
@@ -13038,7 +13107,7 @@
               <a:t>pyspark.sql.functions</a:t>
             </a:r>
             <a:r>
-              <a:rPr lang="fr-FR" b="1" i="1">
+              <a:rPr lang="fr-FR" b="1" i="1" dirty="0">
                 <a:solidFill>
                   <a:schemeClr val="accent6">
                     <a:lumMod val="75000"/>
@@ -13050,7 +13119,7 @@
           </a:p>
           <a:p>
             <a:r>
-              <a:rPr lang="fr-FR" b="1" i="1" err="1">
+              <a:rPr lang="fr-FR" b="1" i="1" dirty="0" err="1">
                 <a:solidFill>
                   <a:schemeClr val="accent6">
                     <a:lumMod val="75000"/>
@@ -13060,7 +13129,7 @@
               <a:t>df.select</a:t>
             </a:r>
             <a:r>
-              <a:rPr lang="fr-FR" b="1" i="1">
+              <a:rPr lang="fr-FR" b="1" i="1" dirty="0">
                 <a:solidFill>
                   <a:schemeClr val="accent6">
                     <a:lumMod val="75000"/>
@@ -13070,7 +13139,7 @@
               <a:t>(</a:t>
             </a:r>
             <a:r>
-              <a:rPr lang="fr-FR" b="1" i="1" err="1">
+              <a:rPr lang="fr-FR" b="1" i="1" dirty="0" err="1">
                 <a:solidFill>
                   <a:schemeClr val="accent6">
                     <a:lumMod val="75000"/>
@@ -13080,15 +13149,23 @@
               <a:t>F.sum</a:t>
             </a:r>
             <a:r>
-              <a:rPr lang="fr-FR" b="1" i="1">
+              <a:rPr lang="fr-FR" b="1" i="1" dirty="0">
                 <a:solidFill>
                   <a:schemeClr val="accent6">
                     <a:lumMod val="75000"/>
                   </a:schemeClr>
                 </a:solidFill>
               </a:rPr>
-              <a:t>(‘rating’))</a:t>
-            </a:r>
+              <a:t>('rating'))</a:t>
+            </a:r>
+            <a:endParaRPr lang="fr-FR" b="1" i="1" dirty="0">
+              <a:solidFill>
+                <a:schemeClr val="accent6">
+                  <a:lumMod val="75000"/>
+                </a:schemeClr>
+              </a:solidFill>
+              <a:cs typeface="Calibri"/>
+            </a:endParaRPr>
           </a:p>
         </p:txBody>
       </p:sp>
@@ -13107,7 +13184,7 @@
         <p:spPr>
           <a:xfrm>
             <a:off x="5448724" y="5856967"/>
-            <a:ext cx="4103496" cy="1200329"/>
+            <a:ext cx="3916457" cy="1200329"/>
           </a:xfrm>
           <a:prstGeom prst="rect">
             <a:avLst/>
@@ -13115,13 +13192,13 @@
           <a:noFill/>
         </p:spPr>
         <p:txBody>
-          <a:bodyPr wrap="none" rtlCol="0">
+          <a:bodyPr wrap="none" lIns="91440" tIns="45720" rIns="91440" bIns="45720" rtlCol="0" anchor="t">
             <a:spAutoFit/>
           </a:bodyPr>
           <a:lstStyle/>
           <a:p>
             <a:r>
-              <a:rPr lang="fr-FR" b="1" i="1">
+              <a:rPr lang="fr-FR" b="1" i="1" dirty="0">
                 <a:solidFill>
                   <a:schemeClr val="accent6">
                     <a:lumMod val="75000"/>
@@ -13131,7 +13208,7 @@
               <a:t>import </a:t>
             </a:r>
             <a:r>
-              <a:rPr lang="fr-FR" b="1" i="1" err="1">
+              <a:rPr lang="fr-FR" b="1" i="1" dirty="0" err="1">
                 <a:solidFill>
                   <a:schemeClr val="accent6">
                     <a:lumMod val="75000"/>
@@ -13141,7 +13218,7 @@
               <a:t>pyspark.sql.functions</a:t>
             </a:r>
             <a:r>
-              <a:rPr lang="fr-FR" b="1" i="1">
+              <a:rPr lang="fr-FR" b="1" i="1" dirty="0">
                 <a:solidFill>
                   <a:schemeClr val="accent6">
                     <a:lumMod val="75000"/>
@@ -13153,7 +13230,7 @@
           </a:p>
           <a:p>
             <a:r>
-              <a:rPr lang="fr-FR" b="1" i="1" err="1">
+              <a:rPr lang="fr-FR" b="1" i="1" dirty="0" err="1">
                 <a:solidFill>
                   <a:schemeClr val="accent6">
                     <a:lumMod val="75000"/>
@@ -13163,17 +13240,17 @@
               <a:t>df.groupBy</a:t>
             </a:r>
             <a:r>
-              <a:rPr lang="fr-FR" b="1" i="1">
+              <a:rPr lang="fr-FR" b="1" i="1" dirty="0">
                 <a:solidFill>
                   <a:schemeClr val="accent6">
                     <a:lumMod val="75000"/>
                   </a:schemeClr>
                 </a:solidFill>
               </a:rPr>
-              <a:t>(‘user’).</a:t>
-            </a:r>
-            <a:r>
-              <a:rPr lang="fr-FR" b="1" i="1" err="1">
+              <a:t>('user').</a:t>
+            </a:r>
+            <a:r>
+              <a:rPr lang="fr-FR" b="1" i="1" dirty="0" err="1">
                 <a:solidFill>
                   <a:schemeClr val="accent6">
                     <a:lumMod val="75000"/>
@@ -13183,7 +13260,7 @@
               <a:t>agg</a:t>
             </a:r>
             <a:r>
-              <a:rPr lang="fr-FR" b="1" i="1">
+              <a:rPr lang="fr-FR" b="1" i="1" dirty="0">
                 <a:solidFill>
                   <a:schemeClr val="accent6">
                     <a:lumMod val="75000"/>
@@ -13193,7 +13270,7 @@
               <a:t> (</a:t>
             </a:r>
             <a:r>
-              <a:rPr lang="fr-FR" b="1" i="1" err="1">
+              <a:rPr lang="fr-FR" b="1" i="1" dirty="0" err="1">
                 <a:solidFill>
                   <a:schemeClr val="accent6">
                     <a:lumMod val="75000"/>
@@ -13203,19 +13280,27 @@
               <a:t>F.sum</a:t>
             </a:r>
             <a:r>
-              <a:rPr lang="fr-FR" b="1" i="1">
+              <a:rPr lang="fr-FR" b="1" i="1" dirty="0">
                 <a:solidFill>
                   <a:schemeClr val="accent6">
                     <a:lumMod val="75000"/>
                   </a:schemeClr>
                 </a:solidFill>
               </a:rPr>
-              <a:t>(‘rating’))</a:t>
-            </a:r>
-          </a:p>
-          <a:p>
-            <a:r>
-              <a:rPr lang="fr-FR" b="1" i="1" err="1">
+              <a:t>('rating'))</a:t>
+            </a:r>
+            <a:endParaRPr lang="fr-FR" b="1" i="1" dirty="0">
+              <a:solidFill>
+                <a:schemeClr val="accent6">
+                  <a:lumMod val="75000"/>
+                </a:schemeClr>
+              </a:solidFill>
+              <a:cs typeface="Calibri"/>
+            </a:endParaRPr>
+          </a:p>
+          <a:p>
+            <a:r>
+              <a:rPr lang="fr-FR" b="1" i="1" dirty="0" err="1">
                 <a:solidFill>
                   <a:schemeClr val="accent6">
                     <a:lumMod val="40000"/>
@@ -13226,7 +13311,7 @@
               <a:t>df.groupBy</a:t>
             </a:r>
             <a:r>
-              <a:rPr lang="fr-FR" b="1" i="1">
+              <a:rPr lang="fr-FR" b="1" i="1" dirty="0">
                 <a:solidFill>
                   <a:schemeClr val="accent6">
                     <a:lumMod val="40000"/>
@@ -13234,10 +13319,10 @@
                   </a:schemeClr>
                 </a:solidFill>
               </a:rPr>
-              <a:t>(‘user’).</a:t>
-            </a:r>
-            <a:r>
-              <a:rPr lang="fr-FR" b="1" i="1" err="1">
+              <a:t>('user').</a:t>
+            </a:r>
+            <a:r>
+              <a:rPr lang="fr-FR" b="1" i="1" dirty="0" err="1">
                 <a:solidFill>
                   <a:schemeClr val="accent6">
                     <a:lumMod val="40000"/>
@@ -13248,7 +13333,7 @@
               <a:t>agg</a:t>
             </a:r>
             <a:r>
-              <a:rPr lang="fr-FR" b="1" i="1">
+              <a:rPr lang="fr-FR" b="1" i="1" dirty="0">
                 <a:solidFill>
                   <a:schemeClr val="accent6">
                     <a:lumMod val="40000"/>
@@ -13256,10 +13341,10 @@
                   </a:schemeClr>
                 </a:solidFill>
               </a:rPr>
-              <a:t> ({‘rating’:’</a:t>
-            </a:r>
-            <a:r>
-              <a:rPr lang="fr-FR" b="1" i="1" err="1">
+              <a:t> ({'rating':'</a:t>
+            </a:r>
+            <a:r>
+              <a:rPr lang="fr-FR" b="1" i="1" dirty="0" err="1">
                 <a:solidFill>
                   <a:schemeClr val="accent6">
                     <a:lumMod val="40000"/>
@@ -13270,7 +13355,7 @@
               <a:t>sum</a:t>
             </a:r>
             <a:r>
-              <a:rPr lang="fr-FR" b="1" i="1">
+              <a:rPr lang="fr-FR" b="1" i="1" dirty="0">
                 <a:solidFill>
                   <a:schemeClr val="accent6">
                     <a:lumMod val="40000"/>
@@ -13278,8 +13363,17 @@
                   </a:schemeClr>
                 </a:solidFill>
               </a:rPr>
-              <a:t>’})</a:t>
-            </a:r>
+              <a:t>'})</a:t>
+            </a:r>
+            <a:endParaRPr lang="fr-FR" b="1" i="1" dirty="0">
+              <a:solidFill>
+                <a:schemeClr val="accent6">
+                  <a:lumMod val="40000"/>
+                  <a:lumOff val="60000"/>
+                </a:schemeClr>
+              </a:solidFill>
+              <a:cs typeface="Calibri"/>
+            </a:endParaRPr>
           </a:p>
           <a:p>
             <a:endParaRPr lang="fr-FR" b="1" i="1">
@@ -13330,25 +13424,25 @@
           </a:fontRef>
         </p:style>
         <p:txBody>
-          <a:bodyPr rtlCol="0" anchor="ctr"/>
+          <a:bodyPr lIns="91440" tIns="45720" rIns="91440" bIns="45720" rtlCol="0" anchor="ctr"/>
           <a:lstStyle/>
           <a:p>
             <a:pPr algn="ctr"/>
             <a:r>
-              <a:rPr lang="fr-FR" err="1"/>
+              <a:rPr lang="fr-FR" b="1" dirty="0" err="1"/>
               <a:t>keyBy</a:t>
             </a:r>
             <a:r>
-              <a:rPr lang="fr-FR"/>
+              <a:rPr lang="fr-FR" b="1" dirty="0"/>
               <a:t>(lambda x:</a:t>
             </a:r>
             <a:r>
-              <a:rPr lang="fr-FR">
+              <a:rPr lang="fr-FR" b="1" dirty="0">
                 <a:sym typeface="Wingdings" panose="05000000000000000000" pitchFamily="2" charset="2"/>
               </a:rPr>
-              <a:t> x[‘user’])</a:t>
-            </a:r>
-            <a:endParaRPr lang="en-US"/>
+              <a:t> x['user'])</a:t>
+            </a:r>
+            <a:endParaRPr lang="en-US" b="1" dirty="0"/>
           </a:p>
         </p:txBody>
       </p:sp>
@@ -13449,14 +13543,14 @@
           <p:nvPr>
             <p:extLst>
               <p:ext uri="{D42A27DB-BD31-4B8C-83A1-F6EECF244321}">
-                <p14:modId xmlns:p14="http://schemas.microsoft.com/office/powerpoint/2010/main" val="1153715756"/>
+                <p14:modId xmlns:p14="http://schemas.microsoft.com/office/powerpoint/2010/main" val="453859449"/>
               </p:ext>
             </p:extLst>
           </p:nvPr>
         </p:nvGraphicFramePr>
         <p:xfrm>
           <a:off x="9240849" y="1325337"/>
-          <a:ext cx="1435267" cy="1479749"/>
+          <a:ext cx="2043195" cy="1584960"/>
         </p:xfrm>
         <a:graphic>
           <a:graphicData uri="http://schemas.openxmlformats.org/drawingml/2006/table">
@@ -13465,7 +13559,7 @@
                 <a:tableStyleId>{5C22544A-7EE6-4342-B048-85BDC9FD1C3A}</a:tableStyleId>
               </a:tblPr>
               <a:tblGrid>
-                <a:gridCol w="1435267">
+                <a:gridCol w="2043195">
                   <a:extLst>
                     <a:ext uri="{9D8B030D-6E8A-4147-A177-3AD203B41FA5}">
                       <a16:colId xmlns:a16="http://schemas.microsoft.com/office/drawing/2014/main" val="2061391393"/>
@@ -13479,11 +13573,30 @@
                     <a:bodyPr/>
                     <a:lstStyle/>
                     <a:p>
-                      <a:r>
-                        <a:rPr lang="fr-FR" sz="1600"/>
-                        <a:t>Row</a:t>
-                      </a:r>
-                      <a:endParaRPr lang="en-US" sz="1600"/>
+                      <a:pPr lvl="0" algn="l">
+                        <a:lnSpc>
+                          <a:spcPct val="100000"/>
+                        </a:lnSpc>
+                        <a:spcBef>
+                          <a:spcPts val="0"/>
+                        </a:spcBef>
+                        <a:spcAft>
+                          <a:spcPts val="0"/>
+                        </a:spcAft>
+                        <a:buNone/>
+                      </a:pPr>
+                      <a:r>
+                        <a:rPr lang="fr-FR" sz="1600" b="1" i="0" u="none" strike="noStrike" noProof="0" dirty="0">
+                          <a:latin typeface="Calibri"/>
+                        </a:rPr>
+                        <a:t>RDD of (K, V) pairs</a:t>
+                      </a:r>
+                    </a:p>
+                    <a:p>
+                      <a:pPr lvl="0">
+                        <a:buNone/>
+                      </a:pPr>
+                      <a:endParaRPr lang="fr-FR" sz="1600" dirty="0"/>
                     </a:p>
                   </a:txBody>
                   <a:tcPr/>
@@ -13501,11 +13614,11 @@
                     <a:lstStyle/>
                     <a:p>
                       <a:r>
-                        <a:rPr lang="fr-FR" sz="1600"/>
+                        <a:rPr lang="fr-FR" sz="1600" dirty="0"/>
                         <a:t>(</a:t>
                       </a:r>
                       <a:r>
-                        <a:rPr lang="en-US" sz="1600"/>
+                        <a:rPr lang="en-US" sz="1600" dirty="0"/>
                         <a:t>"John“, …)</a:t>
                       </a:r>
                     </a:p>
@@ -13525,11 +13638,11 @@
                     <a:lstStyle/>
                     <a:p>
                       <a:r>
-                        <a:rPr lang="fr-FR" sz="1600"/>
+                        <a:rPr lang="fr-FR" sz="1600" dirty="0"/>
                         <a:t>(</a:t>
                       </a:r>
                       <a:r>
-                        <a:rPr lang="en-US" sz="1600"/>
+                        <a:rPr lang="en-US" sz="1600" dirty="0"/>
                         <a:t>“Louise“, …)</a:t>
                       </a:r>
                     </a:p>
@@ -13549,11 +13662,11 @@
                     <a:lstStyle/>
                     <a:p>
                       <a:r>
-                        <a:rPr lang="fr-FR" sz="1600"/>
+                        <a:rPr lang="fr-FR" sz="1600" dirty="0"/>
                         <a:t>(</a:t>
                       </a:r>
                       <a:r>
-                        <a:rPr lang="en-US" sz="1600"/>
+                        <a:rPr lang="en-US" sz="1600" dirty="0"/>
                         <a:t>“Sam“, …)</a:t>
                       </a:r>
                     </a:p>
@@ -13585,7 +13698,7 @@
           <p:nvPr>
             <p:extLst>
               <p:ext uri="{D42A27DB-BD31-4B8C-83A1-F6EECF244321}">
-                <p14:modId xmlns:p14="http://schemas.microsoft.com/office/powerpoint/2010/main" val="3757726331"/>
+                <p14:modId xmlns:p14="http://schemas.microsoft.com/office/powerpoint/2010/main" val="514348416"/>
               </p:ext>
             </p:extLst>
           </p:nvPr>
@@ -13615,11 +13728,16 @@
                     <a:bodyPr/>
                     <a:lstStyle/>
                     <a:p>
-                      <a:r>
-                        <a:rPr lang="fr-FR" sz="1600"/>
-                        <a:t>Row</a:t>
-                      </a:r>
-                      <a:endParaRPr lang="en-US" sz="1600"/>
+                      <a:pPr lvl="0">
+                        <a:buNone/>
+                      </a:pPr>
+                      <a:r>
+                        <a:rPr lang="fr-FR" sz="1600" b="1" i="0" u="none" strike="noStrike" noProof="0" dirty="0">
+                          <a:latin typeface="Calibri"/>
+                        </a:rPr>
+                        <a:t>RDD</a:t>
+                      </a:r>
+                      <a:endParaRPr lang="en-US" dirty="0"/>
                     </a:p>
                   </a:txBody>
                   <a:tcPr/>
@@ -13637,23 +13755,23 @@
                     <a:lstStyle/>
                     <a:p>
                       <a:r>
-                        <a:rPr lang="en-US" sz="1600"/>
+                        <a:rPr lang="en-US" sz="1600" dirty="0"/>
                         <a:t>{"</a:t>
                       </a:r>
                       <a:r>
-                        <a:rPr lang="en-US" sz="1600" err="1"/>
+                        <a:rPr lang="en-US" sz="1600" dirty="0" err="1"/>
                         <a:t>user":"John</a:t>
                       </a:r>
                       <a:r>
-                        <a:rPr lang="en-US" sz="1600"/>
+                        <a:rPr lang="en-US" sz="1600" dirty="0"/>
                         <a:t>", "</a:t>
                       </a:r>
                       <a:r>
-                        <a:rPr lang="en-US" sz="1600" err="1"/>
+                        <a:rPr lang="en-US" sz="1600" dirty="0" err="1"/>
                         <a:t>movie":"Blade</a:t>
                       </a:r>
                       <a:r>
-                        <a:rPr lang="en-US" sz="1600"/>
+                        <a:rPr lang="en-US" sz="1600" dirty="0"/>
                         <a:t> Runner", "rating":5.0}</a:t>
                       </a:r>
                     </a:p>
@@ -13673,23 +13791,23 @@
                     <a:lstStyle/>
                     <a:p>
                       <a:r>
-                        <a:rPr lang="en-US" sz="1600"/>
+                        <a:rPr lang="en-US" sz="1600" dirty="0"/>
                         <a:t>{"</a:t>
                       </a:r>
                       <a:r>
-                        <a:rPr lang="en-US" sz="1600" err="1"/>
+                        <a:rPr lang="en-US" sz="1600" dirty="0" err="1"/>
                         <a:t>user":"Louise</a:t>
                       </a:r>
                       <a:r>
-                        <a:rPr lang="en-US" sz="1600"/>
+                        <a:rPr lang="en-US" sz="1600" dirty="0"/>
                         <a:t>", "</a:t>
                       </a:r>
                       <a:r>
-                        <a:rPr lang="en-US" sz="1600" err="1"/>
+                        <a:rPr lang="en-US" sz="1600" dirty="0" err="1"/>
                         <a:t>movie":"Dirty</a:t>
                       </a:r>
                       <a:r>
-                        <a:rPr lang="en-US" sz="1600"/>
+                        <a:rPr lang="en-US" sz="1600" dirty="0"/>
                         <a:t> dancing", "rating":5.0}</a:t>
                       </a:r>
                     </a:p>
@@ -13726,23 +13844,23 @@
                         <a:defRPr/>
                       </a:pPr>
                       <a:r>
-                        <a:rPr lang="en-US" sz="1600"/>
+                        <a:rPr lang="en-US" sz="1600" dirty="0"/>
                         <a:t>{"</a:t>
                       </a:r>
                       <a:r>
-                        <a:rPr lang="en-US" sz="1600" err="1"/>
+                        <a:rPr lang="en-US" sz="1600" dirty="0" err="1"/>
                         <a:t>user":“Sam</a:t>
                       </a:r>
                       <a:r>
-                        <a:rPr lang="en-US" sz="1600"/>
+                        <a:rPr lang="en-US" sz="1600" dirty="0"/>
                         <a:t>", "</a:t>
                       </a:r>
                       <a:r>
-                        <a:rPr lang="en-US" sz="1600" err="1"/>
+                        <a:rPr lang="en-US" sz="1600" dirty="0" err="1"/>
                         <a:t>movie":“Blade</a:t>
                       </a:r>
                       <a:r>
-                        <a:rPr lang="en-US" sz="1600"/>
+                        <a:rPr lang="en-US" sz="1600" dirty="0"/>
                         <a:t> Runner", "rating":3.5}</a:t>
                       </a:r>
                     </a:p>
@@ -13800,6 +13918,136 @@
           </a:fontRef>
         </p:style>
       </p:cxnSp>
+      <p:sp>
+        <p:nvSpPr>
+          <p:cNvPr id="3" name="TextBox 1">
+            <a:extLst>
+              <a:ext uri="{FF2B5EF4-FFF2-40B4-BE49-F238E27FC236}">
+                <a16:creationId xmlns:a16="http://schemas.microsoft.com/office/drawing/2014/main" id="{387DA3E5-AF0D-6CD2-8A65-AE0C8DF8521D}"/>
+              </a:ext>
+            </a:extLst>
+          </p:cNvPr>
+          <p:cNvSpPr txBox="1"/>
+          <p:nvPr/>
+        </p:nvSpPr>
+        <p:spPr>
+          <a:xfrm>
+            <a:off x="9686567" y="3393978"/>
+            <a:ext cx="732893" cy="461665"/>
+          </a:xfrm>
+          <a:prstGeom prst="rect">
+            <a:avLst/>
+          </a:prstGeom>
+          <a:noFill/>
+        </p:spPr>
+        <p:txBody>
+          <a:bodyPr wrap="none" lIns="91440" tIns="45720" rIns="91440" bIns="45720" rtlCol="0" anchor="t">
+            <a:spAutoFit/>
+          </a:bodyPr>
+          <a:lstStyle>
+            <a:defPPr>
+              <a:defRPr lang="en-US"/>
+            </a:defPPr>
+            <a:lvl1pPr marL="0" algn="l" defTabSz="914400" rtl="0" eaLnBrk="1" latinLnBrk="0" hangingPunct="1">
+              <a:defRPr sz="1800" kern="1200">
+                <a:solidFill>
+                  <a:schemeClr val="tx1"/>
+                </a:solidFill>
+                <a:latin typeface="+mn-lt"/>
+                <a:ea typeface="+mn-ea"/>
+                <a:cs typeface="+mn-cs"/>
+              </a:defRPr>
+            </a:lvl1pPr>
+            <a:lvl2pPr marL="457200" algn="l" defTabSz="914400" rtl="0" eaLnBrk="1" latinLnBrk="0" hangingPunct="1">
+              <a:defRPr sz="1800" kern="1200">
+                <a:solidFill>
+                  <a:schemeClr val="tx1"/>
+                </a:solidFill>
+                <a:latin typeface="+mn-lt"/>
+                <a:ea typeface="+mn-ea"/>
+                <a:cs typeface="+mn-cs"/>
+              </a:defRPr>
+            </a:lvl2pPr>
+            <a:lvl3pPr marL="914400" algn="l" defTabSz="914400" rtl="0" eaLnBrk="1" latinLnBrk="0" hangingPunct="1">
+              <a:defRPr sz="1800" kern="1200">
+                <a:solidFill>
+                  <a:schemeClr val="tx1"/>
+                </a:solidFill>
+                <a:latin typeface="+mn-lt"/>
+                <a:ea typeface="+mn-ea"/>
+                <a:cs typeface="+mn-cs"/>
+              </a:defRPr>
+            </a:lvl3pPr>
+            <a:lvl4pPr marL="1371600" algn="l" defTabSz="914400" rtl="0" eaLnBrk="1" latinLnBrk="0" hangingPunct="1">
+              <a:defRPr sz="1800" kern="1200">
+                <a:solidFill>
+                  <a:schemeClr val="tx1"/>
+                </a:solidFill>
+                <a:latin typeface="+mn-lt"/>
+                <a:ea typeface="+mn-ea"/>
+                <a:cs typeface="+mn-cs"/>
+              </a:defRPr>
+            </a:lvl4pPr>
+            <a:lvl5pPr marL="1828800" algn="l" defTabSz="914400" rtl="0" eaLnBrk="1" latinLnBrk="0" hangingPunct="1">
+              <a:defRPr sz="1800" kern="1200">
+                <a:solidFill>
+                  <a:schemeClr val="tx1"/>
+                </a:solidFill>
+                <a:latin typeface="+mn-lt"/>
+                <a:ea typeface="+mn-ea"/>
+                <a:cs typeface="+mn-cs"/>
+              </a:defRPr>
+            </a:lvl5pPr>
+            <a:lvl6pPr marL="2286000" algn="l" defTabSz="914400" rtl="0" eaLnBrk="1" latinLnBrk="0" hangingPunct="1">
+              <a:defRPr sz="1800" kern="1200">
+                <a:solidFill>
+                  <a:schemeClr val="tx1"/>
+                </a:solidFill>
+                <a:latin typeface="+mn-lt"/>
+                <a:ea typeface="+mn-ea"/>
+                <a:cs typeface="+mn-cs"/>
+              </a:defRPr>
+            </a:lvl6pPr>
+            <a:lvl7pPr marL="2743200" algn="l" defTabSz="914400" rtl="0" eaLnBrk="1" latinLnBrk="0" hangingPunct="1">
+              <a:defRPr sz="1800" kern="1200">
+                <a:solidFill>
+                  <a:schemeClr val="tx1"/>
+                </a:solidFill>
+                <a:latin typeface="+mn-lt"/>
+                <a:ea typeface="+mn-ea"/>
+                <a:cs typeface="+mn-cs"/>
+              </a:defRPr>
+            </a:lvl7pPr>
+            <a:lvl8pPr marL="3200400" algn="l" defTabSz="914400" rtl="0" eaLnBrk="1" latinLnBrk="0" hangingPunct="1">
+              <a:defRPr sz="1800" kern="1200">
+                <a:solidFill>
+                  <a:schemeClr val="tx1"/>
+                </a:solidFill>
+                <a:latin typeface="+mn-lt"/>
+                <a:ea typeface="+mn-ea"/>
+                <a:cs typeface="+mn-cs"/>
+              </a:defRPr>
+            </a:lvl8pPr>
+            <a:lvl9pPr marL="3657600" algn="l" defTabSz="914400" rtl="0" eaLnBrk="1" latinLnBrk="0" hangingPunct="1">
+              <a:defRPr sz="1800" kern="1200">
+                <a:solidFill>
+                  <a:schemeClr val="tx1"/>
+                </a:solidFill>
+                <a:latin typeface="+mn-lt"/>
+                <a:ea typeface="+mn-ea"/>
+                <a:cs typeface="+mn-cs"/>
+              </a:defRPr>
+            </a:lvl9pPr>
+          </a:lstStyle>
+          <a:p>
+            <a:r>
+              <a:rPr lang="fr-FR" sz="2400" b="1" dirty="0"/>
+              <a:t>13.5</a:t>
+            </a:r>
+            <a:endParaRPr lang="en-US" sz="2400" b="1" dirty="0"/>
+          </a:p>
+        </p:txBody>
+      </p:sp>
     </p:spTree>
     <p:extLst>
       <p:ext uri="{BB962C8B-B14F-4D97-AF65-F5344CB8AC3E}">
@@ -13905,25 +14153,44 @@
           </a:fontRef>
         </p:style>
         <p:txBody>
-          <a:bodyPr rtlCol="0" anchor="ctr"/>
+          <a:bodyPr lIns="91440" tIns="45720" rIns="91440" bIns="45720" rtlCol="0" anchor="ctr"/>
           <a:lstStyle/>
           <a:p>
             <a:pPr algn="ctr"/>
             <a:r>
-              <a:rPr lang="fr-FR" err="1"/>
+              <a:rPr lang="fr-FR" b="1" dirty="0" err="1"/>
               <a:t>flatmap</a:t>
             </a:r>
             <a:r>
-              <a:rPr lang="fr-FR"/>
-              <a:t>(x </a:t>
-            </a:r>
-            <a:r>
-              <a:rPr lang="fr-FR">
+              <a:rPr lang="fr-FR" b="1" dirty="0"/>
+              <a:t>(</a:t>
+            </a:r>
+            <a:r>
+              <a:rPr lang="fr-FR" b="1" dirty="0">
+                <a:ea typeface="+mn-lt"/>
+                <a:cs typeface="+mn-lt"/>
+              </a:rPr>
+              <a:t>lambda</a:t>
+            </a:r>
+            <a:r>
+              <a:rPr lang="fr-FR" b="1" dirty="0">
+                <a:ea typeface="+mn-lt"/>
+                <a:cs typeface="+mn-lt"/>
                 <a:sym typeface="Wingdings" panose="05000000000000000000" pitchFamily="2" charset="2"/>
               </a:rPr>
-              <a:t> x[‘genres’].split(‘;’))</a:t>
-            </a:r>
-            <a:endParaRPr lang="en-US"/>
+              <a:t> </a:t>
+            </a:r>
+            <a:r>
+              <a:rPr lang="fr-FR" b="1" dirty="0"/>
+              <a:t>x:</a:t>
+            </a:r>
+            <a:r>
+              <a:rPr lang="fr-FR" b="1" dirty="0">
+                <a:sym typeface="Wingdings" panose="05000000000000000000" pitchFamily="2" charset="2"/>
+              </a:rPr>
+              <a:t> x['genres'].split(';'))</a:t>
+            </a:r>
+            <a:endParaRPr lang="en-US" b="1" dirty="0"/>
           </a:p>
         </p:txBody>
       </p:sp>
@@ -14024,7 +14291,7 @@
           <p:nvPr>
             <p:extLst>
               <p:ext uri="{D42A27DB-BD31-4B8C-83A1-F6EECF244321}">
-                <p14:modId xmlns:p14="http://schemas.microsoft.com/office/powerpoint/2010/main" val="3247897374"/>
+                <p14:modId xmlns:p14="http://schemas.microsoft.com/office/powerpoint/2010/main" val="767747873"/>
               </p:ext>
             </p:extLst>
           </p:nvPr>
@@ -14054,11 +14321,16 @@
                     <a:bodyPr/>
                     <a:lstStyle/>
                     <a:p>
-                      <a:r>
-                        <a:rPr lang="fr-FR" sz="1600"/>
-                        <a:t>Row</a:t>
-                      </a:r>
-                      <a:endParaRPr lang="en-US" sz="1600"/>
+                      <a:pPr lvl="0">
+                        <a:buNone/>
+                      </a:pPr>
+                      <a:r>
+                        <a:rPr lang="fr-FR" sz="1600" b="1" i="0" u="none" strike="noStrike" noProof="0" dirty="0">
+                          <a:latin typeface="Calibri"/>
+                        </a:rPr>
+                        <a:t>RDD</a:t>
+                      </a:r>
+                      <a:endParaRPr lang="en-US" dirty="0"/>
                     </a:p>
                   </a:txBody>
                   <a:tcPr/>
@@ -14075,11 +14347,26 @@
                     <a:bodyPr/>
                     <a:lstStyle/>
                     <a:p>
-                      <a:r>
-                        <a:rPr lang="fr-FR" sz="1600"/>
+                      <a:pPr lvl="0">
+                        <a:buNone/>
+                      </a:pPr>
+                      <a:r>
+                        <a:rPr lang="fr-FR" sz="1600" b="0" i="0" u="none" strike="noStrike" noProof="0" dirty="0">
+                          <a:latin typeface="Calibri"/>
+                        </a:rPr>
+                        <a:t>"</a:t>
+                      </a:r>
+                      <a:r>
+                        <a:rPr lang="fr-FR" sz="1600" dirty="0"/>
                         <a:t>cyberpunk</a:t>
                       </a:r>
-                      <a:endParaRPr lang="en-US" sz="1600"/>
+                      <a:r>
+                        <a:rPr lang="fr-FR" sz="1600" b="0" i="0" u="none" strike="noStrike" noProof="0" dirty="0">
+                          <a:latin typeface="Calibri"/>
+                        </a:rPr>
+                        <a:t>"</a:t>
+                      </a:r>
+                      <a:endParaRPr lang="en-US" sz="1600" dirty="0"/>
                     </a:p>
                   </a:txBody>
                   <a:tcPr/>
@@ -14096,11 +14383,26 @@
                     <a:bodyPr/>
                     <a:lstStyle/>
                     <a:p>
-                      <a:r>
-                        <a:rPr lang="fr-FR" sz="1600" err="1"/>
+                      <a:pPr lvl="0">
+                        <a:buNone/>
+                      </a:pPr>
+                      <a:r>
+                        <a:rPr lang="fr-FR" sz="1600" b="0" i="0" u="none" strike="noStrike" noProof="0" dirty="0">
+                          <a:latin typeface="Calibri"/>
+                        </a:rPr>
+                        <a:t>"</a:t>
+                      </a:r>
+                      <a:r>
+                        <a:rPr lang="fr-FR" sz="1600" dirty="0" err="1"/>
                         <a:t>scifi</a:t>
                       </a:r>
-                      <a:endParaRPr lang="en-US" sz="1600"/>
+                      <a:r>
+                        <a:rPr lang="fr-FR" sz="1600" b="0" i="0" u="none" strike="noStrike" noProof="0" dirty="0">
+                          <a:latin typeface="Calibri"/>
+                        </a:rPr>
+                        <a:t>"</a:t>
+                      </a:r>
+                      <a:endParaRPr lang="en-US" sz="1600" dirty="0"/>
                     </a:p>
                   </a:txBody>
                   <a:tcPr/>
@@ -14117,7 +14419,7 @@
                     <a:bodyPr/>
                     <a:lstStyle/>
                     <a:p>
-                      <a:pPr marL="0" marR="0" lvl="0" indent="0" algn="l" defTabSz="914400" rtl="0" eaLnBrk="1" fontAlgn="auto" latinLnBrk="0" hangingPunct="1">
+                      <a:pPr marL="0" marR="0" lvl="0" indent="0" algn="l" defTabSz="914400">
                         <a:lnSpc>
                           <a:spcPct val="100000"/>
                         </a:lnSpc>
@@ -14127,18 +14429,27 @@
                         <a:spcAft>
                           <a:spcPts val="0"/>
                         </a:spcAft>
-                        <a:buClrTx/>
-                        <a:buSzTx/>
-                        <a:buFontTx/>
                         <a:buNone/>
                         <a:tabLst/>
                         <a:defRPr/>
                       </a:pPr>
                       <a:r>
-                        <a:rPr lang="fr-FR" sz="1600"/>
+                        <a:rPr lang="fr-FR" sz="1600" b="0" i="0" u="none" strike="noStrike" noProof="0" dirty="0">
+                          <a:latin typeface="Calibri"/>
+                        </a:rPr>
+                        <a:t>"</a:t>
+                      </a:r>
+                      <a:r>
+                        <a:rPr lang="fr-FR" sz="1600" dirty="0"/>
                         <a:t>action</a:t>
                       </a:r>
-                      <a:endParaRPr lang="en-US" sz="1600"/>
+                      <a:r>
+                        <a:rPr lang="fr-FR" sz="1600" b="0" i="0" u="none" strike="noStrike" noProof="0" dirty="0">
+                          <a:latin typeface="Calibri"/>
+                        </a:rPr>
+                        <a:t>"</a:t>
+                      </a:r>
+                      <a:endParaRPr lang="en-US" sz="1600" dirty="0"/>
                     </a:p>
                   </a:txBody>
                   <a:tcPr/>
@@ -14155,7 +14466,7 @@
                     <a:bodyPr/>
                     <a:lstStyle/>
                     <a:p>
-                      <a:pPr marL="0" marR="0" lvl="0" indent="0" algn="l" defTabSz="914400" rtl="0" eaLnBrk="1" fontAlgn="auto" latinLnBrk="0" hangingPunct="1">
+                      <a:pPr marL="0" marR="0" lvl="0" indent="0" algn="l" defTabSz="914400">
                         <a:lnSpc>
                           <a:spcPct val="100000"/>
                         </a:lnSpc>
@@ -14165,18 +14476,27 @@
                         <a:spcAft>
                           <a:spcPts val="0"/>
                         </a:spcAft>
-                        <a:buClrTx/>
-                        <a:buSzTx/>
-                        <a:buFontTx/>
                         <a:buNone/>
                         <a:tabLst/>
                         <a:defRPr/>
                       </a:pPr>
                       <a:r>
-                        <a:rPr lang="fr-FR" sz="1600"/>
+                        <a:rPr lang="fr-FR" sz="1600" b="0" i="0" u="none" strike="noStrike" noProof="0" dirty="0">
+                          <a:latin typeface="Calibri"/>
+                        </a:rPr>
+                        <a:t>"</a:t>
+                      </a:r>
+                      <a:r>
+                        <a:rPr lang="fr-FR" sz="1600" dirty="0"/>
                         <a:t>music</a:t>
                       </a:r>
-                      <a:endParaRPr lang="en-US" sz="1600"/>
+                      <a:r>
+                        <a:rPr lang="fr-FR" sz="1600" b="0" i="0" u="none" strike="noStrike" noProof="0" dirty="0">
+                          <a:latin typeface="Calibri"/>
+                        </a:rPr>
+                        <a:t>"</a:t>
+                      </a:r>
+                      <a:endParaRPr lang="en-US" dirty="0"/>
                     </a:p>
                   </a:txBody>
                   <a:tcPr/>
@@ -14193,7 +14513,7 @@
                     <a:bodyPr/>
                     <a:lstStyle/>
                     <a:p>
-                      <a:pPr marL="0" marR="0" lvl="0" indent="0" algn="l" defTabSz="914400" rtl="0" eaLnBrk="1" fontAlgn="auto" latinLnBrk="0" hangingPunct="1">
+                      <a:pPr marL="0" marR="0" lvl="0" indent="0" algn="l" defTabSz="914400">
                         <a:lnSpc>
                           <a:spcPct val="100000"/>
                         </a:lnSpc>
@@ -14203,18 +14523,27 @@
                         <a:spcAft>
                           <a:spcPts val="0"/>
                         </a:spcAft>
-                        <a:buClrTx/>
-                        <a:buSzTx/>
-                        <a:buFontTx/>
                         <a:buNone/>
                         <a:tabLst/>
                         <a:defRPr/>
                       </a:pPr>
                       <a:r>
-                        <a:rPr lang="fr-FR" sz="1600"/>
+                        <a:rPr lang="fr-FR" sz="1600" b="0" i="0" u="none" strike="noStrike" noProof="0" dirty="0">
+                          <a:latin typeface="Calibri"/>
+                        </a:rPr>
+                        <a:t>"</a:t>
+                      </a:r>
+                      <a:r>
+                        <a:rPr lang="fr-FR" sz="1600" dirty="0"/>
                         <a:t>danse</a:t>
                       </a:r>
-                      <a:endParaRPr lang="en-US" sz="1600"/>
+                      <a:r>
+                        <a:rPr lang="fr-FR" sz="1600" b="0" i="0" u="none" strike="noStrike" noProof="0" dirty="0">
+                          <a:latin typeface="Calibri"/>
+                        </a:rPr>
+                        <a:t>"</a:t>
+                      </a:r>
+                      <a:endParaRPr lang="en-US" sz="1600" dirty="0"/>
                     </a:p>
                   </a:txBody>
                   <a:tcPr/>
@@ -14231,7 +14560,7 @@
                     <a:bodyPr/>
                     <a:lstStyle/>
                     <a:p>
-                      <a:pPr marL="0" marR="0" lvl="0" indent="0" algn="l" defTabSz="914400" rtl="0" eaLnBrk="1" fontAlgn="auto" latinLnBrk="0" hangingPunct="1">
+                      <a:pPr marL="0" marR="0" lvl="0" indent="0" algn="l" defTabSz="914400">
                         <a:lnSpc>
                           <a:spcPct val="100000"/>
                         </a:lnSpc>
@@ -14241,18 +14570,27 @@
                         <a:spcAft>
                           <a:spcPts val="0"/>
                         </a:spcAft>
-                        <a:buClrTx/>
-                        <a:buSzTx/>
-                        <a:buFontTx/>
                         <a:buNone/>
                         <a:tabLst/>
                         <a:defRPr/>
                       </a:pPr>
                       <a:r>
-                        <a:rPr lang="fr-FR" sz="1600"/>
+                        <a:rPr lang="fr-FR" sz="1600" b="0" i="0" u="none" strike="noStrike" noProof="0" dirty="0">
+                          <a:latin typeface="Calibri"/>
+                        </a:rPr>
+                        <a:t>"</a:t>
+                      </a:r>
+                      <a:r>
+                        <a:rPr lang="fr-FR" sz="1600" dirty="0"/>
                         <a:t>romance</a:t>
                       </a:r>
-                      <a:endParaRPr lang="en-US" sz="1600"/>
+                      <a:r>
+                        <a:rPr lang="fr-FR" sz="1600" b="0" i="0" u="none" strike="noStrike" noProof="0" dirty="0">
+                          <a:latin typeface="Calibri"/>
+                        </a:rPr>
+                        <a:t>"</a:t>
+                      </a:r>
+                      <a:endParaRPr lang="en-US" sz="1600" dirty="0"/>
                     </a:p>
                   </a:txBody>
                   <a:tcPr/>
@@ -14282,7 +14620,7 @@
           <p:nvPr>
             <p:extLst>
               <p:ext uri="{D42A27DB-BD31-4B8C-83A1-F6EECF244321}">
-                <p14:modId xmlns:p14="http://schemas.microsoft.com/office/powerpoint/2010/main" val="2756594863"/>
+                <p14:modId xmlns:p14="http://schemas.microsoft.com/office/powerpoint/2010/main" val="908329871"/>
               </p:ext>
             </p:extLst>
           </p:nvPr>
@@ -14312,11 +14650,16 @@
                     <a:bodyPr/>
                     <a:lstStyle/>
                     <a:p>
-                      <a:r>
-                        <a:rPr lang="fr-FR" sz="1600"/>
-                        <a:t>Row</a:t>
-                      </a:r>
-                      <a:endParaRPr lang="en-US" sz="1600"/>
+                      <a:pPr lvl="0">
+                        <a:buNone/>
+                      </a:pPr>
+                      <a:r>
+                        <a:rPr lang="fr-FR" sz="1600" b="1" i="0" u="none" strike="noStrike" noProof="0" dirty="0">
+                          <a:latin typeface="Calibri"/>
+                        </a:rPr>
+                        <a:t>RDD</a:t>
+                      </a:r>
+                      <a:endParaRPr lang="en-US" dirty="0"/>
                     </a:p>
                   </a:txBody>
                   <a:tcPr/>
@@ -14334,24 +14677,24 @@
                     <a:lstStyle/>
                     <a:p>
                       <a:r>
-                        <a:rPr lang="en-US" sz="1600"/>
+                        <a:rPr lang="en-US" sz="1600" dirty="0"/>
                         <a:t>{"</a:t>
                       </a:r>
                       <a:r>
-                        <a:rPr lang="en-US" sz="1600" err="1"/>
+                        <a:rPr lang="en-US" sz="1600" dirty="0" err="1"/>
                         <a:t>movie":"Blade</a:t>
                       </a:r>
                       <a:r>
-                        <a:rPr lang="en-US" sz="1600"/>
-                        <a:t> Runner", “genres":”</a:t>
-                      </a:r>
-                      <a:r>
-                        <a:rPr lang="en-US" sz="1600" err="1"/>
+                        <a:rPr lang="en-US" sz="1600" dirty="0"/>
+                        <a:t> Runner", "genres":"</a:t>
+                      </a:r>
+                      <a:r>
+                        <a:rPr lang="en-US" sz="1600" dirty="0" err="1"/>
                         <a:t>cyberpunk|scifi|action</a:t>
                       </a:r>
                       <a:r>
-                        <a:rPr lang="en-US" sz="1600"/>
-                        <a:t>”}</a:t>
+                        <a:rPr lang="en-US" sz="1600" dirty="0"/>
+                        <a:t>"}</a:t>
                       </a:r>
                     </a:p>
                   </a:txBody>
@@ -14370,24 +14713,24 @@
                     <a:lstStyle/>
                     <a:p>
                       <a:r>
-                        <a:rPr lang="en-US" sz="1600"/>
+                        <a:rPr lang="en-US" sz="1600" dirty="0"/>
                         <a:t>{"</a:t>
                       </a:r>
                       <a:r>
-                        <a:rPr lang="en-US" sz="1600" err="1"/>
+                        <a:rPr lang="en-US" sz="1600" dirty="0" err="1"/>
                         <a:t>movie":"Dirty</a:t>
                       </a:r>
                       <a:r>
-                        <a:rPr lang="en-US" sz="1600"/>
-                        <a:t> dancing", “genres":”</a:t>
-                      </a:r>
-                      <a:r>
-                        <a:rPr lang="en-US" sz="1600" err="1"/>
+                        <a:rPr lang="en-US" sz="1600" dirty="0"/>
+                        <a:t> dancing", "genres":"</a:t>
+                      </a:r>
+                      <a:r>
+                        <a:rPr lang="en-US" sz="1600" dirty="0" err="1"/>
                         <a:t>music|danse|romance</a:t>
                       </a:r>
                       <a:r>
-                        <a:rPr lang="en-US" sz="1600"/>
-                        <a:t>”}</a:t>
+                        <a:rPr lang="en-US" sz="1600" dirty="0"/>
+                        <a:t>"}</a:t>
                       </a:r>
                     </a:p>
                   </a:txBody>
@@ -14417,7 +14760,7 @@
         </p:nvSpPr>
         <p:spPr>
           <a:xfrm>
-            <a:off x="5774996" y="2690336"/>
+            <a:off x="5578075" y="2801639"/>
             <a:ext cx="4408450" cy="1754326"/>
           </a:xfrm>
           <a:prstGeom prst="rect">

</xml_diff>